<commit_message>
update demo 1 with three unitary operation and the ppt and javagen
</commit_message>
<xml_diff>
--- a/src/project/demo/PLTFinalPresentation.pptx
+++ b/src/project/demo/PLTFinalPresentation.pptx
@@ -9,11 +9,12 @@
     <p:sldId id="257" r:id="rId3"/>
     <p:sldId id="258" r:id="rId4"/>
     <p:sldId id="259" r:id="rId5"/>
-    <p:sldId id="261" r:id="rId6"/>
-    <p:sldId id="262" r:id="rId7"/>
-    <p:sldId id="263" r:id="rId8"/>
-    <p:sldId id="264" r:id="rId9"/>
-    <p:sldId id="260" r:id="rId10"/>
+    <p:sldId id="265" r:id="rId6"/>
+    <p:sldId id="261" r:id="rId7"/>
+    <p:sldId id="262" r:id="rId8"/>
+    <p:sldId id="263" r:id="rId9"/>
+    <p:sldId id="264" r:id="rId10"/>
+    <p:sldId id="260" r:id="rId11"/>
   </p:sldIdLst>
   <p:sldSz cx="9144000" cy="6858000" type="screen4x3"/>
   <p:notesSz cx="6858000" cy="9144000"/>
@@ -3226,6 +3227,92 @@
 </p:sld>
 </file>
 
+<file path=ppt/slides/slide10.xml><?xml version="1.0" encoding="utf-8"?>
+<p:sld xmlns:a="http://schemas.openxmlformats.org/drawingml/2006/main" xmlns:r="http://schemas.openxmlformats.org/officeDocument/2006/relationships" xmlns:p="http://schemas.openxmlformats.org/presentationml/2006/main">
+  <p:cSld>
+    <p:spTree>
+      <p:nvGrpSpPr>
+        <p:cNvPr id="1" name=""/>
+        <p:cNvGrpSpPr/>
+        <p:nvPr/>
+      </p:nvGrpSpPr>
+      <p:grpSpPr>
+        <a:xfrm>
+          <a:off x="0" y="0"/>
+          <a:ext cx="0" cy="0"/>
+          <a:chOff x="0" y="0"/>
+          <a:chExt cx="0" cy="0"/>
+        </a:xfrm>
+      </p:grpSpPr>
+      <p:sp>
+        <p:nvSpPr>
+          <p:cNvPr id="2" name="Title 1"/>
+          <p:cNvSpPr>
+            <a:spLocks noGrp="1"/>
+          </p:cNvSpPr>
+          <p:nvPr>
+            <p:ph type="title"/>
+          </p:nvPr>
+        </p:nvSpPr>
+        <p:spPr/>
+        <p:txBody>
+          <a:bodyPr/>
+          <a:lstStyle/>
+          <a:p>
+            <a:r>
+              <a:rPr lang="en-US" dirty="0" smtClean="0"/>
+              <a:t>Black-Scholes equation  </a:t>
+            </a:r>
+            <a:endParaRPr lang="en-US" dirty="0"/>
+          </a:p>
+        </p:txBody>
+      </p:sp>
+      <p:pic>
+        <p:nvPicPr>
+          <p:cNvPr id="14" name="Content Placeholder 13" descr="Macintosh HD:Users:feiliu:Desktop:Screen Shot 2014-12-14 at 5.02.49 PM.png"/>
+          <p:cNvPicPr>
+            <a:picLocks noGrp="1"/>
+          </p:cNvPicPr>
+          <p:nvPr>
+            <p:ph idx="1"/>
+          </p:nvPr>
+        </p:nvPicPr>
+        <p:blipFill>
+          <a:blip r:embed="rId2">
+            <a:extLst>
+              <a:ext uri="{28A0092B-C50C-407E-A947-70E740481C1C}">
+                <a14:useLocalDpi xmlns:a14="http://schemas.microsoft.com/office/drawing/2010/main" val="0"/>
+              </a:ext>
+            </a:extLst>
+          </a:blip>
+          <a:srcRect t="-14473" b="-14473"/>
+          <a:stretch>
+            <a:fillRect/>
+          </a:stretch>
+        </p:blipFill>
+        <p:spPr bwMode="auto">
+          <a:prstGeom prst="rect">
+            <a:avLst/>
+          </a:prstGeom>
+          <a:noFill/>
+          <a:ln>
+            <a:noFill/>
+          </a:ln>
+        </p:spPr>
+      </p:pic>
+    </p:spTree>
+    <p:extLst>
+      <p:ext uri="{BB962C8B-B14F-4D97-AF65-F5344CB8AC3E}">
+        <p14:creationId xmlns:p14="http://schemas.microsoft.com/office/powerpoint/2010/main" val="2413541266"/>
+      </p:ext>
+    </p:extLst>
+  </p:cSld>
+  <p:clrMapOvr>
+    <a:masterClrMapping/>
+  </p:clrMapOvr>
+</p:sld>
+</file>
+
 <file path=ppt/slides/slide2.xml><?xml version="1.0" encoding="utf-8"?>
 <p:sld xmlns:a="http://schemas.openxmlformats.org/drawingml/2006/main" xmlns:r="http://schemas.openxmlformats.org/officeDocument/2006/relationships" xmlns:p="http://schemas.openxmlformats.org/presentationml/2006/main">
   <p:cSld>
@@ -3472,22 +3559,20 @@
           </a:p>
           <a:p>
             <a:r>
-              <a:rPr lang="fr-FR" sz="2000" dirty="0"/>
-              <a:t>  </a:t>
-            </a:r>
-            <a:r>
-              <a:rPr lang="fr-FR" sz="2000" dirty="0">
+              <a:rPr lang="tr-TR" sz="2000" b="1" dirty="0">
                 <a:solidFill>
                   <a:srgbClr val="FF0000"/>
                 </a:solidFill>
               </a:rPr>
-              <a:t>  m3 = (((m +. m) *. m) *.. 4)+.. 10;</a:t>
-            </a:r>
-          </a:p>
-          <a:p>
+              <a:t>m3 = (((m +. m') *. m~) *.. 4)+.. m^;</a:t>
+            </a:r>
+            <a:r>
+              <a:rPr lang="is-IS" sz="2000" dirty="0" smtClean="0"/>
+              <a:t>    </a:t>
+            </a:r>
             <a:r>
               <a:rPr lang="is-IS" sz="2000" dirty="0"/>
-              <a:t>    return m3;</a:t>
+              <a:t>return m3;</a:t>
             </a:r>
           </a:p>
           <a:p>
@@ -3993,15 +4078,7 @@
           <a:p>
             <a:r>
               <a:rPr lang="en-US" dirty="0" smtClean="0"/>
-              <a:t>“*”, “/”, “+.”, </a:t>
-            </a:r>
-            <a:r>
-              <a:rPr lang="en-US" dirty="0" smtClean="0"/>
-              <a:t>“-.”, “+..”, “-..”: primary type level, matrix level, and matrix &amp; primar</a:t>
-            </a:r>
-            <a:r>
-              <a:rPr lang="en-US" dirty="0" smtClean="0"/>
-              <a:t>y level</a:t>
+              <a:t>“*”, “/”, “+.”, “-.”, “+..”, “-..”: primary type level, matrix level, and matrix &amp; primary level</a:t>
             </a:r>
           </a:p>
           <a:p>
@@ -4054,11 +4131,7 @@
           <a:bodyPr/>
           <a:lstStyle/>
           <a:p>
-            <a:r>
-              <a:rPr lang="en-US" dirty="0" smtClean="0"/>
-              <a:t>Demo 2</a:t>
-            </a:r>
-            <a:endParaRPr lang="en-US" dirty="0"/>
+            <a:endParaRPr lang="en-US"/>
           </a:p>
         </p:txBody>
       </p:sp>
@@ -4072,410 +4145,19 @@
             <p:ph idx="1"/>
           </p:nvPr>
         </p:nvSpPr>
-        <p:spPr>
-          <a:xfrm>
-            <a:off x="457200" y="1631511"/>
-            <a:ext cx="3561376" cy="4494652"/>
-          </a:xfrm>
-        </p:spPr>
-        <p:txBody>
-          <a:bodyPr>
-            <a:normAutofit fontScale="85000" lnSpcReduction="10000"/>
-          </a:bodyPr>
-          <a:lstStyle/>
-          <a:p>
-            <a:r>
-              <a:rPr lang="en-US" u="sng" dirty="0" err="1"/>
-              <a:t>Int</a:t>
-            </a:r>
-            <a:r>
-              <a:rPr lang="en-US" u="sng" dirty="0"/>
-              <a:t> </a:t>
-            </a:r>
-            <a:r>
-              <a:rPr lang="en-US" u="sng" dirty="0" err="1"/>
-              <a:t>i</a:t>
-            </a:r>
-            <a:r>
-              <a:rPr lang="en-US" u="sng" dirty="0"/>
-              <a:t>;</a:t>
-            </a:r>
-          </a:p>
-          <a:p>
-            <a:r>
-              <a:rPr lang="en-US" dirty="0"/>
-              <a:t>Boolean b;</a:t>
-            </a:r>
-          </a:p>
-          <a:p>
-            <a:endParaRPr lang="en-US" dirty="0"/>
-          </a:p>
-          <a:p>
-            <a:r>
-              <a:rPr lang="en-US" dirty="0"/>
-              <a:t>Structure main2(</a:t>
-            </a:r>
-            <a:r>
-              <a:rPr lang="en-US" u="sng" dirty="0" err="1"/>
-              <a:t>Int</a:t>
-            </a:r>
-            <a:r>
-              <a:rPr lang="en-US" u="sng" dirty="0"/>
-              <a:t> </a:t>
-            </a:r>
-            <a:r>
-              <a:rPr lang="en-US" u="sng" dirty="0" err="1"/>
-              <a:t>argc</a:t>
-            </a:r>
-            <a:r>
-              <a:rPr lang="en-US" u="sng" dirty="0"/>
-              <a:t>, String </a:t>
-            </a:r>
-            <a:r>
-              <a:rPr lang="en-US" u="sng" dirty="0" err="1"/>
-              <a:t>argv</a:t>
-            </a:r>
-            <a:r>
-              <a:rPr lang="en-US" u="sng" dirty="0"/>
-              <a:t>) {</a:t>
-            </a:r>
-          </a:p>
-          <a:p>
-            <a:r>
-              <a:rPr lang="en-US" dirty="0"/>
-              <a:t>	Structure s={a="1", b= </a:t>
-            </a:r>
-            <a:r>
-              <a:rPr lang="en-US" dirty="0" err="1"/>
-              <a:t>toString</a:t>
-            </a:r>
-            <a:r>
-              <a:rPr lang="en-US" dirty="0"/>
-              <a:t>(</a:t>
-            </a:r>
-            <a:r>
-              <a:rPr lang="en-US" u="sng" dirty="0" err="1"/>
-              <a:t>argc</a:t>
-            </a:r>
-            <a:r>
-              <a:rPr lang="en-US" u="sng" dirty="0"/>
-              <a:t>)};</a:t>
-            </a:r>
-          </a:p>
-          <a:p>
-            <a:r>
-              <a:rPr lang="en-US" dirty="0"/>
-              <a:t>	</a:t>
-            </a:r>
-            <a:r>
-              <a:rPr lang="en-US" dirty="0" err="1"/>
-              <a:t>i</a:t>
-            </a:r>
-            <a:r>
-              <a:rPr lang="en-US" dirty="0"/>
-              <a:t>=</a:t>
-            </a:r>
-            <a:r>
-              <a:rPr lang="en-US" dirty="0" err="1"/>
-              <a:t>toInt</a:t>
-            </a:r>
-            <a:r>
-              <a:rPr lang="en-US" dirty="0"/>
-              <a:t>(s -&gt; a);</a:t>
-            </a:r>
-          </a:p>
-          <a:p>
-            <a:r>
-              <a:rPr lang="en-US" dirty="0"/>
-              <a:t>	return s;</a:t>
-            </a:r>
-          </a:p>
-          <a:p>
-            <a:r>
-              <a:rPr lang="en-US" dirty="0"/>
-              <a:t>}</a:t>
-            </a:r>
-          </a:p>
-        </p:txBody>
-      </p:sp>
-      <p:sp>
-        <p:nvSpPr>
-          <p:cNvPr id="4" name="Content Placeholder 2"/>
-          <p:cNvSpPr txBox="1">
-            <a:spLocks/>
-          </p:cNvSpPr>
-          <p:nvPr/>
-        </p:nvSpPr>
-        <p:spPr>
-          <a:xfrm>
-            <a:off x="4418975" y="1631511"/>
-            <a:ext cx="4267825" cy="4087463"/>
-          </a:xfrm>
-          <a:prstGeom prst="rect">
-            <a:avLst/>
-          </a:prstGeom>
-        </p:spPr>
-        <p:txBody>
-          <a:bodyPr vert="horz" lIns="91440" tIns="45720" rIns="91440" bIns="45720" rtlCol="0">
-            <a:normAutofit fontScale="85000" lnSpcReduction="20000"/>
-          </a:bodyPr>
-          <a:lstStyle>
-            <a:lvl1pPr marL="342900" indent="-342900" algn="l" defTabSz="457200" rtl="0" eaLnBrk="1" latinLnBrk="0" hangingPunct="1">
-              <a:spcBef>
-                <a:spcPct val="20000"/>
-              </a:spcBef>
-              <a:buFont typeface="Arial"/>
-              <a:buChar char="•"/>
-              <a:defRPr sz="3200" kern="1200">
-                <a:solidFill>
-                  <a:schemeClr val="tx1"/>
-                </a:solidFill>
-                <a:latin typeface="+mn-lt"/>
-                <a:ea typeface="+mn-ea"/>
-                <a:cs typeface="+mn-cs"/>
-              </a:defRPr>
-            </a:lvl1pPr>
-            <a:lvl2pPr marL="742950" indent="-285750" algn="l" defTabSz="457200" rtl="0" eaLnBrk="1" latinLnBrk="0" hangingPunct="1">
-              <a:spcBef>
-                <a:spcPct val="20000"/>
-              </a:spcBef>
-              <a:buFont typeface="Arial"/>
-              <a:buChar char="–"/>
-              <a:defRPr sz="2800" kern="1200">
-                <a:solidFill>
-                  <a:schemeClr val="tx1"/>
-                </a:solidFill>
-                <a:latin typeface="+mn-lt"/>
-                <a:ea typeface="+mn-ea"/>
-                <a:cs typeface="+mn-cs"/>
-              </a:defRPr>
-            </a:lvl2pPr>
-            <a:lvl3pPr marL="1143000" indent="-228600" algn="l" defTabSz="457200" rtl="0" eaLnBrk="1" latinLnBrk="0" hangingPunct="1">
-              <a:spcBef>
-                <a:spcPct val="20000"/>
-              </a:spcBef>
-              <a:buFont typeface="Arial"/>
-              <a:buChar char="•"/>
-              <a:defRPr sz="2400" kern="1200">
-                <a:solidFill>
-                  <a:schemeClr val="tx1"/>
-                </a:solidFill>
-                <a:latin typeface="+mn-lt"/>
-                <a:ea typeface="+mn-ea"/>
-                <a:cs typeface="+mn-cs"/>
-              </a:defRPr>
-            </a:lvl3pPr>
-            <a:lvl4pPr marL="1600200" indent="-228600" algn="l" defTabSz="457200" rtl="0" eaLnBrk="1" latinLnBrk="0" hangingPunct="1">
-              <a:spcBef>
-                <a:spcPct val="20000"/>
-              </a:spcBef>
-              <a:buFont typeface="Arial"/>
-              <a:buChar char="–"/>
-              <a:defRPr sz="2000" kern="1200">
-                <a:solidFill>
-                  <a:schemeClr val="tx1"/>
-                </a:solidFill>
-                <a:latin typeface="+mn-lt"/>
-                <a:ea typeface="+mn-ea"/>
-                <a:cs typeface="+mn-cs"/>
-              </a:defRPr>
-            </a:lvl4pPr>
-            <a:lvl5pPr marL="2057400" indent="-228600" algn="l" defTabSz="457200" rtl="0" eaLnBrk="1" latinLnBrk="0" hangingPunct="1">
-              <a:spcBef>
-                <a:spcPct val="20000"/>
-              </a:spcBef>
-              <a:buFont typeface="Arial"/>
-              <a:buChar char="»"/>
-              <a:defRPr sz="2000" kern="1200">
-                <a:solidFill>
-                  <a:schemeClr val="tx1"/>
-                </a:solidFill>
-                <a:latin typeface="+mn-lt"/>
-                <a:ea typeface="+mn-ea"/>
-                <a:cs typeface="+mn-cs"/>
-              </a:defRPr>
-            </a:lvl5pPr>
-            <a:lvl6pPr marL="2514600" indent="-228600" algn="l" defTabSz="457200" rtl="0" eaLnBrk="1" latinLnBrk="0" hangingPunct="1">
-              <a:spcBef>
-                <a:spcPct val="20000"/>
-              </a:spcBef>
-              <a:buFont typeface="Arial"/>
-              <a:buChar char="•"/>
-              <a:defRPr sz="2000" kern="1200">
-                <a:solidFill>
-                  <a:schemeClr val="tx1"/>
-                </a:solidFill>
-                <a:latin typeface="+mn-lt"/>
-                <a:ea typeface="+mn-ea"/>
-                <a:cs typeface="+mn-cs"/>
-              </a:defRPr>
-            </a:lvl6pPr>
-            <a:lvl7pPr marL="2971800" indent="-228600" algn="l" defTabSz="457200" rtl="0" eaLnBrk="1" latinLnBrk="0" hangingPunct="1">
-              <a:spcBef>
-                <a:spcPct val="20000"/>
-              </a:spcBef>
-              <a:buFont typeface="Arial"/>
-              <a:buChar char="•"/>
-              <a:defRPr sz="2000" kern="1200">
-                <a:solidFill>
-                  <a:schemeClr val="tx1"/>
-                </a:solidFill>
-                <a:latin typeface="+mn-lt"/>
-                <a:ea typeface="+mn-ea"/>
-                <a:cs typeface="+mn-cs"/>
-              </a:defRPr>
-            </a:lvl7pPr>
-            <a:lvl8pPr marL="3429000" indent="-228600" algn="l" defTabSz="457200" rtl="0" eaLnBrk="1" latinLnBrk="0" hangingPunct="1">
-              <a:spcBef>
-                <a:spcPct val="20000"/>
-              </a:spcBef>
-              <a:buFont typeface="Arial"/>
-              <a:buChar char="•"/>
-              <a:defRPr sz="2000" kern="1200">
-                <a:solidFill>
-                  <a:schemeClr val="tx1"/>
-                </a:solidFill>
-                <a:latin typeface="+mn-lt"/>
-                <a:ea typeface="+mn-ea"/>
-                <a:cs typeface="+mn-cs"/>
-              </a:defRPr>
-            </a:lvl8pPr>
-            <a:lvl9pPr marL="3886200" indent="-228600" algn="l" defTabSz="457200" rtl="0" eaLnBrk="1" latinLnBrk="0" hangingPunct="1">
-              <a:spcBef>
-                <a:spcPct val="20000"/>
-              </a:spcBef>
-              <a:buFont typeface="Arial"/>
-              <a:buChar char="•"/>
-              <a:defRPr sz="2000" kern="1200">
-                <a:solidFill>
-                  <a:schemeClr val="tx1"/>
-                </a:solidFill>
-                <a:latin typeface="+mn-lt"/>
-                <a:ea typeface="+mn-ea"/>
-                <a:cs typeface="+mn-cs"/>
-              </a:defRPr>
-            </a:lvl9pPr>
-          </a:lstStyle>
-          <a:p>
-            <a:r>
-              <a:rPr lang="en-US" u="sng" dirty="0" err="1" smtClean="0"/>
-              <a:t>Int</a:t>
-            </a:r>
-            <a:r>
-              <a:rPr lang="en-US" u="sng" dirty="0" smtClean="0"/>
-              <a:t> </a:t>
-            </a:r>
-            <a:r>
-              <a:rPr lang="en-US" u="sng" dirty="0" err="1" smtClean="0"/>
-              <a:t>i</a:t>
-            </a:r>
-            <a:r>
-              <a:rPr lang="en-US" u="sng" dirty="0" smtClean="0"/>
-              <a:t>;</a:t>
-            </a:r>
-          </a:p>
-          <a:p>
-            <a:r>
-              <a:rPr lang="en-US" dirty="0" smtClean="0"/>
-              <a:t>Boolean b;</a:t>
-            </a:r>
-          </a:p>
-          <a:p>
-            <a:endParaRPr lang="en-US" dirty="0" smtClean="0"/>
-          </a:p>
-          <a:p>
-            <a:r>
-              <a:rPr lang="en-US" dirty="0" smtClean="0"/>
-              <a:t>Structure main2(</a:t>
-            </a:r>
-            <a:r>
-              <a:rPr lang="en-US" u="sng" dirty="0" err="1" smtClean="0"/>
-              <a:t>Int</a:t>
-            </a:r>
-            <a:r>
-              <a:rPr lang="en-US" u="sng" dirty="0" smtClean="0"/>
-              <a:t> </a:t>
-            </a:r>
-            <a:r>
-              <a:rPr lang="en-US" u="sng" dirty="0" err="1" smtClean="0"/>
-              <a:t>argc</a:t>
-            </a:r>
-            <a:r>
-              <a:rPr lang="en-US" u="sng" dirty="0" smtClean="0"/>
-              <a:t>, String </a:t>
-            </a:r>
-            <a:r>
-              <a:rPr lang="en-US" u="sng" dirty="0" err="1" smtClean="0"/>
-              <a:t>argv</a:t>
-            </a:r>
-            <a:r>
-              <a:rPr lang="en-US" u="sng" dirty="0" smtClean="0"/>
-              <a:t>) {</a:t>
-            </a:r>
-          </a:p>
-          <a:p>
-            <a:r>
-              <a:rPr lang="en-US" dirty="0" smtClean="0"/>
-              <a:t>	Structure s={a="1", b= </a:t>
-            </a:r>
-            <a:r>
-              <a:rPr lang="en-US" dirty="0" err="1" smtClean="0"/>
-              <a:t>toString</a:t>
-            </a:r>
-            <a:r>
-              <a:rPr lang="en-US" dirty="0" smtClean="0"/>
-              <a:t>(</a:t>
-            </a:r>
-            <a:r>
-              <a:rPr lang="en-US" u="sng" dirty="0" err="1" smtClean="0"/>
-              <a:t>argc</a:t>
-            </a:r>
-            <a:r>
-              <a:rPr lang="en-US" u="sng" dirty="0" smtClean="0"/>
-              <a:t>)};</a:t>
-            </a:r>
-          </a:p>
-          <a:p>
-            <a:r>
-              <a:rPr lang="en-US" dirty="0" smtClean="0"/>
-              <a:t>	</a:t>
-            </a:r>
-            <a:r>
-              <a:rPr lang="en-US" dirty="0" err="1" smtClean="0"/>
-              <a:t>i</a:t>
-            </a:r>
-            <a:r>
-              <a:rPr lang="en-US" dirty="0" smtClean="0"/>
-              <a:t>=</a:t>
-            </a:r>
-            <a:r>
-              <a:rPr lang="en-US" dirty="0" err="1" smtClean="0"/>
-              <a:t>toInt</a:t>
-            </a:r>
-            <a:r>
-              <a:rPr lang="en-US" dirty="0" smtClean="0"/>
-              <a:t>(s -&gt; a);</a:t>
-            </a:r>
-          </a:p>
-          <a:p>
-            <a:r>
-              <a:rPr lang="en-US" dirty="0" smtClean="0"/>
-              <a:t>	return s;</a:t>
-            </a:r>
-          </a:p>
-          <a:p>
-            <a:r>
-              <a:rPr lang="en-US" dirty="0" smtClean="0"/>
-              <a:t>}</a:t>
-            </a:r>
-            <a:endParaRPr lang="en-US" dirty="0"/>
+        <p:spPr/>
+        <p:txBody>
+          <a:bodyPr/>
+          <a:lstStyle/>
+          <a:p>
+            <a:endParaRPr lang="en-US"/>
           </a:p>
         </p:txBody>
       </p:sp>
     </p:spTree>
     <p:extLst>
       <p:ext uri="{BB962C8B-B14F-4D97-AF65-F5344CB8AC3E}">
-        <p14:creationId xmlns:p14="http://schemas.microsoft.com/office/powerpoint/2010/main" val="2232852458"/>
+        <p14:creationId xmlns:p14="http://schemas.microsoft.com/office/powerpoint/2010/main" val="1845401701"/>
       </p:ext>
     </p:extLst>
   </p:cSld>
@@ -4519,7 +4201,7 @@
           <a:p>
             <a:r>
               <a:rPr lang="en-US" dirty="0" smtClean="0"/>
-              <a:t>Structure holds customized data</a:t>
+              <a:t>Demo 2</a:t>
             </a:r>
             <a:endParaRPr lang="en-US" dirty="0"/>
           </a:p>
@@ -4535,56 +4217,401 @@
             <p:ph idx="1"/>
           </p:nvPr>
         </p:nvSpPr>
-        <p:spPr/>
+        <p:spPr>
+          <a:xfrm>
+            <a:off x="457200" y="1631511"/>
+            <a:ext cx="3561376" cy="4494652"/>
+          </a:xfrm>
+        </p:spPr>
         <p:txBody>
           <a:bodyPr>
-            <a:normAutofit/>
+            <a:normAutofit fontScale="85000" lnSpcReduction="10000"/>
           </a:bodyPr>
           <a:lstStyle/>
           <a:p>
             <a:r>
-              <a:rPr lang="en-US" b="1" dirty="0" smtClean="0">
-                <a:solidFill>
-                  <a:srgbClr val="FF0000"/>
-                </a:solidFill>
-              </a:rPr>
-              <a:t>Universal</a:t>
-            </a:r>
+              <a:rPr lang="en-US" u="sng" dirty="0" err="1"/>
+              <a:t>Int</a:t>
+            </a:r>
+            <a:r>
+              <a:rPr lang="en-US" u="sng" dirty="0"/>
+              <a:t> </a:t>
+            </a:r>
+            <a:r>
+              <a:rPr lang="en-US" u="sng" dirty="0" err="1"/>
+              <a:t>i</a:t>
+            </a:r>
+            <a:r>
+              <a:rPr lang="en-US" u="sng" dirty="0"/>
+              <a:t>;</a:t>
+            </a:r>
+          </a:p>
+          <a:p>
+            <a:r>
+              <a:rPr lang="en-US" dirty="0"/>
+              <a:t>Boolean b;</a:t>
+            </a:r>
+          </a:p>
+          <a:p>
+            <a:endParaRPr lang="en-US" dirty="0"/>
+          </a:p>
+          <a:p>
+            <a:r>
+              <a:rPr lang="en-US" dirty="0"/>
+              <a:t>Structure main2(</a:t>
+            </a:r>
+            <a:r>
+              <a:rPr lang="en-US" u="sng" dirty="0" err="1"/>
+              <a:t>Int</a:t>
+            </a:r>
+            <a:r>
+              <a:rPr lang="en-US" u="sng" dirty="0"/>
+              <a:t> </a:t>
+            </a:r>
+            <a:r>
+              <a:rPr lang="en-US" u="sng" dirty="0" err="1"/>
+              <a:t>argc</a:t>
+            </a:r>
+            <a:r>
+              <a:rPr lang="en-US" u="sng" dirty="0"/>
+              <a:t>, String </a:t>
+            </a:r>
+            <a:r>
+              <a:rPr lang="en-US" u="sng" dirty="0" err="1"/>
+              <a:t>argv</a:t>
+            </a:r>
+            <a:r>
+              <a:rPr lang="en-US" u="sng" dirty="0"/>
+              <a:t>) {</a:t>
+            </a:r>
+          </a:p>
+          <a:p>
+            <a:r>
+              <a:rPr lang="en-US" dirty="0"/>
+              <a:t>	Structure s={a="1", b= </a:t>
+            </a:r>
+            <a:r>
+              <a:rPr lang="en-US" dirty="0" err="1"/>
+              <a:t>toString</a:t>
+            </a:r>
+            <a:r>
+              <a:rPr lang="en-US" dirty="0"/>
+              <a:t>(</a:t>
+            </a:r>
+            <a:r>
+              <a:rPr lang="en-US" u="sng" dirty="0" err="1"/>
+              <a:t>argc</a:t>
+            </a:r>
+            <a:r>
+              <a:rPr lang="en-US" u="sng" dirty="0"/>
+              <a:t>)};</a:t>
+            </a:r>
+          </a:p>
+          <a:p>
+            <a:r>
+              <a:rPr lang="en-US" dirty="0"/>
+              <a:t>	</a:t>
+            </a:r>
+            <a:r>
+              <a:rPr lang="en-US" dirty="0" err="1"/>
+              <a:t>i</a:t>
+            </a:r>
+            <a:r>
+              <a:rPr lang="en-US" dirty="0"/>
+              <a:t>=</a:t>
+            </a:r>
+            <a:r>
+              <a:rPr lang="en-US" dirty="0" err="1"/>
+              <a:t>toInt</a:t>
+            </a:r>
+            <a:r>
+              <a:rPr lang="en-US" dirty="0"/>
+              <a:t>(s -&gt; a);</a:t>
+            </a:r>
+          </a:p>
+          <a:p>
+            <a:r>
+              <a:rPr lang="en-US" dirty="0"/>
+              <a:t>	return s;</a:t>
+            </a:r>
+          </a:p>
+          <a:p>
+            <a:r>
+              <a:rPr lang="en-US" dirty="0"/>
+              <a:t>}</a:t>
+            </a:r>
+          </a:p>
+        </p:txBody>
+      </p:sp>
+      <p:sp>
+        <p:nvSpPr>
+          <p:cNvPr id="4" name="Content Placeholder 2"/>
+          <p:cNvSpPr txBox="1">
+            <a:spLocks/>
+          </p:cNvSpPr>
+          <p:nvPr/>
+        </p:nvSpPr>
+        <p:spPr>
+          <a:xfrm>
+            <a:off x="4418975" y="1631511"/>
+            <a:ext cx="4267825" cy="4087463"/>
+          </a:xfrm>
+          <a:prstGeom prst="rect">
+            <a:avLst/>
+          </a:prstGeom>
+        </p:spPr>
+        <p:txBody>
+          <a:bodyPr vert="horz" lIns="91440" tIns="45720" rIns="91440" bIns="45720" rtlCol="0">
+            <a:normAutofit fontScale="85000" lnSpcReduction="20000"/>
+          </a:bodyPr>
+          <a:lstStyle>
+            <a:lvl1pPr marL="342900" indent="-342900" algn="l" defTabSz="457200" rtl="0" eaLnBrk="1" latinLnBrk="0" hangingPunct="1">
+              <a:spcBef>
+                <a:spcPct val="20000"/>
+              </a:spcBef>
+              <a:buFont typeface="Arial"/>
+              <a:buChar char="•"/>
+              <a:defRPr sz="3200" kern="1200">
+                <a:solidFill>
+                  <a:schemeClr val="tx1"/>
+                </a:solidFill>
+                <a:latin typeface="+mn-lt"/>
+                <a:ea typeface="+mn-ea"/>
+                <a:cs typeface="+mn-cs"/>
+              </a:defRPr>
+            </a:lvl1pPr>
+            <a:lvl2pPr marL="742950" indent="-285750" algn="l" defTabSz="457200" rtl="0" eaLnBrk="1" latinLnBrk="0" hangingPunct="1">
+              <a:spcBef>
+                <a:spcPct val="20000"/>
+              </a:spcBef>
+              <a:buFont typeface="Arial"/>
+              <a:buChar char="–"/>
+              <a:defRPr sz="2800" kern="1200">
+                <a:solidFill>
+                  <a:schemeClr val="tx1"/>
+                </a:solidFill>
+                <a:latin typeface="+mn-lt"/>
+                <a:ea typeface="+mn-ea"/>
+                <a:cs typeface="+mn-cs"/>
+              </a:defRPr>
+            </a:lvl2pPr>
+            <a:lvl3pPr marL="1143000" indent="-228600" algn="l" defTabSz="457200" rtl="0" eaLnBrk="1" latinLnBrk="0" hangingPunct="1">
+              <a:spcBef>
+                <a:spcPct val="20000"/>
+              </a:spcBef>
+              <a:buFont typeface="Arial"/>
+              <a:buChar char="•"/>
+              <a:defRPr sz="2400" kern="1200">
+                <a:solidFill>
+                  <a:schemeClr val="tx1"/>
+                </a:solidFill>
+                <a:latin typeface="+mn-lt"/>
+                <a:ea typeface="+mn-ea"/>
+                <a:cs typeface="+mn-cs"/>
+              </a:defRPr>
+            </a:lvl3pPr>
+            <a:lvl4pPr marL="1600200" indent="-228600" algn="l" defTabSz="457200" rtl="0" eaLnBrk="1" latinLnBrk="0" hangingPunct="1">
+              <a:spcBef>
+                <a:spcPct val="20000"/>
+              </a:spcBef>
+              <a:buFont typeface="Arial"/>
+              <a:buChar char="–"/>
+              <a:defRPr sz="2000" kern="1200">
+                <a:solidFill>
+                  <a:schemeClr val="tx1"/>
+                </a:solidFill>
+                <a:latin typeface="+mn-lt"/>
+                <a:ea typeface="+mn-ea"/>
+                <a:cs typeface="+mn-cs"/>
+              </a:defRPr>
+            </a:lvl4pPr>
+            <a:lvl5pPr marL="2057400" indent="-228600" algn="l" defTabSz="457200" rtl="0" eaLnBrk="1" latinLnBrk="0" hangingPunct="1">
+              <a:spcBef>
+                <a:spcPct val="20000"/>
+              </a:spcBef>
+              <a:buFont typeface="Arial"/>
+              <a:buChar char="»"/>
+              <a:defRPr sz="2000" kern="1200">
+                <a:solidFill>
+                  <a:schemeClr val="tx1"/>
+                </a:solidFill>
+                <a:latin typeface="+mn-lt"/>
+                <a:ea typeface="+mn-ea"/>
+                <a:cs typeface="+mn-cs"/>
+              </a:defRPr>
+            </a:lvl5pPr>
+            <a:lvl6pPr marL="2514600" indent="-228600" algn="l" defTabSz="457200" rtl="0" eaLnBrk="1" latinLnBrk="0" hangingPunct="1">
+              <a:spcBef>
+                <a:spcPct val="20000"/>
+              </a:spcBef>
+              <a:buFont typeface="Arial"/>
+              <a:buChar char="•"/>
+              <a:defRPr sz="2000" kern="1200">
+                <a:solidFill>
+                  <a:schemeClr val="tx1"/>
+                </a:solidFill>
+                <a:latin typeface="+mn-lt"/>
+                <a:ea typeface="+mn-ea"/>
+                <a:cs typeface="+mn-cs"/>
+              </a:defRPr>
+            </a:lvl6pPr>
+            <a:lvl7pPr marL="2971800" indent="-228600" algn="l" defTabSz="457200" rtl="0" eaLnBrk="1" latinLnBrk="0" hangingPunct="1">
+              <a:spcBef>
+                <a:spcPct val="20000"/>
+              </a:spcBef>
+              <a:buFont typeface="Arial"/>
+              <a:buChar char="•"/>
+              <a:defRPr sz="2000" kern="1200">
+                <a:solidFill>
+                  <a:schemeClr val="tx1"/>
+                </a:solidFill>
+                <a:latin typeface="+mn-lt"/>
+                <a:ea typeface="+mn-ea"/>
+                <a:cs typeface="+mn-cs"/>
+              </a:defRPr>
+            </a:lvl7pPr>
+            <a:lvl8pPr marL="3429000" indent="-228600" algn="l" defTabSz="457200" rtl="0" eaLnBrk="1" latinLnBrk="0" hangingPunct="1">
+              <a:spcBef>
+                <a:spcPct val="20000"/>
+              </a:spcBef>
+              <a:buFont typeface="Arial"/>
+              <a:buChar char="•"/>
+              <a:defRPr sz="2000" kern="1200">
+                <a:solidFill>
+                  <a:schemeClr val="tx1"/>
+                </a:solidFill>
+                <a:latin typeface="+mn-lt"/>
+                <a:ea typeface="+mn-ea"/>
+                <a:cs typeface="+mn-cs"/>
+              </a:defRPr>
+            </a:lvl8pPr>
+            <a:lvl9pPr marL="3886200" indent="-228600" algn="l" defTabSz="457200" rtl="0" eaLnBrk="1" latinLnBrk="0" hangingPunct="1">
+              <a:spcBef>
+                <a:spcPct val="20000"/>
+              </a:spcBef>
+              <a:buFont typeface="Arial"/>
+              <a:buChar char="•"/>
+              <a:defRPr sz="2000" kern="1200">
+                <a:solidFill>
+                  <a:schemeClr val="tx1"/>
+                </a:solidFill>
+                <a:latin typeface="+mn-lt"/>
+                <a:ea typeface="+mn-ea"/>
+                <a:cs typeface="+mn-cs"/>
+              </a:defRPr>
+            </a:lvl9pPr>
+          </a:lstStyle>
+          <a:p>
+            <a:r>
+              <a:rPr lang="en-US" u="sng" dirty="0" err="1" smtClean="0"/>
+              <a:t>Int</a:t>
+            </a:r>
+            <a:r>
+              <a:rPr lang="en-US" u="sng" dirty="0" smtClean="0"/>
+              <a:t> </a:t>
+            </a:r>
+            <a:r>
+              <a:rPr lang="en-US" u="sng" dirty="0" err="1" smtClean="0"/>
+              <a:t>i</a:t>
+            </a:r>
+            <a:r>
+              <a:rPr lang="en-US" u="sng" dirty="0" smtClean="0"/>
+              <a:t>;</a:t>
+            </a:r>
+          </a:p>
+          <a:p>
             <a:r>
               <a:rPr lang="en-US" dirty="0" smtClean="0"/>
-              <a:t>:  Anything that can be expressed as a String. Can be a String or a variable of String type</a:t>
-            </a:r>
-          </a:p>
-          <a:p>
-            <a:r>
-              <a:rPr lang="en-US" b="1" dirty="0" smtClean="0">
-                <a:solidFill>
-                  <a:srgbClr val="FF0000"/>
-                </a:solidFill>
-              </a:rPr>
-              <a:t>No Overhead</a:t>
-            </a:r>
+              <a:t>Boolean b;</a:t>
+            </a:r>
+          </a:p>
+          <a:p>
+            <a:endParaRPr lang="en-US" dirty="0" smtClean="0"/>
+          </a:p>
+          <a:p>
             <a:r>
               <a:rPr lang="en-US" dirty="0" smtClean="0"/>
-              <a:t>: Anything your care to use without OOP overhead that a financial user does not care to know</a:t>
-            </a:r>
-          </a:p>
-          <a:p>
-            <a:r>
-              <a:rPr lang="en-US" b="1" dirty="0" smtClean="0">
-                <a:solidFill>
-                  <a:srgbClr val="FF0000"/>
-                </a:solidFill>
-              </a:rPr>
-              <a:t>Extensibility</a:t>
-            </a:r>
+              <a:t>Structure main2(</a:t>
+            </a:r>
+            <a:r>
+              <a:rPr lang="en-US" u="sng" dirty="0" err="1" smtClean="0"/>
+              <a:t>Int</a:t>
+            </a:r>
+            <a:r>
+              <a:rPr lang="en-US" u="sng" dirty="0" smtClean="0"/>
+              <a:t> </a:t>
+            </a:r>
+            <a:r>
+              <a:rPr lang="en-US" u="sng" dirty="0" err="1" smtClean="0"/>
+              <a:t>argc</a:t>
+            </a:r>
+            <a:r>
+              <a:rPr lang="en-US" u="sng" dirty="0" smtClean="0"/>
+              <a:t>, String </a:t>
+            </a:r>
+            <a:r>
+              <a:rPr lang="en-US" u="sng" dirty="0" err="1" smtClean="0"/>
+              <a:t>argv</a:t>
+            </a:r>
+            <a:r>
+              <a:rPr lang="en-US" u="sng" dirty="0" smtClean="0"/>
+              <a:t>) {</a:t>
+            </a:r>
+          </a:p>
+          <a:p>
             <a:r>
               <a:rPr lang="en-US" dirty="0" smtClean="0"/>
-              <a:t>: Easily extended to other disciplinary without much </a:t>
+              <a:t>	Structure s={a="1", b= </a:t>
             </a:r>
             <a:r>
               <a:rPr lang="en-US" dirty="0" err="1" smtClean="0"/>
-              <a:t>efford</a:t>
+              <a:t>toString</a:t>
+            </a:r>
+            <a:r>
+              <a:rPr lang="en-US" dirty="0" smtClean="0"/>
+              <a:t>(</a:t>
+            </a:r>
+            <a:r>
+              <a:rPr lang="en-US" u="sng" dirty="0" err="1" smtClean="0"/>
+              <a:t>argc</a:t>
+            </a:r>
+            <a:r>
+              <a:rPr lang="en-US" u="sng" dirty="0" smtClean="0"/>
+              <a:t>)};</a:t>
+            </a:r>
+          </a:p>
+          <a:p>
+            <a:r>
+              <a:rPr lang="en-US" dirty="0" smtClean="0"/>
+              <a:t>	</a:t>
+            </a:r>
+            <a:r>
+              <a:rPr lang="en-US" dirty="0" err="1" smtClean="0"/>
+              <a:t>i</a:t>
+            </a:r>
+            <a:r>
+              <a:rPr lang="en-US" dirty="0" smtClean="0"/>
+              <a:t>=</a:t>
+            </a:r>
+            <a:r>
+              <a:rPr lang="en-US" dirty="0" err="1" smtClean="0"/>
+              <a:t>toInt</a:t>
+            </a:r>
+            <a:r>
+              <a:rPr lang="en-US" dirty="0" smtClean="0"/>
+              <a:t>(s -&gt; a);</a:t>
+            </a:r>
+          </a:p>
+          <a:p>
+            <a:r>
+              <a:rPr lang="en-US" dirty="0" smtClean="0"/>
+              <a:t>	return s;</a:t>
+            </a:r>
+          </a:p>
+          <a:p>
+            <a:r>
+              <a:rPr lang="en-US" dirty="0" smtClean="0"/>
+              <a:t>}</a:t>
             </a:r>
             <a:endParaRPr lang="en-US" dirty="0"/>
           </a:p>
@@ -4593,7 +4620,7 @@
     </p:spTree>
     <p:extLst>
       <p:ext uri="{BB962C8B-B14F-4D97-AF65-F5344CB8AC3E}">
-        <p14:creationId xmlns:p14="http://schemas.microsoft.com/office/powerpoint/2010/main" val="2054147495"/>
+        <p14:creationId xmlns:p14="http://schemas.microsoft.com/office/powerpoint/2010/main" val="2232852458"/>
       </p:ext>
     </p:extLst>
   </p:cSld>
@@ -4637,7 +4664,7 @@
           <a:p>
             <a:r>
               <a:rPr lang="en-US" dirty="0" smtClean="0"/>
-              <a:t>Demo 3</a:t>
+              <a:t>Structure holds customized data</a:t>
             </a:r>
             <a:endParaRPr lang="en-US" dirty="0"/>
           </a:p>
@@ -4653,349 +4680,65 @@
             <p:ph idx="1"/>
           </p:nvPr>
         </p:nvSpPr>
-        <p:spPr>
-          <a:xfrm>
-            <a:off x="457200" y="1448128"/>
-            <a:ext cx="4361612" cy="5030275"/>
-          </a:xfrm>
-        </p:spPr>
+        <p:spPr/>
         <p:txBody>
           <a:bodyPr>
-            <a:normAutofit fontScale="85000" lnSpcReduction="10000"/>
+            <a:normAutofit/>
           </a:bodyPr>
           <a:lstStyle/>
           <a:p>
             <a:r>
-              <a:rPr lang="en-US" dirty="0"/>
-              <a:t>Float </a:t>
-            </a:r>
-            <a:r>
-              <a:rPr lang="en-US" dirty="0" err="1"/>
-              <a:t>i</a:t>
-            </a:r>
-            <a:r>
-              <a:rPr lang="en-US" dirty="0"/>
-              <a:t>;</a:t>
-            </a:r>
-          </a:p>
-          <a:p>
+              <a:rPr lang="en-US" b="1" dirty="0" smtClean="0">
+                <a:solidFill>
+                  <a:srgbClr val="FF0000"/>
+                </a:solidFill>
+              </a:rPr>
+              <a:t>Universal</a:t>
+            </a:r>
             <a:r>
               <a:rPr lang="en-US" dirty="0" smtClean="0"/>
-              <a:t>Option </a:t>
-            </a:r>
-            <a:r>
-              <a:rPr lang="en-US" dirty="0"/>
-              <a:t>main2(</a:t>
-            </a:r>
-            <a:r>
-              <a:rPr lang="en-US" u="sng" dirty="0" err="1"/>
-              <a:t>Int</a:t>
-            </a:r>
-            <a:r>
-              <a:rPr lang="en-US" u="sng" dirty="0"/>
-              <a:t> </a:t>
-            </a:r>
-            <a:r>
-              <a:rPr lang="en-US" u="sng" dirty="0" err="1"/>
-              <a:t>argc</a:t>
-            </a:r>
-            <a:r>
-              <a:rPr lang="en-US" u="sng" dirty="0"/>
-              <a:t>, String </a:t>
-            </a:r>
-            <a:r>
-              <a:rPr lang="en-US" u="sng" dirty="0" err="1"/>
-              <a:t>argv</a:t>
-            </a:r>
-            <a:r>
-              <a:rPr lang="en-US" u="sng" dirty="0"/>
-              <a:t>) {</a:t>
-            </a:r>
-          </a:p>
-          <a:p>
-            <a:r>
-              <a:rPr lang="en-US" dirty="0"/>
-              <a:t>	Option s={strike="100.0", stock= "150.0", </a:t>
-            </a:r>
-            <a:r>
-              <a:rPr lang="en-US" dirty="0" err="1"/>
-              <a:t>interestRate</a:t>
-            </a:r>
-            <a:r>
-              <a:rPr lang="en-US" dirty="0"/>
-              <a:t>="0.1", period="1.0", </a:t>
-            </a:r>
-            <a:r>
-              <a:rPr lang="en-US" u="sng" dirty="0"/>
-              <a:t>sigma="2.0", </a:t>
-            </a:r>
-            <a:r>
-              <a:rPr lang="en-US" u="sng" dirty="0" err="1"/>
-              <a:t>optionType</a:t>
-            </a:r>
-            <a:r>
-              <a:rPr lang="en-US" u="sng" dirty="0"/>
-              <a:t>="call"};</a:t>
-            </a:r>
-          </a:p>
-          <a:p>
-            <a:r>
-              <a:rPr lang="en-US" dirty="0"/>
-              <a:t>	</a:t>
-            </a:r>
-            <a:r>
-              <a:rPr lang="en-US" dirty="0" err="1"/>
-              <a:t>i</a:t>
-            </a:r>
-            <a:r>
-              <a:rPr lang="en-US" dirty="0"/>
-              <a:t>=</a:t>
-            </a:r>
-            <a:r>
-              <a:rPr lang="en-US" dirty="0" err="1"/>
-              <a:t>toFloat</a:t>
-            </a:r>
-            <a:r>
-              <a:rPr lang="en-US" dirty="0"/>
-              <a:t>(s -&gt; strike);</a:t>
-            </a:r>
-          </a:p>
-          <a:p>
-            <a:r>
-              <a:rPr lang="en-US" dirty="0"/>
-              <a:t>	return s;</a:t>
-            </a:r>
-          </a:p>
-          <a:p>
-            <a:r>
-              <a:rPr lang="en-US" dirty="0"/>
-              <a:t>}</a:t>
-            </a:r>
-          </a:p>
-        </p:txBody>
-      </p:sp>
-      <p:sp>
-        <p:nvSpPr>
-          <p:cNvPr id="4" name="Content Placeholder 2"/>
-          <p:cNvSpPr txBox="1">
-            <a:spLocks/>
-          </p:cNvSpPr>
-          <p:nvPr/>
-        </p:nvSpPr>
-        <p:spPr>
-          <a:xfrm>
-            <a:off x="4354574" y="1448128"/>
-            <a:ext cx="4789426" cy="4525963"/>
-          </a:xfrm>
-          <a:prstGeom prst="rect">
-            <a:avLst/>
-          </a:prstGeom>
-        </p:spPr>
-        <p:txBody>
-          <a:bodyPr vert="horz" lIns="91440" tIns="45720" rIns="91440" bIns="45720" rtlCol="0">
-            <a:normAutofit lnSpcReduction="10000"/>
-          </a:bodyPr>
-          <a:lstStyle>
-            <a:lvl1pPr marL="342900" indent="-342900" algn="l" defTabSz="457200" rtl="0" eaLnBrk="1" latinLnBrk="0" hangingPunct="1">
-              <a:spcBef>
-                <a:spcPct val="20000"/>
-              </a:spcBef>
-              <a:buFont typeface="Arial"/>
-              <a:buChar char="•"/>
-              <a:defRPr sz="3200" kern="1200">
-                <a:solidFill>
-                  <a:schemeClr val="tx1"/>
-                </a:solidFill>
-                <a:latin typeface="+mn-lt"/>
-                <a:ea typeface="+mn-ea"/>
-                <a:cs typeface="+mn-cs"/>
-              </a:defRPr>
-            </a:lvl1pPr>
-            <a:lvl2pPr marL="742950" indent="-285750" algn="l" defTabSz="457200" rtl="0" eaLnBrk="1" latinLnBrk="0" hangingPunct="1">
-              <a:spcBef>
-                <a:spcPct val="20000"/>
-              </a:spcBef>
-              <a:buFont typeface="Arial"/>
-              <a:buChar char="–"/>
-              <a:defRPr sz="2800" kern="1200">
-                <a:solidFill>
-                  <a:schemeClr val="tx1"/>
-                </a:solidFill>
-                <a:latin typeface="+mn-lt"/>
-                <a:ea typeface="+mn-ea"/>
-                <a:cs typeface="+mn-cs"/>
-              </a:defRPr>
-            </a:lvl2pPr>
-            <a:lvl3pPr marL="1143000" indent="-228600" algn="l" defTabSz="457200" rtl="0" eaLnBrk="1" latinLnBrk="0" hangingPunct="1">
-              <a:spcBef>
-                <a:spcPct val="20000"/>
-              </a:spcBef>
-              <a:buFont typeface="Arial"/>
-              <a:buChar char="•"/>
-              <a:defRPr sz="2400" kern="1200">
-                <a:solidFill>
-                  <a:schemeClr val="tx1"/>
-                </a:solidFill>
-                <a:latin typeface="+mn-lt"/>
-                <a:ea typeface="+mn-ea"/>
-                <a:cs typeface="+mn-cs"/>
-              </a:defRPr>
-            </a:lvl3pPr>
-            <a:lvl4pPr marL="1600200" indent="-228600" algn="l" defTabSz="457200" rtl="0" eaLnBrk="1" latinLnBrk="0" hangingPunct="1">
-              <a:spcBef>
-                <a:spcPct val="20000"/>
-              </a:spcBef>
-              <a:buFont typeface="Arial"/>
-              <a:buChar char="–"/>
-              <a:defRPr sz="2000" kern="1200">
-                <a:solidFill>
-                  <a:schemeClr val="tx1"/>
-                </a:solidFill>
-                <a:latin typeface="+mn-lt"/>
-                <a:ea typeface="+mn-ea"/>
-                <a:cs typeface="+mn-cs"/>
-              </a:defRPr>
-            </a:lvl4pPr>
-            <a:lvl5pPr marL="2057400" indent="-228600" algn="l" defTabSz="457200" rtl="0" eaLnBrk="1" latinLnBrk="0" hangingPunct="1">
-              <a:spcBef>
-                <a:spcPct val="20000"/>
-              </a:spcBef>
-              <a:buFont typeface="Arial"/>
-              <a:buChar char="»"/>
-              <a:defRPr sz="2000" kern="1200">
-                <a:solidFill>
-                  <a:schemeClr val="tx1"/>
-                </a:solidFill>
-                <a:latin typeface="+mn-lt"/>
-                <a:ea typeface="+mn-ea"/>
-                <a:cs typeface="+mn-cs"/>
-              </a:defRPr>
-            </a:lvl5pPr>
-            <a:lvl6pPr marL="2514600" indent="-228600" algn="l" defTabSz="457200" rtl="0" eaLnBrk="1" latinLnBrk="0" hangingPunct="1">
-              <a:spcBef>
-                <a:spcPct val="20000"/>
-              </a:spcBef>
-              <a:buFont typeface="Arial"/>
-              <a:buChar char="•"/>
-              <a:defRPr sz="2000" kern="1200">
-                <a:solidFill>
-                  <a:schemeClr val="tx1"/>
-                </a:solidFill>
-                <a:latin typeface="+mn-lt"/>
-                <a:ea typeface="+mn-ea"/>
-                <a:cs typeface="+mn-cs"/>
-              </a:defRPr>
-            </a:lvl6pPr>
-            <a:lvl7pPr marL="2971800" indent="-228600" algn="l" defTabSz="457200" rtl="0" eaLnBrk="1" latinLnBrk="0" hangingPunct="1">
-              <a:spcBef>
-                <a:spcPct val="20000"/>
-              </a:spcBef>
-              <a:buFont typeface="Arial"/>
-              <a:buChar char="•"/>
-              <a:defRPr sz="2000" kern="1200">
-                <a:solidFill>
-                  <a:schemeClr val="tx1"/>
-                </a:solidFill>
-                <a:latin typeface="+mn-lt"/>
-                <a:ea typeface="+mn-ea"/>
-                <a:cs typeface="+mn-cs"/>
-              </a:defRPr>
-            </a:lvl7pPr>
-            <a:lvl8pPr marL="3429000" indent="-228600" algn="l" defTabSz="457200" rtl="0" eaLnBrk="1" latinLnBrk="0" hangingPunct="1">
-              <a:spcBef>
-                <a:spcPct val="20000"/>
-              </a:spcBef>
-              <a:buFont typeface="Arial"/>
-              <a:buChar char="•"/>
-              <a:defRPr sz="2000" kern="1200">
-                <a:solidFill>
-                  <a:schemeClr val="tx1"/>
-                </a:solidFill>
-                <a:latin typeface="+mn-lt"/>
-                <a:ea typeface="+mn-ea"/>
-                <a:cs typeface="+mn-cs"/>
-              </a:defRPr>
-            </a:lvl8pPr>
-            <a:lvl9pPr marL="3886200" indent="-228600" algn="l" defTabSz="457200" rtl="0" eaLnBrk="1" latinLnBrk="0" hangingPunct="1">
-              <a:spcBef>
-                <a:spcPct val="20000"/>
-              </a:spcBef>
-              <a:buFont typeface="Arial"/>
-              <a:buChar char="•"/>
-              <a:defRPr sz="2000" kern="1200">
-                <a:solidFill>
-                  <a:schemeClr val="tx1"/>
-                </a:solidFill>
-                <a:latin typeface="+mn-lt"/>
-                <a:ea typeface="+mn-ea"/>
-                <a:cs typeface="+mn-cs"/>
-              </a:defRPr>
-            </a:lvl9pPr>
-          </a:lstStyle>
-          <a:p>
-            <a:r>
-              <a:rPr lang="en-US" dirty="0"/>
-              <a:t>Void main(</a:t>
-            </a:r>
-            <a:r>
-              <a:rPr lang="en-US" u="sng" dirty="0" err="1"/>
-              <a:t>Int</a:t>
-            </a:r>
-            <a:r>
-              <a:rPr lang="en-US" u="sng" dirty="0"/>
-              <a:t> argc2, String m) {</a:t>
-            </a:r>
-          </a:p>
-          <a:p>
-            <a:r>
-              <a:rPr lang="en-US" dirty="0"/>
-              <a:t>	Option result={};</a:t>
-            </a:r>
-          </a:p>
-          <a:p>
-            <a:r>
-              <a:rPr lang="en-US" dirty="0"/>
-              <a:t>	result=main2(0, "</a:t>
-            </a:r>
-            <a:r>
-              <a:rPr lang="en-US" u="sng" dirty="0" err="1"/>
-              <a:t>str</a:t>
-            </a:r>
-            <a:r>
-              <a:rPr lang="en-US" u="sng" dirty="0"/>
-              <a:t>");</a:t>
-            </a:r>
-          </a:p>
-          <a:p>
-            <a:r>
-              <a:rPr lang="en-US" dirty="0"/>
-              <a:t>	Float d;</a:t>
-            </a:r>
-          </a:p>
-          <a:p>
-            <a:r>
-              <a:rPr lang="en-US" dirty="0"/>
-              <a:t>	d=price(result);</a:t>
-            </a:r>
-          </a:p>
-          <a:p>
-            <a:r>
-              <a:rPr lang="en-US" dirty="0"/>
-              <a:t>	print(d);</a:t>
-            </a:r>
-          </a:p>
-          <a:p>
-            <a:r>
-              <a:rPr lang="en-US" dirty="0"/>
-              <a:t>}</a:t>
-            </a:r>
+              <a:t>:  Anything that can be expressed as a String. Can be a String or a variable of String type</a:t>
+            </a:r>
+          </a:p>
+          <a:p>
+            <a:r>
+              <a:rPr lang="en-US" b="1" dirty="0" smtClean="0">
+                <a:solidFill>
+                  <a:srgbClr val="FF0000"/>
+                </a:solidFill>
+              </a:rPr>
+              <a:t>No Overhead</a:t>
+            </a:r>
+            <a:r>
+              <a:rPr lang="en-US" dirty="0" smtClean="0"/>
+              <a:t>: Anything your care to use without OOP overhead that a financial user does not care to know</a:t>
+            </a:r>
+          </a:p>
+          <a:p>
+            <a:r>
+              <a:rPr lang="en-US" b="1" dirty="0" smtClean="0">
+                <a:solidFill>
+                  <a:srgbClr val="FF0000"/>
+                </a:solidFill>
+              </a:rPr>
+              <a:t>Extensibility</a:t>
+            </a:r>
+            <a:r>
+              <a:rPr lang="en-US" dirty="0" smtClean="0"/>
+              <a:t>: Easily extended to other disciplinary without much </a:t>
+            </a:r>
+            <a:r>
+              <a:rPr lang="en-US" dirty="0" err="1" smtClean="0"/>
+              <a:t>efford</a:t>
+            </a:r>
+            <a:endParaRPr lang="en-US" dirty="0"/>
           </a:p>
         </p:txBody>
       </p:sp>
     </p:spTree>
     <p:extLst>
       <p:ext uri="{BB962C8B-B14F-4D97-AF65-F5344CB8AC3E}">
-        <p14:creationId xmlns:p14="http://schemas.microsoft.com/office/powerpoint/2010/main" val="1991617179"/>
+        <p14:creationId xmlns:p14="http://schemas.microsoft.com/office/powerpoint/2010/main" val="2054147495"/>
       </p:ext>
     </p:extLst>
   </p:cSld>
@@ -5039,7 +4782,7 @@
           <a:p>
             <a:r>
               <a:rPr lang="en-US" dirty="0" smtClean="0"/>
-              <a:t>In Financial District</a:t>
+              <a:t>Demo 3</a:t>
             </a:r>
             <a:endParaRPr lang="en-US" dirty="0"/>
           </a:p>
@@ -5055,39 +4798,341 @@
             <p:ph idx="1"/>
           </p:nvPr>
         </p:nvSpPr>
-        <p:spPr/>
-        <p:txBody>
-          <a:bodyPr/>
-          <a:lstStyle/>
+        <p:spPr>
+          <a:xfrm>
+            <a:off x="457200" y="1448128"/>
+            <a:ext cx="4361612" cy="5030275"/>
+          </a:xfrm>
+        </p:spPr>
+        <p:txBody>
+          <a:bodyPr>
+            <a:normAutofit fontScale="85000" lnSpcReduction="10000"/>
+          </a:bodyPr>
+          <a:lstStyle/>
+          <a:p>
+            <a:r>
+              <a:rPr lang="en-US" dirty="0"/>
+              <a:t>Float </a:t>
+            </a:r>
+            <a:r>
+              <a:rPr lang="en-US" dirty="0" err="1"/>
+              <a:t>i</a:t>
+            </a:r>
+            <a:r>
+              <a:rPr lang="en-US" dirty="0"/>
+              <a:t>;</a:t>
+            </a:r>
+          </a:p>
           <a:p>
             <a:r>
               <a:rPr lang="en-US" dirty="0" smtClean="0"/>
-              <a:t>Easy to use: One of the application of extensible language</a:t>
-            </a:r>
-          </a:p>
-          <a:p>
-            <a:endParaRPr lang="en-US" dirty="0" smtClean="0"/>
-          </a:p>
-          <a:p>
-            <a:r>
-              <a:rPr lang="en-US" dirty="0" smtClean="0"/>
-              <a:t>Make complex things easy:</a:t>
+              <a:t>Option </a:t>
             </a:r>
             <a:r>
               <a:rPr lang="en-US" dirty="0"/>
+              <a:t>main2(</a:t>
+            </a:r>
+            <a:r>
+              <a:rPr lang="en-US" u="sng" dirty="0" err="1"/>
+              <a:t>Int</a:t>
+            </a:r>
+            <a:r>
+              <a:rPr lang="en-US" u="sng" dirty="0"/>
               <a:t> </a:t>
             </a:r>
             <a:r>
-              <a:rPr lang="en-US" dirty="0" smtClean="0"/>
-              <a:t>Don’t know Black-</a:t>
-            </a:r>
-            <a:r>
-              <a:rPr lang="en-US" dirty="0" err="1" smtClean="0"/>
-              <a:t>Shole</a:t>
-            </a:r>
-            <a:r>
-              <a:rPr lang="en-US" dirty="0" smtClean="0"/>
-              <a:t> or anything alike.</a:t>
+              <a:rPr lang="en-US" u="sng" dirty="0" err="1"/>
+              <a:t>argc</a:t>
+            </a:r>
+            <a:r>
+              <a:rPr lang="en-US" u="sng" dirty="0"/>
+              <a:t>, String </a:t>
+            </a:r>
+            <a:r>
+              <a:rPr lang="en-US" u="sng" dirty="0" err="1"/>
+              <a:t>argv</a:t>
+            </a:r>
+            <a:r>
+              <a:rPr lang="en-US" u="sng" dirty="0"/>
+              <a:t>) {</a:t>
+            </a:r>
+          </a:p>
+          <a:p>
+            <a:r>
+              <a:rPr lang="en-US" dirty="0"/>
+              <a:t>	Option s={strike="100.0", stock= "150.0", </a:t>
+            </a:r>
+            <a:r>
+              <a:rPr lang="en-US" dirty="0" err="1"/>
+              <a:t>interestRate</a:t>
+            </a:r>
+            <a:r>
+              <a:rPr lang="en-US" dirty="0"/>
+              <a:t>="0.1", period="1.0", </a:t>
+            </a:r>
+            <a:r>
+              <a:rPr lang="en-US" u="sng" dirty="0"/>
+              <a:t>sigma="2.0", </a:t>
+            </a:r>
+            <a:r>
+              <a:rPr lang="en-US" u="sng" dirty="0" err="1"/>
+              <a:t>optionType</a:t>
+            </a:r>
+            <a:r>
+              <a:rPr lang="en-US" u="sng" dirty="0"/>
+              <a:t>="call"};</a:t>
+            </a:r>
+          </a:p>
+          <a:p>
+            <a:r>
+              <a:rPr lang="en-US" dirty="0"/>
+              <a:t>	</a:t>
+            </a:r>
+            <a:r>
+              <a:rPr lang="en-US" dirty="0" err="1"/>
+              <a:t>i</a:t>
+            </a:r>
+            <a:r>
+              <a:rPr lang="en-US" dirty="0"/>
+              <a:t>=</a:t>
+            </a:r>
+            <a:r>
+              <a:rPr lang="en-US" dirty="0" err="1"/>
+              <a:t>toFloat</a:t>
+            </a:r>
+            <a:r>
+              <a:rPr lang="en-US" dirty="0"/>
+              <a:t>(s -&gt; strike);</a:t>
+            </a:r>
+          </a:p>
+          <a:p>
+            <a:r>
+              <a:rPr lang="en-US" dirty="0"/>
+              <a:t>	return s;</a:t>
+            </a:r>
+          </a:p>
+          <a:p>
+            <a:r>
+              <a:rPr lang="en-US" dirty="0"/>
+              <a:t>}</a:t>
+            </a:r>
+          </a:p>
+        </p:txBody>
+      </p:sp>
+      <p:sp>
+        <p:nvSpPr>
+          <p:cNvPr id="4" name="Content Placeholder 2"/>
+          <p:cNvSpPr txBox="1">
+            <a:spLocks/>
+          </p:cNvSpPr>
+          <p:nvPr/>
+        </p:nvSpPr>
+        <p:spPr>
+          <a:xfrm>
+            <a:off x="4354574" y="1448128"/>
+            <a:ext cx="4789426" cy="4525963"/>
+          </a:xfrm>
+          <a:prstGeom prst="rect">
+            <a:avLst/>
+          </a:prstGeom>
+        </p:spPr>
+        <p:txBody>
+          <a:bodyPr vert="horz" lIns="91440" tIns="45720" rIns="91440" bIns="45720" rtlCol="0">
+            <a:normAutofit lnSpcReduction="10000"/>
+          </a:bodyPr>
+          <a:lstStyle>
+            <a:lvl1pPr marL="342900" indent="-342900" algn="l" defTabSz="457200" rtl="0" eaLnBrk="1" latinLnBrk="0" hangingPunct="1">
+              <a:spcBef>
+                <a:spcPct val="20000"/>
+              </a:spcBef>
+              <a:buFont typeface="Arial"/>
+              <a:buChar char="•"/>
+              <a:defRPr sz="3200" kern="1200">
+                <a:solidFill>
+                  <a:schemeClr val="tx1"/>
+                </a:solidFill>
+                <a:latin typeface="+mn-lt"/>
+                <a:ea typeface="+mn-ea"/>
+                <a:cs typeface="+mn-cs"/>
+              </a:defRPr>
+            </a:lvl1pPr>
+            <a:lvl2pPr marL="742950" indent="-285750" algn="l" defTabSz="457200" rtl="0" eaLnBrk="1" latinLnBrk="0" hangingPunct="1">
+              <a:spcBef>
+                <a:spcPct val="20000"/>
+              </a:spcBef>
+              <a:buFont typeface="Arial"/>
+              <a:buChar char="–"/>
+              <a:defRPr sz="2800" kern="1200">
+                <a:solidFill>
+                  <a:schemeClr val="tx1"/>
+                </a:solidFill>
+                <a:latin typeface="+mn-lt"/>
+                <a:ea typeface="+mn-ea"/>
+                <a:cs typeface="+mn-cs"/>
+              </a:defRPr>
+            </a:lvl2pPr>
+            <a:lvl3pPr marL="1143000" indent="-228600" algn="l" defTabSz="457200" rtl="0" eaLnBrk="1" latinLnBrk="0" hangingPunct="1">
+              <a:spcBef>
+                <a:spcPct val="20000"/>
+              </a:spcBef>
+              <a:buFont typeface="Arial"/>
+              <a:buChar char="•"/>
+              <a:defRPr sz="2400" kern="1200">
+                <a:solidFill>
+                  <a:schemeClr val="tx1"/>
+                </a:solidFill>
+                <a:latin typeface="+mn-lt"/>
+                <a:ea typeface="+mn-ea"/>
+                <a:cs typeface="+mn-cs"/>
+              </a:defRPr>
+            </a:lvl3pPr>
+            <a:lvl4pPr marL="1600200" indent="-228600" algn="l" defTabSz="457200" rtl="0" eaLnBrk="1" latinLnBrk="0" hangingPunct="1">
+              <a:spcBef>
+                <a:spcPct val="20000"/>
+              </a:spcBef>
+              <a:buFont typeface="Arial"/>
+              <a:buChar char="–"/>
+              <a:defRPr sz="2000" kern="1200">
+                <a:solidFill>
+                  <a:schemeClr val="tx1"/>
+                </a:solidFill>
+                <a:latin typeface="+mn-lt"/>
+                <a:ea typeface="+mn-ea"/>
+                <a:cs typeface="+mn-cs"/>
+              </a:defRPr>
+            </a:lvl4pPr>
+            <a:lvl5pPr marL="2057400" indent="-228600" algn="l" defTabSz="457200" rtl="0" eaLnBrk="1" latinLnBrk="0" hangingPunct="1">
+              <a:spcBef>
+                <a:spcPct val="20000"/>
+              </a:spcBef>
+              <a:buFont typeface="Arial"/>
+              <a:buChar char="»"/>
+              <a:defRPr sz="2000" kern="1200">
+                <a:solidFill>
+                  <a:schemeClr val="tx1"/>
+                </a:solidFill>
+                <a:latin typeface="+mn-lt"/>
+                <a:ea typeface="+mn-ea"/>
+                <a:cs typeface="+mn-cs"/>
+              </a:defRPr>
+            </a:lvl5pPr>
+            <a:lvl6pPr marL="2514600" indent="-228600" algn="l" defTabSz="457200" rtl="0" eaLnBrk="1" latinLnBrk="0" hangingPunct="1">
+              <a:spcBef>
+                <a:spcPct val="20000"/>
+              </a:spcBef>
+              <a:buFont typeface="Arial"/>
+              <a:buChar char="•"/>
+              <a:defRPr sz="2000" kern="1200">
+                <a:solidFill>
+                  <a:schemeClr val="tx1"/>
+                </a:solidFill>
+                <a:latin typeface="+mn-lt"/>
+                <a:ea typeface="+mn-ea"/>
+                <a:cs typeface="+mn-cs"/>
+              </a:defRPr>
+            </a:lvl6pPr>
+            <a:lvl7pPr marL="2971800" indent="-228600" algn="l" defTabSz="457200" rtl="0" eaLnBrk="1" latinLnBrk="0" hangingPunct="1">
+              <a:spcBef>
+                <a:spcPct val="20000"/>
+              </a:spcBef>
+              <a:buFont typeface="Arial"/>
+              <a:buChar char="•"/>
+              <a:defRPr sz="2000" kern="1200">
+                <a:solidFill>
+                  <a:schemeClr val="tx1"/>
+                </a:solidFill>
+                <a:latin typeface="+mn-lt"/>
+                <a:ea typeface="+mn-ea"/>
+                <a:cs typeface="+mn-cs"/>
+              </a:defRPr>
+            </a:lvl7pPr>
+            <a:lvl8pPr marL="3429000" indent="-228600" algn="l" defTabSz="457200" rtl="0" eaLnBrk="1" latinLnBrk="0" hangingPunct="1">
+              <a:spcBef>
+                <a:spcPct val="20000"/>
+              </a:spcBef>
+              <a:buFont typeface="Arial"/>
+              <a:buChar char="•"/>
+              <a:defRPr sz="2000" kern="1200">
+                <a:solidFill>
+                  <a:schemeClr val="tx1"/>
+                </a:solidFill>
+                <a:latin typeface="+mn-lt"/>
+                <a:ea typeface="+mn-ea"/>
+                <a:cs typeface="+mn-cs"/>
+              </a:defRPr>
+            </a:lvl8pPr>
+            <a:lvl9pPr marL="3886200" indent="-228600" algn="l" defTabSz="457200" rtl="0" eaLnBrk="1" latinLnBrk="0" hangingPunct="1">
+              <a:spcBef>
+                <a:spcPct val="20000"/>
+              </a:spcBef>
+              <a:buFont typeface="Arial"/>
+              <a:buChar char="•"/>
+              <a:defRPr sz="2000" kern="1200">
+                <a:solidFill>
+                  <a:schemeClr val="tx1"/>
+                </a:solidFill>
+                <a:latin typeface="+mn-lt"/>
+                <a:ea typeface="+mn-ea"/>
+                <a:cs typeface="+mn-cs"/>
+              </a:defRPr>
+            </a:lvl9pPr>
+          </a:lstStyle>
+          <a:p>
+            <a:r>
+              <a:rPr lang="en-US" dirty="0"/>
+              <a:t>Void main(</a:t>
+            </a:r>
+            <a:r>
+              <a:rPr lang="en-US" u="sng" dirty="0" err="1"/>
+              <a:t>Int</a:t>
+            </a:r>
+            <a:r>
+              <a:rPr lang="en-US" u="sng" dirty="0"/>
+              <a:t> argc2, String m) {</a:t>
+            </a:r>
+          </a:p>
+          <a:p>
+            <a:r>
+              <a:rPr lang="en-US" dirty="0"/>
+              <a:t>	Option result={};</a:t>
+            </a:r>
+          </a:p>
+          <a:p>
+            <a:r>
+              <a:rPr lang="en-US" dirty="0"/>
+              <a:t>	result=main2(0, "</a:t>
+            </a:r>
+            <a:r>
+              <a:rPr lang="en-US" u="sng" dirty="0" err="1"/>
+              <a:t>str</a:t>
+            </a:r>
+            <a:r>
+              <a:rPr lang="en-US" u="sng" dirty="0"/>
+              <a:t>");</a:t>
+            </a:r>
+          </a:p>
+          <a:p>
+            <a:r>
+              <a:rPr lang="en-US" dirty="0"/>
+              <a:t>	Float d;</a:t>
+            </a:r>
+          </a:p>
+          <a:p>
+            <a:r>
+              <a:rPr lang="en-US" dirty="0"/>
+              <a:t>	d=price(result);</a:t>
+            </a:r>
+          </a:p>
+          <a:p>
+            <a:r>
+              <a:rPr lang="en-US" dirty="0"/>
+              <a:t>	print(d);</a:t>
+            </a:r>
+          </a:p>
+          <a:p>
+            <a:r>
+              <a:rPr lang="en-US" dirty="0"/>
+              <a:t>}</a:t>
             </a:r>
           </a:p>
         </p:txBody>
@@ -5095,7 +5140,7 @@
     </p:spTree>
     <p:extLst>
       <p:ext uri="{BB962C8B-B14F-4D97-AF65-F5344CB8AC3E}">
-        <p14:creationId xmlns:p14="http://schemas.microsoft.com/office/powerpoint/2010/main" val="2795238429"/>
+        <p14:creationId xmlns:p14="http://schemas.microsoft.com/office/powerpoint/2010/main" val="1991617179"/>
       </p:ext>
     </p:extLst>
   </p:cSld>
@@ -5139,49 +5184,63 @@
           <a:p>
             <a:r>
               <a:rPr lang="en-US" dirty="0" smtClean="0"/>
-              <a:t>Black-Scholes equation  </a:t>
+              <a:t>In Financial District</a:t>
             </a:r>
             <a:endParaRPr lang="en-US" dirty="0"/>
           </a:p>
         </p:txBody>
       </p:sp>
-      <p:pic>
-        <p:nvPicPr>
-          <p:cNvPr id="14" name="Content Placeholder 13" descr="Macintosh HD:Users:feiliu:Desktop:Screen Shot 2014-12-14 at 5.02.49 PM.png"/>
-          <p:cNvPicPr>
-            <a:picLocks noGrp="1"/>
-          </p:cNvPicPr>
+      <p:sp>
+        <p:nvSpPr>
+          <p:cNvPr id="3" name="Content Placeholder 2"/>
+          <p:cNvSpPr>
+            <a:spLocks noGrp="1"/>
+          </p:cNvSpPr>
           <p:nvPr>
             <p:ph idx="1"/>
           </p:nvPr>
-        </p:nvPicPr>
-        <p:blipFill>
-          <a:blip r:embed="rId2">
-            <a:extLst>
-              <a:ext uri="{28A0092B-C50C-407E-A947-70E740481C1C}">
-                <a14:useLocalDpi xmlns:a14="http://schemas.microsoft.com/office/drawing/2010/main" val="0"/>
-              </a:ext>
-            </a:extLst>
-          </a:blip>
-          <a:srcRect t="-14473" b="-14473"/>
-          <a:stretch>
-            <a:fillRect/>
-          </a:stretch>
-        </p:blipFill>
-        <p:spPr bwMode="auto">
-          <a:prstGeom prst="rect">
-            <a:avLst/>
-          </a:prstGeom>
-          <a:noFill/>
-          <a:ln>
-            <a:noFill/>
-          </a:ln>
-        </p:spPr>
-      </p:pic>
+        </p:nvSpPr>
+        <p:spPr/>
+        <p:txBody>
+          <a:bodyPr/>
+          <a:lstStyle/>
+          <a:p>
+            <a:r>
+              <a:rPr lang="en-US" dirty="0" smtClean="0"/>
+              <a:t>Easy to use: One of the application of extensible language</a:t>
+            </a:r>
+          </a:p>
+          <a:p>
+            <a:endParaRPr lang="en-US" dirty="0" smtClean="0"/>
+          </a:p>
+          <a:p>
+            <a:r>
+              <a:rPr lang="en-US" dirty="0" smtClean="0"/>
+              <a:t>Make complex things easy:</a:t>
+            </a:r>
+            <a:r>
+              <a:rPr lang="en-US" dirty="0"/>
+              <a:t> </a:t>
+            </a:r>
+            <a:r>
+              <a:rPr lang="en-US" dirty="0" smtClean="0"/>
+              <a:t>Don’t know Black-</a:t>
+            </a:r>
+            <a:r>
+              <a:rPr lang="en-US" dirty="0" err="1" smtClean="0"/>
+              <a:t>Shole</a:t>
+            </a:r>
+            <a:r>
+              <a:rPr lang="en-US" dirty="0" smtClean="0"/>
+              <a:t> or anything alike.</a:t>
+            </a:r>
+          </a:p>
+        </p:txBody>
+      </p:sp>
     </p:spTree>
     <p:extLst>
       <p:ext uri="{BB962C8B-B14F-4D97-AF65-F5344CB8AC3E}">
-        <p14:creationId xmlns:p14="http://schemas.microsoft.com/office/powerpoint/2010/main" val="2413541266"/>
+        <p14:creationId xmlns:p14="http://schemas.microsoft.com/office/powerpoint/2010/main" val="2795238429"/>
       </p:ext>
     </p:extLst>
   </p:cSld>

</xml_diff>

<commit_message>
update the pptx demo 3
</commit_message>
<xml_diff>
--- a/src/project/demo/PLTFinalPresentation.pptx
+++ b/src/project/demo/PLTFinalPresentation.pptx
@@ -13,8 +13,9 @@
     <p:sldId id="261" r:id="rId7"/>
     <p:sldId id="262" r:id="rId8"/>
     <p:sldId id="263" r:id="rId9"/>
-    <p:sldId id="264" r:id="rId10"/>
-    <p:sldId id="260" r:id="rId11"/>
+    <p:sldId id="266" r:id="rId10"/>
+    <p:sldId id="264" r:id="rId11"/>
+    <p:sldId id="260" r:id="rId12"/>
   </p:sldIdLst>
   <p:sldSz cx="9144000" cy="6858000" type="screen4x3"/>
   <p:notesSz cx="6858000" cy="9144000"/>
@@ -3261,6 +3262,124 @@
           <a:p>
             <a:r>
               <a:rPr lang="en-US" dirty="0" smtClean="0"/>
+              <a:t>In Financial District</a:t>
+            </a:r>
+            <a:endParaRPr lang="en-US" dirty="0"/>
+          </a:p>
+        </p:txBody>
+      </p:sp>
+      <p:sp>
+        <p:nvSpPr>
+          <p:cNvPr id="3" name="Content Placeholder 2"/>
+          <p:cNvSpPr>
+            <a:spLocks noGrp="1"/>
+          </p:cNvSpPr>
+          <p:nvPr>
+            <p:ph idx="1"/>
+          </p:nvPr>
+        </p:nvSpPr>
+        <p:spPr/>
+        <p:txBody>
+          <a:bodyPr/>
+          <a:lstStyle/>
+          <a:p>
+            <a:r>
+              <a:rPr lang="en-US" dirty="0" smtClean="0"/>
+              <a:t>Easy to use: One of the application of extensible language</a:t>
+            </a:r>
+          </a:p>
+          <a:p>
+            <a:endParaRPr lang="en-US" dirty="0" smtClean="0"/>
+          </a:p>
+          <a:p>
+            <a:r>
+              <a:rPr lang="en-US" dirty="0" smtClean="0"/>
+              <a:t>Make complex things easy:</a:t>
+            </a:r>
+            <a:r>
+              <a:rPr lang="en-US" dirty="0"/>
+              <a:t> </a:t>
+            </a:r>
+            <a:r>
+              <a:rPr lang="en-US" dirty="0" smtClean="0"/>
+              <a:t>Don’t know Black-</a:t>
+            </a:r>
+            <a:r>
+              <a:rPr lang="en-US" dirty="0" err="1" smtClean="0"/>
+              <a:t>Shole</a:t>
+            </a:r>
+            <a:r>
+              <a:rPr lang="en-US" dirty="0" smtClean="0"/>
+              <a:t> or anything alike</a:t>
+            </a:r>
+            <a:r>
+              <a:rPr lang="en-US" dirty="0" smtClean="0"/>
+              <a:t>.</a:t>
+            </a:r>
+          </a:p>
+          <a:p>
+            <a:endParaRPr lang="en-US" dirty="0"/>
+          </a:p>
+          <a:p>
+            <a:r>
+              <a:rPr lang="en-US" dirty="0" smtClean="0"/>
+              <a:t>Matrix short-cut for </a:t>
+            </a:r>
+            <a:r>
+              <a:rPr lang="en-US" smtClean="0"/>
+              <a:t>large portfolio</a:t>
+            </a:r>
+            <a:endParaRPr lang="en-US" dirty="0" smtClean="0"/>
+          </a:p>
+        </p:txBody>
+      </p:sp>
+    </p:spTree>
+    <p:extLst>
+      <p:ext uri="{BB962C8B-B14F-4D97-AF65-F5344CB8AC3E}">
+        <p14:creationId xmlns:p14="http://schemas.microsoft.com/office/powerpoint/2010/main" val="2795238429"/>
+      </p:ext>
+    </p:extLst>
+  </p:cSld>
+  <p:clrMapOvr>
+    <a:masterClrMapping/>
+  </p:clrMapOvr>
+</p:sld>
+</file>
+
+<file path=ppt/slides/slide11.xml><?xml version="1.0" encoding="utf-8"?>
+<p:sld xmlns:a="http://schemas.openxmlformats.org/drawingml/2006/main" xmlns:r="http://schemas.openxmlformats.org/officeDocument/2006/relationships" xmlns:p="http://schemas.openxmlformats.org/presentationml/2006/main">
+  <p:cSld>
+    <p:spTree>
+      <p:nvGrpSpPr>
+        <p:cNvPr id="1" name=""/>
+        <p:cNvGrpSpPr/>
+        <p:nvPr/>
+      </p:nvGrpSpPr>
+      <p:grpSpPr>
+        <a:xfrm>
+          <a:off x="0" y="0"/>
+          <a:ext cx="0" cy="0"/>
+          <a:chOff x="0" y="0"/>
+          <a:chExt cx="0" cy="0"/>
+        </a:xfrm>
+      </p:grpSpPr>
+      <p:sp>
+        <p:nvSpPr>
+          <p:cNvPr id="2" name="Title 1"/>
+          <p:cNvSpPr>
+            <a:spLocks noGrp="1"/>
+          </p:cNvSpPr>
+          <p:nvPr>
+            <p:ph type="title"/>
+          </p:nvPr>
+        </p:nvSpPr>
+        <p:spPr/>
+        <p:txBody>
+          <a:bodyPr/>
+          <a:lstStyle/>
+          <a:p>
+            <a:r>
+              <a:rPr lang="en-US" dirty="0" smtClean="0"/>
               <a:t>Black-Scholes equation  </a:t>
             </a:r>
             <a:endParaRPr lang="en-US" dirty="0"/>
@@ -5184,7 +5303,7 @@
           <a:p>
             <a:r>
               <a:rPr lang="en-US" dirty="0" smtClean="0"/>
-              <a:t>In Financial District</a:t>
+              <a:t>Demo 3 extended</a:t>
             </a:r>
             <a:endParaRPr lang="en-US" dirty="0"/>
           </a:p>
@@ -5200,47 +5319,454 @@
             <p:ph idx="1"/>
           </p:nvPr>
         </p:nvSpPr>
-        <p:spPr/>
-        <p:txBody>
-          <a:bodyPr/>
-          <a:lstStyle/>
-          <a:p>
-            <a:r>
-              <a:rPr lang="en-US" dirty="0" smtClean="0"/>
-              <a:t>Easy to use: One of the application of extensible language</a:t>
-            </a:r>
-          </a:p>
-          <a:p>
-            <a:endParaRPr lang="en-US" dirty="0" smtClean="0"/>
-          </a:p>
-          <a:p>
-            <a:r>
-              <a:rPr lang="en-US" dirty="0" smtClean="0"/>
-              <a:t>Make complex things easy:</a:t>
-            </a:r>
+        <p:spPr>
+          <a:xfrm>
+            <a:off x="457200" y="1600200"/>
+            <a:ext cx="4137775" cy="4525963"/>
+          </a:xfrm>
+        </p:spPr>
+        <p:txBody>
+          <a:bodyPr>
+            <a:normAutofit fontScale="85000" lnSpcReduction="20000"/>
+          </a:bodyPr>
+          <a:lstStyle/>
+          <a:p>
             <a:r>
               <a:rPr lang="en-US" dirty="0"/>
-              <a:t> </a:t>
-            </a:r>
-            <a:r>
-              <a:rPr lang="en-US" dirty="0" smtClean="0"/>
-              <a:t>Don’t know Black-</a:t>
-            </a:r>
-            <a:r>
-              <a:rPr lang="en-US" dirty="0" err="1" smtClean="0"/>
-              <a:t>Shole</a:t>
-            </a:r>
-            <a:r>
-              <a:rPr lang="en-US" dirty="0" smtClean="0"/>
-              <a:t> or anything alike.</a:t>
-            </a:r>
+              <a:t>Matrix main3(</a:t>
+            </a:r>
+            <a:r>
+              <a:rPr lang="en-US" u="sng" dirty="0" err="1"/>
+              <a:t>Int</a:t>
+            </a:r>
+            <a:r>
+              <a:rPr lang="en-US" u="sng" dirty="0"/>
+              <a:t> a) {</a:t>
+            </a:r>
+          </a:p>
+          <a:p>
+            <a:r>
+              <a:rPr lang="en-US" dirty="0"/>
+              <a:t>	Matrix strike(1,2);</a:t>
+            </a:r>
+          </a:p>
+          <a:p>
+            <a:r>
+              <a:rPr lang="nb-NO" dirty="0"/>
+              <a:t>	</a:t>
+            </a:r>
+            <a:r>
+              <a:rPr lang="nb-NO" dirty="0" err="1"/>
+              <a:t>strike</a:t>
+            </a:r>
+            <a:r>
+              <a:rPr lang="nb-NO" dirty="0"/>
+              <a:t>[0][0]=10;</a:t>
+            </a:r>
+          </a:p>
+          <a:p>
+            <a:r>
+              <a:rPr lang="nb-NO" dirty="0"/>
+              <a:t>	</a:t>
+            </a:r>
+            <a:r>
+              <a:rPr lang="nb-NO" dirty="0" err="1"/>
+              <a:t>strike</a:t>
+            </a:r>
+            <a:r>
+              <a:rPr lang="nb-NO" dirty="0"/>
+              <a:t>[0][1]=20;</a:t>
+            </a:r>
+          </a:p>
+          <a:p>
+            <a:r>
+              <a:rPr lang="nb-NO" dirty="0"/>
+              <a:t>	Matrix </a:t>
+            </a:r>
+            <a:r>
+              <a:rPr lang="nb-NO" dirty="0" err="1"/>
+              <a:t>stock</a:t>
+            </a:r>
+            <a:r>
+              <a:rPr lang="nb-NO" dirty="0"/>
+              <a:t>(1,2);</a:t>
+            </a:r>
+          </a:p>
+          <a:p>
+            <a:r>
+              <a:rPr lang="nb-NO" dirty="0"/>
+              <a:t>	</a:t>
+            </a:r>
+            <a:r>
+              <a:rPr lang="nb-NO" dirty="0" err="1"/>
+              <a:t>stock</a:t>
+            </a:r>
+            <a:r>
+              <a:rPr lang="nb-NO" dirty="0"/>
+              <a:t>[0][0]=15;</a:t>
+            </a:r>
+          </a:p>
+          <a:p>
+            <a:r>
+              <a:rPr lang="nb-NO" dirty="0"/>
+              <a:t>	</a:t>
+            </a:r>
+            <a:r>
+              <a:rPr lang="nb-NO" dirty="0" err="1"/>
+              <a:t>stock</a:t>
+            </a:r>
+            <a:r>
+              <a:rPr lang="nb-NO" dirty="0"/>
+              <a:t>[0][1]=25;</a:t>
+            </a:r>
+          </a:p>
+          <a:p>
+            <a:r>
+              <a:rPr lang="nb-NO" dirty="0"/>
+              <a:t>	</a:t>
+            </a:r>
+            <a:r>
+              <a:rPr lang="nb-NO" dirty="0" smtClean="0"/>
+              <a:t>Matrix </a:t>
+            </a:r>
+            <a:r>
+              <a:rPr lang="nb-NO" dirty="0" err="1" smtClean="0"/>
+              <a:t>interestRate</a:t>
+            </a:r>
+            <a:r>
+              <a:rPr lang="nb-NO" dirty="0" smtClean="0"/>
+              <a:t>(1,2);</a:t>
+            </a:r>
+          </a:p>
+          <a:p>
+            <a:r>
+              <a:rPr lang="de-DE" dirty="0" smtClean="0"/>
+              <a:t>	</a:t>
+            </a:r>
+            <a:r>
+              <a:rPr lang="de-DE" dirty="0" err="1" smtClean="0"/>
+              <a:t>interestRate</a:t>
+            </a:r>
+            <a:r>
+              <a:rPr lang="de-DE" dirty="0" smtClean="0"/>
+              <a:t>[0][0]=0.4;</a:t>
+            </a:r>
+          </a:p>
+          <a:p>
+            <a:r>
+              <a:rPr lang="de-DE" dirty="0" smtClean="0"/>
+              <a:t>	</a:t>
+            </a:r>
+            <a:r>
+              <a:rPr lang="de-DE" dirty="0" err="1" smtClean="0"/>
+              <a:t>interestRate</a:t>
+            </a:r>
+            <a:r>
+              <a:rPr lang="de-DE" dirty="0" smtClean="0"/>
+              <a:t>[0][1]=0.1;</a:t>
+            </a:r>
+          </a:p>
+        </p:txBody>
+      </p:sp>
+      <p:sp>
+        <p:nvSpPr>
+          <p:cNvPr id="4" name="Content Placeholder 2"/>
+          <p:cNvSpPr txBox="1">
+            <a:spLocks/>
+          </p:cNvSpPr>
+          <p:nvPr/>
+        </p:nvSpPr>
+        <p:spPr>
+          <a:xfrm>
+            <a:off x="4747375" y="1750488"/>
+            <a:ext cx="4137775" cy="4525963"/>
+          </a:xfrm>
+          <a:prstGeom prst="rect">
+            <a:avLst/>
+          </a:prstGeom>
+        </p:spPr>
+        <p:txBody>
+          <a:bodyPr vert="horz" lIns="91440" tIns="45720" rIns="91440" bIns="45720" rtlCol="0">
+            <a:normAutofit fontScale="70000" lnSpcReduction="20000"/>
+          </a:bodyPr>
+          <a:lstStyle>
+            <a:lvl1pPr marL="342900" indent="-342900" algn="l" defTabSz="457200" rtl="0" eaLnBrk="1" latinLnBrk="0" hangingPunct="1">
+              <a:spcBef>
+                <a:spcPct val="20000"/>
+              </a:spcBef>
+              <a:buFont typeface="Arial"/>
+              <a:buChar char="•"/>
+              <a:defRPr sz="3200" kern="1200">
+                <a:solidFill>
+                  <a:schemeClr val="tx1"/>
+                </a:solidFill>
+                <a:latin typeface="+mn-lt"/>
+                <a:ea typeface="+mn-ea"/>
+                <a:cs typeface="+mn-cs"/>
+              </a:defRPr>
+            </a:lvl1pPr>
+            <a:lvl2pPr marL="742950" indent="-285750" algn="l" defTabSz="457200" rtl="0" eaLnBrk="1" latinLnBrk="0" hangingPunct="1">
+              <a:spcBef>
+                <a:spcPct val="20000"/>
+              </a:spcBef>
+              <a:buFont typeface="Arial"/>
+              <a:buChar char="–"/>
+              <a:defRPr sz="2800" kern="1200">
+                <a:solidFill>
+                  <a:schemeClr val="tx1"/>
+                </a:solidFill>
+                <a:latin typeface="+mn-lt"/>
+                <a:ea typeface="+mn-ea"/>
+                <a:cs typeface="+mn-cs"/>
+              </a:defRPr>
+            </a:lvl2pPr>
+            <a:lvl3pPr marL="1143000" indent="-228600" algn="l" defTabSz="457200" rtl="0" eaLnBrk="1" latinLnBrk="0" hangingPunct="1">
+              <a:spcBef>
+                <a:spcPct val="20000"/>
+              </a:spcBef>
+              <a:buFont typeface="Arial"/>
+              <a:buChar char="•"/>
+              <a:defRPr sz="2400" kern="1200">
+                <a:solidFill>
+                  <a:schemeClr val="tx1"/>
+                </a:solidFill>
+                <a:latin typeface="+mn-lt"/>
+                <a:ea typeface="+mn-ea"/>
+                <a:cs typeface="+mn-cs"/>
+              </a:defRPr>
+            </a:lvl3pPr>
+            <a:lvl4pPr marL="1600200" indent="-228600" algn="l" defTabSz="457200" rtl="0" eaLnBrk="1" latinLnBrk="0" hangingPunct="1">
+              <a:spcBef>
+                <a:spcPct val="20000"/>
+              </a:spcBef>
+              <a:buFont typeface="Arial"/>
+              <a:buChar char="–"/>
+              <a:defRPr sz="2000" kern="1200">
+                <a:solidFill>
+                  <a:schemeClr val="tx1"/>
+                </a:solidFill>
+                <a:latin typeface="+mn-lt"/>
+                <a:ea typeface="+mn-ea"/>
+                <a:cs typeface="+mn-cs"/>
+              </a:defRPr>
+            </a:lvl4pPr>
+            <a:lvl5pPr marL="2057400" indent="-228600" algn="l" defTabSz="457200" rtl="0" eaLnBrk="1" latinLnBrk="0" hangingPunct="1">
+              <a:spcBef>
+                <a:spcPct val="20000"/>
+              </a:spcBef>
+              <a:buFont typeface="Arial"/>
+              <a:buChar char="»"/>
+              <a:defRPr sz="2000" kern="1200">
+                <a:solidFill>
+                  <a:schemeClr val="tx1"/>
+                </a:solidFill>
+                <a:latin typeface="+mn-lt"/>
+                <a:ea typeface="+mn-ea"/>
+                <a:cs typeface="+mn-cs"/>
+              </a:defRPr>
+            </a:lvl5pPr>
+            <a:lvl6pPr marL="2514600" indent="-228600" algn="l" defTabSz="457200" rtl="0" eaLnBrk="1" latinLnBrk="0" hangingPunct="1">
+              <a:spcBef>
+                <a:spcPct val="20000"/>
+              </a:spcBef>
+              <a:buFont typeface="Arial"/>
+              <a:buChar char="•"/>
+              <a:defRPr sz="2000" kern="1200">
+                <a:solidFill>
+                  <a:schemeClr val="tx1"/>
+                </a:solidFill>
+                <a:latin typeface="+mn-lt"/>
+                <a:ea typeface="+mn-ea"/>
+                <a:cs typeface="+mn-cs"/>
+              </a:defRPr>
+            </a:lvl6pPr>
+            <a:lvl7pPr marL="2971800" indent="-228600" algn="l" defTabSz="457200" rtl="0" eaLnBrk="1" latinLnBrk="0" hangingPunct="1">
+              <a:spcBef>
+                <a:spcPct val="20000"/>
+              </a:spcBef>
+              <a:buFont typeface="Arial"/>
+              <a:buChar char="•"/>
+              <a:defRPr sz="2000" kern="1200">
+                <a:solidFill>
+                  <a:schemeClr val="tx1"/>
+                </a:solidFill>
+                <a:latin typeface="+mn-lt"/>
+                <a:ea typeface="+mn-ea"/>
+                <a:cs typeface="+mn-cs"/>
+              </a:defRPr>
+            </a:lvl7pPr>
+            <a:lvl8pPr marL="3429000" indent="-228600" algn="l" defTabSz="457200" rtl="0" eaLnBrk="1" latinLnBrk="0" hangingPunct="1">
+              <a:spcBef>
+                <a:spcPct val="20000"/>
+              </a:spcBef>
+              <a:buFont typeface="Arial"/>
+              <a:buChar char="•"/>
+              <a:defRPr sz="2000" kern="1200">
+                <a:solidFill>
+                  <a:schemeClr val="tx1"/>
+                </a:solidFill>
+                <a:latin typeface="+mn-lt"/>
+                <a:ea typeface="+mn-ea"/>
+                <a:cs typeface="+mn-cs"/>
+              </a:defRPr>
+            </a:lvl8pPr>
+            <a:lvl9pPr marL="3886200" indent="-228600" algn="l" defTabSz="457200" rtl="0" eaLnBrk="1" latinLnBrk="0" hangingPunct="1">
+              <a:spcBef>
+                <a:spcPct val="20000"/>
+              </a:spcBef>
+              <a:buFont typeface="Arial"/>
+              <a:buChar char="•"/>
+              <a:defRPr sz="2000" kern="1200">
+                <a:solidFill>
+                  <a:schemeClr val="tx1"/>
+                </a:solidFill>
+                <a:latin typeface="+mn-lt"/>
+                <a:ea typeface="+mn-ea"/>
+                <a:cs typeface="+mn-cs"/>
+              </a:defRPr>
+            </a:lvl9pPr>
+          </a:lstStyle>
+          <a:p>
+            <a:r>
+              <a:rPr lang="de-DE" dirty="0"/>
+              <a:t>	Matrix </a:t>
+            </a:r>
+            <a:r>
+              <a:rPr lang="de-DE" dirty="0" err="1"/>
+              <a:t>period</a:t>
+            </a:r>
+            <a:r>
+              <a:rPr lang="de-DE" dirty="0"/>
+              <a:t>(1,2);</a:t>
+            </a:r>
+          </a:p>
+          <a:p>
+            <a:r>
+              <a:rPr lang="de-DE" dirty="0"/>
+              <a:t>	</a:t>
+            </a:r>
+            <a:r>
+              <a:rPr lang="de-DE" dirty="0" err="1"/>
+              <a:t>period</a:t>
+            </a:r>
+            <a:r>
+              <a:rPr lang="de-DE" dirty="0"/>
+              <a:t>[0][0]=3;</a:t>
+            </a:r>
+          </a:p>
+          <a:p>
+            <a:r>
+              <a:rPr lang="de-DE" dirty="0"/>
+              <a:t>	</a:t>
+            </a:r>
+            <a:r>
+              <a:rPr lang="de-DE" dirty="0" err="1"/>
+              <a:t>period</a:t>
+            </a:r>
+            <a:r>
+              <a:rPr lang="de-DE" dirty="0"/>
+              <a:t>[0][1]=4;</a:t>
+            </a:r>
+          </a:p>
+          <a:p>
+            <a:r>
+              <a:rPr lang="de-DE" dirty="0"/>
+              <a:t>	Matrix </a:t>
+            </a:r>
+            <a:r>
+              <a:rPr lang="de-DE" u="sng" dirty="0" err="1"/>
+              <a:t>sigma</a:t>
+            </a:r>
+            <a:r>
+              <a:rPr lang="de-DE" u="sng" dirty="0"/>
+              <a:t>(1,2);</a:t>
+            </a:r>
+          </a:p>
+          <a:p>
+            <a:r>
+              <a:rPr lang="de-DE" dirty="0"/>
+              <a:t>	</a:t>
+            </a:r>
+            <a:r>
+              <a:rPr lang="de-DE" u="sng" dirty="0" err="1"/>
+              <a:t>sigma</a:t>
+            </a:r>
+            <a:r>
+              <a:rPr lang="de-DE" u="sng" dirty="0"/>
+              <a:t>[0][0]=0.1;</a:t>
+            </a:r>
+          </a:p>
+          <a:p>
+            <a:r>
+              <a:rPr lang="de-DE" dirty="0"/>
+              <a:t>	</a:t>
+            </a:r>
+            <a:r>
+              <a:rPr lang="de-DE" u="sng" dirty="0" err="1"/>
+              <a:t>sigma</a:t>
+            </a:r>
+            <a:r>
+              <a:rPr lang="de-DE" u="sng" dirty="0"/>
+              <a:t>[0][1]=0.2;</a:t>
+            </a:r>
+          </a:p>
+          <a:p>
+            <a:r>
+              <a:rPr lang="de-DE" dirty="0"/>
+              <a:t>	</a:t>
+            </a:r>
+          </a:p>
+          <a:p>
+            <a:r>
+              <a:rPr lang="fr-FR" dirty="0"/>
+              <a:t>	Matrix s(0,0);</a:t>
+            </a:r>
+          </a:p>
+          <a:p>
+            <a:r>
+              <a:rPr lang="fr-FR" dirty="0"/>
+              <a:t>	s= </a:t>
+            </a:r>
+            <a:r>
+              <a:rPr lang="fr-FR" dirty="0" err="1"/>
+              <a:t>priceM</a:t>
+            </a:r>
+            <a:r>
+              <a:rPr lang="fr-FR" dirty="0"/>
+              <a:t>(</a:t>
+            </a:r>
+            <a:r>
+              <a:rPr lang="fr-FR" dirty="0" err="1"/>
+              <a:t>strike,stock,interestRate,period,</a:t>
+            </a:r>
+            <a:r>
+              <a:rPr lang="fr-FR" u="sng" dirty="0" err="1"/>
+              <a:t>sigma</a:t>
+            </a:r>
+            <a:r>
+              <a:rPr lang="fr-FR" u="sng" dirty="0"/>
+              <a:t>);</a:t>
+            </a:r>
+          </a:p>
+          <a:p>
+            <a:r>
+              <a:rPr lang="fr-FR" dirty="0"/>
+              <a:t>	return s;</a:t>
+            </a:r>
+          </a:p>
+          <a:p>
+            <a:r>
+              <a:rPr lang="fr-FR" dirty="0"/>
+              <a:t>}</a:t>
+            </a:r>
+            <a:endParaRPr lang="en-US" dirty="0"/>
           </a:p>
         </p:txBody>
       </p:sp>
     </p:spTree>
     <p:extLst>
       <p:ext uri="{BB962C8B-B14F-4D97-AF65-F5344CB8AC3E}">
-        <p14:creationId xmlns:p14="http://schemas.microsoft.com/office/powerpoint/2010/main" val="2795238429"/>
+        <p14:creationId xmlns:p14="http://schemas.microsoft.com/office/powerpoint/2010/main" val="513124646"/>
       </p:ext>
     </p:extLst>
   </p:cSld>

</xml_diff>

<commit_message>
demo each person case update
</commit_message>
<xml_diff>
--- a/src/project/demo/PLTFinalPresentation.pptx
+++ b/src/project/demo/PLTFinalPresentation.pptx
@@ -19,7 +19,8 @@
     <p:sldId id="268" r:id="rId13"/>
     <p:sldId id="269" r:id="rId14"/>
     <p:sldId id="270" r:id="rId15"/>
-    <p:sldId id="271" r:id="rId16"/>
+    <p:sldId id="272" r:id="rId16"/>
+    <p:sldId id="271" r:id="rId17"/>
   </p:sldIdLst>
   <p:sldSz cx="9144000" cy="6858000" type="screen4x3"/>
   <p:notesSz cx="6858000" cy="9144000"/>
@@ -3598,7 +3599,11 @@
           <a:p>
             <a:r>
               <a:rPr lang="en-US" dirty="0" smtClean="0"/>
-              <a:t>Code Generation</a:t>
+              <a:t>Code </a:t>
+            </a:r>
+            <a:r>
+              <a:rPr lang="en-US" dirty="0" smtClean="0"/>
+              <a:t>Generation (1)</a:t>
             </a:r>
             <a:endParaRPr lang="en-US" dirty="0"/>
           </a:p>
@@ -3616,10 +3621,84 @@
         </p:nvSpPr>
         <p:spPr/>
         <p:txBody>
-          <a:bodyPr/>
-          <a:lstStyle/>
-          <a:p>
-            <a:endParaRPr lang="en-US"/>
+          <a:bodyPr>
+            <a:normAutofit/>
+          </a:bodyPr>
+          <a:lstStyle/>
+          <a:p>
+            <a:r>
+              <a:rPr lang="en-US" dirty="0" smtClean="0"/>
+              <a:t>Challenge:</a:t>
+            </a:r>
+          </a:p>
+          <a:p>
+            <a:pPr marL="0" indent="0">
+              <a:buNone/>
+            </a:pPr>
+            <a:r>
+              <a:rPr lang="en-US" dirty="0" smtClean="0"/>
+              <a:t>1. No operator overload in java</a:t>
+            </a:r>
+          </a:p>
+          <a:p>
+            <a:pPr marL="0" indent="0">
+              <a:buNone/>
+            </a:pPr>
+            <a:r>
+              <a:rPr lang="en-US" dirty="0" smtClean="0"/>
+              <a:t>2. E</a:t>
+            </a:r>
+            <a:r>
+              <a:rPr lang="en-US" dirty="0" smtClean="0"/>
+              <a:t>xceptions (division by zero)</a:t>
+            </a:r>
+          </a:p>
+          <a:p>
+            <a:pPr marL="0" indent="0">
+              <a:buNone/>
+            </a:pPr>
+            <a:r>
+              <a:rPr lang="en-US" dirty="0" smtClean="0"/>
+              <a:t>3. Access member function of </a:t>
+            </a:r>
+            <a:r>
+              <a:rPr lang="en-US" dirty="0" err="1" smtClean="0"/>
+              <a:t>Struct</a:t>
+            </a:r>
+            <a:endParaRPr lang="en-US" dirty="0" smtClean="0"/>
+          </a:p>
+          <a:p>
+            <a:pPr marL="0" indent="0">
+              <a:buNone/>
+            </a:pPr>
+            <a:r>
+              <a:rPr lang="en-US" dirty="0" smtClean="0"/>
+              <a:t>4. Java initialization requirements (in global not in arguments)</a:t>
+            </a:r>
+          </a:p>
+          <a:p>
+            <a:pPr marL="0" indent="0">
+              <a:buNone/>
+            </a:pPr>
+            <a:endParaRPr lang="en-US" dirty="0" smtClean="0"/>
+          </a:p>
+          <a:p>
+            <a:pPr marL="0" indent="0">
+              <a:buNone/>
+            </a:pPr>
+            <a:endParaRPr lang="en-US" dirty="0" smtClean="0"/>
+          </a:p>
+          <a:p>
+            <a:pPr marL="0" indent="0">
+              <a:buNone/>
+            </a:pPr>
+            <a:endParaRPr lang="en-US" dirty="0" smtClean="0"/>
+          </a:p>
+          <a:p>
+            <a:pPr marL="0" indent="0">
+              <a:buNone/>
+            </a:pPr>
+            <a:endParaRPr lang="en-US" dirty="0"/>
           </a:p>
         </p:txBody>
       </p:sp>
@@ -3637,6 +3716,156 @@
 </file>
 
 <file path=ppt/slides/slide15.xml><?xml version="1.0" encoding="utf-8"?>
+<p:sld xmlns:a="http://schemas.openxmlformats.org/drawingml/2006/main" xmlns:r="http://schemas.openxmlformats.org/officeDocument/2006/relationships" xmlns:p="http://schemas.openxmlformats.org/presentationml/2006/main">
+  <p:cSld>
+    <p:spTree>
+      <p:nvGrpSpPr>
+        <p:cNvPr id="1" name=""/>
+        <p:cNvGrpSpPr/>
+        <p:nvPr/>
+      </p:nvGrpSpPr>
+      <p:grpSpPr>
+        <a:xfrm>
+          <a:off x="0" y="0"/>
+          <a:ext cx="0" cy="0"/>
+          <a:chOff x="0" y="0"/>
+          <a:chExt cx="0" cy="0"/>
+        </a:xfrm>
+      </p:grpSpPr>
+      <p:sp>
+        <p:nvSpPr>
+          <p:cNvPr id="2" name="Title 1"/>
+          <p:cNvSpPr>
+            <a:spLocks noGrp="1"/>
+          </p:cNvSpPr>
+          <p:nvPr>
+            <p:ph type="title"/>
+          </p:nvPr>
+        </p:nvSpPr>
+        <p:spPr/>
+        <p:txBody>
+          <a:bodyPr/>
+          <a:lstStyle/>
+          <a:p>
+            <a:r>
+              <a:rPr lang="en-US" dirty="0"/>
+              <a:t>Code Generation </a:t>
+            </a:r>
+            <a:r>
+              <a:rPr lang="en-US" dirty="0" smtClean="0"/>
+              <a:t>(2)</a:t>
+            </a:r>
+            <a:endParaRPr lang="en-US" dirty="0"/>
+          </a:p>
+        </p:txBody>
+      </p:sp>
+      <p:sp>
+        <p:nvSpPr>
+          <p:cNvPr id="3" name="Content Placeholder 2"/>
+          <p:cNvSpPr>
+            <a:spLocks noGrp="1"/>
+          </p:cNvSpPr>
+          <p:nvPr>
+            <p:ph idx="1"/>
+          </p:nvPr>
+        </p:nvSpPr>
+        <p:spPr/>
+        <p:txBody>
+          <a:bodyPr/>
+          <a:lstStyle/>
+          <a:p>
+            <a:r>
+              <a:rPr lang="en-US" dirty="0" smtClean="0"/>
+              <a:t>Solutions:</a:t>
+            </a:r>
+          </a:p>
+          <a:p>
+            <a:pPr marL="0" indent="0">
+              <a:buNone/>
+            </a:pPr>
+            <a:r>
+              <a:rPr lang="en-US" dirty="0" smtClean="0"/>
+              <a:t>1. Operator </a:t>
+            </a:r>
+            <a:r>
+              <a:rPr lang="en-US" dirty="0" smtClean="0">
+                <a:sym typeface="Wingdings"/>
+              </a:rPr>
+              <a:t> method</a:t>
+            </a:r>
+          </a:p>
+          <a:p>
+            <a:pPr marL="0" indent="0">
+              <a:buNone/>
+            </a:pPr>
+            <a:r>
+              <a:rPr lang="en-US" dirty="0" smtClean="0">
+                <a:sym typeface="Wingdings"/>
+              </a:rPr>
+              <a:t>2. Try/catch  catch need to return the same type as function definition  match pattern return type</a:t>
+            </a:r>
+          </a:p>
+          <a:p>
+            <a:pPr marL="0" indent="0">
+              <a:buNone/>
+            </a:pPr>
+            <a:r>
+              <a:rPr lang="en-US" dirty="0" smtClean="0">
+                <a:sym typeface="Wingdings"/>
+              </a:rPr>
+              <a:t>3. Member access  </a:t>
+            </a:r>
+            <a:r>
+              <a:rPr lang="en-US" dirty="0" err="1" smtClean="0">
+                <a:sym typeface="Wingdings"/>
+              </a:rPr>
+              <a:t>HashMap</a:t>
+            </a:r>
+            <a:endParaRPr lang="en-US" dirty="0" smtClean="0">
+              <a:sym typeface="Wingdings"/>
+            </a:endParaRPr>
+          </a:p>
+          <a:p>
+            <a:pPr marL="0" indent="0">
+              <a:buNone/>
+            </a:pPr>
+            <a:r>
+              <a:rPr lang="en-US" dirty="0" smtClean="0">
+                <a:sym typeface="Wingdings"/>
+              </a:rPr>
+              <a:t>4. Match for different type and initialize</a:t>
+            </a:r>
+          </a:p>
+          <a:p>
+            <a:pPr marL="0" indent="0">
+              <a:buNone/>
+            </a:pPr>
+            <a:endParaRPr lang="en-US" dirty="0" smtClean="0">
+              <a:sym typeface="Wingdings"/>
+            </a:endParaRPr>
+          </a:p>
+          <a:p>
+            <a:pPr marL="0" indent="0">
+              <a:buNone/>
+            </a:pPr>
+            <a:endParaRPr lang="en-US" dirty="0"/>
+          </a:p>
+        </p:txBody>
+      </p:sp>
+    </p:spTree>
+    <p:extLst>
+      <p:ext uri="{BB962C8B-B14F-4D97-AF65-F5344CB8AC3E}">
+        <p14:creationId xmlns:p14="http://schemas.microsoft.com/office/powerpoint/2010/main" val="1654716311"/>
+      </p:ext>
+    </p:extLst>
+  </p:cSld>
+  <p:clrMapOvr>
+    <a:masterClrMapping/>
+  </p:clrMapOvr>
+</p:sld>
+</file>
+
+<file path=ppt/slides/slide16.xml><?xml version="1.0" encoding="utf-8"?>
 <p:sld xmlns:a="http://schemas.openxmlformats.org/drawingml/2006/main" xmlns:r="http://schemas.openxmlformats.org/officeDocument/2006/relationships" xmlns:p="http://schemas.openxmlformats.org/presentationml/2006/main">
   <p:cSld>
     <p:spTree>

</xml_diff>

<commit_message>
added angelaZTest target for test only
</commit_message>
<xml_diff>
--- a/src/project/demo/PLTFinalPresentation.pptx
+++ b/src/project/demo/PLTFinalPresentation.pptx
@@ -15,8 +15,8 @@
     <p:sldId id="266" r:id="rId9"/>
     <p:sldId id="264" r:id="rId10"/>
     <p:sldId id="260" r:id="rId11"/>
-    <p:sldId id="267" r:id="rId12"/>
-    <p:sldId id="268" r:id="rId13"/>
+    <p:sldId id="273" r:id="rId12"/>
+    <p:sldId id="274" r:id="rId13"/>
     <p:sldId id="269" r:id="rId14"/>
     <p:sldId id="270" r:id="rId15"/>
     <p:sldId id="272" r:id="rId16"/>
@@ -3338,7 +3338,7 @@
       </p:grpSpPr>
       <p:sp>
         <p:nvSpPr>
-          <p:cNvPr id="2" name="Title 1"/>
+          <p:cNvPr id="84" name="Shape 84"/>
           <p:cNvSpPr>
             <a:spLocks noGrp="1"/>
           </p:cNvSpPr>
@@ -3346,58 +3346,1495 @@
             <p:ph type="title"/>
           </p:nvPr>
         </p:nvSpPr>
-        <p:spPr/>
+        <p:spPr>
+          <a:xfrm>
+            <a:off x="457200" y="274638"/>
+            <a:ext cx="8229600" cy="1143001"/>
+          </a:xfrm>
+          <a:prstGeom prst="rect">
+            <a:avLst/>
+          </a:prstGeom>
+        </p:spPr>
         <p:txBody>
           <a:bodyPr/>
           <a:lstStyle/>
           <a:p>
-            <a:r>
-              <a:rPr lang="en-US" dirty="0" smtClean="0"/>
+            <a:pPr lvl="0">
+              <a:defRPr sz="1800"/>
+            </a:pPr>
+            <a:r>
+              <a:rPr sz="4400"/>
               <a:t>Scanner/Parser</a:t>
             </a:r>
-            <a:endParaRPr lang="en-US" dirty="0"/>
-          </a:p>
-        </p:txBody>
-      </p:sp>
-      <p:sp>
-        <p:nvSpPr>
-          <p:cNvPr id="3" name="Content Placeholder 2"/>
-          <p:cNvSpPr>
-            <a:spLocks noGrp="1"/>
-          </p:cNvSpPr>
-          <p:nvPr>
-            <p:ph idx="1"/>
-          </p:nvPr>
-        </p:nvSpPr>
-        <p:spPr/>
+          </a:p>
+        </p:txBody>
+      </p:sp>
+      <p:sp>
+        <p:nvSpPr>
+          <p:cNvPr id="85" name="Shape 85"/>
+          <p:cNvSpPr>
+            <a:spLocks noGrp="1"/>
+          </p:cNvSpPr>
+          <p:nvPr>
+            <p:ph type="body" idx="1"/>
+          </p:nvPr>
+        </p:nvSpPr>
+        <p:spPr>
+          <a:xfrm>
+            <a:off x="457200" y="1600200"/>
+            <a:ext cx="8229600" cy="4525963"/>
+          </a:xfrm>
+          <a:prstGeom prst="rect">
+            <a:avLst/>
+          </a:prstGeom>
+        </p:spPr>
         <p:txBody>
           <a:bodyPr/>
           <a:lstStyle/>
           <a:p>
-            <a:r>
-              <a:rPr lang="en-US" dirty="0" smtClean="0"/>
-              <a:t>Token definition for all symbols</a:t>
-            </a:r>
-          </a:p>
-          <a:p>
-            <a:r>
-              <a:rPr lang="en-US" dirty="0" smtClean="0"/>
-              <a:t>The parser uses AST file to pass the pattern to the correct functions that latter triggers </a:t>
-            </a:r>
-            <a:endParaRPr lang="en-US" dirty="0"/>
+            <a:pPr lvl="0">
+              <a:defRPr sz="1800"/>
+            </a:pPr>
+            <a:r>
+              <a:rPr sz="3200" dirty="0"/>
+              <a:t>In Scanner, translate characters to tokens</a:t>
+            </a:r>
+          </a:p>
+          <a:p>
+            <a:pPr marL="0" lvl="0" indent="0">
+              <a:spcBef>
+                <a:spcPts val="0"/>
+              </a:spcBef>
+              <a:buSzTx/>
+              <a:buFontTx/>
+              <a:buNone/>
+              <a:defRPr sz="1800"/>
+            </a:pPr>
+            <a:r>
+              <a:rPr sz="1200" dirty="0">
+                <a:latin typeface="Monaco"/>
+                <a:ea typeface="Monaco"/>
+                <a:cs typeface="Monaco"/>
+                <a:sym typeface="Monaco"/>
+              </a:rPr>
+              <a:t>			</a:t>
+            </a:r>
+            <a:r>
+              <a:rPr sz="1200" dirty="0">
+                <a:solidFill>
+                  <a:srgbClr val="931A68"/>
+                </a:solidFill>
+                <a:latin typeface="Monaco"/>
+                <a:ea typeface="Monaco"/>
+                <a:cs typeface="Monaco"/>
+                <a:sym typeface="Monaco"/>
+              </a:rPr>
+              <a:t>rule</a:t>
+            </a:r>
+            <a:r>
+              <a:rPr sz="1200" dirty="0">
+                <a:latin typeface="Monaco"/>
+                <a:ea typeface="Monaco"/>
+                <a:cs typeface="Monaco"/>
+                <a:sym typeface="Monaco"/>
+              </a:rPr>
+              <a:t> token </a:t>
+            </a:r>
+            <a:r>
+              <a:rPr sz="1200" dirty="0">
+                <a:solidFill>
+                  <a:srgbClr val="941100"/>
+                </a:solidFill>
+                <a:latin typeface="Monaco"/>
+                <a:ea typeface="Monaco"/>
+                <a:cs typeface="Monaco"/>
+                <a:sym typeface="Monaco"/>
+              </a:rPr>
+              <a:t>=</a:t>
+            </a:r>
+            <a:r>
+              <a:rPr sz="1200" dirty="0">
+                <a:latin typeface="Monaco"/>
+                <a:ea typeface="Monaco"/>
+                <a:cs typeface="Monaco"/>
+                <a:sym typeface="Monaco"/>
+              </a:rPr>
+              <a:t> </a:t>
+            </a:r>
+            <a:r>
+              <a:rPr sz="1200" dirty="0">
+                <a:solidFill>
+                  <a:srgbClr val="931A68"/>
+                </a:solidFill>
+                <a:latin typeface="Monaco"/>
+                <a:ea typeface="Monaco"/>
+                <a:cs typeface="Monaco"/>
+                <a:sym typeface="Monaco"/>
+              </a:rPr>
+              <a:t>parse</a:t>
+            </a:r>
+          </a:p>
+          <a:p>
+            <a:pPr marL="0" lvl="0" indent="0">
+              <a:spcBef>
+                <a:spcPts val="0"/>
+              </a:spcBef>
+              <a:buSzTx/>
+              <a:buFontTx/>
+              <a:buNone/>
+              <a:defRPr sz="1800"/>
+            </a:pPr>
+            <a:r>
+              <a:rPr sz="1200" dirty="0">
+                <a:latin typeface="Monaco"/>
+                <a:ea typeface="Monaco"/>
+                <a:cs typeface="Monaco"/>
+                <a:sym typeface="Monaco"/>
+              </a:rPr>
+              <a:t>  			  </a:t>
+            </a:r>
+            <a:r>
+              <a:rPr sz="1200" dirty="0">
+                <a:solidFill>
+                  <a:srgbClr val="941100"/>
+                </a:solidFill>
+                <a:latin typeface="Monaco"/>
+                <a:ea typeface="Monaco"/>
+                <a:cs typeface="Monaco"/>
+                <a:sym typeface="Monaco"/>
+              </a:rPr>
+              <a:t>[</a:t>
+            </a:r>
+            <a:r>
+              <a:rPr sz="1200" dirty="0">
+                <a:solidFill>
+                  <a:srgbClr val="FF9300"/>
+                </a:solidFill>
+                <a:latin typeface="Monaco"/>
+                <a:ea typeface="Monaco"/>
+                <a:cs typeface="Monaco"/>
+                <a:sym typeface="Monaco"/>
+              </a:rPr>
+              <a:t>' '</a:t>
+            </a:r>
+            <a:r>
+              <a:rPr sz="1200" dirty="0">
+                <a:latin typeface="Monaco"/>
+                <a:ea typeface="Monaco"/>
+                <a:cs typeface="Monaco"/>
+                <a:sym typeface="Monaco"/>
+              </a:rPr>
+              <a:t> </a:t>
+            </a:r>
+            <a:r>
+              <a:rPr sz="1200" dirty="0">
+                <a:solidFill>
+                  <a:srgbClr val="FF9300"/>
+                </a:solidFill>
+                <a:latin typeface="Monaco"/>
+                <a:ea typeface="Monaco"/>
+                <a:cs typeface="Monaco"/>
+                <a:sym typeface="Monaco"/>
+              </a:rPr>
+              <a:t>'\t'</a:t>
+            </a:r>
+            <a:r>
+              <a:rPr sz="1200" dirty="0">
+                <a:latin typeface="Monaco"/>
+                <a:ea typeface="Monaco"/>
+                <a:cs typeface="Monaco"/>
+                <a:sym typeface="Monaco"/>
+              </a:rPr>
+              <a:t> </a:t>
+            </a:r>
+            <a:r>
+              <a:rPr sz="1200" dirty="0">
+                <a:solidFill>
+                  <a:srgbClr val="FF9300"/>
+                </a:solidFill>
+                <a:latin typeface="Monaco"/>
+                <a:ea typeface="Monaco"/>
+                <a:cs typeface="Monaco"/>
+                <a:sym typeface="Monaco"/>
+              </a:rPr>
+              <a:t>'\r'</a:t>
+            </a:r>
+            <a:r>
+              <a:rPr sz="1200" dirty="0">
+                <a:latin typeface="Monaco"/>
+                <a:ea typeface="Monaco"/>
+                <a:cs typeface="Monaco"/>
+                <a:sym typeface="Monaco"/>
+              </a:rPr>
+              <a:t> </a:t>
+            </a:r>
+            <a:r>
+              <a:rPr sz="1200" dirty="0">
+                <a:solidFill>
+                  <a:srgbClr val="FF9300"/>
+                </a:solidFill>
+                <a:latin typeface="Monaco"/>
+                <a:ea typeface="Monaco"/>
+                <a:cs typeface="Monaco"/>
+                <a:sym typeface="Monaco"/>
+              </a:rPr>
+              <a:t>'\n'</a:t>
+            </a:r>
+            <a:r>
+              <a:rPr sz="1200" dirty="0">
+                <a:solidFill>
+                  <a:srgbClr val="941100"/>
+                </a:solidFill>
+                <a:latin typeface="Monaco"/>
+                <a:ea typeface="Monaco"/>
+                <a:cs typeface="Monaco"/>
+                <a:sym typeface="Monaco"/>
+              </a:rPr>
+              <a:t>]</a:t>
+            </a:r>
+            <a:r>
+              <a:rPr sz="1200" dirty="0">
+                <a:latin typeface="Monaco"/>
+                <a:ea typeface="Monaco"/>
+                <a:cs typeface="Monaco"/>
+                <a:sym typeface="Monaco"/>
+              </a:rPr>
+              <a:t> </a:t>
+            </a:r>
+            <a:r>
+              <a:rPr sz="1200" dirty="0">
+                <a:solidFill>
+                  <a:srgbClr val="941100"/>
+                </a:solidFill>
+                <a:latin typeface="Monaco"/>
+                <a:ea typeface="Monaco"/>
+                <a:cs typeface="Monaco"/>
+                <a:sym typeface="Monaco"/>
+              </a:rPr>
+              <a:t>{</a:t>
+            </a:r>
+            <a:r>
+              <a:rPr sz="1200" dirty="0">
+                <a:latin typeface="Monaco"/>
+                <a:ea typeface="Monaco"/>
+                <a:cs typeface="Monaco"/>
+                <a:sym typeface="Monaco"/>
+              </a:rPr>
+              <a:t> token lexbuf </a:t>
+            </a:r>
+            <a:r>
+              <a:rPr sz="1200" dirty="0">
+                <a:solidFill>
+                  <a:srgbClr val="941100"/>
+                </a:solidFill>
+                <a:latin typeface="Monaco"/>
+                <a:ea typeface="Monaco"/>
+                <a:cs typeface="Monaco"/>
+                <a:sym typeface="Monaco"/>
+              </a:rPr>
+              <a:t>}</a:t>
+            </a:r>
+            <a:r>
+              <a:rPr sz="1200" dirty="0">
+                <a:latin typeface="Monaco"/>
+                <a:ea typeface="Monaco"/>
+                <a:cs typeface="Monaco"/>
+                <a:sym typeface="Monaco"/>
+              </a:rPr>
+              <a:t> </a:t>
+            </a:r>
+            <a:r>
+              <a:rPr sz="1200" dirty="0">
+                <a:solidFill>
+                  <a:srgbClr val="4E9072"/>
+                </a:solidFill>
+                <a:latin typeface="Monaco"/>
+                <a:ea typeface="Monaco"/>
+                <a:cs typeface="Monaco"/>
+                <a:sym typeface="Monaco"/>
+              </a:rPr>
+              <a:t>(* Whitespace *)</a:t>
+            </a:r>
+          </a:p>
+          <a:p>
+            <a:pPr marL="0" lvl="0" indent="0">
+              <a:spcBef>
+                <a:spcPts val="0"/>
+              </a:spcBef>
+              <a:buSzTx/>
+              <a:buFontTx/>
+              <a:buNone/>
+              <a:defRPr sz="1800"/>
+            </a:pPr>
+            <a:r>
+              <a:rPr sz="1200" dirty="0">
+                <a:solidFill>
+                  <a:srgbClr val="3933FF"/>
+                </a:solidFill>
+                <a:latin typeface="Monaco"/>
+                <a:ea typeface="Monaco"/>
+                <a:cs typeface="Monaco"/>
+                <a:sym typeface="Monaco"/>
+              </a:rPr>
+              <a:t>			</a:t>
+            </a:r>
+            <a:r>
+              <a:rPr sz="1200" dirty="0">
+                <a:solidFill>
+                  <a:srgbClr val="941100"/>
+                </a:solidFill>
+                <a:latin typeface="Monaco"/>
+                <a:ea typeface="Monaco"/>
+                <a:cs typeface="Monaco"/>
+                <a:sym typeface="Monaco"/>
+              </a:rPr>
+              <a:t>|</a:t>
+            </a:r>
+            <a:r>
+              <a:rPr sz="1200" dirty="0">
+                <a:latin typeface="Monaco"/>
+                <a:ea typeface="Monaco"/>
+                <a:cs typeface="Monaco"/>
+                <a:sym typeface="Monaco"/>
+              </a:rPr>
+              <a:t> </a:t>
+            </a:r>
+            <a:r>
+              <a:rPr sz="1200" dirty="0">
+                <a:solidFill>
+                  <a:srgbClr val="3933FF"/>
+                </a:solidFill>
+                <a:latin typeface="Monaco"/>
+                <a:ea typeface="Monaco"/>
+                <a:cs typeface="Monaco"/>
+                <a:sym typeface="Monaco"/>
+              </a:rPr>
+              <a:t>"Matrix"</a:t>
+            </a:r>
+            <a:r>
+              <a:rPr sz="1200" dirty="0">
+                <a:latin typeface="Monaco"/>
+                <a:ea typeface="Monaco"/>
+                <a:cs typeface="Monaco"/>
+                <a:sym typeface="Monaco"/>
+              </a:rPr>
+              <a:t> </a:t>
+            </a:r>
+            <a:r>
+              <a:rPr sz="1200" dirty="0">
+                <a:solidFill>
+                  <a:srgbClr val="941100"/>
+                </a:solidFill>
+                <a:latin typeface="Monaco"/>
+                <a:ea typeface="Monaco"/>
+                <a:cs typeface="Monaco"/>
+                <a:sym typeface="Monaco"/>
+              </a:rPr>
+              <a:t>{</a:t>
+            </a:r>
+            <a:r>
+              <a:rPr sz="1200" dirty="0">
+                <a:latin typeface="Monaco"/>
+                <a:ea typeface="Monaco"/>
+                <a:cs typeface="Monaco"/>
+                <a:sym typeface="Monaco"/>
+              </a:rPr>
+              <a:t> MATRIX </a:t>
+            </a:r>
+            <a:r>
+              <a:rPr sz="1200" dirty="0">
+                <a:solidFill>
+                  <a:srgbClr val="941100"/>
+                </a:solidFill>
+                <a:latin typeface="Monaco"/>
+                <a:ea typeface="Monaco"/>
+                <a:cs typeface="Monaco"/>
+                <a:sym typeface="Monaco"/>
+              </a:rPr>
+              <a:t>}</a:t>
+            </a:r>
+            <a:endParaRPr sz="1200" dirty="0">
+              <a:latin typeface="Monaco"/>
+              <a:ea typeface="Monaco"/>
+              <a:cs typeface="Monaco"/>
+              <a:sym typeface="Monaco"/>
+            </a:endParaRPr>
+          </a:p>
+          <a:p>
+            <a:pPr marL="0" lvl="0" indent="0">
+              <a:spcBef>
+                <a:spcPts val="0"/>
+              </a:spcBef>
+              <a:buSzTx/>
+              <a:buFontTx/>
+              <a:buNone/>
+              <a:defRPr sz="1800"/>
+            </a:pPr>
+            <a:r>
+              <a:rPr sz="1200" dirty="0">
+                <a:latin typeface="Monaco"/>
+                <a:ea typeface="Monaco"/>
+                <a:cs typeface="Monaco"/>
+                <a:sym typeface="Monaco"/>
+              </a:rPr>
+              <a:t>			</a:t>
+            </a:r>
+            <a:r>
+              <a:rPr sz="1200" dirty="0">
+                <a:solidFill>
+                  <a:srgbClr val="941100"/>
+                </a:solidFill>
+                <a:latin typeface="Monaco"/>
+                <a:ea typeface="Monaco"/>
+                <a:cs typeface="Monaco"/>
+                <a:sym typeface="Monaco"/>
+              </a:rPr>
+              <a:t>|</a:t>
+            </a:r>
+            <a:r>
+              <a:rPr sz="1200" dirty="0">
+                <a:latin typeface="Monaco"/>
+                <a:ea typeface="Monaco"/>
+                <a:cs typeface="Monaco"/>
+                <a:sym typeface="Monaco"/>
+              </a:rPr>
+              <a:t> </a:t>
+            </a:r>
+            <a:r>
+              <a:rPr sz="1200" dirty="0">
+                <a:solidFill>
+                  <a:srgbClr val="FF9300"/>
+                </a:solidFill>
+                <a:latin typeface="Monaco"/>
+                <a:ea typeface="Monaco"/>
+                <a:cs typeface="Monaco"/>
+                <a:sym typeface="Monaco"/>
+              </a:rPr>
+              <a:t>'''</a:t>
+            </a:r>
+            <a:r>
+              <a:rPr sz="1200" dirty="0">
+                <a:latin typeface="Monaco"/>
+                <a:ea typeface="Monaco"/>
+                <a:cs typeface="Monaco"/>
+                <a:sym typeface="Monaco"/>
+              </a:rPr>
+              <a:t>      </a:t>
+            </a:r>
+            <a:r>
+              <a:rPr sz="1200" dirty="0">
+                <a:solidFill>
+                  <a:srgbClr val="941100"/>
+                </a:solidFill>
+                <a:latin typeface="Monaco"/>
+                <a:ea typeface="Monaco"/>
+                <a:cs typeface="Monaco"/>
+                <a:sym typeface="Monaco"/>
+              </a:rPr>
+              <a:t>{</a:t>
+            </a:r>
+            <a:r>
+              <a:rPr sz="1200" dirty="0">
+                <a:latin typeface="Monaco"/>
+                <a:ea typeface="Monaco"/>
+                <a:cs typeface="Monaco"/>
+                <a:sym typeface="Monaco"/>
+              </a:rPr>
+              <a:t> TRANSPOSE </a:t>
+            </a:r>
+            <a:r>
+              <a:rPr sz="1200" dirty="0">
+                <a:solidFill>
+                  <a:srgbClr val="941100"/>
+                </a:solidFill>
+                <a:latin typeface="Monaco"/>
+                <a:ea typeface="Monaco"/>
+                <a:cs typeface="Monaco"/>
+                <a:sym typeface="Monaco"/>
+              </a:rPr>
+              <a:t>}</a:t>
+            </a:r>
+            <a:endParaRPr sz="1200" dirty="0">
+              <a:latin typeface="Monaco"/>
+              <a:ea typeface="Monaco"/>
+              <a:cs typeface="Monaco"/>
+              <a:sym typeface="Monaco"/>
+            </a:endParaRPr>
+          </a:p>
+          <a:p>
+            <a:pPr marL="0" lvl="0" indent="0">
+              <a:spcBef>
+                <a:spcPts val="0"/>
+              </a:spcBef>
+              <a:buSzTx/>
+              <a:buFontTx/>
+              <a:buNone/>
+              <a:defRPr sz="1800"/>
+            </a:pPr>
+            <a:r>
+              <a:rPr sz="1200" dirty="0">
+                <a:latin typeface="Monaco"/>
+                <a:ea typeface="Monaco"/>
+                <a:cs typeface="Monaco"/>
+                <a:sym typeface="Monaco"/>
+              </a:rPr>
+              <a:t>			</a:t>
+            </a:r>
+            <a:r>
+              <a:rPr sz="1200" dirty="0">
+                <a:solidFill>
+                  <a:srgbClr val="941100"/>
+                </a:solidFill>
+                <a:latin typeface="Monaco"/>
+                <a:ea typeface="Monaco"/>
+                <a:cs typeface="Monaco"/>
+                <a:sym typeface="Monaco"/>
+              </a:rPr>
+              <a:t>|</a:t>
+            </a:r>
+            <a:r>
+              <a:rPr sz="1200" dirty="0">
+                <a:latin typeface="Monaco"/>
+                <a:ea typeface="Monaco"/>
+                <a:cs typeface="Monaco"/>
+                <a:sym typeface="Monaco"/>
+              </a:rPr>
+              <a:t> </a:t>
+            </a:r>
+            <a:r>
+              <a:rPr sz="1200" dirty="0">
+                <a:solidFill>
+                  <a:srgbClr val="FF9300"/>
+                </a:solidFill>
+                <a:latin typeface="Monaco"/>
+                <a:ea typeface="Monaco"/>
+                <a:cs typeface="Monaco"/>
+                <a:sym typeface="Monaco"/>
+              </a:rPr>
+              <a:t>'~'</a:t>
+            </a:r>
+            <a:r>
+              <a:rPr sz="1200" dirty="0">
+                <a:latin typeface="Monaco"/>
+                <a:ea typeface="Monaco"/>
+                <a:cs typeface="Monaco"/>
+                <a:sym typeface="Monaco"/>
+              </a:rPr>
+              <a:t>      </a:t>
+            </a:r>
+            <a:r>
+              <a:rPr sz="1200" dirty="0">
+                <a:solidFill>
+                  <a:srgbClr val="941100"/>
+                </a:solidFill>
+                <a:latin typeface="Monaco"/>
+                <a:ea typeface="Monaco"/>
+                <a:cs typeface="Monaco"/>
+                <a:sym typeface="Monaco"/>
+              </a:rPr>
+              <a:t>{</a:t>
+            </a:r>
+            <a:r>
+              <a:rPr sz="1200" dirty="0">
+                <a:latin typeface="Monaco"/>
+                <a:ea typeface="Monaco"/>
+                <a:cs typeface="Monaco"/>
+                <a:sym typeface="Monaco"/>
+              </a:rPr>
+              <a:t> INVERSION </a:t>
+            </a:r>
+            <a:r>
+              <a:rPr sz="1200" dirty="0">
+                <a:solidFill>
+                  <a:srgbClr val="941100"/>
+                </a:solidFill>
+                <a:latin typeface="Monaco"/>
+                <a:ea typeface="Monaco"/>
+                <a:cs typeface="Monaco"/>
+                <a:sym typeface="Monaco"/>
+              </a:rPr>
+              <a:t>}</a:t>
+            </a:r>
+            <a:endParaRPr sz="1200" dirty="0">
+              <a:latin typeface="Monaco"/>
+              <a:ea typeface="Monaco"/>
+              <a:cs typeface="Monaco"/>
+              <a:sym typeface="Monaco"/>
+            </a:endParaRPr>
+          </a:p>
+          <a:p>
+            <a:pPr marL="0" lvl="0" indent="0">
+              <a:spcBef>
+                <a:spcPts val="0"/>
+              </a:spcBef>
+              <a:buSzTx/>
+              <a:buFontTx/>
+              <a:buNone/>
+              <a:defRPr sz="1800"/>
+            </a:pPr>
+            <a:r>
+              <a:rPr sz="1100" dirty="0">
+                <a:latin typeface="Monaco"/>
+                <a:ea typeface="Monaco"/>
+                <a:cs typeface="Monaco"/>
+                <a:sym typeface="Monaco"/>
+              </a:rPr>
+              <a:t>			</a:t>
+            </a:r>
+            <a:r>
+              <a:rPr sz="1200" dirty="0">
+                <a:solidFill>
+                  <a:srgbClr val="941100"/>
+                </a:solidFill>
+                <a:latin typeface="Monaco"/>
+                <a:ea typeface="Monaco"/>
+                <a:cs typeface="Monaco"/>
+                <a:sym typeface="Monaco"/>
+              </a:rPr>
+              <a:t>|</a:t>
+            </a:r>
+            <a:r>
+              <a:rPr sz="1200" dirty="0">
+                <a:latin typeface="Monaco"/>
+                <a:ea typeface="Monaco"/>
+                <a:cs typeface="Monaco"/>
+                <a:sym typeface="Monaco"/>
+              </a:rPr>
+              <a:t> </a:t>
+            </a:r>
+            <a:r>
+              <a:rPr sz="1200" dirty="0">
+                <a:solidFill>
+                  <a:srgbClr val="FF9300"/>
+                </a:solidFill>
+                <a:latin typeface="Monaco"/>
+                <a:ea typeface="Monaco"/>
+                <a:cs typeface="Monaco"/>
+                <a:sym typeface="Monaco"/>
+              </a:rPr>
+              <a:t>'^'</a:t>
+            </a:r>
+            <a:r>
+              <a:rPr sz="1200" dirty="0">
+                <a:latin typeface="Monaco"/>
+                <a:ea typeface="Monaco"/>
+                <a:cs typeface="Monaco"/>
+                <a:sym typeface="Monaco"/>
+              </a:rPr>
+              <a:t>      </a:t>
+            </a:r>
+            <a:r>
+              <a:rPr sz="1200" dirty="0">
+                <a:solidFill>
+                  <a:srgbClr val="941100"/>
+                </a:solidFill>
+                <a:latin typeface="Monaco"/>
+                <a:ea typeface="Monaco"/>
+                <a:cs typeface="Monaco"/>
+                <a:sym typeface="Monaco"/>
+              </a:rPr>
+              <a:t>{</a:t>
+            </a:r>
+            <a:r>
+              <a:rPr sz="1200" dirty="0">
+                <a:latin typeface="Monaco"/>
+                <a:ea typeface="Monaco"/>
+                <a:cs typeface="Monaco"/>
+                <a:sym typeface="Monaco"/>
+              </a:rPr>
+              <a:t> DETERMINANT </a:t>
+            </a:r>
+            <a:r>
+              <a:rPr sz="1200" dirty="0">
+                <a:solidFill>
+                  <a:srgbClr val="941100"/>
+                </a:solidFill>
+                <a:latin typeface="Monaco"/>
+                <a:ea typeface="Monaco"/>
+                <a:cs typeface="Monaco"/>
+                <a:sym typeface="Monaco"/>
+              </a:rPr>
+              <a:t>}</a:t>
+            </a:r>
+            <a:r>
+              <a:rPr sz="1100" dirty="0">
+                <a:latin typeface="Monaco"/>
+                <a:ea typeface="Monaco"/>
+                <a:cs typeface="Monaco"/>
+                <a:sym typeface="Monaco"/>
+              </a:rPr>
+              <a:t> </a:t>
+            </a:r>
+          </a:p>
+          <a:p>
+            <a:pPr lvl="0">
+              <a:defRPr sz="1800"/>
+            </a:pPr>
+            <a:r>
+              <a:rPr sz="3200" dirty="0"/>
+              <a:t>In Parser, pattern matching and pattern reduction to build an AST tree </a:t>
+            </a:r>
+            <a:endParaRPr sz="1200" dirty="0"/>
+          </a:p>
+          <a:p>
+            <a:pPr marL="0" lvl="0" indent="0">
+              <a:spcBef>
+                <a:spcPts val="0"/>
+              </a:spcBef>
+              <a:buSzTx/>
+              <a:buFontTx/>
+              <a:buNone/>
+              <a:defRPr sz="1800"/>
+            </a:pPr>
+            <a:r>
+              <a:rPr sz="1200" dirty="0">
+                <a:solidFill>
+                  <a:srgbClr val="6485C1"/>
+                </a:solidFill>
+                <a:latin typeface="Monaco"/>
+                <a:ea typeface="Monaco"/>
+                <a:cs typeface="Monaco"/>
+                <a:sym typeface="Monaco"/>
+              </a:rPr>
+              <a:t>			expr:</a:t>
+            </a:r>
+          </a:p>
+          <a:p>
+            <a:pPr marL="0" lvl="0" indent="0">
+              <a:spcBef>
+                <a:spcPts val="0"/>
+              </a:spcBef>
+              <a:buSzTx/>
+              <a:buFontTx/>
+              <a:buNone/>
+              <a:defRPr sz="1800"/>
+            </a:pPr>
+            <a:r>
+              <a:rPr sz="1200" dirty="0">
+                <a:solidFill>
+                  <a:srgbClr val="6485C1"/>
+                </a:solidFill>
+                <a:latin typeface="Monaco"/>
+                <a:ea typeface="Monaco"/>
+                <a:cs typeface="Monaco"/>
+                <a:sym typeface="Monaco"/>
+              </a:rPr>
+              <a:t>			  ID               </a:t>
+            </a:r>
+            <a:r>
+              <a:rPr sz="1200" dirty="0">
+                <a:solidFill>
+                  <a:srgbClr val="941100"/>
+                </a:solidFill>
+                <a:latin typeface="Monaco"/>
+                <a:ea typeface="Monaco"/>
+                <a:cs typeface="Monaco"/>
+                <a:sym typeface="Monaco"/>
+              </a:rPr>
+              <a:t>{</a:t>
+            </a:r>
+            <a:r>
+              <a:rPr sz="1200" dirty="0">
+                <a:solidFill>
+                  <a:srgbClr val="6485C1"/>
+                </a:solidFill>
+                <a:latin typeface="Monaco"/>
+                <a:ea typeface="Monaco"/>
+                <a:cs typeface="Monaco"/>
+                <a:sym typeface="Monaco"/>
+              </a:rPr>
+              <a:t> Id</a:t>
+            </a:r>
+            <a:r>
+              <a:rPr sz="1200" dirty="0">
+                <a:solidFill>
+                  <a:srgbClr val="941100"/>
+                </a:solidFill>
+                <a:latin typeface="Monaco"/>
+                <a:ea typeface="Monaco"/>
+                <a:cs typeface="Monaco"/>
+                <a:sym typeface="Monaco"/>
+              </a:rPr>
+              <a:t>($</a:t>
+            </a:r>
+            <a:r>
+              <a:rPr sz="1200" dirty="0">
+                <a:solidFill>
+                  <a:srgbClr val="009193"/>
+                </a:solidFill>
+                <a:latin typeface="Monaco"/>
+                <a:ea typeface="Monaco"/>
+                <a:cs typeface="Monaco"/>
+                <a:sym typeface="Monaco"/>
+              </a:rPr>
+              <a:t>1</a:t>
+            </a:r>
+            <a:r>
+              <a:rPr sz="1200" dirty="0">
+                <a:solidFill>
+                  <a:srgbClr val="941100"/>
+                </a:solidFill>
+                <a:latin typeface="Monaco"/>
+                <a:ea typeface="Monaco"/>
+                <a:cs typeface="Monaco"/>
+                <a:sym typeface="Monaco"/>
+              </a:rPr>
+              <a:t>)</a:t>
+            </a:r>
+            <a:r>
+              <a:rPr sz="1200" dirty="0">
+                <a:solidFill>
+                  <a:srgbClr val="6485C1"/>
+                </a:solidFill>
+                <a:latin typeface="Monaco"/>
+                <a:ea typeface="Monaco"/>
+                <a:cs typeface="Monaco"/>
+                <a:sym typeface="Monaco"/>
+              </a:rPr>
+              <a:t> </a:t>
+            </a:r>
+            <a:r>
+              <a:rPr sz="1200" dirty="0">
+                <a:solidFill>
+                  <a:srgbClr val="941100"/>
+                </a:solidFill>
+                <a:latin typeface="Monaco"/>
+                <a:ea typeface="Monaco"/>
+                <a:cs typeface="Monaco"/>
+                <a:sym typeface="Monaco"/>
+              </a:rPr>
+              <a:t>}</a:t>
+            </a:r>
+            <a:endParaRPr sz="1200" dirty="0">
+              <a:solidFill>
+                <a:srgbClr val="6485C1"/>
+              </a:solidFill>
+              <a:latin typeface="Monaco"/>
+              <a:ea typeface="Monaco"/>
+              <a:cs typeface="Monaco"/>
+              <a:sym typeface="Monaco"/>
+            </a:endParaRPr>
+          </a:p>
+          <a:p>
+            <a:pPr marL="0" lvl="0" indent="0">
+              <a:spcBef>
+                <a:spcPts val="0"/>
+              </a:spcBef>
+              <a:buSzTx/>
+              <a:buFontTx/>
+              <a:buNone/>
+              <a:defRPr sz="1800"/>
+            </a:pPr>
+            <a:r>
+              <a:rPr sz="1200" dirty="0">
+                <a:solidFill>
+                  <a:srgbClr val="6485C1"/>
+                </a:solidFill>
+                <a:latin typeface="Monaco"/>
+                <a:ea typeface="Monaco"/>
+                <a:cs typeface="Monaco"/>
+                <a:sym typeface="Monaco"/>
+              </a:rPr>
+              <a:t>			/* matrix_unary: */</a:t>
+            </a:r>
+            <a:endParaRPr sz="1200" dirty="0">
+              <a:latin typeface="Monaco"/>
+              <a:ea typeface="Monaco"/>
+              <a:cs typeface="Monaco"/>
+              <a:sym typeface="Monaco"/>
+            </a:endParaRPr>
+          </a:p>
+          <a:p>
+            <a:pPr marL="0" lvl="0" indent="0">
+              <a:spcBef>
+                <a:spcPts val="0"/>
+              </a:spcBef>
+              <a:buSzTx/>
+              <a:buFontTx/>
+              <a:buNone/>
+              <a:defRPr sz="1800"/>
+            </a:pPr>
+            <a:r>
+              <a:rPr sz="1200" dirty="0">
+                <a:latin typeface="Monaco"/>
+                <a:ea typeface="Monaco"/>
+                <a:cs typeface="Monaco"/>
+                <a:sym typeface="Monaco"/>
+              </a:rPr>
+              <a:t>			|</a:t>
+            </a:r>
+            <a:r>
+              <a:rPr sz="1200" dirty="0">
+                <a:solidFill>
+                  <a:srgbClr val="941100"/>
+                </a:solidFill>
+                <a:latin typeface="Monaco"/>
+                <a:ea typeface="Monaco"/>
+                <a:cs typeface="Monaco"/>
+                <a:sym typeface="Monaco"/>
+              </a:rPr>
+              <a:t> </a:t>
+            </a:r>
+            <a:r>
+              <a:rPr sz="1200" dirty="0">
+                <a:latin typeface="Monaco"/>
+                <a:ea typeface="Monaco"/>
+                <a:cs typeface="Monaco"/>
+                <a:sym typeface="Monaco"/>
+              </a:rPr>
+              <a:t>expr TRANSPOSE   </a:t>
+            </a:r>
+            <a:r>
+              <a:rPr sz="1200" dirty="0">
+                <a:solidFill>
+                  <a:srgbClr val="941100"/>
+                </a:solidFill>
+                <a:latin typeface="Monaco"/>
+                <a:ea typeface="Monaco"/>
+                <a:cs typeface="Monaco"/>
+                <a:sym typeface="Monaco"/>
+              </a:rPr>
+              <a:t>{</a:t>
+            </a:r>
+            <a:r>
+              <a:rPr sz="1200" dirty="0">
+                <a:latin typeface="Monaco"/>
+                <a:ea typeface="Monaco"/>
+                <a:cs typeface="Monaco"/>
+                <a:sym typeface="Monaco"/>
+              </a:rPr>
+              <a:t> MatUnary_op</a:t>
+            </a:r>
+            <a:r>
+              <a:rPr sz="1200" dirty="0">
+                <a:solidFill>
+                  <a:srgbClr val="941100"/>
+                </a:solidFill>
+                <a:latin typeface="Monaco"/>
+                <a:ea typeface="Monaco"/>
+                <a:cs typeface="Monaco"/>
+                <a:sym typeface="Monaco"/>
+              </a:rPr>
+              <a:t>($</a:t>
+            </a:r>
+            <a:r>
+              <a:rPr sz="1200" dirty="0">
+                <a:solidFill>
+                  <a:srgbClr val="009193"/>
+                </a:solidFill>
+                <a:latin typeface="Monaco"/>
+                <a:ea typeface="Monaco"/>
+                <a:cs typeface="Monaco"/>
+                <a:sym typeface="Monaco"/>
+              </a:rPr>
+              <a:t>1</a:t>
+            </a:r>
+            <a:r>
+              <a:rPr sz="1200" dirty="0">
+                <a:solidFill>
+                  <a:srgbClr val="941100"/>
+                </a:solidFill>
+                <a:latin typeface="Monaco"/>
+                <a:ea typeface="Monaco"/>
+                <a:cs typeface="Monaco"/>
+                <a:sym typeface="Monaco"/>
+              </a:rPr>
+              <a:t>,</a:t>
+            </a:r>
+            <a:r>
+              <a:rPr sz="1200" dirty="0">
+                <a:latin typeface="Monaco"/>
+                <a:ea typeface="Monaco"/>
+                <a:cs typeface="Monaco"/>
+                <a:sym typeface="Monaco"/>
+              </a:rPr>
+              <a:t> MTranspose</a:t>
+            </a:r>
+            <a:r>
+              <a:rPr sz="1200" dirty="0">
+                <a:solidFill>
+                  <a:srgbClr val="941100"/>
+                </a:solidFill>
+                <a:latin typeface="Monaco"/>
+                <a:ea typeface="Monaco"/>
+                <a:cs typeface="Monaco"/>
+                <a:sym typeface="Monaco"/>
+              </a:rPr>
+              <a:t>)</a:t>
+            </a:r>
+            <a:r>
+              <a:rPr sz="1200" dirty="0">
+                <a:latin typeface="Monaco"/>
+                <a:ea typeface="Monaco"/>
+                <a:cs typeface="Monaco"/>
+                <a:sym typeface="Monaco"/>
+              </a:rPr>
+              <a:t> </a:t>
+            </a:r>
+            <a:r>
+              <a:rPr sz="1200" dirty="0">
+                <a:solidFill>
+                  <a:srgbClr val="941100"/>
+                </a:solidFill>
+                <a:latin typeface="Monaco"/>
+                <a:ea typeface="Monaco"/>
+                <a:cs typeface="Monaco"/>
+                <a:sym typeface="Monaco"/>
+              </a:rPr>
+              <a:t>}</a:t>
+            </a:r>
+            <a:endParaRPr sz="1200" dirty="0">
+              <a:latin typeface="Monaco"/>
+              <a:ea typeface="Monaco"/>
+              <a:cs typeface="Monaco"/>
+              <a:sym typeface="Monaco"/>
+            </a:endParaRPr>
+          </a:p>
+          <a:p>
+            <a:pPr marL="0" lvl="0" indent="0">
+              <a:spcBef>
+                <a:spcPts val="0"/>
+              </a:spcBef>
+              <a:buSzTx/>
+              <a:buFontTx/>
+              <a:buNone/>
+              <a:defRPr sz="1800"/>
+            </a:pPr>
+            <a:r>
+              <a:rPr sz="1200" dirty="0">
+                <a:latin typeface="Monaco"/>
+                <a:ea typeface="Monaco"/>
+                <a:cs typeface="Monaco"/>
+                <a:sym typeface="Monaco"/>
+              </a:rPr>
+              <a:t>			</a:t>
+            </a:r>
+            <a:r>
+              <a:rPr sz="1200" dirty="0">
+                <a:solidFill>
+                  <a:srgbClr val="941100"/>
+                </a:solidFill>
+                <a:latin typeface="Monaco"/>
+                <a:ea typeface="Monaco"/>
+                <a:cs typeface="Monaco"/>
+                <a:sym typeface="Monaco"/>
+              </a:rPr>
+              <a:t>|</a:t>
+            </a:r>
+            <a:r>
+              <a:rPr sz="1200" dirty="0">
+                <a:latin typeface="Monaco"/>
+                <a:ea typeface="Monaco"/>
+                <a:cs typeface="Monaco"/>
+                <a:sym typeface="Monaco"/>
+              </a:rPr>
+              <a:t> expr INVERSION   </a:t>
+            </a:r>
+            <a:r>
+              <a:rPr sz="1200" dirty="0">
+                <a:solidFill>
+                  <a:srgbClr val="941100"/>
+                </a:solidFill>
+                <a:latin typeface="Monaco"/>
+                <a:ea typeface="Monaco"/>
+                <a:cs typeface="Monaco"/>
+                <a:sym typeface="Monaco"/>
+              </a:rPr>
+              <a:t>{</a:t>
+            </a:r>
+            <a:r>
+              <a:rPr sz="1200" dirty="0">
+                <a:latin typeface="Monaco"/>
+                <a:ea typeface="Monaco"/>
+                <a:cs typeface="Monaco"/>
+                <a:sym typeface="Monaco"/>
+              </a:rPr>
+              <a:t> MatUnary_op</a:t>
+            </a:r>
+            <a:r>
+              <a:rPr sz="1200" dirty="0">
+                <a:solidFill>
+                  <a:srgbClr val="941100"/>
+                </a:solidFill>
+                <a:latin typeface="Monaco"/>
+                <a:ea typeface="Monaco"/>
+                <a:cs typeface="Monaco"/>
+                <a:sym typeface="Monaco"/>
+              </a:rPr>
+              <a:t>($</a:t>
+            </a:r>
+            <a:r>
+              <a:rPr sz="1200" dirty="0">
+                <a:solidFill>
+                  <a:srgbClr val="009193"/>
+                </a:solidFill>
+                <a:latin typeface="Monaco"/>
+                <a:ea typeface="Monaco"/>
+                <a:cs typeface="Monaco"/>
+                <a:sym typeface="Monaco"/>
+              </a:rPr>
+              <a:t>1</a:t>
+            </a:r>
+            <a:r>
+              <a:rPr sz="1200" dirty="0">
+                <a:solidFill>
+                  <a:srgbClr val="941100"/>
+                </a:solidFill>
+                <a:latin typeface="Monaco"/>
+                <a:ea typeface="Monaco"/>
+                <a:cs typeface="Monaco"/>
+                <a:sym typeface="Monaco"/>
+              </a:rPr>
+              <a:t>,</a:t>
+            </a:r>
+            <a:r>
+              <a:rPr sz="1200" dirty="0">
+                <a:latin typeface="Monaco"/>
+                <a:ea typeface="Monaco"/>
+                <a:cs typeface="Monaco"/>
+                <a:sym typeface="Monaco"/>
+              </a:rPr>
+              <a:t> MInversion</a:t>
+            </a:r>
+            <a:r>
+              <a:rPr sz="1200" dirty="0">
+                <a:solidFill>
+                  <a:srgbClr val="941100"/>
+                </a:solidFill>
+                <a:latin typeface="Monaco"/>
+                <a:ea typeface="Monaco"/>
+                <a:cs typeface="Monaco"/>
+                <a:sym typeface="Monaco"/>
+              </a:rPr>
+              <a:t>)</a:t>
+            </a:r>
+            <a:r>
+              <a:rPr sz="1200" dirty="0">
+                <a:latin typeface="Monaco"/>
+                <a:ea typeface="Monaco"/>
+                <a:cs typeface="Monaco"/>
+                <a:sym typeface="Monaco"/>
+              </a:rPr>
+              <a:t> </a:t>
+            </a:r>
+            <a:r>
+              <a:rPr sz="1200" dirty="0">
+                <a:solidFill>
+                  <a:srgbClr val="941100"/>
+                </a:solidFill>
+                <a:latin typeface="Monaco"/>
+                <a:ea typeface="Monaco"/>
+                <a:cs typeface="Monaco"/>
+                <a:sym typeface="Monaco"/>
+              </a:rPr>
+              <a:t>}</a:t>
+            </a:r>
+            <a:endParaRPr sz="1200" dirty="0">
+              <a:latin typeface="Monaco"/>
+              <a:ea typeface="Monaco"/>
+              <a:cs typeface="Monaco"/>
+              <a:sym typeface="Monaco"/>
+            </a:endParaRPr>
+          </a:p>
+          <a:p>
+            <a:pPr marL="0" lvl="0" indent="0">
+              <a:spcBef>
+                <a:spcPts val="0"/>
+              </a:spcBef>
+              <a:buSzTx/>
+              <a:buFontTx/>
+              <a:buNone/>
+              <a:defRPr sz="1800"/>
+            </a:pPr>
+            <a:r>
+              <a:rPr sz="1200" dirty="0">
+                <a:latin typeface="Monaco"/>
+                <a:ea typeface="Monaco"/>
+                <a:cs typeface="Monaco"/>
+                <a:sym typeface="Monaco"/>
+              </a:rPr>
+              <a:t>			</a:t>
+            </a:r>
+            <a:r>
+              <a:rPr sz="1200" dirty="0">
+                <a:solidFill>
+                  <a:srgbClr val="941100"/>
+                </a:solidFill>
+                <a:latin typeface="Monaco"/>
+                <a:ea typeface="Monaco"/>
+                <a:cs typeface="Monaco"/>
+                <a:sym typeface="Monaco"/>
+              </a:rPr>
+              <a:t>|</a:t>
+            </a:r>
+            <a:r>
+              <a:rPr sz="1200" dirty="0">
+                <a:latin typeface="Monaco"/>
+                <a:ea typeface="Monaco"/>
+                <a:cs typeface="Monaco"/>
+                <a:sym typeface="Monaco"/>
+              </a:rPr>
+              <a:t> expr DETERMINANT </a:t>
+            </a:r>
+            <a:r>
+              <a:rPr sz="1200" dirty="0">
+                <a:solidFill>
+                  <a:srgbClr val="941100"/>
+                </a:solidFill>
+                <a:latin typeface="Monaco"/>
+                <a:ea typeface="Monaco"/>
+                <a:cs typeface="Monaco"/>
+                <a:sym typeface="Monaco"/>
+              </a:rPr>
+              <a:t>{</a:t>
+            </a:r>
+            <a:r>
+              <a:rPr sz="1200" dirty="0">
+                <a:latin typeface="Monaco"/>
+                <a:ea typeface="Monaco"/>
+                <a:cs typeface="Monaco"/>
+                <a:sym typeface="Monaco"/>
+              </a:rPr>
+              <a:t> MatUnary_op</a:t>
+            </a:r>
+            <a:r>
+              <a:rPr sz="1200" dirty="0">
+                <a:solidFill>
+                  <a:srgbClr val="941100"/>
+                </a:solidFill>
+                <a:latin typeface="Monaco"/>
+                <a:ea typeface="Monaco"/>
+                <a:cs typeface="Monaco"/>
+                <a:sym typeface="Monaco"/>
+              </a:rPr>
+              <a:t>($</a:t>
+            </a:r>
+            <a:r>
+              <a:rPr sz="1200" dirty="0">
+                <a:solidFill>
+                  <a:srgbClr val="009193"/>
+                </a:solidFill>
+                <a:latin typeface="Monaco"/>
+                <a:ea typeface="Monaco"/>
+                <a:cs typeface="Monaco"/>
+                <a:sym typeface="Monaco"/>
+              </a:rPr>
+              <a:t>1</a:t>
+            </a:r>
+            <a:r>
+              <a:rPr sz="1200" dirty="0">
+                <a:solidFill>
+                  <a:srgbClr val="941100"/>
+                </a:solidFill>
+                <a:latin typeface="Monaco"/>
+                <a:ea typeface="Monaco"/>
+                <a:cs typeface="Monaco"/>
+                <a:sym typeface="Monaco"/>
+              </a:rPr>
+              <a:t>,</a:t>
+            </a:r>
+            <a:r>
+              <a:rPr sz="1200" dirty="0">
+                <a:latin typeface="Monaco"/>
+                <a:ea typeface="Monaco"/>
+                <a:cs typeface="Monaco"/>
+                <a:sym typeface="Monaco"/>
+              </a:rPr>
+              <a:t> MDeterminant</a:t>
+            </a:r>
+            <a:r>
+              <a:rPr sz="1200" dirty="0">
+                <a:solidFill>
+                  <a:srgbClr val="941100"/>
+                </a:solidFill>
+                <a:latin typeface="Monaco"/>
+                <a:ea typeface="Monaco"/>
+                <a:cs typeface="Monaco"/>
+                <a:sym typeface="Monaco"/>
+              </a:rPr>
+              <a:t>)</a:t>
+            </a:r>
+            <a:r>
+              <a:rPr sz="1200" dirty="0">
+                <a:latin typeface="Monaco"/>
+                <a:ea typeface="Monaco"/>
+                <a:cs typeface="Monaco"/>
+                <a:sym typeface="Monaco"/>
+              </a:rPr>
+              <a:t> </a:t>
+            </a:r>
+            <a:r>
+              <a:rPr sz="1200" dirty="0">
+                <a:solidFill>
+                  <a:srgbClr val="941100"/>
+                </a:solidFill>
+                <a:latin typeface="Monaco"/>
+                <a:ea typeface="Monaco"/>
+                <a:cs typeface="Monaco"/>
+                <a:sym typeface="Monaco"/>
+              </a:rPr>
+              <a:t>}</a:t>
+            </a:r>
+          </a:p>
+          <a:p>
+            <a:pPr marL="0" lvl="0" indent="0">
+              <a:spcBef>
+                <a:spcPts val="0"/>
+              </a:spcBef>
+              <a:buSzTx/>
+              <a:buFontTx/>
+              <a:buNone/>
+              <a:defRPr sz="1800"/>
+            </a:pPr>
+            <a:r>
+              <a:rPr sz="1200" dirty="0">
+                <a:solidFill>
+                  <a:srgbClr val="941100"/>
+                </a:solidFill>
+                <a:latin typeface="Monaco"/>
+                <a:ea typeface="Monaco"/>
+                <a:cs typeface="Monaco"/>
+                <a:sym typeface="Monaco"/>
+              </a:rPr>
+              <a:t>			</a:t>
+            </a:r>
+            <a:r>
+              <a:rPr sz="1200" dirty="0">
+                <a:solidFill>
+                  <a:srgbClr val="CD5550"/>
+                </a:solidFill>
+                <a:latin typeface="Monaco"/>
+                <a:ea typeface="Monaco"/>
+                <a:cs typeface="Monaco"/>
+                <a:sym typeface="Monaco"/>
+              </a:rPr>
+              <a:t>stmt:</a:t>
+            </a:r>
+            <a:endParaRPr sz="1200" dirty="0">
+              <a:latin typeface="Monaco"/>
+              <a:ea typeface="Monaco"/>
+              <a:cs typeface="Monaco"/>
+              <a:sym typeface="Monaco"/>
+            </a:endParaRPr>
+          </a:p>
+          <a:p>
+            <a:pPr marL="0" lvl="0" indent="0">
+              <a:spcBef>
+                <a:spcPts val="0"/>
+              </a:spcBef>
+              <a:buSzTx/>
+              <a:buFontTx/>
+              <a:buNone/>
+              <a:defRPr sz="1800"/>
+            </a:pPr>
+            <a:r>
+              <a:rPr sz="1200" dirty="0">
+                <a:latin typeface="Monaco"/>
+                <a:ea typeface="Monaco"/>
+                <a:cs typeface="Monaco"/>
+                <a:sym typeface="Monaco"/>
+              </a:rPr>
+              <a:t>    			  expr SEMI </a:t>
+            </a:r>
+            <a:r>
+              <a:rPr sz="1200" dirty="0">
+                <a:solidFill>
+                  <a:srgbClr val="941100"/>
+                </a:solidFill>
+                <a:latin typeface="Monaco"/>
+                <a:ea typeface="Monaco"/>
+                <a:cs typeface="Monaco"/>
+                <a:sym typeface="Monaco"/>
+              </a:rPr>
+              <a:t>{</a:t>
+            </a:r>
+            <a:r>
+              <a:rPr sz="1200" dirty="0">
+                <a:latin typeface="Monaco"/>
+                <a:ea typeface="Monaco"/>
+                <a:cs typeface="Monaco"/>
+                <a:sym typeface="Monaco"/>
+              </a:rPr>
+              <a:t> Expr</a:t>
+            </a:r>
+            <a:r>
+              <a:rPr sz="1200" dirty="0">
+                <a:solidFill>
+                  <a:srgbClr val="941100"/>
+                </a:solidFill>
+                <a:latin typeface="Monaco"/>
+                <a:ea typeface="Monaco"/>
+                <a:cs typeface="Monaco"/>
+                <a:sym typeface="Monaco"/>
+              </a:rPr>
+              <a:t>($</a:t>
+            </a:r>
+            <a:r>
+              <a:rPr sz="1200" dirty="0">
+                <a:solidFill>
+                  <a:srgbClr val="009193"/>
+                </a:solidFill>
+                <a:latin typeface="Monaco"/>
+                <a:ea typeface="Monaco"/>
+                <a:cs typeface="Monaco"/>
+                <a:sym typeface="Monaco"/>
+              </a:rPr>
+              <a:t>1</a:t>
+            </a:r>
+            <a:r>
+              <a:rPr sz="1200" dirty="0">
+                <a:solidFill>
+                  <a:srgbClr val="941100"/>
+                </a:solidFill>
+                <a:latin typeface="Monaco"/>
+                <a:ea typeface="Monaco"/>
+                <a:cs typeface="Monaco"/>
+                <a:sym typeface="Monaco"/>
+              </a:rPr>
+              <a:t>)</a:t>
+            </a:r>
+            <a:r>
+              <a:rPr sz="1200" dirty="0">
+                <a:latin typeface="Monaco"/>
+                <a:ea typeface="Monaco"/>
+                <a:cs typeface="Monaco"/>
+                <a:sym typeface="Monaco"/>
+              </a:rPr>
+              <a:t> </a:t>
+            </a:r>
+            <a:r>
+              <a:rPr sz="1200" dirty="0">
+                <a:solidFill>
+                  <a:srgbClr val="941100"/>
+                </a:solidFill>
+                <a:latin typeface="Monaco"/>
+                <a:ea typeface="Monaco"/>
+                <a:cs typeface="Monaco"/>
+                <a:sym typeface="Monaco"/>
+              </a:rPr>
+              <a:t>}</a:t>
+            </a:r>
           </a:p>
         </p:txBody>
       </p:sp>
     </p:spTree>
     <p:extLst>
       <p:ext uri="{BB962C8B-B14F-4D97-AF65-F5344CB8AC3E}">
-        <p14:creationId xmlns:p14="http://schemas.microsoft.com/office/powerpoint/2010/main" val="2242842429"/>
+        <p14:creationId xmlns:p14="http://schemas.microsoft.com/office/powerpoint/2010/main" val="837922780"/>
       </p:ext>
     </p:extLst>
   </p:cSld>
   <p:clrMapOvr>
     <a:masterClrMapping/>
   </p:clrMapOvr>
+  <mc:AlternateContent xmlns:mc="http://schemas.openxmlformats.org/markup-compatibility/2006">
+    <mc:Choice xmlns:p14="http://schemas.microsoft.com/office/powerpoint/2010/main" Requires="p14">
+      <p:transition spd="slow" p14:dur="2000"/>
+    </mc:Choice>
+    <mc:Fallback>
+      <p:transition xmlns:p14="http://schemas.microsoft.com/office/powerpoint/2010/main" spd="slow"/>
+    </mc:Fallback>
+  </mc:AlternateContent>
 </p:sld>
 </file>
 
@@ -3420,7 +4857,7 @@
       </p:grpSpPr>
       <p:sp>
         <p:nvSpPr>
-          <p:cNvPr id="2" name="Title 1"/>
+          <p:cNvPr id="87" name="Shape 87"/>
           <p:cNvSpPr>
             <a:spLocks noGrp="1"/>
           </p:cNvSpPr>
@@ -3428,60 +4865,1246 @@
             <p:ph type="title"/>
           </p:nvPr>
         </p:nvSpPr>
-        <p:spPr/>
+        <p:spPr>
+          <a:xfrm>
+            <a:off x="457200" y="274638"/>
+            <a:ext cx="8229600" cy="1143001"/>
+          </a:xfrm>
+          <a:prstGeom prst="rect">
+            <a:avLst/>
+          </a:prstGeom>
+        </p:spPr>
         <p:txBody>
           <a:bodyPr/>
           <a:lstStyle/>
           <a:p>
-            <a:r>
-              <a:rPr lang="en-US" dirty="0" err="1" smtClean="0"/>
-              <a:t>Ast</a:t>
-            </a:r>
-            <a:endParaRPr lang="en-US" dirty="0"/>
-          </a:p>
-        </p:txBody>
-      </p:sp>
-      <p:sp>
-        <p:nvSpPr>
-          <p:cNvPr id="3" name="Content Placeholder 2"/>
-          <p:cNvSpPr>
-            <a:spLocks noGrp="1"/>
-          </p:cNvSpPr>
-          <p:nvPr>
-            <p:ph idx="1"/>
-          </p:nvPr>
-        </p:nvSpPr>
-        <p:spPr/>
+            <a:pPr lvl="0">
+              <a:defRPr sz="1800"/>
+            </a:pPr>
+            <a:r>
+              <a:rPr sz="4400"/>
+              <a:t>AST</a:t>
+            </a:r>
+          </a:p>
+        </p:txBody>
+      </p:sp>
+      <p:sp>
+        <p:nvSpPr>
+          <p:cNvPr id="88" name="Shape 88"/>
+          <p:cNvSpPr>
+            <a:spLocks noGrp="1"/>
+          </p:cNvSpPr>
+          <p:nvPr>
+            <p:ph type="body" idx="1"/>
+          </p:nvPr>
+        </p:nvSpPr>
+        <p:spPr>
+          <a:xfrm>
+            <a:off x="457200" y="1600200"/>
+            <a:ext cx="8229600" cy="4525963"/>
+          </a:xfrm>
+          <a:prstGeom prst="rect">
+            <a:avLst/>
+          </a:prstGeom>
+        </p:spPr>
         <p:txBody>
           <a:bodyPr/>
           <a:lstStyle/>
           <a:p>
-            <a:r>
-              <a:rPr lang="en-US" dirty="0" smtClean="0"/>
-              <a:t>Notably: We define a </a:t>
-            </a:r>
-            <a:r>
-              <a:rPr lang="en-US" dirty="0" err="1" smtClean="0"/>
-              <a:t>struct</a:t>
-            </a:r>
-            <a:r>
-              <a:rPr lang="en-US" dirty="0" smtClean="0"/>
-              <a:t> that remember s</a:t>
-            </a:r>
-            <a:endParaRPr lang="en-US" dirty="0"/>
+            <a:pPr lvl="0">
+              <a:defRPr sz="1800"/>
+            </a:pPr>
+            <a:r>
+              <a:rPr sz="3200"/>
+              <a:t>In AST, define structure corresponding to each pattern in Parser</a:t>
+            </a:r>
+          </a:p>
+          <a:p>
+            <a:pPr marL="0" lvl="0" indent="0">
+              <a:spcBef>
+                <a:spcPts val="0"/>
+              </a:spcBef>
+              <a:buSzTx/>
+              <a:buFontTx/>
+              <a:buNone/>
+              <a:defRPr sz="1800"/>
+            </a:pPr>
+            <a:r>
+              <a:rPr sz="1200">
+                <a:solidFill>
+                  <a:srgbClr val="6485C1"/>
+                </a:solidFill>
+                <a:latin typeface="Monaco"/>
+                <a:ea typeface="Monaco"/>
+                <a:cs typeface="Monaco"/>
+                <a:sym typeface="Monaco"/>
+              </a:rPr>
+              <a:t>		</a:t>
+            </a:r>
+            <a:r>
+              <a:rPr sz="1200">
+                <a:solidFill>
+                  <a:srgbClr val="931A68"/>
+                </a:solidFill>
+                <a:latin typeface="Monaco"/>
+                <a:ea typeface="Monaco"/>
+                <a:cs typeface="Monaco"/>
+                <a:sym typeface="Monaco"/>
+              </a:rPr>
+              <a:t>type</a:t>
+            </a:r>
+            <a:r>
+              <a:rPr sz="1200">
+                <a:latin typeface="Monaco"/>
+                <a:ea typeface="Monaco"/>
+                <a:cs typeface="Monaco"/>
+                <a:sym typeface="Monaco"/>
+              </a:rPr>
+              <a:t> mat_uop </a:t>
+            </a:r>
+            <a:r>
+              <a:rPr sz="1200">
+                <a:solidFill>
+                  <a:srgbClr val="941100"/>
+                </a:solidFill>
+                <a:latin typeface="Monaco"/>
+                <a:ea typeface="Monaco"/>
+                <a:cs typeface="Monaco"/>
+                <a:sym typeface="Monaco"/>
+              </a:rPr>
+              <a:t>=</a:t>
+            </a:r>
+            <a:r>
+              <a:rPr sz="1200">
+                <a:latin typeface="Monaco"/>
+                <a:ea typeface="Monaco"/>
+                <a:cs typeface="Monaco"/>
+                <a:sym typeface="Monaco"/>
+              </a:rPr>
+              <a:t> </a:t>
+            </a:r>
+            <a:r>
+              <a:rPr sz="1200">
+                <a:solidFill>
+                  <a:srgbClr val="6485C1"/>
+                </a:solidFill>
+                <a:latin typeface="Monaco"/>
+                <a:ea typeface="Monaco"/>
+                <a:cs typeface="Monaco"/>
+                <a:sym typeface="Monaco"/>
+              </a:rPr>
+              <a:t>MTranspose</a:t>
+            </a:r>
+            <a:r>
+              <a:rPr sz="1200">
+                <a:latin typeface="Monaco"/>
+                <a:ea typeface="Monaco"/>
+                <a:cs typeface="Monaco"/>
+                <a:sym typeface="Monaco"/>
+              </a:rPr>
+              <a:t> </a:t>
+            </a:r>
+            <a:r>
+              <a:rPr sz="1200">
+                <a:solidFill>
+                  <a:srgbClr val="941100"/>
+                </a:solidFill>
+                <a:latin typeface="Monaco"/>
+                <a:ea typeface="Monaco"/>
+                <a:cs typeface="Monaco"/>
+                <a:sym typeface="Monaco"/>
+              </a:rPr>
+              <a:t>|</a:t>
+            </a:r>
+            <a:r>
+              <a:rPr sz="1200">
+                <a:latin typeface="Monaco"/>
+                <a:ea typeface="Monaco"/>
+                <a:cs typeface="Monaco"/>
+                <a:sym typeface="Monaco"/>
+              </a:rPr>
+              <a:t> </a:t>
+            </a:r>
+            <a:r>
+              <a:rPr sz="1200">
+                <a:solidFill>
+                  <a:srgbClr val="6485C1"/>
+                </a:solidFill>
+                <a:latin typeface="Monaco"/>
+                <a:ea typeface="Monaco"/>
+                <a:cs typeface="Monaco"/>
+                <a:sym typeface="Monaco"/>
+              </a:rPr>
+              <a:t>MInversion</a:t>
+            </a:r>
+            <a:r>
+              <a:rPr sz="1200">
+                <a:latin typeface="Monaco"/>
+                <a:ea typeface="Monaco"/>
+                <a:cs typeface="Monaco"/>
+                <a:sym typeface="Monaco"/>
+              </a:rPr>
+              <a:t> </a:t>
+            </a:r>
+            <a:r>
+              <a:rPr sz="1200">
+                <a:solidFill>
+                  <a:srgbClr val="941100"/>
+                </a:solidFill>
+                <a:latin typeface="Monaco"/>
+                <a:ea typeface="Monaco"/>
+                <a:cs typeface="Monaco"/>
+                <a:sym typeface="Monaco"/>
+              </a:rPr>
+              <a:t>|</a:t>
+            </a:r>
+            <a:r>
+              <a:rPr sz="1200">
+                <a:latin typeface="Monaco"/>
+                <a:ea typeface="Monaco"/>
+                <a:cs typeface="Monaco"/>
+                <a:sym typeface="Monaco"/>
+              </a:rPr>
+              <a:t> </a:t>
+            </a:r>
+            <a:r>
+              <a:rPr sz="1200">
+                <a:solidFill>
+                  <a:srgbClr val="6485C1"/>
+                </a:solidFill>
+                <a:latin typeface="Monaco"/>
+                <a:ea typeface="Monaco"/>
+                <a:cs typeface="Monaco"/>
+                <a:sym typeface="Monaco"/>
+              </a:rPr>
+              <a:t>MDeterminant</a:t>
+            </a:r>
+          </a:p>
+          <a:p>
+            <a:pPr marL="0" lvl="0" indent="0">
+              <a:spcBef>
+                <a:spcPts val="0"/>
+              </a:spcBef>
+              <a:buSzTx/>
+              <a:buFontTx/>
+              <a:buNone/>
+              <a:defRPr sz="1800"/>
+            </a:pPr>
+            <a:r>
+              <a:rPr sz="1200">
+                <a:latin typeface="Monaco"/>
+                <a:ea typeface="Monaco"/>
+                <a:cs typeface="Monaco"/>
+                <a:sym typeface="Monaco"/>
+              </a:rPr>
+              <a:t>		</a:t>
+            </a:r>
+            <a:r>
+              <a:rPr sz="1200">
+                <a:solidFill>
+                  <a:srgbClr val="931A68"/>
+                </a:solidFill>
+                <a:latin typeface="Monaco"/>
+                <a:ea typeface="Monaco"/>
+                <a:cs typeface="Monaco"/>
+                <a:sym typeface="Monaco"/>
+              </a:rPr>
+              <a:t>type</a:t>
+            </a:r>
+            <a:r>
+              <a:rPr sz="1200">
+                <a:latin typeface="Monaco"/>
+                <a:ea typeface="Monaco"/>
+                <a:cs typeface="Monaco"/>
+                <a:sym typeface="Monaco"/>
+              </a:rPr>
+              <a:t> expr </a:t>
+            </a:r>
+            <a:r>
+              <a:rPr sz="1200">
+                <a:solidFill>
+                  <a:srgbClr val="941100"/>
+                </a:solidFill>
+                <a:latin typeface="Monaco"/>
+                <a:ea typeface="Monaco"/>
+                <a:cs typeface="Monaco"/>
+                <a:sym typeface="Monaco"/>
+              </a:rPr>
+              <a:t>=</a:t>
+            </a:r>
+          </a:p>
+          <a:p>
+            <a:pPr marL="0" lvl="0" indent="0">
+              <a:spcBef>
+                <a:spcPts val="0"/>
+              </a:spcBef>
+              <a:buSzTx/>
+              <a:buFontTx/>
+              <a:buNone/>
+              <a:defRPr sz="1800"/>
+            </a:pPr>
+            <a:r>
+              <a:rPr sz="1200">
+                <a:solidFill>
+                  <a:srgbClr val="941100"/>
+                </a:solidFill>
+                <a:latin typeface="Monaco"/>
+                <a:ea typeface="Monaco"/>
+                <a:cs typeface="Monaco"/>
+                <a:sym typeface="Monaco"/>
+              </a:rPr>
+              <a:t>   		  </a:t>
+            </a:r>
+            <a:r>
+              <a:rPr sz="1200">
+                <a:solidFill>
+                  <a:srgbClr val="6485C1"/>
+                </a:solidFill>
+                <a:latin typeface="Monaco"/>
+                <a:ea typeface="Monaco"/>
+                <a:cs typeface="Monaco"/>
+                <a:sym typeface="Monaco"/>
+              </a:rPr>
+              <a:t>Id</a:t>
+            </a:r>
+            <a:r>
+              <a:rPr sz="1200">
+                <a:latin typeface="Monaco"/>
+                <a:ea typeface="Monaco"/>
+                <a:cs typeface="Monaco"/>
+                <a:sym typeface="Monaco"/>
+              </a:rPr>
+              <a:t> </a:t>
+            </a:r>
+            <a:r>
+              <a:rPr sz="1200">
+                <a:solidFill>
+                  <a:srgbClr val="931A68"/>
+                </a:solidFill>
+                <a:latin typeface="Monaco"/>
+                <a:ea typeface="Monaco"/>
+                <a:cs typeface="Monaco"/>
+                <a:sym typeface="Monaco"/>
+              </a:rPr>
+              <a:t>of</a:t>
+            </a:r>
+            <a:r>
+              <a:rPr sz="1200">
+                <a:latin typeface="Monaco"/>
+                <a:ea typeface="Monaco"/>
+                <a:cs typeface="Monaco"/>
+                <a:sym typeface="Monaco"/>
+              </a:rPr>
+              <a:t> string</a:t>
+            </a:r>
+            <a:endParaRPr sz="1200">
+              <a:solidFill>
+                <a:srgbClr val="941100"/>
+              </a:solidFill>
+              <a:latin typeface="Monaco"/>
+              <a:ea typeface="Monaco"/>
+              <a:cs typeface="Monaco"/>
+              <a:sym typeface="Monaco"/>
+            </a:endParaRPr>
+          </a:p>
+          <a:p>
+            <a:pPr marL="0" lvl="0" indent="0">
+              <a:spcBef>
+                <a:spcPts val="0"/>
+              </a:spcBef>
+              <a:buSzTx/>
+              <a:buFontTx/>
+              <a:buNone/>
+              <a:defRPr sz="1800"/>
+            </a:pPr>
+            <a:r>
+              <a:rPr sz="1200">
+                <a:solidFill>
+                  <a:srgbClr val="941100"/>
+                </a:solidFill>
+                <a:latin typeface="Monaco"/>
+                <a:ea typeface="Monaco"/>
+                <a:cs typeface="Monaco"/>
+                <a:sym typeface="Monaco"/>
+              </a:rPr>
+              <a:t>		| </a:t>
+            </a:r>
+            <a:r>
+              <a:rPr sz="1200">
+                <a:latin typeface="Monaco"/>
+                <a:ea typeface="Monaco"/>
+                <a:cs typeface="Monaco"/>
+                <a:sym typeface="Monaco"/>
+              </a:rPr>
+              <a:t>MatUnary_op </a:t>
+            </a:r>
+            <a:r>
+              <a:rPr sz="1200">
+                <a:solidFill>
+                  <a:srgbClr val="931A68"/>
+                </a:solidFill>
+                <a:latin typeface="Monaco"/>
+                <a:ea typeface="Monaco"/>
+                <a:cs typeface="Monaco"/>
+                <a:sym typeface="Monaco"/>
+              </a:rPr>
+              <a:t>of</a:t>
+            </a:r>
+            <a:r>
+              <a:rPr sz="1200">
+                <a:latin typeface="Monaco"/>
+                <a:ea typeface="Monaco"/>
+                <a:cs typeface="Monaco"/>
+                <a:sym typeface="Monaco"/>
+              </a:rPr>
+              <a:t> expr </a:t>
+            </a:r>
+            <a:r>
+              <a:rPr sz="1200">
+                <a:solidFill>
+                  <a:srgbClr val="941100"/>
+                </a:solidFill>
+                <a:latin typeface="Monaco"/>
+                <a:ea typeface="Monaco"/>
+                <a:cs typeface="Monaco"/>
+                <a:sym typeface="Monaco"/>
+              </a:rPr>
+              <a:t>*</a:t>
+            </a:r>
+            <a:r>
+              <a:rPr sz="1200">
+                <a:latin typeface="Monaco"/>
+                <a:ea typeface="Monaco"/>
+                <a:cs typeface="Monaco"/>
+                <a:sym typeface="Monaco"/>
+              </a:rPr>
+              <a:t> mat_uop</a:t>
+            </a:r>
+          </a:p>
+          <a:p>
+            <a:pPr marL="0" lvl="0" indent="0">
+              <a:spcBef>
+                <a:spcPts val="0"/>
+              </a:spcBef>
+              <a:buSzTx/>
+              <a:buFontTx/>
+              <a:buNone/>
+              <a:defRPr sz="1800"/>
+            </a:pPr>
+            <a:endParaRPr sz="1200">
+              <a:latin typeface="Monaco"/>
+              <a:ea typeface="Monaco"/>
+              <a:cs typeface="Monaco"/>
+              <a:sym typeface="Monaco"/>
+            </a:endParaRPr>
+          </a:p>
+          <a:p>
+            <a:pPr marL="0" lvl="0" indent="0">
+              <a:spcBef>
+                <a:spcPts val="0"/>
+              </a:spcBef>
+              <a:buSzTx/>
+              <a:buFontTx/>
+              <a:buNone/>
+              <a:defRPr sz="1800"/>
+            </a:pPr>
+            <a:r>
+              <a:rPr sz="1200">
+                <a:solidFill>
+                  <a:srgbClr val="4E9072"/>
+                </a:solidFill>
+                <a:latin typeface="Monaco"/>
+                <a:ea typeface="Monaco"/>
+                <a:cs typeface="Monaco"/>
+                <a:sym typeface="Monaco"/>
+              </a:rPr>
+              <a:t>		(* "Pretty printed" version of the AST *)</a:t>
+            </a:r>
+          </a:p>
+          <a:p>
+            <a:pPr marL="0" lvl="0" indent="0">
+              <a:spcBef>
+                <a:spcPts val="0"/>
+              </a:spcBef>
+              <a:buSzTx/>
+              <a:buFontTx/>
+              <a:buNone/>
+              <a:defRPr sz="1800"/>
+            </a:pPr>
+            <a:r>
+              <a:rPr sz="1200">
+                <a:latin typeface="Monaco"/>
+                <a:ea typeface="Monaco"/>
+                <a:cs typeface="Monaco"/>
+                <a:sym typeface="Monaco"/>
+              </a:rPr>
+              <a:t>		</a:t>
+            </a:r>
+            <a:r>
+              <a:rPr sz="1200">
+                <a:solidFill>
+                  <a:srgbClr val="931A68"/>
+                </a:solidFill>
+                <a:latin typeface="Monaco"/>
+                <a:ea typeface="Monaco"/>
+                <a:cs typeface="Monaco"/>
+                <a:sym typeface="Monaco"/>
+              </a:rPr>
+              <a:t>let</a:t>
+            </a:r>
+            <a:r>
+              <a:rPr sz="1200">
+                <a:latin typeface="Monaco"/>
+                <a:ea typeface="Monaco"/>
+                <a:cs typeface="Monaco"/>
+                <a:sym typeface="Monaco"/>
+              </a:rPr>
+              <a:t> </a:t>
+            </a:r>
+            <a:r>
+              <a:rPr sz="1200">
+                <a:solidFill>
+                  <a:srgbClr val="931A68"/>
+                </a:solidFill>
+                <a:latin typeface="Monaco"/>
+                <a:ea typeface="Monaco"/>
+                <a:cs typeface="Monaco"/>
+                <a:sym typeface="Monaco"/>
+              </a:rPr>
+              <a:t>rec</a:t>
+            </a:r>
+            <a:r>
+              <a:rPr sz="1200">
+                <a:latin typeface="Monaco"/>
+                <a:ea typeface="Monaco"/>
+                <a:cs typeface="Monaco"/>
+                <a:sym typeface="Monaco"/>
+              </a:rPr>
+              <a:t> string_of_expr </a:t>
+            </a:r>
+            <a:r>
+              <a:rPr sz="1200">
+                <a:solidFill>
+                  <a:srgbClr val="941100"/>
+                </a:solidFill>
+                <a:latin typeface="Monaco"/>
+                <a:ea typeface="Monaco"/>
+                <a:cs typeface="Monaco"/>
+                <a:sym typeface="Monaco"/>
+              </a:rPr>
+              <a:t>=</a:t>
+            </a:r>
+            <a:r>
+              <a:rPr sz="1200">
+                <a:latin typeface="Monaco"/>
+                <a:ea typeface="Monaco"/>
+                <a:cs typeface="Monaco"/>
+                <a:sym typeface="Monaco"/>
+              </a:rPr>
+              <a:t> </a:t>
+            </a:r>
+            <a:r>
+              <a:rPr sz="1200">
+                <a:solidFill>
+                  <a:srgbClr val="931A68"/>
+                </a:solidFill>
+                <a:latin typeface="Monaco"/>
+                <a:ea typeface="Monaco"/>
+                <a:cs typeface="Monaco"/>
+                <a:sym typeface="Monaco"/>
+              </a:rPr>
+              <a:t>function</a:t>
+            </a:r>
+          </a:p>
+          <a:p>
+            <a:pPr marL="0" lvl="0" indent="0">
+              <a:spcBef>
+                <a:spcPts val="0"/>
+              </a:spcBef>
+              <a:buSzTx/>
+              <a:buFontTx/>
+              <a:buNone/>
+              <a:defRPr sz="1800"/>
+            </a:pPr>
+            <a:r>
+              <a:rPr sz="1200">
+                <a:solidFill>
+                  <a:srgbClr val="931A68"/>
+                </a:solidFill>
+                <a:latin typeface="Monaco"/>
+                <a:ea typeface="Monaco"/>
+                <a:cs typeface="Monaco"/>
+                <a:sym typeface="Monaco"/>
+              </a:rPr>
+              <a:t>  		  </a:t>
+            </a:r>
+            <a:r>
+              <a:rPr sz="1200">
+                <a:latin typeface="Monaco"/>
+                <a:ea typeface="Monaco"/>
+                <a:cs typeface="Monaco"/>
+                <a:sym typeface="Monaco"/>
+              </a:rPr>
+              <a:t>Id</a:t>
+            </a:r>
+            <a:r>
+              <a:rPr sz="1200">
+                <a:solidFill>
+                  <a:srgbClr val="941100"/>
+                </a:solidFill>
+                <a:latin typeface="Monaco"/>
+                <a:ea typeface="Monaco"/>
+                <a:cs typeface="Monaco"/>
+                <a:sym typeface="Monaco"/>
+              </a:rPr>
+              <a:t>(</a:t>
+            </a:r>
+            <a:r>
+              <a:rPr sz="1200">
+                <a:latin typeface="Monaco"/>
+                <a:ea typeface="Monaco"/>
+                <a:cs typeface="Monaco"/>
+                <a:sym typeface="Monaco"/>
+              </a:rPr>
+              <a:t>s</a:t>
+            </a:r>
+            <a:r>
+              <a:rPr sz="1200">
+                <a:solidFill>
+                  <a:srgbClr val="941100"/>
+                </a:solidFill>
+                <a:latin typeface="Monaco"/>
+                <a:ea typeface="Monaco"/>
+                <a:cs typeface="Monaco"/>
+                <a:sym typeface="Monaco"/>
+              </a:rPr>
+              <a:t>)</a:t>
+            </a:r>
+            <a:r>
+              <a:rPr sz="1200">
+                <a:latin typeface="Monaco"/>
+                <a:ea typeface="Monaco"/>
+                <a:cs typeface="Monaco"/>
+                <a:sym typeface="Monaco"/>
+              </a:rPr>
+              <a:t> </a:t>
+            </a:r>
+            <a:r>
+              <a:rPr sz="1200">
+                <a:solidFill>
+                  <a:srgbClr val="941100"/>
+                </a:solidFill>
+                <a:latin typeface="Monaco"/>
+                <a:ea typeface="Monaco"/>
+                <a:cs typeface="Monaco"/>
+                <a:sym typeface="Monaco"/>
+              </a:rPr>
+              <a:t>-&gt;</a:t>
+            </a:r>
+            <a:r>
+              <a:rPr sz="1200">
+                <a:latin typeface="Monaco"/>
+                <a:ea typeface="Monaco"/>
+                <a:cs typeface="Monaco"/>
+                <a:sym typeface="Monaco"/>
+              </a:rPr>
+              <a:t> s</a:t>
+            </a:r>
+          </a:p>
+          <a:p>
+            <a:pPr marL="0" lvl="0" indent="0">
+              <a:spcBef>
+                <a:spcPts val="0"/>
+              </a:spcBef>
+              <a:buSzTx/>
+              <a:buFontTx/>
+              <a:buNone/>
+              <a:defRPr sz="1800"/>
+            </a:pPr>
+            <a:r>
+              <a:rPr sz="1200">
+                <a:latin typeface="Monaco"/>
+                <a:ea typeface="Monaco"/>
+                <a:cs typeface="Monaco"/>
+                <a:sym typeface="Monaco"/>
+              </a:rPr>
+              <a:t>		</a:t>
+            </a:r>
+            <a:r>
+              <a:rPr sz="1200">
+                <a:solidFill>
+                  <a:srgbClr val="941100"/>
+                </a:solidFill>
+                <a:latin typeface="Monaco"/>
+                <a:ea typeface="Monaco"/>
+                <a:cs typeface="Monaco"/>
+                <a:sym typeface="Monaco"/>
+              </a:rPr>
+              <a:t>|</a:t>
+            </a:r>
+            <a:r>
+              <a:rPr sz="1200">
+                <a:latin typeface="Monaco"/>
+                <a:ea typeface="Monaco"/>
+                <a:cs typeface="Monaco"/>
+                <a:sym typeface="Monaco"/>
+              </a:rPr>
+              <a:t> MatUnary_op</a:t>
+            </a:r>
+            <a:r>
+              <a:rPr sz="1200">
+                <a:solidFill>
+                  <a:srgbClr val="941100"/>
+                </a:solidFill>
+                <a:latin typeface="Monaco"/>
+                <a:ea typeface="Monaco"/>
+                <a:cs typeface="Monaco"/>
+                <a:sym typeface="Monaco"/>
+              </a:rPr>
+              <a:t>(</a:t>
+            </a:r>
+            <a:r>
+              <a:rPr sz="1200">
+                <a:latin typeface="Monaco"/>
+                <a:ea typeface="Monaco"/>
+                <a:cs typeface="Monaco"/>
+                <a:sym typeface="Monaco"/>
+              </a:rPr>
+              <a:t>e</a:t>
+            </a:r>
+            <a:r>
+              <a:rPr sz="1200">
+                <a:solidFill>
+                  <a:srgbClr val="941100"/>
+                </a:solidFill>
+                <a:latin typeface="Monaco"/>
+                <a:ea typeface="Monaco"/>
+                <a:cs typeface="Monaco"/>
+                <a:sym typeface="Monaco"/>
+              </a:rPr>
+              <a:t>,</a:t>
+            </a:r>
+            <a:r>
+              <a:rPr sz="1200">
+                <a:latin typeface="Monaco"/>
+                <a:ea typeface="Monaco"/>
+                <a:cs typeface="Monaco"/>
+                <a:sym typeface="Monaco"/>
+              </a:rPr>
+              <a:t> o</a:t>
+            </a:r>
+            <a:r>
+              <a:rPr sz="1200">
+                <a:solidFill>
+                  <a:srgbClr val="941100"/>
+                </a:solidFill>
+                <a:latin typeface="Monaco"/>
+                <a:ea typeface="Monaco"/>
+                <a:cs typeface="Monaco"/>
+                <a:sym typeface="Monaco"/>
+              </a:rPr>
+              <a:t>)</a:t>
+            </a:r>
+            <a:r>
+              <a:rPr sz="1200">
+                <a:latin typeface="Monaco"/>
+                <a:ea typeface="Monaco"/>
+                <a:cs typeface="Monaco"/>
+                <a:sym typeface="Monaco"/>
+              </a:rPr>
+              <a:t> </a:t>
+            </a:r>
+            <a:r>
+              <a:rPr sz="1200">
+                <a:solidFill>
+                  <a:srgbClr val="941100"/>
+                </a:solidFill>
+                <a:latin typeface="Monaco"/>
+                <a:ea typeface="Monaco"/>
+                <a:cs typeface="Monaco"/>
+                <a:sym typeface="Monaco"/>
+              </a:rPr>
+              <a:t>-&gt;</a:t>
+            </a:r>
+            <a:r>
+              <a:rPr sz="1200">
+                <a:latin typeface="Monaco"/>
+                <a:ea typeface="Monaco"/>
+                <a:cs typeface="Monaco"/>
+                <a:sym typeface="Monaco"/>
+              </a:rPr>
+              <a:t> </a:t>
+            </a:r>
+          </a:p>
+          <a:p>
+            <a:pPr marL="0" lvl="0" indent="0">
+              <a:spcBef>
+                <a:spcPts val="0"/>
+              </a:spcBef>
+              <a:buSzTx/>
+              <a:buFontTx/>
+              <a:buNone/>
+              <a:defRPr sz="1800"/>
+            </a:pPr>
+            <a:r>
+              <a:rPr sz="1200">
+                <a:latin typeface="Monaco"/>
+                <a:ea typeface="Monaco"/>
+                <a:cs typeface="Monaco"/>
+                <a:sym typeface="Monaco"/>
+              </a:rPr>
+              <a:t>			</a:t>
+            </a:r>
+            <a:r>
+              <a:rPr sz="1200">
+                <a:solidFill>
+                  <a:srgbClr val="941100"/>
+                </a:solidFill>
+                <a:latin typeface="Monaco"/>
+                <a:ea typeface="Monaco"/>
+                <a:cs typeface="Monaco"/>
+                <a:sym typeface="Monaco"/>
+              </a:rPr>
+              <a:t>(</a:t>
+            </a:r>
+            <a:r>
+              <a:rPr sz="1200">
+                <a:latin typeface="Monaco"/>
+                <a:ea typeface="Monaco"/>
+                <a:cs typeface="Monaco"/>
+                <a:sym typeface="Monaco"/>
+              </a:rPr>
+              <a:t>match o with</a:t>
+            </a:r>
+          </a:p>
+          <a:p>
+            <a:pPr marL="0" lvl="0" indent="0">
+              <a:spcBef>
+                <a:spcPts val="0"/>
+              </a:spcBef>
+              <a:buSzTx/>
+              <a:buFontTx/>
+              <a:buNone/>
+              <a:defRPr sz="1800"/>
+            </a:pPr>
+            <a:r>
+              <a:rPr sz="1200">
+                <a:latin typeface="Monaco"/>
+                <a:ea typeface="Monaco"/>
+                <a:cs typeface="Monaco"/>
+                <a:sym typeface="Monaco"/>
+              </a:rPr>
+              <a:t>	 		 </a:t>
+            </a:r>
+            <a:r>
+              <a:rPr sz="1200">
+                <a:solidFill>
+                  <a:srgbClr val="6485C1"/>
+                </a:solidFill>
+                <a:latin typeface="Monaco"/>
+                <a:ea typeface="Monaco"/>
+                <a:cs typeface="Monaco"/>
+                <a:sym typeface="Monaco"/>
+              </a:rPr>
+              <a:t>MTranspose</a:t>
+            </a:r>
+            <a:r>
+              <a:rPr sz="1200">
+                <a:latin typeface="Monaco"/>
+                <a:ea typeface="Monaco"/>
+                <a:cs typeface="Monaco"/>
+                <a:sym typeface="Monaco"/>
+              </a:rPr>
+              <a:t> </a:t>
+            </a:r>
+            <a:r>
+              <a:rPr sz="1200">
+                <a:solidFill>
+                  <a:srgbClr val="941100"/>
+                </a:solidFill>
+                <a:latin typeface="Monaco"/>
+                <a:ea typeface="Monaco"/>
+                <a:cs typeface="Monaco"/>
+                <a:sym typeface="Monaco"/>
+              </a:rPr>
+              <a:t>-&gt;</a:t>
+            </a:r>
+            <a:r>
+              <a:rPr sz="1200">
+                <a:latin typeface="Monaco"/>
+                <a:ea typeface="Monaco"/>
+                <a:cs typeface="Monaco"/>
+                <a:sym typeface="Monaco"/>
+              </a:rPr>
+              <a:t> </a:t>
+            </a:r>
+            <a:r>
+              <a:rPr sz="1200">
+                <a:solidFill>
+                  <a:srgbClr val="3933FF"/>
+                </a:solidFill>
+                <a:latin typeface="Monaco"/>
+                <a:ea typeface="Monaco"/>
+                <a:cs typeface="Monaco"/>
+                <a:sym typeface="Monaco"/>
+              </a:rPr>
+              <a:t>"Transpose"</a:t>
+            </a:r>
+            <a:r>
+              <a:rPr sz="1200">
+                <a:latin typeface="Monaco"/>
+                <a:ea typeface="Monaco"/>
+                <a:cs typeface="Monaco"/>
+                <a:sym typeface="Monaco"/>
+              </a:rPr>
+              <a:t> </a:t>
+            </a:r>
+            <a:r>
+              <a:rPr sz="1200">
+                <a:solidFill>
+                  <a:srgbClr val="941100"/>
+                </a:solidFill>
+                <a:latin typeface="Monaco"/>
+                <a:ea typeface="Monaco"/>
+                <a:cs typeface="Monaco"/>
+                <a:sym typeface="Monaco"/>
+              </a:rPr>
+              <a:t>|</a:t>
+            </a:r>
+            <a:r>
+              <a:rPr sz="1200">
+                <a:latin typeface="Monaco"/>
+                <a:ea typeface="Monaco"/>
+                <a:cs typeface="Monaco"/>
+                <a:sym typeface="Monaco"/>
+              </a:rPr>
+              <a:t> </a:t>
+            </a:r>
+            <a:r>
+              <a:rPr sz="1200">
+                <a:solidFill>
+                  <a:srgbClr val="6485C1"/>
+                </a:solidFill>
+                <a:latin typeface="Monaco"/>
+                <a:ea typeface="Monaco"/>
+                <a:cs typeface="Monaco"/>
+                <a:sym typeface="Monaco"/>
+              </a:rPr>
+              <a:t>MInversion</a:t>
+            </a:r>
+            <a:r>
+              <a:rPr sz="1200">
+                <a:latin typeface="Monaco"/>
+                <a:ea typeface="Monaco"/>
+                <a:cs typeface="Monaco"/>
+                <a:sym typeface="Monaco"/>
+              </a:rPr>
+              <a:t> </a:t>
+            </a:r>
+            <a:r>
+              <a:rPr sz="1200">
+                <a:solidFill>
+                  <a:srgbClr val="941100"/>
+                </a:solidFill>
+                <a:latin typeface="Monaco"/>
+                <a:ea typeface="Monaco"/>
+                <a:cs typeface="Monaco"/>
+                <a:sym typeface="Monaco"/>
+              </a:rPr>
+              <a:t>-&gt;</a:t>
+            </a:r>
+            <a:r>
+              <a:rPr sz="1200">
+                <a:latin typeface="Monaco"/>
+                <a:ea typeface="Monaco"/>
+                <a:cs typeface="Monaco"/>
+                <a:sym typeface="Monaco"/>
+              </a:rPr>
+              <a:t> </a:t>
+            </a:r>
+            <a:r>
+              <a:rPr sz="1200">
+                <a:solidFill>
+                  <a:srgbClr val="3933FF"/>
+                </a:solidFill>
+                <a:latin typeface="Monaco"/>
+                <a:ea typeface="Monaco"/>
+                <a:cs typeface="Monaco"/>
+                <a:sym typeface="Monaco"/>
+              </a:rPr>
+              <a:t>"Inversion"</a:t>
+            </a:r>
+            <a:r>
+              <a:rPr sz="1200">
+                <a:latin typeface="Monaco"/>
+                <a:ea typeface="Monaco"/>
+                <a:cs typeface="Monaco"/>
+                <a:sym typeface="Monaco"/>
+              </a:rPr>
+              <a:t> </a:t>
+            </a:r>
+            <a:r>
+              <a:rPr sz="1200">
+                <a:solidFill>
+                  <a:srgbClr val="941100"/>
+                </a:solidFill>
+                <a:latin typeface="Monaco"/>
+                <a:ea typeface="Monaco"/>
+                <a:cs typeface="Monaco"/>
+                <a:sym typeface="Monaco"/>
+              </a:rPr>
+              <a:t>|</a:t>
+            </a:r>
+            <a:r>
+              <a:rPr sz="1200">
+                <a:latin typeface="Monaco"/>
+                <a:ea typeface="Monaco"/>
+                <a:cs typeface="Monaco"/>
+                <a:sym typeface="Monaco"/>
+              </a:rPr>
+              <a:t> </a:t>
+            </a:r>
+          </a:p>
+          <a:p>
+            <a:pPr marL="0" lvl="0" indent="0">
+              <a:spcBef>
+                <a:spcPts val="0"/>
+              </a:spcBef>
+              <a:buSzTx/>
+              <a:buFontTx/>
+              <a:buNone/>
+              <a:defRPr sz="1800"/>
+            </a:pPr>
+            <a:r>
+              <a:rPr sz="1200">
+                <a:latin typeface="Monaco"/>
+                <a:ea typeface="Monaco"/>
+                <a:cs typeface="Monaco"/>
+                <a:sym typeface="Monaco"/>
+              </a:rPr>
+              <a:t>			 </a:t>
+            </a:r>
+            <a:r>
+              <a:rPr sz="1200">
+                <a:solidFill>
+                  <a:srgbClr val="6485C1"/>
+                </a:solidFill>
+                <a:latin typeface="Monaco"/>
+                <a:ea typeface="Monaco"/>
+                <a:cs typeface="Monaco"/>
+                <a:sym typeface="Monaco"/>
+              </a:rPr>
+              <a:t>MDeterminant</a:t>
+            </a:r>
+            <a:r>
+              <a:rPr sz="1200">
+                <a:latin typeface="Monaco"/>
+                <a:ea typeface="Monaco"/>
+                <a:cs typeface="Monaco"/>
+                <a:sym typeface="Monaco"/>
+              </a:rPr>
+              <a:t> </a:t>
+            </a:r>
+            <a:r>
+              <a:rPr sz="1200">
+                <a:solidFill>
+                  <a:srgbClr val="941100"/>
+                </a:solidFill>
+                <a:latin typeface="Monaco"/>
+                <a:ea typeface="Monaco"/>
+                <a:cs typeface="Monaco"/>
+                <a:sym typeface="Monaco"/>
+              </a:rPr>
+              <a:t>-&gt;</a:t>
+            </a:r>
+            <a:r>
+              <a:rPr sz="1200">
+                <a:latin typeface="Monaco"/>
+                <a:ea typeface="Monaco"/>
+                <a:cs typeface="Monaco"/>
+                <a:sym typeface="Monaco"/>
+              </a:rPr>
+              <a:t> </a:t>
+            </a:r>
+            <a:r>
+              <a:rPr sz="1200">
+                <a:solidFill>
+                  <a:srgbClr val="3933FF"/>
+                </a:solidFill>
+                <a:latin typeface="Monaco"/>
+                <a:ea typeface="Monaco"/>
+                <a:cs typeface="Monaco"/>
+                <a:sym typeface="Monaco"/>
+              </a:rPr>
+              <a:t>"Determinant"</a:t>
+            </a:r>
+            <a:r>
+              <a:rPr sz="1200">
+                <a:latin typeface="Monaco"/>
+                <a:ea typeface="Monaco"/>
+                <a:cs typeface="Monaco"/>
+                <a:sym typeface="Monaco"/>
+              </a:rPr>
+              <a:t>	</a:t>
+            </a:r>
+          </a:p>
+          <a:p>
+            <a:pPr marL="0" lvl="0" indent="0">
+              <a:spcBef>
+                <a:spcPts val="0"/>
+              </a:spcBef>
+              <a:buSzTx/>
+              <a:buFontTx/>
+              <a:buNone/>
+              <a:defRPr sz="1800"/>
+            </a:pPr>
+            <a:r>
+              <a:rPr sz="1200">
+                <a:latin typeface="Monaco"/>
+                <a:ea typeface="Monaco"/>
+                <a:cs typeface="Monaco"/>
+                <a:sym typeface="Monaco"/>
+              </a:rPr>
+              <a:t>			</a:t>
+            </a:r>
+            <a:r>
+              <a:rPr sz="1200">
+                <a:solidFill>
+                  <a:srgbClr val="941100"/>
+                </a:solidFill>
+                <a:latin typeface="Monaco"/>
+                <a:ea typeface="Monaco"/>
+                <a:cs typeface="Monaco"/>
+                <a:sym typeface="Monaco"/>
+              </a:rPr>
+              <a:t>)</a:t>
+            </a:r>
+            <a:r>
+              <a:rPr sz="1200">
+                <a:latin typeface="Monaco"/>
+                <a:ea typeface="Monaco"/>
+                <a:cs typeface="Monaco"/>
+                <a:sym typeface="Monaco"/>
+              </a:rPr>
+              <a:t> </a:t>
+            </a:r>
+            <a:r>
+              <a:rPr sz="1200">
+                <a:solidFill>
+                  <a:srgbClr val="941100"/>
+                </a:solidFill>
+                <a:latin typeface="Monaco"/>
+                <a:ea typeface="Monaco"/>
+                <a:cs typeface="Monaco"/>
+                <a:sym typeface="Monaco"/>
+              </a:rPr>
+              <a:t>^</a:t>
+            </a:r>
+            <a:r>
+              <a:rPr sz="1200">
+                <a:latin typeface="Monaco"/>
+                <a:ea typeface="Monaco"/>
+                <a:cs typeface="Monaco"/>
+                <a:sym typeface="Monaco"/>
+              </a:rPr>
+              <a:t> </a:t>
+            </a:r>
+            <a:r>
+              <a:rPr sz="1200">
+                <a:solidFill>
+                  <a:srgbClr val="3933FF"/>
+                </a:solidFill>
+                <a:latin typeface="Monaco"/>
+                <a:ea typeface="Monaco"/>
+                <a:cs typeface="Monaco"/>
+                <a:sym typeface="Monaco"/>
+              </a:rPr>
+              <a:t>"("</a:t>
+            </a:r>
+            <a:r>
+              <a:rPr sz="1200">
+                <a:latin typeface="Monaco"/>
+                <a:ea typeface="Monaco"/>
+                <a:cs typeface="Monaco"/>
+                <a:sym typeface="Monaco"/>
+              </a:rPr>
+              <a:t> </a:t>
+            </a:r>
+            <a:r>
+              <a:rPr sz="1200">
+                <a:solidFill>
+                  <a:srgbClr val="941100"/>
+                </a:solidFill>
+                <a:latin typeface="Monaco"/>
+                <a:ea typeface="Monaco"/>
+                <a:cs typeface="Monaco"/>
+                <a:sym typeface="Monaco"/>
+              </a:rPr>
+              <a:t>^</a:t>
+            </a:r>
+            <a:r>
+              <a:rPr sz="1200">
+                <a:latin typeface="Monaco"/>
+                <a:ea typeface="Monaco"/>
+                <a:cs typeface="Monaco"/>
+                <a:sym typeface="Monaco"/>
+              </a:rPr>
+              <a:t> string_of_expr e </a:t>
+            </a:r>
+            <a:r>
+              <a:rPr sz="1200">
+                <a:solidFill>
+                  <a:srgbClr val="941100"/>
+                </a:solidFill>
+                <a:latin typeface="Monaco"/>
+                <a:ea typeface="Monaco"/>
+                <a:cs typeface="Monaco"/>
+                <a:sym typeface="Monaco"/>
+              </a:rPr>
+              <a:t>^</a:t>
+            </a:r>
+            <a:r>
+              <a:rPr sz="1200">
+                <a:latin typeface="Monaco"/>
+                <a:ea typeface="Monaco"/>
+                <a:cs typeface="Monaco"/>
+                <a:sym typeface="Monaco"/>
+              </a:rPr>
+              <a:t> </a:t>
+            </a:r>
+            <a:r>
+              <a:rPr sz="1200">
+                <a:solidFill>
+                  <a:srgbClr val="3933FF"/>
+                </a:solidFill>
+                <a:latin typeface="Monaco"/>
+                <a:ea typeface="Monaco"/>
+                <a:cs typeface="Monaco"/>
+                <a:sym typeface="Monaco"/>
+              </a:rPr>
+              <a:t>")"</a:t>
+            </a:r>
           </a:p>
         </p:txBody>
       </p:sp>
     </p:spTree>
     <p:extLst>
       <p:ext uri="{BB962C8B-B14F-4D97-AF65-F5344CB8AC3E}">
-        <p14:creationId xmlns:p14="http://schemas.microsoft.com/office/powerpoint/2010/main" val="4169971199"/>
+        <p14:creationId xmlns:p14="http://schemas.microsoft.com/office/powerpoint/2010/main" val="2562951438"/>
       </p:ext>
     </p:extLst>
   </p:cSld>
   <p:clrMapOvr>
     <a:masterClrMapping/>
   </p:clrMapOvr>
+  <mc:AlternateContent xmlns:mc="http://schemas.openxmlformats.org/markup-compatibility/2006">
+    <mc:Choice xmlns:p14="http://schemas.microsoft.com/office/powerpoint/2010/main" Requires="p14">
+      <p:transition spd="slow" p14:dur="2000"/>
+    </mc:Choice>
+    <mc:Fallback>
+      <p:transition xmlns:p14="http://schemas.microsoft.com/office/powerpoint/2010/main" spd="slow"/>
+    </mc:Fallback>
+  </mc:AlternateContent>
 </p:sld>
 </file>
 

</xml_diff>

<commit_message>
updated angelaZ angelaZTest and slides
</commit_message>
<xml_diff>
--- a/src/project/demo/PLTFinalPresentation.pptx
+++ b/src/project/demo/PLTFinalPresentation.pptx
@@ -2,33 +2,33 @@
 <file path=ppt/presentation.xml><?xml version="1.0" encoding="utf-8"?>
 <p:presentation xmlns:a="http://schemas.openxmlformats.org/drawingml/2006/main" xmlns:r="http://schemas.openxmlformats.org/officeDocument/2006/relationships" xmlns:p="http://schemas.openxmlformats.org/presentationml/2006/main">
   <p:sldMasterIdLst>
-    <p:sldMasterId id="2147483648" r:id="rId5"/>
+    <p:sldMasterId id="2147483648" r:id="rId1"/>
   </p:sldMasterIdLst>
   <p:notesMasterIdLst>
-    <p:notesMasterId r:id="rId7"/>
+    <p:notesMasterId r:id="rId21"/>
   </p:notesMasterIdLst>
   <p:sldIdLst>
-    <p:sldId id="256" r:id="rId8"/>
-    <p:sldId id="257" r:id="rId9"/>
-    <p:sldId id="258" r:id="rId10"/>
-    <p:sldId id="259" r:id="rId11"/>
-    <p:sldId id="260" r:id="rId12"/>
-    <p:sldId id="261" r:id="rId13"/>
-    <p:sldId id="262" r:id="rId14"/>
-    <p:sldId id="263" r:id="rId15"/>
-    <p:sldId id="264" r:id="rId16"/>
-    <p:sldId id="265" r:id="rId17"/>
-    <p:sldId id="266" r:id="rId18"/>
-    <p:sldId id="267" r:id="rId19"/>
-    <p:sldId id="268" r:id="rId20"/>
-    <p:sldId id="269" r:id="rId21"/>
-    <p:sldId id="270" r:id="rId22"/>
-    <p:sldId id="271" r:id="rId23"/>
-    <p:sldId id="272" r:id="rId24"/>
-    <p:sldId id="273" r:id="rId25"/>
-    <p:sldId id="274" r:id="rId26"/>
+    <p:sldId id="256" r:id="rId2"/>
+    <p:sldId id="257" r:id="rId3"/>
+    <p:sldId id="258" r:id="rId4"/>
+    <p:sldId id="259" r:id="rId5"/>
+    <p:sldId id="260" r:id="rId6"/>
+    <p:sldId id="261" r:id="rId7"/>
+    <p:sldId id="262" r:id="rId8"/>
+    <p:sldId id="263" r:id="rId9"/>
+    <p:sldId id="264" r:id="rId10"/>
+    <p:sldId id="265" r:id="rId11"/>
+    <p:sldId id="266" r:id="rId12"/>
+    <p:sldId id="267" r:id="rId13"/>
+    <p:sldId id="268" r:id="rId14"/>
+    <p:sldId id="269" r:id="rId15"/>
+    <p:sldId id="270" r:id="rId16"/>
+    <p:sldId id="271" r:id="rId17"/>
+    <p:sldId id="272" r:id="rId18"/>
+    <p:sldId id="273" r:id="rId19"/>
+    <p:sldId id="274" r:id="rId20"/>
   </p:sldIdLst>
-  <p:sldSz cx="9144000" cy="6858000"/>
+  <p:sldSz cx="9144000" cy="6858000" type="screen4x3"/>
   <p:notesSz cx="6858000" cy="9144000"/>
   <p:defaultTextStyle>
     <a:lvl1pPr defTabSz="457200">
@@ -107,13 +107,14 @@
 </p:presentation>
 </file>
 
-<file path=ppt/commentAuthors.xml><?xml version="1.0" encoding="utf-8"?>
-<p:cmAuthorLst xmlns:a="http://schemas.openxmlformats.org/drawingml/2006/main" xmlns:r="http://schemas.openxmlformats.org/officeDocument/2006/relationships" xmlns:p="http://schemas.openxmlformats.org/presentationml/2006/main"/>
-</file>
-
 <file path=ppt/notesMasters/notesMaster1.xml><?xml version="1.0" encoding="utf-8"?>
 <p:notesMaster xmlns:a="http://schemas.openxmlformats.org/drawingml/2006/main" xmlns:r="http://schemas.openxmlformats.org/officeDocument/2006/relationships" xmlns:p="http://schemas.openxmlformats.org/presentationml/2006/main">
   <p:cSld>
+    <p:bg>
+      <p:bgRef idx="1001">
+        <a:schemeClr val="bg1"/>
+      </p:bgRef>
+    </p:bg>
     <p:spTree>
       <p:nvGrpSpPr>
         <p:cNvPr id="1" name=""/>
@@ -131,7 +132,9 @@
       <p:sp>
         <p:nvSpPr>
           <p:cNvPr id="46" name="Shape 46"/>
-          <p:cNvSpPr/>
+          <p:cNvSpPr>
+            <a:spLocks noGrp="1" noRot="1" noChangeAspect="1"/>
+          </p:cNvSpPr>
           <p:nvPr>
             <p:ph type="sldImg"/>
           </p:nvPr>
@@ -150,13 +153,16 @@
           <a:lstStyle/>
           <a:p>
             <a:pPr lvl="0"/>
+            <a:endParaRPr/>
           </a:p>
         </p:txBody>
       </p:sp>
       <p:sp>
         <p:nvSpPr>
           <p:cNvPr id="47" name="Shape 47"/>
-          <p:cNvSpPr/>
+          <p:cNvSpPr>
+            <a:spLocks noGrp="1"/>
+          </p:cNvSpPr>
           <p:nvPr>
             <p:ph type="body" sz="quarter" idx="1"/>
           </p:nvPr>
@@ -175,10 +181,16 @@
           <a:lstStyle/>
           <a:p>
             <a:pPr lvl="0"/>
+            <a:endParaRPr/>
           </a:p>
         </p:txBody>
       </p:sp>
     </p:spTree>
+    <p:extLst>
+      <p:ext uri="{BB962C8B-B14F-4D97-AF65-F5344CB8AC3E}">
+        <p14:creationId xmlns:p14="http://schemas.microsoft.com/office/powerpoint/2010/main" val="2932063273"/>
+      </p:ext>
+    </p:extLst>
   </p:cSld>
   <p:clrMap bg1="lt1" tx1="dk1" bg2="lt2" tx2="dk2" accent1="accent1" accent2="accent2" accent3="accent3" accent4="accent4" accent5="accent5" accent6="accent6" hlink="hlink" folHlink="folHlink"/>
   <p:notesStyle>
@@ -286,7 +298,7 @@
 </file>
 
 <file path=ppt/slideLayouts/slideLayout1.xml><?xml version="1.0" encoding="utf-8"?>
-<p:sldLayout xmlns:a="http://schemas.openxmlformats.org/drawingml/2006/main" xmlns:r="http://schemas.openxmlformats.org/officeDocument/2006/relationships" xmlns:p="http://schemas.openxmlformats.org/presentationml/2006/main" type="tx" showMasterSp="1" showMasterPhAnim="1">
+<p:sldLayout xmlns:a="http://schemas.openxmlformats.org/drawingml/2006/main" xmlns:r="http://schemas.openxmlformats.org/officeDocument/2006/relationships" xmlns:p="http://schemas.openxmlformats.org/presentationml/2006/main" type="tx">
   <p:cSld name="Title Slide">
     <p:spTree>
       <p:nvGrpSpPr>
@@ -305,7 +317,9 @@
       <p:sp>
         <p:nvSpPr>
           <p:cNvPr id="6" name="Shape 6"/>
-          <p:cNvSpPr/>
+          <p:cNvSpPr>
+            <a:spLocks noGrp="1"/>
+          </p:cNvSpPr>
           <p:nvPr>
             <p:ph type="title"/>
           </p:nvPr>
@@ -336,7 +350,9 @@
       <p:sp>
         <p:nvSpPr>
           <p:cNvPr id="7" name="Shape 7"/>
-          <p:cNvSpPr/>
+          <p:cNvSpPr>
+            <a:spLocks noGrp="1"/>
+          </p:cNvSpPr>
           <p:nvPr>
             <p:ph type="body" idx="1"/>
           </p:nvPr>
@@ -386,7 +402,9 @@
       <p:sp>
         <p:nvSpPr>
           <p:cNvPr id="8" name="Shape 8"/>
-          <p:cNvSpPr/>
+          <p:cNvSpPr>
+            <a:spLocks noGrp="1"/>
+          </p:cNvSpPr>
           <p:nvPr>
             <p:ph type="sldNum" sz="quarter" idx="2"/>
           </p:nvPr>
@@ -401,7 +419,10 @@
           <a:lstStyle/>
           <a:p>
             <a:pPr lvl="0"/>
-            <a:fld id="{86CB4B4D-7CA3-9044-876B-883B54F8677D}" type="slidenum"/>
+            <a:fld id="{86CB4B4D-7CA3-9044-876B-883B54F8677D}" type="slidenum">
+              <a:t>‹#›</a:t>
+            </a:fld>
+            <a:endParaRPr/>
           </a:p>
         </p:txBody>
       </p:sp>
@@ -410,12 +431,12 @@
   <p:clrMapOvr>
     <a:masterClrMapping/>
   </p:clrMapOvr>
-  <p:transition spd="med" advClick="1"/>
+  <p:transition xmlns:p14="http://schemas.microsoft.com/office/powerpoint/2010/main" spd="med"/>
 </p:sldLayout>
 </file>
 
 <file path=ppt/slideLayouts/slideLayout10.xml><?xml version="1.0" encoding="utf-8"?>
-<p:sldLayout xmlns:a="http://schemas.openxmlformats.org/drawingml/2006/main" xmlns:r="http://schemas.openxmlformats.org/officeDocument/2006/relationships" xmlns:p="http://schemas.openxmlformats.org/presentationml/2006/main" type="tx" showMasterSp="1" showMasterPhAnim="1">
+<p:sldLayout xmlns:a="http://schemas.openxmlformats.org/drawingml/2006/main" xmlns:r="http://schemas.openxmlformats.org/officeDocument/2006/relationships" xmlns:p="http://schemas.openxmlformats.org/presentationml/2006/main" type="tx">
   <p:cSld name="Title and Vertical Text">
     <p:spTree>
       <p:nvGrpSpPr>
@@ -434,7 +455,9 @@
       <p:sp>
         <p:nvSpPr>
           <p:cNvPr id="39" name="Shape 39"/>
-          <p:cNvSpPr/>
+          <p:cNvSpPr>
+            <a:spLocks noGrp="1"/>
+          </p:cNvSpPr>
           <p:nvPr>
             <p:ph type="title"/>
           </p:nvPr>
@@ -461,7 +484,9 @@
       <p:sp>
         <p:nvSpPr>
           <p:cNvPr id="40" name="Shape 40"/>
-          <p:cNvSpPr/>
+          <p:cNvSpPr>
+            <a:spLocks noGrp="1"/>
+          </p:cNvSpPr>
           <p:nvPr>
             <p:ph type="body" idx="1"/>
           </p:nvPr>
@@ -482,7 +507,6 @@
               <a:rPr sz="3200"/>
               <a:t>Click to edit Master text styles</a:t>
             </a:r>
-            <a:endParaRPr sz="3200"/>
           </a:p>
           <a:p>
             <a:pPr lvl="1">
@@ -492,7 +516,6 @@
               <a:rPr sz="3200"/>
               <a:t>Second level</a:t>
             </a:r>
-            <a:endParaRPr sz="3200"/>
           </a:p>
           <a:p>
             <a:pPr lvl="2">
@@ -502,7 +525,6 @@
               <a:rPr sz="3200"/>
               <a:t>Third level</a:t>
             </a:r>
-            <a:endParaRPr sz="3200"/>
           </a:p>
           <a:p>
             <a:pPr lvl="3">
@@ -512,7 +534,6 @@
               <a:rPr sz="3200"/>
               <a:t>Fourth level</a:t>
             </a:r>
-            <a:endParaRPr sz="3200"/>
           </a:p>
           <a:p>
             <a:pPr lvl="4">
@@ -528,7 +549,9 @@
       <p:sp>
         <p:nvSpPr>
           <p:cNvPr id="41" name="Shape 41"/>
-          <p:cNvSpPr/>
+          <p:cNvSpPr>
+            <a:spLocks noGrp="1"/>
+          </p:cNvSpPr>
           <p:nvPr>
             <p:ph type="sldNum" sz="quarter" idx="2"/>
           </p:nvPr>
@@ -543,7 +566,10 @@
           <a:lstStyle/>
           <a:p>
             <a:pPr lvl="0"/>
-            <a:fld id="{86CB4B4D-7CA3-9044-876B-883B54F8677D}" type="slidenum"/>
+            <a:fld id="{86CB4B4D-7CA3-9044-876B-883B54F8677D}" type="slidenum">
+              <a:t>‹#›</a:t>
+            </a:fld>
+            <a:endParaRPr/>
           </a:p>
         </p:txBody>
       </p:sp>
@@ -552,12 +578,12 @@
   <p:clrMapOvr>
     <a:masterClrMapping/>
   </p:clrMapOvr>
-  <p:transition spd="med" advClick="1"/>
+  <p:transition xmlns:p14="http://schemas.microsoft.com/office/powerpoint/2010/main" spd="med"/>
 </p:sldLayout>
 </file>
 
 <file path=ppt/slideLayouts/slideLayout11.xml><?xml version="1.0" encoding="utf-8"?>
-<p:sldLayout xmlns:a="http://schemas.openxmlformats.org/drawingml/2006/main" xmlns:r="http://schemas.openxmlformats.org/officeDocument/2006/relationships" xmlns:p="http://schemas.openxmlformats.org/presentationml/2006/main" type="tx" showMasterSp="1" showMasterPhAnim="1">
+<p:sldLayout xmlns:a="http://schemas.openxmlformats.org/drawingml/2006/main" xmlns:r="http://schemas.openxmlformats.org/officeDocument/2006/relationships" xmlns:p="http://schemas.openxmlformats.org/presentationml/2006/main" type="tx">
   <p:cSld name="Vertical Title and Text">
     <p:spTree>
       <p:nvGrpSpPr>
@@ -576,7 +602,9 @@
       <p:sp>
         <p:nvSpPr>
           <p:cNvPr id="43" name="Shape 43"/>
-          <p:cNvSpPr/>
+          <p:cNvSpPr>
+            <a:spLocks noGrp="1"/>
+          </p:cNvSpPr>
           <p:nvPr>
             <p:ph type="title"/>
           </p:nvPr>
@@ -607,7 +635,9 @@
       <p:sp>
         <p:nvSpPr>
           <p:cNvPr id="44" name="Shape 44"/>
-          <p:cNvSpPr/>
+          <p:cNvSpPr>
+            <a:spLocks noGrp="1"/>
+          </p:cNvSpPr>
           <p:nvPr>
             <p:ph type="body" idx="1"/>
           </p:nvPr>
@@ -632,7 +662,6 @@
               <a:rPr sz="3200"/>
               <a:t>Click to edit Master text styles</a:t>
             </a:r>
-            <a:endParaRPr sz="3200"/>
           </a:p>
           <a:p>
             <a:pPr lvl="1">
@@ -642,7 +671,6 @@
               <a:rPr sz="3200"/>
               <a:t>Second level</a:t>
             </a:r>
-            <a:endParaRPr sz="3200"/>
           </a:p>
           <a:p>
             <a:pPr lvl="2">
@@ -652,7 +680,6 @@
               <a:rPr sz="3200"/>
               <a:t>Third level</a:t>
             </a:r>
-            <a:endParaRPr sz="3200"/>
           </a:p>
           <a:p>
             <a:pPr lvl="3">
@@ -662,7 +689,6 @@
               <a:rPr sz="3200"/>
               <a:t>Fourth level</a:t>
             </a:r>
-            <a:endParaRPr sz="3200"/>
           </a:p>
           <a:p>
             <a:pPr lvl="4">
@@ -678,7 +704,9 @@
       <p:sp>
         <p:nvSpPr>
           <p:cNvPr id="45" name="Shape 45"/>
-          <p:cNvSpPr/>
+          <p:cNvSpPr>
+            <a:spLocks noGrp="1"/>
+          </p:cNvSpPr>
           <p:nvPr>
             <p:ph type="sldNum" sz="quarter" idx="2"/>
           </p:nvPr>
@@ -693,7 +721,10 @@
           <a:lstStyle/>
           <a:p>
             <a:pPr lvl="0"/>
-            <a:fld id="{86CB4B4D-7CA3-9044-876B-883B54F8677D}" type="slidenum"/>
+            <a:fld id="{86CB4B4D-7CA3-9044-876B-883B54F8677D}" type="slidenum">
+              <a:t>‹#›</a:t>
+            </a:fld>
+            <a:endParaRPr/>
           </a:p>
         </p:txBody>
       </p:sp>
@@ -702,12 +733,12 @@
   <p:clrMapOvr>
     <a:masterClrMapping/>
   </p:clrMapOvr>
-  <p:transition spd="med" advClick="1"/>
+  <p:transition xmlns:p14="http://schemas.microsoft.com/office/powerpoint/2010/main" spd="med"/>
 </p:sldLayout>
 </file>
 
 <file path=ppt/slideLayouts/slideLayout2.xml><?xml version="1.0" encoding="utf-8"?>
-<p:sldLayout xmlns:a="http://schemas.openxmlformats.org/drawingml/2006/main" xmlns:r="http://schemas.openxmlformats.org/officeDocument/2006/relationships" xmlns:p="http://schemas.openxmlformats.org/presentationml/2006/main" type="tx" showMasterSp="1" showMasterPhAnim="1">
+<p:sldLayout xmlns:a="http://schemas.openxmlformats.org/drawingml/2006/main" xmlns:r="http://schemas.openxmlformats.org/officeDocument/2006/relationships" xmlns:p="http://schemas.openxmlformats.org/presentationml/2006/main" type="tx">
   <p:cSld name="Title and Content">
     <p:spTree>
       <p:nvGrpSpPr>
@@ -726,7 +757,9 @@
       <p:sp>
         <p:nvSpPr>
           <p:cNvPr id="10" name="Shape 10"/>
-          <p:cNvSpPr/>
+          <p:cNvSpPr>
+            <a:spLocks noGrp="1"/>
+          </p:cNvSpPr>
           <p:nvPr>
             <p:ph type="title"/>
           </p:nvPr>
@@ -753,7 +786,9 @@
       <p:sp>
         <p:nvSpPr>
           <p:cNvPr id="11" name="Shape 11"/>
-          <p:cNvSpPr/>
+          <p:cNvSpPr>
+            <a:spLocks noGrp="1"/>
+          </p:cNvSpPr>
           <p:nvPr>
             <p:ph type="body" idx="1"/>
           </p:nvPr>
@@ -774,7 +809,6 @@
               <a:rPr sz="3200"/>
               <a:t>Click to edit Master text styles</a:t>
             </a:r>
-            <a:endParaRPr sz="3200"/>
           </a:p>
           <a:p>
             <a:pPr lvl="1">
@@ -784,7 +818,6 @@
               <a:rPr sz="3200"/>
               <a:t>Second level</a:t>
             </a:r>
-            <a:endParaRPr sz="3200"/>
           </a:p>
           <a:p>
             <a:pPr lvl="2">
@@ -794,7 +827,6 @@
               <a:rPr sz="3200"/>
               <a:t>Third level</a:t>
             </a:r>
-            <a:endParaRPr sz="3200"/>
           </a:p>
           <a:p>
             <a:pPr lvl="3">
@@ -804,7 +836,6 @@
               <a:rPr sz="3200"/>
               <a:t>Fourth level</a:t>
             </a:r>
-            <a:endParaRPr sz="3200"/>
           </a:p>
           <a:p>
             <a:pPr lvl="4">
@@ -820,7 +851,9 @@
       <p:sp>
         <p:nvSpPr>
           <p:cNvPr id="12" name="Shape 12"/>
-          <p:cNvSpPr/>
+          <p:cNvSpPr>
+            <a:spLocks noGrp="1"/>
+          </p:cNvSpPr>
           <p:nvPr>
             <p:ph type="sldNum" sz="quarter" idx="2"/>
           </p:nvPr>
@@ -835,7 +868,10 @@
           <a:lstStyle/>
           <a:p>
             <a:pPr lvl="0"/>
-            <a:fld id="{86CB4B4D-7CA3-9044-876B-883B54F8677D}" type="slidenum"/>
+            <a:fld id="{86CB4B4D-7CA3-9044-876B-883B54F8677D}" type="slidenum">
+              <a:t>‹#›</a:t>
+            </a:fld>
+            <a:endParaRPr/>
           </a:p>
         </p:txBody>
       </p:sp>
@@ -844,12 +880,12 @@
   <p:clrMapOvr>
     <a:masterClrMapping/>
   </p:clrMapOvr>
-  <p:transition spd="med" advClick="1"/>
+  <p:transition xmlns:p14="http://schemas.microsoft.com/office/powerpoint/2010/main" spd="med"/>
 </p:sldLayout>
 </file>
 
 <file path=ppt/slideLayouts/slideLayout3.xml><?xml version="1.0" encoding="utf-8"?>
-<p:sldLayout xmlns:a="http://schemas.openxmlformats.org/drawingml/2006/main" xmlns:r="http://schemas.openxmlformats.org/officeDocument/2006/relationships" xmlns:p="http://schemas.openxmlformats.org/presentationml/2006/main" type="tx" showMasterSp="1" showMasterPhAnim="1">
+<p:sldLayout xmlns:a="http://schemas.openxmlformats.org/drawingml/2006/main" xmlns:r="http://schemas.openxmlformats.org/officeDocument/2006/relationships" xmlns:p="http://schemas.openxmlformats.org/presentationml/2006/main" type="tx">
   <p:cSld name="Section Header">
     <p:spTree>
       <p:nvGrpSpPr>
@@ -868,7 +904,9 @@
       <p:sp>
         <p:nvSpPr>
           <p:cNvPr id="14" name="Shape 14"/>
-          <p:cNvSpPr/>
+          <p:cNvSpPr>
+            <a:spLocks noGrp="1"/>
+          </p:cNvSpPr>
           <p:nvPr>
             <p:ph type="title"/>
           </p:nvPr>
@@ -886,15 +924,15 @@
           <a:bodyPr anchor="t"/>
           <a:lstStyle>
             <a:lvl1pPr algn="l">
-              <a:defRPr b="1" cap="all" sz="4000"/>
+              <a:defRPr sz="4000" b="1" cap="all"/>
             </a:lvl1pPr>
           </a:lstStyle>
           <a:p>
             <a:pPr lvl="0">
-              <a:defRPr b="0" cap="none" sz="1800"/>
-            </a:pPr>
-            <a:r>
-              <a:rPr b="1" cap="all" sz="4000"/>
+              <a:defRPr sz="1800" b="0" cap="none"/>
+            </a:pPr>
+            <a:r>
+              <a:rPr sz="4000" b="1" cap="all"/>
               <a:t>Click to edit Master title style</a:t>
             </a:r>
           </a:p>
@@ -903,7 +941,9 @@
       <p:sp>
         <p:nvSpPr>
           <p:cNvPr id="15" name="Shape 15"/>
-          <p:cNvSpPr/>
+          <p:cNvSpPr>
+            <a:spLocks noGrp="1"/>
+          </p:cNvSpPr>
           <p:nvPr>
             <p:ph type="body" idx="1"/>
           </p:nvPr>
@@ -956,7 +996,9 @@
       <p:sp>
         <p:nvSpPr>
           <p:cNvPr id="16" name="Shape 16"/>
-          <p:cNvSpPr/>
+          <p:cNvSpPr>
+            <a:spLocks noGrp="1"/>
+          </p:cNvSpPr>
           <p:nvPr>
             <p:ph type="sldNum" sz="quarter" idx="2"/>
           </p:nvPr>
@@ -971,7 +1013,10 @@
           <a:lstStyle/>
           <a:p>
             <a:pPr lvl="0"/>
-            <a:fld id="{86CB4B4D-7CA3-9044-876B-883B54F8677D}" type="slidenum"/>
+            <a:fld id="{86CB4B4D-7CA3-9044-876B-883B54F8677D}" type="slidenum">
+              <a:t>‹#›</a:t>
+            </a:fld>
+            <a:endParaRPr/>
           </a:p>
         </p:txBody>
       </p:sp>
@@ -980,12 +1025,12 @@
   <p:clrMapOvr>
     <a:masterClrMapping/>
   </p:clrMapOvr>
-  <p:transition spd="med" advClick="1"/>
+  <p:transition xmlns:p14="http://schemas.microsoft.com/office/powerpoint/2010/main" spd="med"/>
 </p:sldLayout>
 </file>
 
 <file path=ppt/slideLayouts/slideLayout4.xml><?xml version="1.0" encoding="utf-8"?>
-<p:sldLayout xmlns:a="http://schemas.openxmlformats.org/drawingml/2006/main" xmlns:r="http://schemas.openxmlformats.org/officeDocument/2006/relationships" xmlns:p="http://schemas.openxmlformats.org/presentationml/2006/main" type="tx" showMasterSp="1" showMasterPhAnim="1">
+<p:sldLayout xmlns:a="http://schemas.openxmlformats.org/drawingml/2006/main" xmlns:r="http://schemas.openxmlformats.org/officeDocument/2006/relationships" xmlns:p="http://schemas.openxmlformats.org/presentationml/2006/main" type="tx">
   <p:cSld name="Two Content">
     <p:spTree>
       <p:nvGrpSpPr>
@@ -1004,7 +1049,9 @@
       <p:sp>
         <p:nvSpPr>
           <p:cNvPr id="18" name="Shape 18"/>
-          <p:cNvSpPr/>
+          <p:cNvSpPr>
+            <a:spLocks noGrp="1"/>
+          </p:cNvSpPr>
           <p:nvPr>
             <p:ph type="title"/>
           </p:nvPr>
@@ -1031,7 +1078,9 @@
       <p:sp>
         <p:nvSpPr>
           <p:cNvPr id="19" name="Shape 19"/>
-          <p:cNvSpPr/>
+          <p:cNvSpPr>
+            <a:spLocks noGrp="1"/>
+          </p:cNvSpPr>
           <p:nvPr>
             <p:ph type="body" idx="1"/>
           </p:nvPr>
@@ -1087,7 +1136,6 @@
               <a:rPr sz="2800"/>
               <a:t>Click to edit Master text styles</a:t>
             </a:r>
-            <a:endParaRPr sz="2800"/>
           </a:p>
           <a:p>
             <a:pPr lvl="1">
@@ -1097,7 +1145,6 @@
               <a:rPr sz="2800"/>
               <a:t>Second level</a:t>
             </a:r>
-            <a:endParaRPr sz="2800"/>
           </a:p>
           <a:p>
             <a:pPr lvl="2">
@@ -1107,7 +1154,6 @@
               <a:rPr sz="2800"/>
               <a:t>Third level</a:t>
             </a:r>
-            <a:endParaRPr sz="2800"/>
           </a:p>
           <a:p>
             <a:pPr lvl="3">
@@ -1117,7 +1163,6 @@
               <a:rPr sz="2800"/>
               <a:t>Fourth level</a:t>
             </a:r>
-            <a:endParaRPr sz="2800"/>
           </a:p>
           <a:p>
             <a:pPr lvl="4">
@@ -1133,7 +1178,9 @@
       <p:sp>
         <p:nvSpPr>
           <p:cNvPr id="20" name="Shape 20"/>
-          <p:cNvSpPr/>
+          <p:cNvSpPr>
+            <a:spLocks noGrp="1"/>
+          </p:cNvSpPr>
           <p:nvPr>
             <p:ph type="sldNum" sz="quarter" idx="2"/>
           </p:nvPr>
@@ -1148,7 +1195,10 @@
           <a:lstStyle/>
           <a:p>
             <a:pPr lvl="0"/>
-            <a:fld id="{86CB4B4D-7CA3-9044-876B-883B54F8677D}" type="slidenum"/>
+            <a:fld id="{86CB4B4D-7CA3-9044-876B-883B54F8677D}" type="slidenum">
+              <a:t>‹#›</a:t>
+            </a:fld>
+            <a:endParaRPr/>
           </a:p>
         </p:txBody>
       </p:sp>
@@ -1157,12 +1207,12 @@
   <p:clrMapOvr>
     <a:masterClrMapping/>
   </p:clrMapOvr>
-  <p:transition spd="med" advClick="1"/>
+  <p:transition xmlns:p14="http://schemas.microsoft.com/office/powerpoint/2010/main" spd="med"/>
 </p:sldLayout>
 </file>
 
 <file path=ppt/slideLayouts/slideLayout5.xml><?xml version="1.0" encoding="utf-8"?>
-<p:sldLayout xmlns:a="http://schemas.openxmlformats.org/drawingml/2006/main" xmlns:r="http://schemas.openxmlformats.org/officeDocument/2006/relationships" xmlns:p="http://schemas.openxmlformats.org/presentationml/2006/main" type="tx" showMasterSp="1" showMasterPhAnim="1">
+<p:sldLayout xmlns:a="http://schemas.openxmlformats.org/drawingml/2006/main" xmlns:r="http://schemas.openxmlformats.org/officeDocument/2006/relationships" xmlns:p="http://schemas.openxmlformats.org/presentationml/2006/main" type="tx">
   <p:cSld name="Comparison">
     <p:spTree>
       <p:nvGrpSpPr>
@@ -1181,7 +1231,9 @@
       <p:sp>
         <p:nvSpPr>
           <p:cNvPr id="22" name="Shape 22"/>
-          <p:cNvSpPr/>
+          <p:cNvSpPr>
+            <a:spLocks noGrp="1"/>
+          </p:cNvSpPr>
           <p:nvPr>
             <p:ph type="title"/>
           </p:nvPr>
@@ -1212,7 +1264,9 @@
       <p:sp>
         <p:nvSpPr>
           <p:cNvPr id="23" name="Shape 23"/>
-          <p:cNvSpPr/>
+          <p:cNvSpPr>
+            <a:spLocks noGrp="1"/>
+          </p:cNvSpPr>
           <p:nvPr>
             <p:ph type="body" idx="1"/>
           </p:nvPr>
@@ -1236,15 +1290,15 @@
               <a:buSzTx/>
               <a:buFontTx/>
               <a:buNone/>
-              <a:defRPr b="1" sz="2400"/>
+              <a:defRPr sz="2400" b="1"/>
             </a:lvl1pPr>
           </a:lstStyle>
           <a:p>
             <a:pPr lvl="0">
-              <a:defRPr b="0" sz="1800"/>
-            </a:pPr>
-            <a:r>
-              <a:rPr b="1" sz="2400"/>
+              <a:defRPr sz="1800" b="0"/>
+            </a:pPr>
+            <a:r>
+              <a:rPr sz="2400" b="1"/>
               <a:t>Click to edit Master text styles</a:t>
             </a:r>
           </a:p>
@@ -1253,7 +1307,9 @@
       <p:sp>
         <p:nvSpPr>
           <p:cNvPr id="24" name="Shape 24"/>
-          <p:cNvSpPr/>
+          <p:cNvSpPr>
+            <a:spLocks noGrp="1"/>
+          </p:cNvSpPr>
           <p:nvPr>
             <p:ph type="sldNum" sz="quarter" idx="2"/>
           </p:nvPr>
@@ -1268,7 +1324,10 @@
           <a:lstStyle/>
           <a:p>
             <a:pPr lvl="0"/>
-            <a:fld id="{86CB4B4D-7CA3-9044-876B-883B54F8677D}" type="slidenum"/>
+            <a:fld id="{86CB4B4D-7CA3-9044-876B-883B54F8677D}" type="slidenum">
+              <a:t>‹#›</a:t>
+            </a:fld>
+            <a:endParaRPr/>
           </a:p>
         </p:txBody>
       </p:sp>
@@ -1277,12 +1336,12 @@
   <p:clrMapOvr>
     <a:masterClrMapping/>
   </p:clrMapOvr>
-  <p:transition spd="med" advClick="1"/>
+  <p:transition xmlns:p14="http://schemas.microsoft.com/office/powerpoint/2010/main" spd="med"/>
 </p:sldLayout>
 </file>
 
 <file path=ppt/slideLayouts/slideLayout6.xml><?xml version="1.0" encoding="utf-8"?>
-<p:sldLayout xmlns:a="http://schemas.openxmlformats.org/drawingml/2006/main" xmlns:r="http://schemas.openxmlformats.org/officeDocument/2006/relationships" xmlns:p="http://schemas.openxmlformats.org/presentationml/2006/main" type="tx" showMasterSp="1" showMasterPhAnim="1">
+<p:sldLayout xmlns:a="http://schemas.openxmlformats.org/drawingml/2006/main" xmlns:r="http://schemas.openxmlformats.org/officeDocument/2006/relationships" xmlns:p="http://schemas.openxmlformats.org/presentationml/2006/main" type="tx">
   <p:cSld name="Title Only">
     <p:spTree>
       <p:nvGrpSpPr>
@@ -1301,7 +1360,9 @@
       <p:sp>
         <p:nvSpPr>
           <p:cNvPr id="26" name="Shape 26"/>
-          <p:cNvSpPr/>
+          <p:cNvSpPr>
+            <a:spLocks noGrp="1"/>
+          </p:cNvSpPr>
           <p:nvPr>
             <p:ph type="title"/>
           </p:nvPr>
@@ -1328,7 +1389,9 @@
       <p:sp>
         <p:nvSpPr>
           <p:cNvPr id="27" name="Shape 27"/>
-          <p:cNvSpPr/>
+          <p:cNvSpPr>
+            <a:spLocks noGrp="1"/>
+          </p:cNvSpPr>
           <p:nvPr>
             <p:ph type="sldNum" sz="quarter" idx="2"/>
           </p:nvPr>
@@ -1343,7 +1406,10 @@
           <a:lstStyle/>
           <a:p>
             <a:pPr lvl="0"/>
-            <a:fld id="{86CB4B4D-7CA3-9044-876B-883B54F8677D}" type="slidenum"/>
+            <a:fld id="{86CB4B4D-7CA3-9044-876B-883B54F8677D}" type="slidenum">
+              <a:t>‹#›</a:t>
+            </a:fld>
+            <a:endParaRPr/>
           </a:p>
         </p:txBody>
       </p:sp>
@@ -1352,12 +1418,12 @@
   <p:clrMapOvr>
     <a:masterClrMapping/>
   </p:clrMapOvr>
-  <p:transition spd="med" advClick="1"/>
+  <p:transition xmlns:p14="http://schemas.microsoft.com/office/powerpoint/2010/main" spd="med"/>
 </p:sldLayout>
 </file>
 
 <file path=ppt/slideLayouts/slideLayout7.xml><?xml version="1.0" encoding="utf-8"?>
-<p:sldLayout xmlns:a="http://schemas.openxmlformats.org/drawingml/2006/main" xmlns:r="http://schemas.openxmlformats.org/officeDocument/2006/relationships" xmlns:p="http://schemas.openxmlformats.org/presentationml/2006/main" type="tx" showMasterSp="1" showMasterPhAnim="1">
+<p:sldLayout xmlns:a="http://schemas.openxmlformats.org/drawingml/2006/main" xmlns:r="http://schemas.openxmlformats.org/officeDocument/2006/relationships" xmlns:p="http://schemas.openxmlformats.org/presentationml/2006/main" type="tx">
   <p:cSld name="Blank">
     <p:spTree>
       <p:nvGrpSpPr>
@@ -1376,7 +1442,9 @@
       <p:sp>
         <p:nvSpPr>
           <p:cNvPr id="29" name="Shape 29"/>
-          <p:cNvSpPr/>
+          <p:cNvSpPr>
+            <a:spLocks noGrp="1"/>
+          </p:cNvSpPr>
           <p:nvPr>
             <p:ph type="sldNum" sz="quarter" idx="2"/>
           </p:nvPr>
@@ -1391,7 +1459,10 @@
           <a:lstStyle/>
           <a:p>
             <a:pPr lvl="0"/>
-            <a:fld id="{86CB4B4D-7CA3-9044-876B-883B54F8677D}" type="slidenum"/>
+            <a:fld id="{86CB4B4D-7CA3-9044-876B-883B54F8677D}" type="slidenum">
+              <a:t>‹#›</a:t>
+            </a:fld>
+            <a:endParaRPr/>
           </a:p>
         </p:txBody>
       </p:sp>
@@ -1400,12 +1471,12 @@
   <p:clrMapOvr>
     <a:masterClrMapping/>
   </p:clrMapOvr>
-  <p:transition spd="med" advClick="1"/>
+  <p:transition xmlns:p14="http://schemas.microsoft.com/office/powerpoint/2010/main" spd="med"/>
 </p:sldLayout>
 </file>
 
 <file path=ppt/slideLayouts/slideLayout8.xml><?xml version="1.0" encoding="utf-8"?>
-<p:sldLayout xmlns:a="http://schemas.openxmlformats.org/drawingml/2006/main" xmlns:r="http://schemas.openxmlformats.org/officeDocument/2006/relationships" xmlns:p="http://schemas.openxmlformats.org/presentationml/2006/main" type="tx" showMasterSp="1" showMasterPhAnim="1">
+<p:sldLayout xmlns:a="http://schemas.openxmlformats.org/drawingml/2006/main" xmlns:r="http://schemas.openxmlformats.org/officeDocument/2006/relationships" xmlns:p="http://schemas.openxmlformats.org/presentationml/2006/main" type="tx">
   <p:cSld name="Content with Caption">
     <p:spTree>
       <p:nvGrpSpPr>
@@ -1424,7 +1495,9 @@
       <p:sp>
         <p:nvSpPr>
           <p:cNvPr id="31" name="Shape 31"/>
-          <p:cNvSpPr/>
+          <p:cNvSpPr>
+            <a:spLocks noGrp="1"/>
+          </p:cNvSpPr>
           <p:nvPr>
             <p:ph type="title"/>
           </p:nvPr>
@@ -1442,15 +1515,15 @@
           <a:bodyPr anchor="b"/>
           <a:lstStyle>
             <a:lvl1pPr algn="l">
-              <a:defRPr b="1" sz="2000"/>
+              <a:defRPr sz="2000" b="1"/>
             </a:lvl1pPr>
           </a:lstStyle>
           <a:p>
             <a:pPr lvl="0">
-              <a:defRPr b="0" sz="1800"/>
-            </a:pPr>
-            <a:r>
-              <a:rPr b="1" sz="2000"/>
+              <a:defRPr sz="1800" b="0"/>
+            </a:pPr>
+            <a:r>
+              <a:rPr sz="2000" b="1"/>
               <a:t>Click to edit Master title style</a:t>
             </a:r>
           </a:p>
@@ -1459,7 +1532,9 @@
       <p:sp>
         <p:nvSpPr>
           <p:cNvPr id="32" name="Shape 32"/>
-          <p:cNvSpPr/>
+          <p:cNvSpPr>
+            <a:spLocks noGrp="1"/>
+          </p:cNvSpPr>
           <p:nvPr>
             <p:ph type="body" idx="1"/>
           </p:nvPr>
@@ -1484,7 +1559,6 @@
               <a:rPr sz="3200"/>
               <a:t>Click to edit Master text styles</a:t>
             </a:r>
-            <a:endParaRPr sz="3200"/>
           </a:p>
           <a:p>
             <a:pPr lvl="1">
@@ -1494,7 +1568,6 @@
               <a:rPr sz="3200"/>
               <a:t>Second level</a:t>
             </a:r>
-            <a:endParaRPr sz="3200"/>
           </a:p>
           <a:p>
             <a:pPr lvl="2">
@@ -1504,7 +1577,6 @@
               <a:rPr sz="3200"/>
               <a:t>Third level</a:t>
             </a:r>
-            <a:endParaRPr sz="3200"/>
           </a:p>
           <a:p>
             <a:pPr lvl="3">
@@ -1514,7 +1586,6 @@
               <a:rPr sz="3200"/>
               <a:t>Fourth level</a:t>
             </a:r>
-            <a:endParaRPr sz="3200"/>
           </a:p>
           <a:p>
             <a:pPr lvl="4">
@@ -1530,7 +1601,9 @@
       <p:sp>
         <p:nvSpPr>
           <p:cNvPr id="33" name="Shape 33"/>
-          <p:cNvSpPr/>
+          <p:cNvSpPr>
+            <a:spLocks noGrp="1"/>
+          </p:cNvSpPr>
           <p:nvPr>
             <p:ph type="sldNum" sz="quarter" idx="2"/>
           </p:nvPr>
@@ -1545,7 +1618,10 @@
           <a:lstStyle/>
           <a:p>
             <a:pPr lvl="0"/>
-            <a:fld id="{86CB4B4D-7CA3-9044-876B-883B54F8677D}" type="slidenum"/>
+            <a:fld id="{86CB4B4D-7CA3-9044-876B-883B54F8677D}" type="slidenum">
+              <a:t>‹#›</a:t>
+            </a:fld>
+            <a:endParaRPr/>
           </a:p>
         </p:txBody>
       </p:sp>
@@ -1554,12 +1630,12 @@
   <p:clrMapOvr>
     <a:masterClrMapping/>
   </p:clrMapOvr>
-  <p:transition spd="med" advClick="1"/>
+  <p:transition xmlns:p14="http://schemas.microsoft.com/office/powerpoint/2010/main" spd="med"/>
 </p:sldLayout>
 </file>
 
 <file path=ppt/slideLayouts/slideLayout9.xml><?xml version="1.0" encoding="utf-8"?>
-<p:sldLayout xmlns:a="http://schemas.openxmlformats.org/drawingml/2006/main" xmlns:r="http://schemas.openxmlformats.org/officeDocument/2006/relationships" xmlns:p="http://schemas.openxmlformats.org/presentationml/2006/main" type="tx" showMasterSp="1" showMasterPhAnim="1">
+<p:sldLayout xmlns:a="http://schemas.openxmlformats.org/drawingml/2006/main" xmlns:r="http://schemas.openxmlformats.org/officeDocument/2006/relationships" xmlns:p="http://schemas.openxmlformats.org/presentationml/2006/main" type="tx">
   <p:cSld name="Picture with Caption">
     <p:spTree>
       <p:nvGrpSpPr>
@@ -1578,7 +1654,9 @@
       <p:sp>
         <p:nvSpPr>
           <p:cNvPr id="35" name="Shape 35"/>
-          <p:cNvSpPr/>
+          <p:cNvSpPr>
+            <a:spLocks noGrp="1"/>
+          </p:cNvSpPr>
           <p:nvPr>
             <p:ph type="title"/>
           </p:nvPr>
@@ -1596,15 +1674,15 @@
           <a:bodyPr anchor="b"/>
           <a:lstStyle>
             <a:lvl1pPr algn="l">
-              <a:defRPr b="1" sz="2000"/>
+              <a:defRPr sz="2000" b="1"/>
             </a:lvl1pPr>
           </a:lstStyle>
           <a:p>
             <a:pPr lvl="0">
-              <a:defRPr b="0" sz="1800"/>
-            </a:pPr>
-            <a:r>
-              <a:rPr b="1" sz="2000"/>
+              <a:defRPr sz="1800" b="0"/>
+            </a:pPr>
+            <a:r>
+              <a:rPr sz="2000" b="1"/>
               <a:t>Click to edit Master title style</a:t>
             </a:r>
           </a:p>
@@ -1613,7 +1691,9 @@
       <p:sp>
         <p:nvSpPr>
           <p:cNvPr id="36" name="Shape 36"/>
-          <p:cNvSpPr/>
+          <p:cNvSpPr>
+            <a:spLocks noGrp="1"/>
+          </p:cNvSpPr>
           <p:nvPr>
             <p:ph type="body" idx="1"/>
           </p:nvPr>
@@ -1654,7 +1734,9 @@
       <p:sp>
         <p:nvSpPr>
           <p:cNvPr id="37" name="Shape 37"/>
-          <p:cNvSpPr/>
+          <p:cNvSpPr>
+            <a:spLocks noGrp="1"/>
+          </p:cNvSpPr>
           <p:nvPr>
             <p:ph type="sldNum" sz="quarter" idx="2"/>
           </p:nvPr>
@@ -1669,7 +1751,10 @@
           <a:lstStyle/>
           <a:p>
             <a:pPr lvl="0"/>
-            <a:fld id="{86CB4B4D-7CA3-9044-876B-883B54F8677D}" type="slidenum"/>
+            <a:fld id="{86CB4B4D-7CA3-9044-876B-883B54F8677D}" type="slidenum">
+              <a:t>‹#›</a:t>
+            </a:fld>
+            <a:endParaRPr/>
           </a:p>
         </p:txBody>
       </p:sp>
@@ -1678,7 +1763,7 @@
   <p:clrMapOvr>
     <a:masterClrMapping/>
   </p:clrMapOvr>
-  <p:transition spd="med" advClick="1"/>
+  <p:transition xmlns:p14="http://schemas.microsoft.com/office/powerpoint/2010/main" spd="med"/>
 </p:sldLayout>
 </file>
 
@@ -1690,6 +1775,7 @@
         <a:solidFill>
           <a:srgbClr val="FFFFFF"/>
         </a:solidFill>
+        <a:effectLst/>
       </p:bgPr>
     </p:bg>
     <p:spTree>
@@ -1709,7 +1795,9 @@
       <p:sp>
         <p:nvSpPr>
           <p:cNvPr id="2" name="Shape 2"/>
-          <p:cNvSpPr/>
+          <p:cNvSpPr>
+            <a:spLocks noGrp="1"/>
+          </p:cNvSpPr>
           <p:nvPr>
             <p:ph type="title"/>
           </p:nvPr>
@@ -1733,7 +1821,7 @@
         </p:spPr>
         <p:txBody>
           <a:bodyPr lIns="45719" rIns="45719" anchor="ctr">
-            <a:normAutofit fontScale="100000" lnSpcReduction="0"/>
+            <a:normAutofit/>
           </a:bodyPr>
           <a:lstStyle/>
           <a:p>
@@ -1750,7 +1838,9 @@
       <p:sp>
         <p:nvSpPr>
           <p:cNvPr id="3" name="Shape 3"/>
-          <p:cNvSpPr/>
+          <p:cNvSpPr>
+            <a:spLocks noGrp="1"/>
+          </p:cNvSpPr>
           <p:nvPr>
             <p:ph type="body" idx="1"/>
           </p:nvPr>
@@ -1774,7 +1864,7 @@
         </p:spPr>
         <p:txBody>
           <a:bodyPr lIns="45719" rIns="45719">
-            <a:normAutofit fontScale="100000" lnSpcReduction="0"/>
+            <a:normAutofit/>
           </a:bodyPr>
           <a:lstStyle/>
           <a:p>
@@ -1785,7 +1875,6 @@
               <a:rPr sz="3200"/>
               <a:t>Click to edit Master text styles</a:t>
             </a:r>
-            <a:endParaRPr sz="3200"/>
           </a:p>
           <a:p>
             <a:pPr lvl="1">
@@ -1795,7 +1884,6 @@
               <a:rPr sz="3200"/>
               <a:t>Second level</a:t>
             </a:r>
-            <a:endParaRPr sz="3200"/>
           </a:p>
           <a:p>
             <a:pPr lvl="2">
@@ -1805,7 +1893,6 @@
               <a:rPr sz="3200"/>
               <a:t>Third level</a:t>
             </a:r>
-            <a:endParaRPr sz="3200"/>
           </a:p>
           <a:p>
             <a:pPr lvl="3">
@@ -1815,7 +1902,6 @@
               <a:rPr sz="3200"/>
               <a:t>Fourth level</a:t>
             </a:r>
-            <a:endParaRPr sz="3200"/>
           </a:p>
           <a:p>
             <a:pPr lvl="4">
@@ -1831,7 +1917,9 @@
       <p:sp>
         <p:nvSpPr>
           <p:cNvPr id="4" name="Shape 4"/>
-          <p:cNvSpPr/>
+          <p:cNvSpPr>
+            <a:spLocks noGrp="1"/>
+          </p:cNvSpPr>
           <p:nvPr>
             <p:ph type="sldNum" sz="quarter" idx="2"/>
           </p:nvPr>
@@ -1863,7 +1951,10 @@
           </a:lstStyle>
           <a:p>
             <a:pPr lvl="0"/>
-            <a:fld id="{86CB4B4D-7CA3-9044-876B-883B54F8677D}" type="slidenum"/>
+            <a:fld id="{86CB4B4D-7CA3-9044-876B-883B54F8677D}" type="slidenum">
+              <a:t>‹#›</a:t>
+            </a:fld>
+            <a:endParaRPr/>
           </a:p>
         </p:txBody>
       </p:sp>
@@ -1871,19 +1962,19 @@
   </p:cSld>
   <p:clrMap bg1="lt1" tx1="dk1" bg2="lt2" tx2="dk2" accent1="accent1" accent2="accent2" accent3="accent3" accent4="accent4" accent5="accent5" accent6="accent6" hlink="hlink" folHlink="folHlink"/>
   <p:sldLayoutIdLst>
-    <p:sldLayoutId id="2147483649" r:id="rId2"/>
-    <p:sldLayoutId id="2147483650" r:id="rId3"/>
-    <p:sldLayoutId id="2147483651" r:id="rId4"/>
-    <p:sldLayoutId id="2147483652" r:id="rId5"/>
-    <p:sldLayoutId id="2147483653" r:id="rId6"/>
-    <p:sldLayoutId id="2147483654" r:id="rId7"/>
-    <p:sldLayoutId id="2147483655" r:id="rId8"/>
-    <p:sldLayoutId id="2147483656" r:id="rId9"/>
-    <p:sldLayoutId id="2147483657" r:id="rId10"/>
-    <p:sldLayoutId id="2147483658" r:id="rId11"/>
-    <p:sldLayoutId id="2147483659" r:id="rId12"/>
+    <p:sldLayoutId id="2147483649" r:id="rId1"/>
+    <p:sldLayoutId id="2147483650" r:id="rId2"/>
+    <p:sldLayoutId id="2147483651" r:id="rId3"/>
+    <p:sldLayoutId id="2147483652" r:id="rId4"/>
+    <p:sldLayoutId id="2147483653" r:id="rId5"/>
+    <p:sldLayoutId id="2147483654" r:id="rId6"/>
+    <p:sldLayoutId id="2147483655" r:id="rId7"/>
+    <p:sldLayoutId id="2147483656" r:id="rId8"/>
+    <p:sldLayoutId id="2147483657" r:id="rId9"/>
+    <p:sldLayoutId id="2147483658" r:id="rId10"/>
+    <p:sldLayoutId id="2147483659" r:id="rId11"/>
   </p:sldLayoutIdLst>
-  <p:transition spd="med" advClick="1"/>
+  <p:transition xmlns:p14="http://schemas.microsoft.com/office/powerpoint/2010/main" spd="med"/>
   <p:txStyles>
     <p:titleStyle>
       <a:lvl1pPr algn="ctr" defTabSz="457200">
@@ -2193,7 +2284,7 @@
 </file>
 
 <file path=ppt/slides/slide1.xml><?xml version="1.0" encoding="utf-8"?>
-<p:sld xmlns:a="http://schemas.openxmlformats.org/drawingml/2006/main" xmlns:r="http://schemas.openxmlformats.org/officeDocument/2006/relationships" xmlns:p="http://schemas.openxmlformats.org/presentationml/2006/main" showMasterSp="1" showMasterPhAnim="1">
+<p:sld xmlns:a="http://schemas.openxmlformats.org/drawingml/2006/main" xmlns:r="http://schemas.openxmlformats.org/officeDocument/2006/relationships" xmlns:p="http://schemas.openxmlformats.org/presentationml/2006/main">
   <p:cSld>
     <p:spTree>
       <p:nvGrpSpPr>
@@ -2212,7 +2303,9 @@
       <p:sp>
         <p:nvSpPr>
           <p:cNvPr id="49" name="Shape 49"/>
-          <p:cNvSpPr/>
+          <p:cNvSpPr>
+            <a:spLocks noGrp="1"/>
+          </p:cNvSpPr>
           <p:nvPr>
             <p:ph type="title"/>
           </p:nvPr>
@@ -2259,7 +2352,9 @@
       <p:sp>
         <p:nvSpPr>
           <p:cNvPr id="50" name="Shape 50"/>
-          <p:cNvSpPr/>
+          <p:cNvSpPr>
+            <a:spLocks noGrp="1"/>
+          </p:cNvSpPr>
           <p:nvPr>
             <p:ph type="body" idx="1"/>
           </p:nvPr>
@@ -2285,10 +2380,9 @@
               </a:defRPr>
             </a:pPr>
             <a:r>
-              <a:rPr b="1" sz="3200"/>
+              <a:rPr sz="3200" b="1"/>
               <a:t>Angel invests on those who awaits and prepare for the Zen of Matrix</a:t>
             </a:r>
-            <a:endParaRPr b="1" sz="3200"/>
           </a:p>
           <a:p>
             <a:pPr lvl="0">
@@ -2299,10 +2393,9 @@
               </a:defRPr>
             </a:pPr>
             <a:r>
-              <a:rPr b="1" sz="3200"/>
+              <a:rPr sz="3200" b="1"/>
               <a:t>People know Matrix.</a:t>
             </a:r>
-            <a:endParaRPr b="1" sz="3200"/>
           </a:p>
           <a:p>
             <a:pPr lvl="0">
@@ -2316,11 +2409,11 @@
               </a:defRPr>
             </a:pPr>
             <a:r>
-              <a:rPr b="1" sz="3200"/>
+              <a:rPr sz="3200" b="1"/>
               <a:t>We know the </a:t>
             </a:r>
             <a:r>
-              <a:rPr b="1" sz="3600">
+              <a:rPr sz="3600" b="1">
                 <a:solidFill>
                   <a:srgbClr val="FF0000"/>
                 </a:solidFill>
@@ -2328,7 +2421,7 @@
               <a:t>ZEN</a:t>
             </a:r>
             <a:r>
-              <a:rPr b="1" sz="3600"/>
+              <a:rPr sz="3600" b="1"/>
               <a:t>!</a:t>
             </a:r>
           </a:p>
@@ -2339,12 +2432,12 @@
   <p:clrMapOvr>
     <a:masterClrMapping/>
   </p:clrMapOvr>
-  <p:transition spd="med" advClick="1"/>
+  <p:transition xmlns:p14="http://schemas.microsoft.com/office/powerpoint/2010/main" spd="med"/>
 </p:sld>
 </file>
 
 <file path=ppt/slides/slide10.xml><?xml version="1.0" encoding="utf-8"?>
-<p:sld xmlns:a="http://schemas.openxmlformats.org/drawingml/2006/main" xmlns:r="http://schemas.openxmlformats.org/officeDocument/2006/relationships" xmlns:p="http://schemas.openxmlformats.org/presentationml/2006/main" showMasterSp="1" showMasterPhAnim="1">
+<p:sld xmlns:a="http://schemas.openxmlformats.org/drawingml/2006/main" xmlns:r="http://schemas.openxmlformats.org/officeDocument/2006/relationships" xmlns:p="http://schemas.openxmlformats.org/presentationml/2006/main">
   <p:cSld>
     <p:spTree>
       <p:nvGrpSpPr>
@@ -2363,7 +2456,9 @@
       <p:sp>
         <p:nvSpPr>
           <p:cNvPr id="81" name="Shape 81"/>
-          <p:cNvSpPr/>
+          <p:cNvSpPr>
+            <a:spLocks noGrp="1"/>
+          </p:cNvSpPr>
           <p:nvPr>
             <p:ph type="title"/>
           </p:nvPr>
@@ -2423,12 +2518,12 @@
   <p:clrMapOvr>
     <a:masterClrMapping/>
   </p:clrMapOvr>
-  <p:transition spd="med" advClick="1"/>
+  <p:transition xmlns:p14="http://schemas.microsoft.com/office/powerpoint/2010/main" spd="med"/>
 </p:sld>
 </file>
 
 <file path=ppt/slides/slide11.xml><?xml version="1.0" encoding="utf-8"?>
-<p:sld xmlns:a="http://schemas.openxmlformats.org/drawingml/2006/main" xmlns:r="http://schemas.openxmlformats.org/officeDocument/2006/relationships" xmlns:p="http://schemas.openxmlformats.org/presentationml/2006/main" showMasterSp="1" showMasterPhAnim="1">
+<p:sld xmlns:a="http://schemas.openxmlformats.org/drawingml/2006/main" xmlns:r="http://schemas.openxmlformats.org/officeDocument/2006/relationships" xmlns:p="http://schemas.openxmlformats.org/presentationml/2006/main">
   <p:cSld>
     <p:spTree>
       <p:nvGrpSpPr>
@@ -2447,7 +2542,9 @@
       <p:sp>
         <p:nvSpPr>
           <p:cNvPr id="84" name="Shape 84"/>
-          <p:cNvSpPr/>
+          <p:cNvSpPr>
+            <a:spLocks noGrp="1"/>
+          </p:cNvSpPr>
           <p:nvPr>
             <p:ph type="title"/>
           </p:nvPr>
@@ -2478,7 +2575,9 @@
       <p:sp>
         <p:nvSpPr>
           <p:cNvPr id="85" name="Shape 85"/>
-          <p:cNvSpPr/>
+          <p:cNvSpPr>
+            <a:spLocks noGrp="1"/>
+          </p:cNvSpPr>
           <p:nvPr>
             <p:ph type="body" idx="1"/>
           </p:nvPr>
@@ -2496,7 +2595,7 @@
           <a:bodyPr/>
           <a:lstStyle/>
           <a:p>
-            <a:pPr lvl="0" marL="609600" indent="-609600">
+            <a:pPr marL="609600" lvl="0" indent="-609600">
               <a:defRPr sz="1800"/>
             </a:pPr>
             <a:r>
@@ -2505,7 +2604,7 @@
             </a:r>
           </a:p>
           <a:p>
-            <a:pPr lvl="0" marL="0" indent="0">
+            <a:pPr marL="0" lvl="0" indent="0">
               <a:spcBef>
                 <a:spcPts val="0"/>
               </a:spcBef>
@@ -2578,7 +2677,7 @@
             </a:r>
           </a:p>
           <a:p>
-            <a:pPr lvl="0" marL="0" indent="0">
+            <a:pPr marL="0" lvl="0" indent="0">
               <a:spcBef>
                 <a:spcPts val="0"/>
               </a:spcBef>
@@ -2759,7 +2858,7 @@
             </a:r>
           </a:p>
           <a:p>
-            <a:pPr lvl="0" marL="0" indent="0">
+            <a:pPr marL="0" lvl="0" indent="0">
               <a:spcBef>
                 <a:spcPts val="0"/>
               </a:spcBef>
@@ -2862,7 +2961,7 @@
             </a:endParaRPr>
           </a:p>
           <a:p>
-            <a:pPr lvl="0" marL="0" indent="0">
+            <a:pPr marL="0" lvl="0" indent="0">
               <a:spcBef>
                 <a:spcPts val="0"/>
               </a:spcBef>
@@ -2962,7 +3061,7 @@
             </a:endParaRPr>
           </a:p>
           <a:p>
-            <a:pPr lvl="0" marL="0" indent="0">
+            <a:pPr marL="0" lvl="0" indent="0">
               <a:spcBef>
                 <a:spcPts val="0"/>
               </a:spcBef>
@@ -3062,7 +3161,7 @@
             </a:endParaRPr>
           </a:p>
           <a:p>
-            <a:pPr lvl="0" marL="0" indent="0">
+            <a:pPr marL="0" lvl="0" indent="0">
               <a:spcBef>
                 <a:spcPts val="0"/>
               </a:spcBef>
@@ -3165,7 +3264,7 @@
             </a:r>
           </a:p>
           <a:p>
-            <a:pPr lvl="0" marL="609600" indent="-609600">
+            <a:pPr marL="609600" lvl="0" indent="-609600">
               <a:defRPr sz="1800"/>
             </a:pPr>
             <a:r>
@@ -3175,7 +3274,7 @@
             <a:endParaRPr sz="1200"/>
           </a:p>
           <a:p>
-            <a:pPr lvl="0" marL="0" indent="0">
+            <a:pPr marL="0" lvl="0" indent="0">
               <a:spcBef>
                 <a:spcPts val="0"/>
               </a:spcBef>
@@ -3197,7 +3296,7 @@
             </a:r>
           </a:p>
           <a:p>
-            <a:pPr lvl="0" marL="0" indent="0">
+            <a:pPr marL="0" lvl="0" indent="0">
               <a:spcBef>
                 <a:spcPts val="0"/>
               </a:spcBef>
@@ -3312,7 +3411,7 @@
             </a:endParaRPr>
           </a:p>
           <a:p>
-            <a:pPr lvl="0" marL="0" indent="0">
+            <a:pPr marL="0" lvl="0" indent="0">
               <a:spcBef>
                 <a:spcPts val="0"/>
               </a:spcBef>
@@ -3340,7 +3439,7 @@
             </a:endParaRPr>
           </a:p>
           <a:p>
-            <a:pPr lvl="0" marL="0" indent="0">
+            <a:pPr marL="0" lvl="0" indent="0">
               <a:spcBef>
                 <a:spcPts val="0"/>
               </a:spcBef>
@@ -3485,7 +3584,7 @@
             </a:endParaRPr>
           </a:p>
           <a:p>
-            <a:pPr lvl="0" marL="0" indent="0">
+            <a:pPr marL="0" lvl="0" indent="0">
               <a:spcBef>
                 <a:spcPts val="0"/>
               </a:spcBef>
@@ -3630,7 +3729,7 @@
             </a:endParaRPr>
           </a:p>
           <a:p>
-            <a:pPr lvl="0" marL="0" indent="0">
+            <a:pPr marL="0" lvl="0" indent="0">
               <a:spcBef>
                 <a:spcPts val="0"/>
               </a:spcBef>
@@ -3769,7 +3868,7 @@
             </a:r>
           </a:p>
           <a:p>
-            <a:pPr lvl="0" marL="0" indent="0">
+            <a:pPr marL="0" lvl="0" indent="0">
               <a:spcBef>
                 <a:spcPts val="0"/>
               </a:spcBef>
@@ -3809,7 +3908,7 @@
             </a:endParaRPr>
           </a:p>
           <a:p>
-            <a:pPr lvl="0" marL="0" indent="0">
+            <a:pPr marL="0" lvl="0" indent="0">
               <a:spcBef>
                 <a:spcPts val="0"/>
               </a:spcBef>
@@ -3912,12 +4011,12 @@
   <p:clrMapOvr>
     <a:masterClrMapping/>
   </p:clrMapOvr>
-  <p:transition spd="med" advClick="1"/>
+  <p:transition xmlns:p14="http://schemas.microsoft.com/office/powerpoint/2010/main" spd="med"/>
 </p:sld>
 </file>
 
 <file path=ppt/slides/slide12.xml><?xml version="1.0" encoding="utf-8"?>
-<p:sld xmlns:a="http://schemas.openxmlformats.org/drawingml/2006/main" xmlns:r="http://schemas.openxmlformats.org/officeDocument/2006/relationships" xmlns:p="http://schemas.openxmlformats.org/presentationml/2006/main" showMasterSp="1" showMasterPhAnim="1">
+<p:sld xmlns:a="http://schemas.openxmlformats.org/drawingml/2006/main" xmlns:r="http://schemas.openxmlformats.org/officeDocument/2006/relationships" xmlns:p="http://schemas.openxmlformats.org/presentationml/2006/main">
   <p:cSld>
     <p:spTree>
       <p:nvGrpSpPr>
@@ -3936,7 +4035,9 @@
       <p:sp>
         <p:nvSpPr>
           <p:cNvPr id="87" name="Shape 87"/>
-          <p:cNvSpPr/>
+          <p:cNvSpPr>
+            <a:spLocks noGrp="1"/>
+          </p:cNvSpPr>
           <p:nvPr>
             <p:ph type="title"/>
           </p:nvPr>
@@ -3967,7 +4068,9 @@
       <p:sp>
         <p:nvSpPr>
           <p:cNvPr id="88" name="Shape 88"/>
-          <p:cNvSpPr/>
+          <p:cNvSpPr>
+            <a:spLocks noGrp="1"/>
+          </p:cNvSpPr>
           <p:nvPr>
             <p:ph type="body" idx="1"/>
           </p:nvPr>
@@ -3985,7 +4088,7 @@
           <a:bodyPr/>
           <a:lstStyle/>
           <a:p>
-            <a:pPr lvl="0" marL="609600" indent="-609600">
+            <a:pPr marL="609600" lvl="0" indent="-609600">
               <a:defRPr sz="1800"/>
             </a:pPr>
             <a:r>
@@ -3994,7 +4097,7 @@
             </a:r>
           </a:p>
           <a:p>
-            <a:pPr lvl="0" marL="0" indent="0">
+            <a:pPr marL="0" lvl="0" indent="0">
               <a:spcBef>
                 <a:spcPts val="0"/>
               </a:spcBef>
@@ -4154,7 +4257,7 @@
             </a:r>
           </a:p>
           <a:p>
-            <a:pPr lvl="0" marL="0" indent="0">
+            <a:pPr marL="0" lvl="0" indent="0">
               <a:spcBef>
                 <a:spcPts val="0"/>
               </a:spcBef>
@@ -4206,7 +4309,7 @@
             </a:r>
           </a:p>
           <a:p>
-            <a:pPr lvl="0" marL="0" indent="0">
+            <a:pPr marL="0" lvl="0" indent="0">
               <a:spcBef>
                 <a:spcPts val="0"/>
               </a:spcBef>
@@ -4279,7 +4382,7 @@
             </a:endParaRPr>
           </a:p>
           <a:p>
-            <a:pPr lvl="0" marL="0" indent="0">
+            <a:pPr marL="0" lvl="0" indent="0">
               <a:spcBef>
                 <a:spcPts val="0"/>
               </a:spcBef>
@@ -4352,7 +4455,7 @@
             </a:r>
           </a:p>
           <a:p>
-            <a:pPr lvl="0" marL="0" indent="0">
+            <a:pPr marL="0" lvl="0" indent="0">
               <a:spcBef>
                 <a:spcPts val="0"/>
               </a:spcBef>
@@ -4368,7 +4471,7 @@
             </a:endParaRPr>
           </a:p>
           <a:p>
-            <a:pPr lvl="0" marL="0" indent="0">
+            <a:pPr marL="0" lvl="0" indent="0">
               <a:spcBef>
                 <a:spcPts val="0"/>
               </a:spcBef>
@@ -4390,7 +4493,7 @@
             </a:r>
           </a:p>
           <a:p>
-            <a:pPr lvl="0" marL="0" indent="0">
+            <a:pPr marL="0" lvl="0" indent="0">
               <a:spcBef>
                 <a:spcPts val="0"/>
               </a:spcBef>
@@ -4484,7 +4587,7 @@
             </a:r>
           </a:p>
           <a:p>
-            <a:pPr lvl="0" marL="0" indent="0">
+            <a:pPr marL="0" lvl="0" indent="0">
               <a:spcBef>
                 <a:spcPts val="0"/>
               </a:spcBef>
@@ -4578,7 +4681,7 @@
             </a:r>
           </a:p>
           <a:p>
-            <a:pPr lvl="0" marL="0" indent="0">
+            <a:pPr marL="0" lvl="0" indent="0">
               <a:spcBef>
                 <a:spcPts val="0"/>
               </a:spcBef>
@@ -4702,7 +4805,7 @@
             </a:r>
           </a:p>
           <a:p>
-            <a:pPr lvl="0" marL="0" indent="0">
+            <a:pPr marL="0" lvl="0" indent="0">
               <a:spcBef>
                 <a:spcPts val="0"/>
               </a:spcBef>
@@ -4742,7 +4845,7 @@
             </a:r>
           </a:p>
           <a:p>
-            <a:pPr lvl="0" marL="0" indent="0">
+            <a:pPr marL="0" lvl="0" indent="0">
               <a:spcBef>
                 <a:spcPts val="0"/>
               </a:spcBef>
@@ -4929,7 +5032,7 @@
             </a:r>
           </a:p>
           <a:p>
-            <a:pPr lvl="0" marL="0" indent="0">
+            <a:pPr marL="0" lvl="0" indent="0">
               <a:spcBef>
                 <a:spcPts val="0"/>
               </a:spcBef>
@@ -5011,7 +5114,7 @@
             </a:r>
           </a:p>
           <a:p>
-            <a:pPr lvl="0" marL="0" indent="0">
+            <a:pPr marL="0" lvl="0" indent="0">
               <a:spcBef>
                 <a:spcPts val="0"/>
               </a:spcBef>
@@ -5153,12 +5256,12 @@
   <p:clrMapOvr>
     <a:masterClrMapping/>
   </p:clrMapOvr>
-  <p:transition spd="med" advClick="1"/>
+  <p:transition xmlns:p14="http://schemas.microsoft.com/office/powerpoint/2010/main" spd="med"/>
 </p:sld>
 </file>
 
 <file path=ppt/slides/slide13.xml><?xml version="1.0" encoding="utf-8"?>
-<p:sld xmlns:a="http://schemas.openxmlformats.org/drawingml/2006/main" xmlns:r="http://schemas.openxmlformats.org/officeDocument/2006/relationships" xmlns:p="http://schemas.openxmlformats.org/presentationml/2006/main" showMasterSp="1" showMasterPhAnim="1">
+<p:sld xmlns:a="http://schemas.openxmlformats.org/drawingml/2006/main" xmlns:r="http://schemas.openxmlformats.org/officeDocument/2006/relationships" xmlns:p="http://schemas.openxmlformats.org/presentationml/2006/main">
   <p:cSld>
     <p:spTree>
       <p:nvGrpSpPr>
@@ -5177,7 +5280,9 @@
       <p:sp>
         <p:nvSpPr>
           <p:cNvPr id="90" name="Shape 90"/>
-          <p:cNvSpPr/>
+          <p:cNvSpPr>
+            <a:spLocks noGrp="1"/>
+          </p:cNvSpPr>
           <p:nvPr>
             <p:ph type="title"/>
           </p:nvPr>
@@ -5208,7 +5313,9 @@
       <p:sp>
         <p:nvSpPr>
           <p:cNvPr id="91" name="Shape 91"/>
-          <p:cNvSpPr/>
+          <p:cNvSpPr>
+            <a:spLocks noGrp="1"/>
+          </p:cNvSpPr>
           <p:nvPr>
             <p:ph type="body" idx="1"/>
           </p:nvPr>
@@ -5226,7 +5333,7 @@
           <a:bodyPr/>
           <a:lstStyle/>
           <a:p>
-            <a:pPr lvl="0" marL="526694" indent="-526694" defTabSz="421354">
+            <a:pPr marL="526694" lvl="0" indent="-526694" defTabSz="421354">
               <a:spcBef>
                 <a:spcPts val="600"/>
               </a:spcBef>
@@ -5239,7 +5346,7 @@
             <a:endParaRPr sz="1727"/>
           </a:p>
           <a:p>
-            <a:pPr lvl="0" marL="0" indent="0" defTabSz="421354">
+            <a:pPr marL="0" lvl="0" indent="0" defTabSz="421354">
               <a:spcBef>
                 <a:spcPts val="0"/>
               </a:spcBef>
@@ -5288,7 +5395,7 @@
             </a:endParaRPr>
           </a:p>
           <a:p>
-            <a:pPr lvl="0" marL="0" indent="0" defTabSz="421354">
+            <a:pPr marL="0" lvl="0" indent="0" defTabSz="421354">
               <a:spcBef>
                 <a:spcPts val="0"/>
               </a:spcBef>
@@ -5413,7 +5520,7 @@
             <a:endParaRPr sz="1727"/>
           </a:p>
           <a:p>
-            <a:pPr lvl="0" marL="0" indent="0" defTabSz="421354">
+            <a:pPr marL="0" lvl="0" indent="0" defTabSz="421354">
               <a:spcBef>
                 <a:spcPts val="0"/>
               </a:spcBef>
@@ -5559,7 +5666,7 @@
             <a:endParaRPr sz="1727"/>
           </a:p>
           <a:p>
-            <a:pPr lvl="0" marL="0" indent="0" defTabSz="421354">
+            <a:pPr marL="0" lvl="0" indent="0" defTabSz="421354">
               <a:spcBef>
                 <a:spcPts val="0"/>
               </a:spcBef>
@@ -5663,7 +5770,7 @@
             <a:endParaRPr sz="1727"/>
           </a:p>
           <a:p>
-            <a:pPr lvl="0" marL="526694" indent="-526694" defTabSz="421354">
+            <a:pPr marL="526694" lvl="0" indent="-526694" defTabSz="421354">
               <a:spcBef>
                 <a:spcPts val="600"/>
               </a:spcBef>
@@ -5673,10 +5780,9 @@
               <a:rPr sz="2880"/>
               <a:t>Environment/Scopes:</a:t>
             </a:r>
-            <a:endParaRPr sz="2880"/>
-          </a:p>
-          <a:p>
-            <a:pPr lvl="0" marL="0" indent="0" defTabSz="421354">
+          </a:p>
+          <a:p>
+            <a:pPr marL="0" lvl="0" indent="0" defTabSz="421354">
               <a:spcBef>
                 <a:spcPts val="600"/>
               </a:spcBef>
@@ -5720,7 +5826,7 @@
             <a:endParaRPr sz="1727"/>
           </a:p>
           <a:p>
-            <a:pPr lvl="0" marL="0" indent="0" defTabSz="438911">
+            <a:pPr marL="0" lvl="0" indent="0" defTabSz="438911">
               <a:spcBef>
                 <a:spcPts val="0"/>
               </a:spcBef>
@@ -5800,7 +5906,7 @@
             </a:endParaRPr>
           </a:p>
           <a:p>
-            <a:pPr lvl="0" marL="0" indent="0" defTabSz="438911">
+            <a:pPr marL="0" lvl="0" indent="0" defTabSz="438911">
               <a:spcBef>
                 <a:spcPts val="0"/>
               </a:spcBef>
@@ -5880,7 +5986,7 @@
             </a:endParaRPr>
           </a:p>
           <a:p>
-            <a:pPr lvl="0" marL="0" indent="0" defTabSz="438911">
+            <a:pPr marL="0" lvl="0" indent="0" defTabSz="438911">
               <a:spcBef>
                 <a:spcPts val="0"/>
               </a:spcBef>
@@ -5912,7 +6018,7 @@
             </a:endParaRPr>
           </a:p>
           <a:p>
-            <a:pPr lvl="0" marL="0" indent="0" defTabSz="421354">
+            <a:pPr marL="0" lvl="0" indent="0" defTabSz="421354">
               <a:spcBef>
                 <a:spcPts val="0"/>
               </a:spcBef>
@@ -6003,7 +6109,7 @@
             </a:endParaRPr>
           </a:p>
           <a:p>
-            <a:pPr lvl="0" marL="0" indent="0" defTabSz="421354">
+            <a:pPr marL="0" lvl="0" indent="0" defTabSz="421354">
               <a:spcBef>
                 <a:spcPts val="0"/>
               </a:spcBef>
@@ -6061,7 +6167,7 @@
             </a:endParaRPr>
           </a:p>
           <a:p>
-            <a:pPr lvl="0" marL="0" indent="0" defTabSz="421354">
+            <a:pPr marL="0" lvl="0" indent="0" defTabSz="421354">
               <a:spcBef>
                 <a:spcPts val="0"/>
               </a:spcBef>
@@ -6236,7 +6342,7 @@
             </a:endParaRPr>
           </a:p>
           <a:p>
-            <a:pPr lvl="0" marL="0" indent="0" defTabSz="421354">
+            <a:pPr marL="0" lvl="0" indent="0" defTabSz="421354">
               <a:spcBef>
                 <a:spcPts val="0"/>
               </a:spcBef>
@@ -6315,7 +6421,7 @@
             </a:endParaRPr>
           </a:p>
           <a:p>
-            <a:pPr lvl="0" marL="0" indent="0" defTabSz="421354">
+            <a:pPr marL="0" lvl="0" indent="0" defTabSz="421354">
               <a:spcBef>
                 <a:spcPts val="0"/>
               </a:spcBef>
@@ -6394,7 +6500,7 @@
             </a:endParaRPr>
           </a:p>
           <a:p>
-            <a:pPr lvl="0" marL="0" indent="0" defTabSz="421354">
+            <a:pPr marL="0" lvl="0" indent="0" defTabSz="421354">
               <a:spcBef>
                 <a:spcPts val="0"/>
               </a:spcBef>
@@ -6473,7 +6579,7 @@
             </a:endParaRPr>
           </a:p>
           <a:p>
-            <a:pPr lvl="0" marL="0" indent="0" defTabSz="421354">
+            <a:pPr marL="0" lvl="0" indent="0" defTabSz="421354">
               <a:spcBef>
                 <a:spcPts val="0"/>
               </a:spcBef>
@@ -6496,7 +6602,7 @@
             <a:endParaRPr sz="1727"/>
           </a:p>
           <a:p>
-            <a:pPr lvl="0" marL="0" indent="0" defTabSz="421354">
+            <a:pPr marL="0" lvl="0" indent="0" defTabSz="421354">
               <a:spcBef>
                 <a:spcPts val="0"/>
               </a:spcBef>
@@ -6566,7 +6672,7 @@
             </a:endParaRPr>
           </a:p>
           <a:p>
-            <a:pPr lvl="0" marL="0" indent="0" defTabSz="421354">
+            <a:pPr marL="0" lvl="0" indent="0" defTabSz="421354">
               <a:spcBef>
                 <a:spcPts val="0"/>
               </a:spcBef>
@@ -6699,7 +6805,7 @@
             </a:endParaRPr>
           </a:p>
           <a:p>
-            <a:pPr lvl="0" marL="0" indent="0" defTabSz="421354">
+            <a:pPr marL="0" lvl="0" indent="0" defTabSz="421354">
               <a:spcBef>
                 <a:spcPts val="0"/>
               </a:spcBef>
@@ -6778,7 +6884,7 @@
             </a:endParaRPr>
           </a:p>
           <a:p>
-            <a:pPr lvl="0" marL="0" indent="0" defTabSz="421354">
+            <a:pPr marL="0" lvl="0" indent="0" defTabSz="421354">
               <a:spcBef>
                 <a:spcPts val="0"/>
               </a:spcBef>
@@ -6999,18 +7105,9 @@
               </a:rPr>
               <a:t>;</a:t>
             </a:r>
-            <a:endParaRPr sz="1248">
-              <a:solidFill>
-                <a:srgbClr val="941100"/>
-              </a:solidFill>
-              <a:latin typeface="Monaco"/>
-              <a:ea typeface="Monaco"/>
-              <a:cs typeface="Monaco"/>
-              <a:sym typeface="Monaco"/>
-            </a:endParaRPr>
-          </a:p>
-          <a:p>
-            <a:pPr lvl="0" marL="0" indent="0" defTabSz="421354">
+          </a:p>
+          <a:p>
+            <a:pPr marL="0" lvl="0" indent="0" defTabSz="421354">
               <a:spcBef>
                 <a:spcPts val="0"/>
               </a:spcBef>
@@ -7038,12 +7135,12 @@
   <p:clrMapOvr>
     <a:masterClrMapping/>
   </p:clrMapOvr>
-  <p:transition spd="med" advClick="1"/>
+  <p:transition xmlns:p14="http://schemas.microsoft.com/office/powerpoint/2010/main" spd="med"/>
 </p:sld>
 </file>
 
 <file path=ppt/slides/slide14.xml><?xml version="1.0" encoding="utf-8"?>
-<p:sld xmlns:a="http://schemas.openxmlformats.org/drawingml/2006/main" xmlns:r="http://schemas.openxmlformats.org/officeDocument/2006/relationships" xmlns:p="http://schemas.openxmlformats.org/presentationml/2006/main" showMasterSp="1" showMasterPhAnim="1">
+<p:sld xmlns:a="http://schemas.openxmlformats.org/drawingml/2006/main" xmlns:r="http://schemas.openxmlformats.org/officeDocument/2006/relationships" xmlns:p="http://schemas.openxmlformats.org/presentationml/2006/main">
   <p:cSld>
     <p:spTree>
       <p:nvGrpSpPr>
@@ -7062,7 +7159,9 @@
       <p:sp>
         <p:nvSpPr>
           <p:cNvPr id="93" name="Shape 93"/>
-          <p:cNvSpPr/>
+          <p:cNvSpPr>
+            <a:spLocks noGrp="1"/>
+          </p:cNvSpPr>
           <p:nvPr>
             <p:ph type="title"/>
           </p:nvPr>
@@ -7093,7 +7192,9 @@
       <p:sp>
         <p:nvSpPr>
           <p:cNvPr id="94" name="Shape 94"/>
-          <p:cNvSpPr/>
+          <p:cNvSpPr>
+            <a:spLocks noGrp="1"/>
+          </p:cNvSpPr>
           <p:nvPr>
             <p:ph type="body" idx="1"/>
           </p:nvPr>
@@ -7111,7 +7212,7 @@
           <a:bodyPr lIns="0" tIns="0" rIns="0" bIns="0"/>
           <a:lstStyle/>
           <a:p>
-            <a:pPr lvl="0" marL="513778" indent="-513778" defTabSz="425194">
+            <a:pPr marL="513778" lvl="0" indent="-513778" defTabSz="425194">
               <a:spcBef>
                 <a:spcPts val="600"/>
               </a:spcBef>
@@ -7123,7 +7224,7 @@
             </a:r>
           </a:p>
           <a:p>
-            <a:pPr lvl="1" marL="744092" indent="-318896" defTabSz="425194">
+            <a:pPr marL="744092" lvl="1" indent="-318896" defTabSz="425194">
               <a:spcBef>
                 <a:spcPts val="600"/>
               </a:spcBef>
@@ -7134,10 +7235,9 @@
               <a:rPr sz="2700"/>
               <a:t>Types of operations/expressions are consistent </a:t>
             </a:r>
-            <a:endParaRPr sz="2700"/>
-          </a:p>
-          <a:p>
-            <a:pPr lvl="2" marL="1275587" indent="-425196" defTabSz="425194">
+          </a:p>
+          <a:p>
+            <a:pPr marL="1275587" lvl="2" indent="-425196" defTabSz="425194">
               <a:spcBef>
                 <a:spcPts val="500"/>
               </a:spcBef>
@@ -7147,10 +7247,9 @@
               <a:rPr sz="2400"/>
               <a:t> int convert to float is allowed, reverse is not allowed</a:t>
             </a:r>
-            <a:endParaRPr sz="2400"/>
-          </a:p>
-          <a:p>
-            <a:pPr lvl="2" marL="1275587" indent="-425196" defTabSz="425194">
+          </a:p>
+          <a:p>
+            <a:pPr marL="1275587" lvl="2" indent="-425196" defTabSz="425194">
               <a:spcBef>
                 <a:spcPts val="500"/>
               </a:spcBef>
@@ -7162,7 +7261,7 @@
             </a:r>
           </a:p>
           <a:p>
-            <a:pPr lvl="1" marL="744092" indent="-318896" defTabSz="425194">
+            <a:pPr marL="744092" lvl="1" indent="-318896" defTabSz="425194">
               <a:spcBef>
                 <a:spcPts val="600"/>
               </a:spcBef>
@@ -7175,7 +7274,7 @@
             </a:r>
           </a:p>
           <a:p>
-            <a:pPr lvl="1" marL="744092" indent="-318896" defTabSz="425194">
+            <a:pPr marL="744092" lvl="1" indent="-318896" defTabSz="425194">
               <a:spcBef>
                 <a:spcPts val="600"/>
               </a:spcBef>
@@ -7188,7 +7287,7 @@
             </a:r>
           </a:p>
           <a:p>
-            <a:pPr lvl="2" marL="1169287" indent="-318896" defTabSz="425194">
+            <a:pPr marL="1169287" lvl="2" indent="-318896" defTabSz="425194">
               <a:spcBef>
                 <a:spcPts val="600"/>
               </a:spcBef>
@@ -7198,10 +7297,9 @@
               <a:rPr sz="2400"/>
               <a:t>if(expr)—expr can only be of boolean type;</a:t>
             </a:r>
-            <a:endParaRPr sz="2400"/>
-          </a:p>
-          <a:p>
-            <a:pPr lvl="2" marL="1169287" indent="-318896" defTabSz="425194">
+          </a:p>
+          <a:p>
+            <a:pPr marL="1169287" lvl="2" indent="-318896" defTabSz="425194">
               <a:spcBef>
                 <a:spcPts val="600"/>
               </a:spcBef>
@@ -7219,12 +7317,12 @@
   <p:clrMapOvr>
     <a:masterClrMapping/>
   </p:clrMapOvr>
-  <p:transition spd="med" advClick="1"/>
+  <p:transition xmlns:p14="http://schemas.microsoft.com/office/powerpoint/2010/main" spd="med"/>
 </p:sld>
 </file>
 
 <file path=ppt/slides/slide15.xml><?xml version="1.0" encoding="utf-8"?>
-<p:sld xmlns:a="http://schemas.openxmlformats.org/drawingml/2006/main" xmlns:r="http://schemas.openxmlformats.org/officeDocument/2006/relationships" xmlns:p="http://schemas.openxmlformats.org/presentationml/2006/main" showMasterSp="1" showMasterPhAnim="1">
+<p:sld xmlns:a="http://schemas.openxmlformats.org/drawingml/2006/main" xmlns:r="http://schemas.openxmlformats.org/officeDocument/2006/relationships" xmlns:p="http://schemas.openxmlformats.org/presentationml/2006/main">
   <p:cSld>
     <p:spTree>
       <p:nvGrpSpPr>
@@ -7243,7 +7341,9 @@
       <p:sp>
         <p:nvSpPr>
           <p:cNvPr id="96" name="Shape 96"/>
-          <p:cNvSpPr/>
+          <p:cNvSpPr>
+            <a:spLocks noGrp="1"/>
+          </p:cNvSpPr>
           <p:nvPr>
             <p:ph type="title"/>
           </p:nvPr>
@@ -7274,7 +7374,9 @@
       <p:sp>
         <p:nvSpPr>
           <p:cNvPr id="97" name="Shape 97"/>
-          <p:cNvSpPr/>
+          <p:cNvSpPr>
+            <a:spLocks noGrp="1"/>
+          </p:cNvSpPr>
           <p:nvPr>
             <p:ph type="body" idx="1"/>
           </p:nvPr>
@@ -7292,7 +7394,7 @@
           <a:bodyPr lIns="0" tIns="0" rIns="0" bIns="0"/>
           <a:lstStyle/>
           <a:p>
-            <a:pPr lvl="0" marL="609600" indent="-609600">
+            <a:pPr marL="609600" lvl="0" indent="-609600">
               <a:defRPr sz="1800"/>
             </a:pPr>
             <a:r>
@@ -7301,7 +7403,7 @@
             </a:r>
           </a:p>
           <a:p>
-            <a:pPr lvl="1" marL="1066800" indent="-609600">
+            <a:pPr marL="1066800" lvl="1" indent="-609600">
               <a:buChar char="•"/>
               <a:defRPr sz="1800"/>
             </a:pPr>
@@ -7311,27 +7413,25 @@
             </a:r>
           </a:p>
           <a:p>
-            <a:pPr lvl="2" marL="1257300" indent="-342900">
+            <a:pPr marL="1257300" lvl="2" indent="-342900">
               <a:defRPr sz="1800"/>
             </a:pPr>
             <a:r>
               <a:rPr sz="2600"/>
               <a:t>fields within structure must be declared ahead</a:t>
             </a:r>
-            <a:endParaRPr sz="2600"/>
-          </a:p>
-          <a:p>
-            <a:pPr lvl="2" marL="1257300" indent="-342900">
+          </a:p>
+          <a:p>
+            <a:pPr marL="1257300" lvl="2" indent="-342900">
               <a:defRPr sz="1800"/>
             </a:pPr>
             <a:r>
               <a:rPr sz="2600"/>
               <a:t>No duplicate fields declaration</a:t>
             </a:r>
-            <a:endParaRPr sz="2600"/>
-          </a:p>
-          <a:p>
-            <a:pPr lvl="2" marL="1257300" indent="-342900">
+          </a:p>
+          <a:p>
+            <a:pPr marL="1257300" lvl="2" indent="-342900">
               <a:defRPr sz="1800"/>
             </a:pPr>
             <a:r>
@@ -7340,7 +7440,7 @@
             </a:r>
           </a:p>
           <a:p>
-            <a:pPr lvl="1" marL="1066800" indent="-609600">
+            <a:pPr marL="1066800" lvl="1" indent="-609600">
               <a:buChar char="•"/>
               <a:defRPr sz="1800"/>
             </a:pPr>
@@ -7350,17 +7450,16 @@
             </a:r>
           </a:p>
           <a:p>
-            <a:pPr lvl="2" marL="1257300" indent="-342900">
+            <a:pPr marL="1257300" lvl="2" indent="-342900">
               <a:defRPr sz="1800"/>
             </a:pPr>
             <a:r>
               <a:rPr sz="2800"/>
               <a:t>dimension matches for matrices operations</a:t>
             </a:r>
-            <a:endParaRPr sz="2800"/>
-          </a:p>
-          <a:p>
-            <a:pPr lvl="3" marL="1981200" indent="-609600">
+          </a:p>
+          <a:p>
+            <a:pPr marL="1981200" lvl="3" indent="-609600">
               <a:buChar char="•"/>
               <a:defRPr sz="1800"/>
             </a:pPr>
@@ -7372,10 +7471,9 @@
               <a:rPr sz="2400"/>
               <a:t>+. -. </a:t>
             </a:r>
-            <a:endParaRPr sz="2400"/>
-          </a:p>
-          <a:p>
-            <a:pPr lvl="3" marL="1387440" indent="-15840">
+          </a:p>
+          <a:p>
+            <a:pPr marL="1387440" lvl="3" indent="-15840">
               <a:buChar char="•"/>
               <a:defRPr sz="1800"/>
             </a:pPr>
@@ -7391,12 +7489,12 @@
   <p:clrMapOvr>
     <a:masterClrMapping/>
   </p:clrMapOvr>
-  <p:transition spd="med" advClick="1"/>
+  <p:transition xmlns:p14="http://schemas.microsoft.com/office/powerpoint/2010/main" spd="med"/>
 </p:sld>
 </file>
 
 <file path=ppt/slides/slide16.xml><?xml version="1.0" encoding="utf-8"?>
-<p:sld xmlns:a="http://schemas.openxmlformats.org/drawingml/2006/main" xmlns:r="http://schemas.openxmlformats.org/officeDocument/2006/relationships" xmlns:p="http://schemas.openxmlformats.org/presentationml/2006/main" showMasterSp="1" showMasterPhAnim="1">
+<p:sld xmlns:a="http://schemas.openxmlformats.org/drawingml/2006/main" xmlns:r="http://schemas.openxmlformats.org/officeDocument/2006/relationships" xmlns:p="http://schemas.openxmlformats.org/presentationml/2006/main">
   <p:cSld>
     <p:spTree>
       <p:nvGrpSpPr>
@@ -7415,7 +7513,9 @@
       <p:sp>
         <p:nvSpPr>
           <p:cNvPr id="99" name="Shape 99"/>
-          <p:cNvSpPr/>
+          <p:cNvSpPr>
+            <a:spLocks noGrp="1"/>
+          </p:cNvSpPr>
           <p:nvPr>
             <p:ph type="title"/>
           </p:nvPr>
@@ -7446,7 +7546,9 @@
       <p:sp>
         <p:nvSpPr>
           <p:cNvPr id="100" name="Shape 100"/>
-          <p:cNvSpPr/>
+          <p:cNvSpPr>
+            <a:spLocks noGrp="1"/>
+          </p:cNvSpPr>
           <p:nvPr>
             <p:ph type="body" idx="1"/>
           </p:nvPr>
@@ -7468,55 +7570,67 @@
               <a:defRPr sz="1800"/>
             </a:pPr>
             <a:r>
-              <a:rPr sz="3200"/>
+              <a:rPr sz="3200" dirty="0"/>
               <a:t>Challenge:</a:t>
             </a:r>
-            <a:endParaRPr sz="3200"/>
-          </a:p>
-          <a:p>
-            <a:pPr lvl="0" marL="0" indent="0">
+          </a:p>
+          <a:p>
+            <a:pPr marL="0" lvl="0" indent="0">
               <a:buSzTx/>
               <a:buNone/>
               <a:defRPr sz="1800"/>
             </a:pPr>
             <a:r>
-              <a:rPr sz="3200"/>
+              <a:rPr sz="3200" dirty="0"/>
               <a:t>1. No operator overload in java</a:t>
             </a:r>
-            <a:endParaRPr sz="3200"/>
-          </a:p>
-          <a:p>
-            <a:pPr lvl="0" marL="0" indent="0">
+          </a:p>
+          <a:p>
+            <a:pPr marL="0" lvl="0" indent="0">
               <a:buSzTx/>
               <a:buNone/>
               <a:defRPr sz="1800"/>
             </a:pPr>
             <a:r>
-              <a:rPr sz="3200"/>
+              <a:rPr sz="3200" dirty="0"/>
               <a:t>2. Exceptions (division by zero)</a:t>
             </a:r>
-            <a:endParaRPr sz="3200"/>
-          </a:p>
-          <a:p>
-            <a:pPr lvl="0" marL="0" indent="0">
+          </a:p>
+          <a:p>
+            <a:pPr marL="0" lvl="0" indent="0">
               <a:buSzTx/>
               <a:buNone/>
               <a:defRPr sz="1800"/>
             </a:pPr>
             <a:r>
-              <a:rPr sz="3200"/>
-              <a:t>3. Access member function of Struct</a:t>
-            </a:r>
-            <a:endParaRPr sz="3200"/>
-          </a:p>
-          <a:p>
-            <a:pPr lvl="0" marL="0" indent="0">
+              <a:rPr sz="3200" dirty="0"/>
+              <a:t>3. Access </a:t>
+            </a:r>
+            <a:r>
+              <a:rPr sz="3200" dirty="0" smtClean="0"/>
+              <a:t>member</a:t>
+            </a:r>
+            <a:r>
+              <a:rPr lang="en-US" sz="3200" dirty="0" smtClean="0"/>
+              <a:t> element</a:t>
+            </a:r>
+            <a:r>
+              <a:rPr sz="3200" dirty="0" smtClean="0"/>
+              <a:t> </a:t>
+            </a:r>
+            <a:r>
+              <a:rPr sz="3200" dirty="0"/>
+              <a:t>of Struct</a:t>
+            </a:r>
+          </a:p>
+          <a:p>
+            <a:pPr marL="0" lvl="0" indent="0">
               <a:buSzTx/>
               <a:buNone/>
               <a:defRPr sz="1800"/>
             </a:pPr>
             <a:r>
-              <a:rPr sz="3200"/>
+              <a:rPr sz="3200" dirty="0"/>
               <a:t>4. Java initialization requirements (in global not in arguments)</a:t>
             </a:r>
           </a:p>
@@ -7527,12 +7641,12 @@
   <p:clrMapOvr>
     <a:masterClrMapping/>
   </p:clrMapOvr>
-  <p:transition spd="med" advClick="1"/>
+  <p:transition xmlns:p14="http://schemas.microsoft.com/office/powerpoint/2010/main" spd="med"/>
 </p:sld>
 </file>
 
 <file path=ppt/slides/slide17.xml><?xml version="1.0" encoding="utf-8"?>
-<p:sld xmlns:a="http://schemas.openxmlformats.org/drawingml/2006/main" xmlns:r="http://schemas.openxmlformats.org/officeDocument/2006/relationships" xmlns:p="http://schemas.openxmlformats.org/presentationml/2006/main" showMasterSp="1" showMasterPhAnim="1">
+<p:sld xmlns:a="http://schemas.openxmlformats.org/drawingml/2006/main" xmlns:r="http://schemas.openxmlformats.org/officeDocument/2006/relationships" xmlns:p="http://schemas.openxmlformats.org/presentationml/2006/main">
   <p:cSld>
     <p:spTree>
       <p:nvGrpSpPr>
@@ -7551,7 +7665,9 @@
       <p:sp>
         <p:nvSpPr>
           <p:cNvPr id="102" name="Shape 102"/>
-          <p:cNvSpPr/>
+          <p:cNvSpPr>
+            <a:spLocks noGrp="1"/>
+          </p:cNvSpPr>
           <p:nvPr>
             <p:ph type="title"/>
           </p:nvPr>
@@ -7582,7 +7698,9 @@
       <p:sp>
         <p:nvSpPr>
           <p:cNvPr id="103" name="Shape 103"/>
-          <p:cNvSpPr/>
+          <p:cNvSpPr>
+            <a:spLocks noGrp="1"/>
+          </p:cNvSpPr>
           <p:nvPr>
             <p:ph type="body" idx="1"/>
           </p:nvPr>
@@ -7607,10 +7725,9 @@
               <a:rPr sz="3200"/>
               <a:t>Solutions:</a:t>
             </a:r>
-            <a:endParaRPr sz="3200"/>
-          </a:p>
-          <a:p>
-            <a:pPr lvl="0" marL="0" indent="0">
+          </a:p>
+          <a:p>
+            <a:pPr marL="0" lvl="0" indent="0">
               <a:buSzTx/>
               <a:buNone/>
               <a:defRPr sz="1800"/>
@@ -7632,10 +7749,9 @@
               <a:rPr sz="3200"/>
               <a:t>method</a:t>
             </a:r>
-            <a:endParaRPr sz="3200"/>
-          </a:p>
-          <a:p>
-            <a:pPr lvl="0" marL="0" indent="0">
+          </a:p>
+          <a:p>
+            <a:pPr marL="0" lvl="0" indent="0">
               <a:buSzTx/>
               <a:buNone/>
               <a:defRPr sz="1800"/>
@@ -7670,10 +7786,9 @@
               <a:rPr sz="3200"/>
               <a:t>match pattern return type</a:t>
             </a:r>
-            <a:endParaRPr sz="3200"/>
-          </a:p>
-          <a:p>
-            <a:pPr lvl="0" marL="0" indent="0">
+          </a:p>
+          <a:p>
+            <a:pPr marL="0" lvl="0" indent="0">
               <a:buSzTx/>
               <a:buNone/>
               <a:defRPr sz="1800"/>
@@ -7695,10 +7810,9 @@
               <a:rPr sz="3200"/>
               <a:t>HashMap</a:t>
             </a:r>
-            <a:endParaRPr sz="3200"/>
-          </a:p>
-          <a:p>
-            <a:pPr lvl="0" marL="0" indent="0">
+          </a:p>
+          <a:p>
+            <a:pPr marL="0" lvl="0" indent="0">
               <a:buSzTx/>
               <a:buNone/>
               <a:defRPr sz="1800"/>
@@ -7715,12 +7829,12 @@
   <p:clrMapOvr>
     <a:masterClrMapping/>
   </p:clrMapOvr>
-  <p:transition spd="med" advClick="1"/>
+  <p:transition xmlns:p14="http://schemas.microsoft.com/office/powerpoint/2010/main" spd="med"/>
 </p:sld>
 </file>
 
 <file path=ppt/slides/slide18.xml><?xml version="1.0" encoding="utf-8"?>
-<p:sld xmlns:a="http://schemas.openxmlformats.org/drawingml/2006/main" xmlns:r="http://schemas.openxmlformats.org/officeDocument/2006/relationships" xmlns:p="http://schemas.openxmlformats.org/presentationml/2006/main" showMasterSp="1" showMasterPhAnim="1">
+<p:sld xmlns:a="http://schemas.openxmlformats.org/drawingml/2006/main" xmlns:r="http://schemas.openxmlformats.org/officeDocument/2006/relationships" xmlns:p="http://schemas.openxmlformats.org/presentationml/2006/main">
   <p:cSld>
     <p:spTree>
       <p:nvGrpSpPr>
@@ -7739,7 +7853,9 @@
       <p:sp>
         <p:nvSpPr>
           <p:cNvPr id="105" name="Shape 105"/>
-          <p:cNvSpPr/>
+          <p:cNvSpPr>
+            <a:spLocks noGrp="1"/>
+          </p:cNvSpPr>
           <p:nvPr>
             <p:ph type="title"/>
           </p:nvPr>
@@ -7770,7 +7886,9 @@
       <p:sp>
         <p:nvSpPr>
           <p:cNvPr id="106" name="Shape 106"/>
-          <p:cNvSpPr/>
+          <p:cNvSpPr>
+            <a:spLocks noGrp="1"/>
+          </p:cNvSpPr>
           <p:nvPr>
             <p:ph type="body" idx="1"/>
           </p:nvPr>
@@ -7795,7 +7913,6 @@
               <a:rPr sz="3200"/>
               <a:t>Unit test for each developing phase: AST, Parser and scanner/ SAST/ JavaGen</a:t>
             </a:r>
-            <a:endParaRPr sz="3200"/>
           </a:p>
           <a:p>
             <a:pPr lvl="0">
@@ -7805,7 +7922,6 @@
               <a:rPr sz="3200"/>
               <a:t>Integration test for the linked modules.</a:t>
             </a:r>
-            <a:endParaRPr sz="3200"/>
           </a:p>
           <a:p>
             <a:pPr lvl="0">
@@ -7815,7 +7931,6 @@
               <a:rPr sz="3200"/>
               <a:t>Shell script is used to automatically run the test cases and compare output.</a:t>
             </a:r>
-            <a:endParaRPr sz="3200"/>
           </a:p>
           <a:p>
             <a:pPr lvl="0">
@@ -7833,12 +7948,12 @@
   <p:clrMapOvr>
     <a:masterClrMapping/>
   </p:clrMapOvr>
-  <p:transition spd="med" advClick="1"/>
+  <p:transition xmlns:p14="http://schemas.microsoft.com/office/powerpoint/2010/main" spd="med"/>
 </p:sld>
 </file>
 
 <file path=ppt/slides/slide19.xml><?xml version="1.0" encoding="utf-8"?>
-<p:sld xmlns:a="http://schemas.openxmlformats.org/drawingml/2006/main" xmlns:r="http://schemas.openxmlformats.org/officeDocument/2006/relationships" xmlns:p="http://schemas.openxmlformats.org/presentationml/2006/main" showMasterSp="1" showMasterPhAnim="1">
+<p:sld xmlns:a="http://schemas.openxmlformats.org/drawingml/2006/main" xmlns:r="http://schemas.openxmlformats.org/officeDocument/2006/relationships" xmlns:p="http://schemas.openxmlformats.org/presentationml/2006/main">
   <p:cSld>
     <p:spTree>
       <p:nvGrpSpPr>
@@ -7857,7 +7972,9 @@
       <p:sp>
         <p:nvSpPr>
           <p:cNvPr id="108" name="Shape 108"/>
-          <p:cNvSpPr/>
+          <p:cNvSpPr>
+            <a:spLocks noGrp="1"/>
+          </p:cNvSpPr>
           <p:nvPr>
             <p:ph type="title"/>
           </p:nvPr>
@@ -7876,6 +7993,11 @@
           <a:lstStyle/>
           <a:p>
             <a:pPr lvl="0"/>
+            <a:r>
+              <a:rPr lang="en-US" dirty="0" smtClean="0"/>
+              <a:t>Thanks</a:t>
+            </a:r>
+            <a:endParaRPr dirty="0"/>
           </a:p>
         </p:txBody>
       </p:sp>
@@ -7911,12 +8033,12 @@
   <p:clrMapOvr>
     <a:masterClrMapping/>
   </p:clrMapOvr>
-  <p:transition spd="med" advClick="1"/>
+  <p:transition xmlns:p14="http://schemas.microsoft.com/office/powerpoint/2010/main" spd="med"/>
 </p:sld>
 </file>
 
 <file path=ppt/slides/slide2.xml><?xml version="1.0" encoding="utf-8"?>
-<p:sld xmlns:a="http://schemas.openxmlformats.org/drawingml/2006/main" xmlns:r="http://schemas.openxmlformats.org/officeDocument/2006/relationships" xmlns:p="http://schemas.openxmlformats.org/presentationml/2006/main" showMasterSp="1" showMasterPhAnim="1">
+<p:sld xmlns:a="http://schemas.openxmlformats.org/drawingml/2006/main" xmlns:r="http://schemas.openxmlformats.org/officeDocument/2006/relationships" xmlns:p="http://schemas.openxmlformats.org/presentationml/2006/main">
   <p:cSld>
     <p:spTree>
       <p:nvGrpSpPr>
@@ -7935,7 +8057,9 @@
       <p:sp>
         <p:nvSpPr>
           <p:cNvPr id="52" name="Shape 52"/>
-          <p:cNvSpPr/>
+          <p:cNvSpPr>
+            <a:spLocks noGrp="1"/>
+          </p:cNvSpPr>
           <p:nvPr>
             <p:ph type="title"/>
           </p:nvPr>
@@ -7966,7 +8090,9 @@
       <p:sp>
         <p:nvSpPr>
           <p:cNvPr id="53" name="Shape 53"/>
-          <p:cNvSpPr/>
+          <p:cNvSpPr>
+            <a:spLocks noGrp="1"/>
+          </p:cNvSpPr>
           <p:nvPr>
             <p:ph type="body" idx="1"/>
           </p:nvPr>
@@ -7991,7 +8117,6 @@
               <a:rPr sz="3200"/>
               <a:t>Yeah, sit there doing nothing!</a:t>
             </a:r>
-            <a:endParaRPr sz="3200"/>
           </a:p>
           <a:p>
             <a:pPr lvl="0">
@@ -8001,7 +8126,6 @@
               <a:rPr sz="3200"/>
               <a:t>But, not really…..</a:t>
             </a:r>
-            <a:endParaRPr sz="3200"/>
           </a:p>
           <a:p>
             <a:pPr lvl="0">
@@ -8019,12 +8143,12 @@
   <p:clrMapOvr>
     <a:masterClrMapping/>
   </p:clrMapOvr>
-  <p:transition spd="med" advClick="1"/>
+  <p:transition xmlns:p14="http://schemas.microsoft.com/office/powerpoint/2010/main" spd="med"/>
 </p:sld>
 </file>
 
 <file path=ppt/slides/slide3.xml><?xml version="1.0" encoding="utf-8"?>
-<p:sld xmlns:a="http://schemas.openxmlformats.org/drawingml/2006/main" xmlns:r="http://schemas.openxmlformats.org/officeDocument/2006/relationships" xmlns:p="http://schemas.openxmlformats.org/presentationml/2006/main" showMasterSp="1" showMasterPhAnim="1">
+<p:sld xmlns:a="http://schemas.openxmlformats.org/drawingml/2006/main" xmlns:r="http://schemas.openxmlformats.org/officeDocument/2006/relationships" xmlns:p="http://schemas.openxmlformats.org/presentationml/2006/main">
   <p:cSld>
     <p:spTree>
       <p:nvGrpSpPr>
@@ -8043,7 +8167,9 @@
       <p:sp>
         <p:nvSpPr>
           <p:cNvPr id="55" name="Shape 55"/>
-          <p:cNvSpPr/>
+          <p:cNvSpPr>
+            <a:spLocks noGrp="1"/>
+          </p:cNvSpPr>
           <p:nvPr>
             <p:ph type="title"/>
           </p:nvPr>
@@ -8074,7 +8200,9 @@
       <p:sp>
         <p:nvSpPr>
           <p:cNvPr id="56" name="Shape 56"/>
-          <p:cNvSpPr/>
+          <p:cNvSpPr>
+            <a:spLocks noGrp="1"/>
+          </p:cNvSpPr>
           <p:nvPr>
             <p:ph type="body" idx="1"/>
           </p:nvPr>
@@ -8092,7 +8220,7 @@
           <a:bodyPr/>
           <a:lstStyle/>
           <a:p>
-            <a:pPr lvl="0" marL="214312" indent="-214312">
+            <a:pPr marL="214312" lvl="0" indent="-214312">
               <a:spcBef>
                 <a:spcPts val="400"/>
               </a:spcBef>
@@ -8102,10 +8230,9 @@
               <a:rPr sz="2000" u="sng"/>
               <a:t>Int i;</a:t>
             </a:r>
-            <a:endParaRPr sz="2000" u="sng"/>
-          </a:p>
-          <a:p>
-            <a:pPr lvl="0" marL="214312" indent="-214312">
+          </a:p>
+          <a:p>
+            <a:pPr marL="214312" lvl="0" indent="-214312">
               <a:spcBef>
                 <a:spcPts val="400"/>
               </a:spcBef>
@@ -8115,10 +8242,9 @@
               <a:rPr sz="2000"/>
               <a:t>Boolean b;</a:t>
             </a:r>
-            <a:endParaRPr sz="2000"/>
-          </a:p>
-          <a:p>
-            <a:pPr lvl="0" marL="214312" indent="-214312">
+          </a:p>
+          <a:p>
+            <a:pPr marL="214312" lvl="0" indent="-214312">
               <a:spcBef>
                 <a:spcPts val="400"/>
               </a:spcBef>
@@ -8132,10 +8258,9 @@
               <a:rPr sz="2000" u="sng"/>
               <a:t>Int argc, String argv) {</a:t>
             </a:r>
-            <a:endParaRPr sz="2000" u="sng"/>
-          </a:p>
-          <a:p>
-            <a:pPr lvl="0" marL="214312" indent="-214312">
+          </a:p>
+          <a:p>
+            <a:pPr marL="214312" lvl="0" indent="-214312">
               <a:spcBef>
                 <a:spcPts val="400"/>
               </a:spcBef>
@@ -8145,10 +8270,9 @@
               <a:rPr sz="2000"/>
               <a:t>	Matrix m3(2,2);</a:t>
             </a:r>
-            <a:endParaRPr sz="2000"/>
-          </a:p>
-          <a:p>
-            <a:pPr lvl="0" marL="214312" indent="-214312">
+          </a:p>
+          <a:p>
+            <a:pPr marL="214312" lvl="0" indent="-214312">
               <a:spcBef>
                 <a:spcPts val="400"/>
               </a:spcBef>
@@ -8158,10 +8282,9 @@
               <a:rPr sz="2000"/>
               <a:t>    Matrix m(2,2);</a:t>
             </a:r>
-            <a:endParaRPr sz="2000"/>
-          </a:p>
-          <a:p>
-            <a:pPr lvl="0" marL="214312" indent="-214312">
+          </a:p>
+          <a:p>
+            <a:pPr marL="214312" lvl="0" indent="-214312">
               <a:spcBef>
                 <a:spcPts val="400"/>
               </a:spcBef>
@@ -8171,10 +8294,9 @@
               <a:rPr sz="2000"/>
               <a:t>	m[0][0]=1; </a:t>
             </a:r>
-            <a:endParaRPr sz="2000"/>
-          </a:p>
-          <a:p>
-            <a:pPr lvl="0" marL="214312" indent="-214312">
+          </a:p>
+          <a:p>
+            <a:pPr marL="214312" lvl="0" indent="-214312">
               <a:spcBef>
                 <a:spcPts val="400"/>
               </a:spcBef>
@@ -8184,10 +8306,9 @@
               <a:rPr sz="2000"/>
               <a:t>	m[0][1]=2; </a:t>
             </a:r>
-            <a:endParaRPr sz="2000"/>
-          </a:p>
-          <a:p>
-            <a:pPr lvl="0" marL="214312" indent="-214312">
+          </a:p>
+          <a:p>
+            <a:pPr marL="214312" lvl="0" indent="-214312">
               <a:spcBef>
                 <a:spcPts val="400"/>
               </a:spcBef>
@@ -8197,10 +8318,9 @@
               <a:rPr sz="2000"/>
               <a:t>	m[1][0]=3;</a:t>
             </a:r>
-            <a:endParaRPr sz="2000"/>
-          </a:p>
-          <a:p>
-            <a:pPr lvl="0" marL="214312" indent="-214312">
+          </a:p>
+          <a:p>
+            <a:pPr marL="214312" lvl="0" indent="-214312">
               <a:spcBef>
                 <a:spcPts val="400"/>
               </a:spcBef>
@@ -8210,10 +8330,9 @@
               <a:rPr sz="2000"/>
               <a:t>	m[1][1]=4;</a:t>
             </a:r>
-            <a:endParaRPr sz="2000"/>
-          </a:p>
-          <a:p>
-            <a:pPr lvl="0" marL="214312" indent="-214312">
+          </a:p>
+          <a:p>
+            <a:pPr marL="214312" lvl="0" indent="-214312">
               <a:spcBef>
                 <a:spcPts val="400"/>
               </a:spcBef>
@@ -8223,7 +8342,7 @@
               <a:defRPr sz="1800"/>
             </a:pPr>
             <a:r>
-              <a:rPr b="1" sz="2000">
+              <a:rPr sz="2000" b="1">
                 <a:solidFill>
                   <a:srgbClr val="FF0000"/>
                 </a:solidFill>
@@ -8234,10 +8353,9 @@
               <a:rPr sz="2000"/>
               <a:t>    return m3;</a:t>
             </a:r>
-            <a:endParaRPr sz="2000"/>
-          </a:p>
-          <a:p>
-            <a:pPr lvl="0" marL="214312" indent="-214312">
+          </a:p>
+          <a:p>
+            <a:pPr marL="214312" lvl="0" indent="-214312">
               <a:spcBef>
                 <a:spcPts val="400"/>
               </a:spcBef>
@@ -8279,7 +8397,7 @@
           </a:bodyPr>
           <a:lstStyle/>
           <a:p>
-            <a:pPr lvl="0" marL="214312" indent="-214312">
+            <a:pPr marL="214312" lvl="0" indent="-214312">
               <a:spcBef>
                 <a:spcPts val="400"/>
               </a:spcBef>
@@ -8309,7 +8427,7 @@
             <a:endParaRPr sz="3200"/>
           </a:p>
           <a:p>
-            <a:pPr lvl="0" marL="214312" indent="-214312">
+            <a:pPr marL="214312" lvl="0" indent="-214312">
               <a:spcBef>
                 <a:spcPts val="400"/>
               </a:spcBef>
@@ -8324,7 +8442,7 @@
             <a:endParaRPr sz="3200"/>
           </a:p>
           <a:p>
-            <a:pPr lvl="0" marL="214312" indent="-214312">
+            <a:pPr marL="214312" lvl="0" indent="-214312">
               <a:spcBef>
                 <a:spcPts val="400"/>
               </a:spcBef>
@@ -8339,7 +8457,7 @@
             <a:endParaRPr sz="3200"/>
           </a:p>
           <a:p>
-            <a:pPr lvl="0" marL="214312" indent="-214312">
+            <a:pPr marL="214312" lvl="0" indent="-214312">
               <a:spcBef>
                 <a:spcPts val="400"/>
               </a:spcBef>
@@ -8358,7 +8476,7 @@
             <a:endParaRPr sz="3200"/>
           </a:p>
           <a:p>
-            <a:pPr lvl="0" marL="214312" indent="-214312">
+            <a:pPr marL="214312" lvl="0" indent="-214312">
               <a:spcBef>
                 <a:spcPts val="400"/>
               </a:spcBef>
@@ -8373,7 +8491,7 @@
             <a:endParaRPr sz="3200"/>
           </a:p>
           <a:p>
-            <a:pPr lvl="0" marL="214312" indent="-214312">
+            <a:pPr marL="214312" lvl="0" indent="-214312">
               <a:spcBef>
                 <a:spcPts val="400"/>
               </a:spcBef>
@@ -8417,7 +8535,7 @@
           </a:bodyPr>
           <a:lstStyle/>
           <a:p>
-            <a:pPr lvl="0" marL="257175" indent="-257175">
+            <a:pPr marL="257175" lvl="0" indent="-257175">
               <a:spcBef>
                 <a:spcPts val="500"/>
               </a:spcBef>
@@ -8429,7 +8547,7 @@
               <a:buChar char="•"/>
             </a:pPr>
             <a:r>
-              <a:rPr b="1" sz="2400">
+              <a:rPr sz="2400" b="1">
                 <a:solidFill>
                   <a:srgbClr val="FF0000"/>
                 </a:solidFill>
@@ -8439,7 +8557,7 @@
             <a:endParaRPr sz="3200"/>
           </a:p>
           <a:p>
-            <a:pPr lvl="0" marL="257175" indent="-257175">
+            <a:pPr marL="257175" lvl="0" indent="-257175">
               <a:spcBef>
                 <a:spcPts val="500"/>
               </a:spcBef>
@@ -8451,7 +8569,7 @@
               <a:buChar char="•"/>
             </a:pPr>
             <a:r>
-              <a:rPr b="1" sz="2400">
+              <a:rPr sz="2400" b="1">
                 <a:solidFill>
                   <a:srgbClr val="FF0000"/>
                 </a:solidFill>
@@ -8466,12 +8584,12 @@
   <p:clrMapOvr>
     <a:masterClrMapping/>
   </p:clrMapOvr>
-  <p:transition spd="med" advClick="1"/>
+  <p:transition xmlns:p14="http://schemas.microsoft.com/office/powerpoint/2010/main" spd="med"/>
 </p:sld>
 </file>
 
 <file path=ppt/slides/slide4.xml><?xml version="1.0" encoding="utf-8"?>
-<p:sld xmlns:a="http://schemas.openxmlformats.org/drawingml/2006/main" xmlns:r="http://schemas.openxmlformats.org/officeDocument/2006/relationships" xmlns:p="http://schemas.openxmlformats.org/presentationml/2006/main" showMasterSp="1" showMasterPhAnim="1">
+<p:sld xmlns:a="http://schemas.openxmlformats.org/drawingml/2006/main" xmlns:r="http://schemas.openxmlformats.org/officeDocument/2006/relationships" xmlns:p="http://schemas.openxmlformats.org/presentationml/2006/main">
   <p:cSld>
     <p:spTree>
       <p:nvGrpSpPr>
@@ -8490,7 +8608,9 @@
       <p:sp>
         <p:nvSpPr>
           <p:cNvPr id="60" name="Shape 60"/>
-          <p:cNvSpPr/>
+          <p:cNvSpPr>
+            <a:spLocks noGrp="1"/>
+          </p:cNvSpPr>
           <p:nvPr>
             <p:ph type="title"/>
           </p:nvPr>
@@ -8513,10 +8633,10 @@
           </a:lstStyle>
           <a:p>
             <a:pPr lvl="0">
-              <a:defRPr b="0" sz="1800"/>
-            </a:pPr>
-            <a:r>
-              <a:rPr b="1" sz="4400"/>
+              <a:defRPr sz="1800" b="0"/>
+            </a:pPr>
+            <a:r>
+              <a:rPr sz="4400" b="1"/>
               <a:t>A series of operators</a:t>
             </a:r>
           </a:p>
@@ -8525,7 +8645,9 @@
       <p:sp>
         <p:nvSpPr>
           <p:cNvPr id="61" name="Shape 61"/>
-          <p:cNvSpPr/>
+          <p:cNvSpPr>
+            <a:spLocks noGrp="1"/>
+          </p:cNvSpPr>
           <p:nvPr>
             <p:ph type="body" idx="1"/>
           </p:nvPr>
@@ -8550,7 +8672,6 @@
               <a:rPr sz="3200"/>
               <a:t>“+”, “-”: positive/ negative sign</a:t>
             </a:r>
-            <a:endParaRPr sz="3200"/>
           </a:p>
           <a:p>
             <a:pPr lvl="0">
@@ -8580,12 +8701,12 @@
   <p:clrMapOvr>
     <a:masterClrMapping/>
   </p:clrMapOvr>
-  <p:transition spd="med" advClick="1"/>
+  <p:transition xmlns:p14="http://schemas.microsoft.com/office/powerpoint/2010/main" spd="med"/>
 </p:sld>
 </file>
 
 <file path=ppt/slides/slide5.xml><?xml version="1.0" encoding="utf-8"?>
-<p:sld xmlns:a="http://schemas.openxmlformats.org/drawingml/2006/main" xmlns:r="http://schemas.openxmlformats.org/officeDocument/2006/relationships" xmlns:p="http://schemas.openxmlformats.org/presentationml/2006/main" showMasterSp="1" showMasterPhAnim="1">
+<p:sld xmlns:a="http://schemas.openxmlformats.org/drawingml/2006/main" xmlns:r="http://schemas.openxmlformats.org/officeDocument/2006/relationships" xmlns:p="http://schemas.openxmlformats.org/presentationml/2006/main">
   <p:cSld>
     <p:spTree>
       <p:nvGrpSpPr>
@@ -8604,7 +8725,9 @@
       <p:sp>
         <p:nvSpPr>
           <p:cNvPr id="63" name="Shape 63"/>
-          <p:cNvSpPr/>
+          <p:cNvSpPr>
+            <a:spLocks noGrp="1"/>
+          </p:cNvSpPr>
           <p:nvPr>
             <p:ph type="title"/>
           </p:nvPr>
@@ -8635,7 +8758,9 @@
       <p:sp>
         <p:nvSpPr>
           <p:cNvPr id="64" name="Shape 64"/>
-          <p:cNvSpPr/>
+          <p:cNvSpPr>
+            <a:spLocks noGrp="1"/>
+          </p:cNvSpPr>
           <p:nvPr>
             <p:ph type="body" idx="1"/>
           </p:nvPr>
@@ -8682,7 +8807,6 @@
               <a:rPr sz="2700"/>
               <a:t>Boolean b;</a:t>
             </a:r>
-            <a:endParaRPr sz="2700"/>
           </a:p>
           <a:p>
             <a:pPr lvl="0">
@@ -8750,7 +8874,6 @@
               <a:rPr sz="2700"/>
               <a:t>	i=toInt(s -&gt; a);</a:t>
             </a:r>
-            <a:endParaRPr sz="2700"/>
           </a:p>
           <a:p>
             <a:pPr lvl="0">
@@ -8766,7 +8889,6 @@
               <a:rPr sz="2700"/>
               <a:t>	return s;</a:t>
             </a:r>
-            <a:endParaRPr sz="2700"/>
           </a:p>
           <a:p>
             <a:pPr lvl="0">
@@ -8810,155 +8932,58 @@
         </p:spPr>
         <p:txBody>
           <a:bodyPr lIns="0" tIns="0" rIns="0" bIns="0">
-            <a:normAutofit fontScale="100000" lnSpcReduction="0"/>
+            <a:normAutofit/>
           </a:bodyPr>
           <a:lstStyle/>
           <a:p>
-            <a:pPr lvl="0" marL="339470" indent="-339470" defTabSz="452627">
-              <a:lnSpc>
-                <a:spcPct val="80000"/>
-              </a:lnSpc>
-              <a:spcBef>
-                <a:spcPts val="600"/>
-              </a:spcBef>
-              <a:buSzPct val="100000"/>
-              <a:buFont typeface="Arial"/>
-              <a:buChar char="•"/>
-            </a:pPr>
-            <a:r>
-              <a:rPr sz="2673" u="sng"/>
-              <a:t>Int i;</a:t>
-            </a:r>
-            <a:endParaRPr sz="2673"/>
-          </a:p>
-          <a:p>
-            <a:pPr lvl="0" marL="339470" indent="-339470" defTabSz="452627">
-              <a:lnSpc>
-                <a:spcPct val="80000"/>
-              </a:lnSpc>
-              <a:spcBef>
-                <a:spcPts val="600"/>
-              </a:spcBef>
-              <a:buSzPct val="100000"/>
-              <a:buFont typeface="Arial"/>
-              <a:buChar char="•"/>
-            </a:pPr>
-            <a:r>
-              <a:rPr sz="2673"/>
-              <a:t>Boolean b;</a:t>
-            </a:r>
-            <a:endParaRPr sz="2673"/>
-          </a:p>
-          <a:p>
-            <a:pPr lvl="0" marL="339470" indent="-339470" defTabSz="452627">
-              <a:lnSpc>
-                <a:spcPct val="80000"/>
-              </a:lnSpc>
-              <a:spcBef>
-                <a:spcPts val="600"/>
-              </a:spcBef>
-              <a:buSzPct val="100000"/>
-              <a:buFont typeface="Arial"/>
-              <a:buChar char="•"/>
-            </a:pPr>
-            <a:endParaRPr sz="2673"/>
-          </a:p>
-          <a:p>
-            <a:pPr lvl="0" marL="339470" indent="-339470" defTabSz="452627">
-              <a:lnSpc>
-                <a:spcPct val="80000"/>
-              </a:lnSpc>
-              <a:spcBef>
-                <a:spcPts val="600"/>
-              </a:spcBef>
-              <a:buSzPct val="100000"/>
-              <a:buFont typeface="Arial"/>
-              <a:buChar char="•"/>
-            </a:pPr>
-            <a:r>
-              <a:rPr sz="2673"/>
-              <a:t>Structure main2(</a:t>
-            </a:r>
-            <a:r>
-              <a:rPr sz="2673" u="sng"/>
-              <a:t>Int argc, String argv) {</a:t>
-            </a:r>
-            <a:endParaRPr sz="2673"/>
-          </a:p>
-          <a:p>
-            <a:pPr lvl="0" marL="339470" indent="-339470" defTabSz="452627">
-              <a:lnSpc>
-                <a:spcPct val="80000"/>
-              </a:lnSpc>
-              <a:spcBef>
-                <a:spcPts val="600"/>
-              </a:spcBef>
-              <a:buSzPct val="100000"/>
-              <a:buFont typeface="Arial"/>
-              <a:buChar char="•"/>
-            </a:pPr>
-            <a:r>
-              <a:rPr sz="2673"/>
-              <a:t>	Structure s={a="1", b= toString(</a:t>
-            </a:r>
-            <a:r>
-              <a:rPr sz="2673" u="sng"/>
-              <a:t>argc)};</a:t>
-            </a:r>
-            <a:endParaRPr sz="2673"/>
-          </a:p>
-          <a:p>
-            <a:pPr lvl="0" marL="339470" indent="-339470" defTabSz="452627">
-              <a:lnSpc>
-                <a:spcPct val="80000"/>
-              </a:lnSpc>
-              <a:spcBef>
-                <a:spcPts val="600"/>
-              </a:spcBef>
-              <a:buSzPct val="100000"/>
-              <a:buFont typeface="Arial"/>
-              <a:buChar char="•"/>
-            </a:pPr>
-            <a:r>
-              <a:rPr sz="2673"/>
-              <a:t>	i=toInt(s -&gt; a);</a:t>
-            </a:r>
-            <a:endParaRPr sz="2673"/>
-          </a:p>
-          <a:p>
-            <a:pPr lvl="0" marL="339470" indent="-339470" defTabSz="452627">
-              <a:lnSpc>
-                <a:spcPct val="80000"/>
-              </a:lnSpc>
-              <a:spcBef>
-                <a:spcPts val="600"/>
-              </a:spcBef>
-              <a:buSzPct val="100000"/>
-              <a:buFont typeface="Arial"/>
-              <a:buChar char="•"/>
-            </a:pPr>
-            <a:r>
-              <a:rPr sz="2673"/>
-              <a:t>	return s;</a:t>
-            </a:r>
-            <a:endParaRPr sz="2673"/>
-          </a:p>
-          <a:p>
-            <a:pPr lvl="0" marL="339470" indent="-339470" defTabSz="452627">
-              <a:lnSpc>
-                <a:spcPct val="80000"/>
-              </a:lnSpc>
-              <a:spcBef>
-                <a:spcPts val="600"/>
-              </a:spcBef>
-              <a:buSzPct val="100000"/>
-              <a:buFont typeface="Arial"/>
-              <a:buChar char="•"/>
-            </a:pPr>
-            <a:r>
-              <a:rPr sz="2673"/>
+            <a:endParaRPr lang="en-US" sz="2800" dirty="0"/>
+          </a:p>
+          <a:p>
+            <a:r>
+              <a:rPr lang="en-US" sz="2800" dirty="0"/>
+              <a:t>Void main(</a:t>
+            </a:r>
+            <a:r>
+              <a:rPr lang="en-US" sz="2800" u="sng" dirty="0" err="1"/>
+              <a:t>Int</a:t>
+            </a:r>
+            <a:r>
+              <a:rPr lang="en-US" sz="2800" u="sng" dirty="0"/>
+              <a:t> argc2, String m) {</a:t>
+            </a:r>
+          </a:p>
+          <a:p>
+            <a:r>
+              <a:rPr lang="en-US" sz="2800" dirty="0"/>
+              <a:t>	Structure result={};</a:t>
+            </a:r>
+          </a:p>
+          <a:p>
+            <a:r>
+              <a:rPr lang="en-US" sz="2800" dirty="0"/>
+              <a:t>	result=main2(0, "</a:t>
+            </a:r>
+            <a:r>
+              <a:rPr lang="en-US" sz="2800" u="sng" dirty="0" err="1"/>
+              <a:t>str</a:t>
+            </a:r>
+            <a:r>
+              <a:rPr lang="en-US" sz="2800" u="sng" dirty="0"/>
+              <a:t>");</a:t>
+            </a:r>
+          </a:p>
+          <a:p>
+            <a:r>
+              <a:rPr lang="en-US" sz="2800" dirty="0"/>
+              <a:t>	print(result);</a:t>
+            </a:r>
+          </a:p>
+          <a:p>
+            <a:r>
+              <a:rPr lang="en-US" sz="2800" dirty="0"/>
               <a:t>}</a:t>
             </a:r>
+            <a:endParaRPr sz="2673" dirty="0"/>
           </a:p>
         </p:txBody>
       </p:sp>
@@ -8967,12 +8992,12 @@
   <p:clrMapOvr>
     <a:masterClrMapping/>
   </p:clrMapOvr>
-  <p:transition spd="med" advClick="1"/>
+  <p:transition xmlns:p14="http://schemas.microsoft.com/office/powerpoint/2010/main" spd="med"/>
 </p:sld>
 </file>
 
 <file path=ppt/slides/slide6.xml><?xml version="1.0" encoding="utf-8"?>
-<p:sld xmlns:a="http://schemas.openxmlformats.org/drawingml/2006/main" xmlns:r="http://schemas.openxmlformats.org/officeDocument/2006/relationships" xmlns:p="http://schemas.openxmlformats.org/presentationml/2006/main" showMasterSp="1" showMasterPhAnim="1">
+<p:sld xmlns:a="http://schemas.openxmlformats.org/drawingml/2006/main" xmlns:r="http://schemas.openxmlformats.org/officeDocument/2006/relationships" xmlns:p="http://schemas.openxmlformats.org/presentationml/2006/main">
   <p:cSld>
     <p:spTree>
       <p:nvGrpSpPr>
@@ -8991,7 +9016,9 @@
       <p:sp>
         <p:nvSpPr>
           <p:cNvPr id="67" name="Shape 67"/>
-          <p:cNvSpPr/>
+          <p:cNvSpPr>
+            <a:spLocks noGrp="1"/>
+          </p:cNvSpPr>
           <p:nvPr>
             <p:ph type="title"/>
           </p:nvPr>
@@ -9022,7 +9049,9 @@
       <p:sp>
         <p:nvSpPr>
           <p:cNvPr id="68" name="Shape 68"/>
-          <p:cNvSpPr/>
+          <p:cNvSpPr>
+            <a:spLocks noGrp="1"/>
+          </p:cNvSpPr>
           <p:nvPr>
             <p:ph type="body" idx="1"/>
           </p:nvPr>
@@ -9047,7 +9076,7 @@
               <a:defRPr sz="1800"/>
             </a:pPr>
             <a:r>
-              <a:rPr b="1" sz="3200">
+              <a:rPr sz="3200" b="1">
                 <a:solidFill>
                   <a:srgbClr val="FF0000"/>
                 </a:solidFill>
@@ -9058,7 +9087,6 @@
               <a:rPr sz="3200"/>
               <a:t>:  Anything that can be expressed as a String. Can be a String or a variable of String type</a:t>
             </a:r>
-            <a:endParaRPr sz="3200"/>
           </a:p>
           <a:p>
             <a:pPr lvl="0">
@@ -9068,7 +9096,7 @@
               <a:defRPr sz="1800"/>
             </a:pPr>
             <a:r>
-              <a:rPr b="1" sz="3200">
+              <a:rPr sz="3200" b="1">
                 <a:solidFill>
                   <a:srgbClr val="FF0000"/>
                 </a:solidFill>
@@ -9079,7 +9107,6 @@
               <a:rPr sz="3200"/>
               <a:t>: Anything your care to use without OOP overhead that a financial user does not care to know</a:t>
             </a:r>
-            <a:endParaRPr sz="3200"/>
           </a:p>
           <a:p>
             <a:pPr lvl="0">
@@ -9089,7 +9116,7 @@
               <a:defRPr sz="1800"/>
             </a:pPr>
             <a:r>
-              <a:rPr b="1" sz="3200">
+              <a:rPr sz="3200" b="1">
                 <a:solidFill>
                   <a:srgbClr val="FF0000"/>
                 </a:solidFill>
@@ -9108,12 +9135,12 @@
   <p:clrMapOvr>
     <a:masterClrMapping/>
   </p:clrMapOvr>
-  <p:transition spd="med" advClick="1"/>
+  <p:transition xmlns:p14="http://schemas.microsoft.com/office/powerpoint/2010/main" spd="med"/>
 </p:sld>
 </file>
 
 <file path=ppt/slides/slide7.xml><?xml version="1.0" encoding="utf-8"?>
-<p:sld xmlns:a="http://schemas.openxmlformats.org/drawingml/2006/main" xmlns:r="http://schemas.openxmlformats.org/officeDocument/2006/relationships" xmlns:p="http://schemas.openxmlformats.org/presentationml/2006/main" showMasterSp="1" showMasterPhAnim="1">
+<p:sld xmlns:a="http://schemas.openxmlformats.org/drawingml/2006/main" xmlns:r="http://schemas.openxmlformats.org/officeDocument/2006/relationships" xmlns:p="http://schemas.openxmlformats.org/presentationml/2006/main">
   <p:cSld>
     <p:spTree>
       <p:nvGrpSpPr>
@@ -9132,7 +9159,9 @@
       <p:sp>
         <p:nvSpPr>
           <p:cNvPr id="70" name="Shape 70"/>
-          <p:cNvSpPr/>
+          <p:cNvSpPr>
+            <a:spLocks noGrp="1"/>
+          </p:cNvSpPr>
           <p:nvPr>
             <p:ph type="title"/>
           </p:nvPr>
@@ -9163,7 +9192,9 @@
       <p:sp>
         <p:nvSpPr>
           <p:cNvPr id="71" name="Shape 71"/>
-          <p:cNvSpPr/>
+          <p:cNvSpPr>
+            <a:spLocks noGrp="1"/>
+          </p:cNvSpPr>
           <p:nvPr>
             <p:ph type="body" idx="1"/>
           </p:nvPr>
@@ -9194,7 +9225,6 @@
               <a:rPr sz="2700"/>
               <a:t>Float i;</a:t>
             </a:r>
-            <a:endParaRPr sz="2700"/>
           </a:p>
           <a:p>
             <a:pPr lvl="0">
@@ -9250,7 +9280,6 @@
               <a:rPr sz="2700"/>
               <a:t>	i=toFloat(s -&gt; strike);</a:t>
             </a:r>
-            <a:endParaRPr sz="2700"/>
           </a:p>
           <a:p>
             <a:pPr lvl="0">
@@ -9266,7 +9295,6 @@
               <a:rPr sz="2700"/>
               <a:t>	return s;</a:t>
             </a:r>
-            <a:endParaRPr sz="2700"/>
           </a:p>
           <a:p>
             <a:pPr lvl="0">
@@ -9310,11 +9338,11 @@
         </p:spPr>
         <p:txBody>
           <a:bodyPr lIns="0" tIns="0" rIns="0" bIns="0">
-            <a:normAutofit fontScale="100000" lnSpcReduction="0"/>
+            <a:normAutofit/>
           </a:bodyPr>
           <a:lstStyle/>
           <a:p>
-            <a:pPr lvl="0" marL="342900" indent="-342900">
+            <a:pPr marL="342900" lvl="0" indent="-342900">
               <a:lnSpc>
                 <a:spcPct val="90000"/>
               </a:lnSpc>
@@ -9336,7 +9364,7 @@
             <a:endParaRPr sz="3200"/>
           </a:p>
           <a:p>
-            <a:pPr lvl="0" marL="342900" indent="-342900">
+            <a:pPr marL="342900" lvl="0" indent="-342900">
               <a:lnSpc>
                 <a:spcPct val="90000"/>
               </a:lnSpc>
@@ -9351,10 +9379,9 @@
               <a:rPr sz="3200"/>
               <a:t>	Option result={};</a:t>
             </a:r>
-            <a:endParaRPr sz="3200"/>
-          </a:p>
-          <a:p>
-            <a:pPr lvl="0" marL="342900" indent="-342900">
+          </a:p>
+          <a:p>
+            <a:pPr marL="342900" lvl="0" indent="-342900">
               <a:lnSpc>
                 <a:spcPct val="90000"/>
               </a:lnSpc>
@@ -9376,7 +9403,7 @@
             <a:endParaRPr sz="3200"/>
           </a:p>
           <a:p>
-            <a:pPr lvl="0" marL="342900" indent="-342900">
+            <a:pPr marL="342900" lvl="0" indent="-342900">
               <a:lnSpc>
                 <a:spcPct val="90000"/>
               </a:lnSpc>
@@ -9391,10 +9418,9 @@
               <a:rPr sz="3200"/>
               <a:t>	Float d;</a:t>
             </a:r>
-            <a:endParaRPr sz="3200"/>
-          </a:p>
-          <a:p>
-            <a:pPr lvl="0" marL="342900" indent="-342900">
+          </a:p>
+          <a:p>
+            <a:pPr marL="342900" lvl="0" indent="-342900">
               <a:lnSpc>
                 <a:spcPct val="90000"/>
               </a:lnSpc>
@@ -9409,10 +9435,9 @@
               <a:rPr sz="3200"/>
               <a:t>	d=price(result);</a:t>
             </a:r>
-            <a:endParaRPr sz="3200"/>
-          </a:p>
-          <a:p>
-            <a:pPr lvl="0" marL="342900" indent="-342900">
+          </a:p>
+          <a:p>
+            <a:pPr marL="342900" lvl="0" indent="-342900">
               <a:lnSpc>
                 <a:spcPct val="90000"/>
               </a:lnSpc>
@@ -9427,10 +9452,9 @@
               <a:rPr sz="3200"/>
               <a:t>	print(d);</a:t>
             </a:r>
-            <a:endParaRPr sz="3200"/>
-          </a:p>
-          <a:p>
-            <a:pPr lvl="0" marL="342900" indent="-342900">
+          </a:p>
+          <a:p>
+            <a:pPr marL="342900" lvl="0" indent="-342900">
               <a:lnSpc>
                 <a:spcPct val="90000"/>
               </a:lnSpc>
@@ -9453,12 +9477,12 @@
   <p:clrMapOvr>
     <a:masterClrMapping/>
   </p:clrMapOvr>
-  <p:transition spd="med" advClick="1"/>
+  <p:transition xmlns:p14="http://schemas.microsoft.com/office/powerpoint/2010/main" spd="med"/>
 </p:sld>
 </file>
 
 <file path=ppt/slides/slide8.xml><?xml version="1.0" encoding="utf-8"?>
-<p:sld xmlns:a="http://schemas.openxmlformats.org/drawingml/2006/main" xmlns:r="http://schemas.openxmlformats.org/officeDocument/2006/relationships" xmlns:p="http://schemas.openxmlformats.org/presentationml/2006/main" showMasterSp="1" showMasterPhAnim="1">
+<p:sld xmlns:a="http://schemas.openxmlformats.org/drawingml/2006/main" xmlns:r="http://schemas.openxmlformats.org/officeDocument/2006/relationships" xmlns:p="http://schemas.openxmlformats.org/presentationml/2006/main">
   <p:cSld>
     <p:spTree>
       <p:nvGrpSpPr>
@@ -9477,7 +9501,9 @@
       <p:sp>
         <p:nvSpPr>
           <p:cNvPr id="74" name="Shape 74"/>
-          <p:cNvSpPr/>
+          <p:cNvSpPr>
+            <a:spLocks noGrp="1"/>
+          </p:cNvSpPr>
           <p:nvPr>
             <p:ph type="title"/>
           </p:nvPr>
@@ -9508,7 +9534,9 @@
       <p:sp>
         <p:nvSpPr>
           <p:cNvPr id="75" name="Shape 75"/>
-          <p:cNvSpPr/>
+          <p:cNvSpPr>
+            <a:spLocks noGrp="1"/>
+          </p:cNvSpPr>
           <p:nvPr>
             <p:ph type="body" idx="1"/>
           </p:nvPr>
@@ -9559,7 +9587,6 @@
               <a:rPr sz="2700"/>
               <a:t>	Matrix strike(1,2);</a:t>
             </a:r>
-            <a:endParaRPr sz="2700"/>
           </a:p>
           <a:p>
             <a:pPr lvl="0">
@@ -9575,7 +9602,6 @@
               <a:rPr sz="2700"/>
               <a:t>	strike[0][0]=10;</a:t>
             </a:r>
-            <a:endParaRPr sz="2700"/>
           </a:p>
           <a:p>
             <a:pPr lvl="0">
@@ -9591,7 +9617,6 @@
               <a:rPr sz="2700"/>
               <a:t>	strike[0][1]=20;</a:t>
             </a:r>
-            <a:endParaRPr sz="2700"/>
           </a:p>
           <a:p>
             <a:pPr lvl="0">
@@ -9607,7 +9632,6 @@
               <a:rPr sz="2700"/>
               <a:t>	Matrix stock(1,2);</a:t>
             </a:r>
-            <a:endParaRPr sz="2700"/>
           </a:p>
           <a:p>
             <a:pPr lvl="0">
@@ -9623,7 +9647,6 @@
               <a:rPr sz="2700"/>
               <a:t>	stock[0][0]=15;</a:t>
             </a:r>
-            <a:endParaRPr sz="2700"/>
           </a:p>
           <a:p>
             <a:pPr lvl="0">
@@ -9639,7 +9662,6 @@
               <a:rPr sz="2700"/>
               <a:t>	stock[0][1]=25;</a:t>
             </a:r>
-            <a:endParaRPr sz="2700"/>
           </a:p>
           <a:p>
             <a:pPr lvl="0">
@@ -9655,7 +9677,6 @@
               <a:rPr sz="2700"/>
               <a:t>	Matrix interestRate(1,2);</a:t>
             </a:r>
-            <a:endParaRPr sz="2700"/>
           </a:p>
           <a:p>
             <a:pPr lvl="0">
@@ -9671,7 +9692,6 @@
               <a:rPr sz="2700"/>
               <a:t>	interestRate[0][0]=0.4;</a:t>
             </a:r>
-            <a:endParaRPr sz="2700"/>
           </a:p>
           <a:p>
             <a:pPr lvl="0">
@@ -9715,11 +9735,11 @@
         </p:spPr>
         <p:txBody>
           <a:bodyPr lIns="0" tIns="0" rIns="0" bIns="0">
-            <a:normAutofit fontScale="100000" lnSpcReduction="0"/>
+            <a:normAutofit/>
           </a:bodyPr>
           <a:lstStyle/>
           <a:p>
-            <a:pPr lvl="0" marL="342900" indent="-342900">
+            <a:pPr marL="342900" lvl="0" indent="-342900">
               <a:lnSpc>
                 <a:spcPct val="80000"/>
               </a:lnSpc>
@@ -9734,10 +9754,9 @@
               <a:rPr sz="2200"/>
               <a:t>	Matrix period(1,2);</a:t>
             </a:r>
-            <a:endParaRPr sz="2200"/>
-          </a:p>
-          <a:p>
-            <a:pPr lvl="0" marL="342900" indent="-342900">
+          </a:p>
+          <a:p>
+            <a:pPr marL="342900" lvl="0" indent="-342900">
               <a:lnSpc>
                 <a:spcPct val="80000"/>
               </a:lnSpc>
@@ -9752,10 +9771,9 @@
               <a:rPr sz="2200"/>
               <a:t>	period[0][0]=3;</a:t>
             </a:r>
-            <a:endParaRPr sz="2200"/>
-          </a:p>
-          <a:p>
-            <a:pPr lvl="0" marL="342900" indent="-342900">
+          </a:p>
+          <a:p>
+            <a:pPr marL="342900" lvl="0" indent="-342900">
               <a:lnSpc>
                 <a:spcPct val="80000"/>
               </a:lnSpc>
@@ -9770,10 +9788,9 @@
               <a:rPr sz="2200"/>
               <a:t>	period[0][1]=4;</a:t>
             </a:r>
-            <a:endParaRPr sz="2200"/>
-          </a:p>
-          <a:p>
-            <a:pPr lvl="0" marL="342900" indent="-342900">
+          </a:p>
+          <a:p>
+            <a:pPr marL="342900" lvl="0" indent="-342900">
               <a:lnSpc>
                 <a:spcPct val="80000"/>
               </a:lnSpc>
@@ -9795,7 +9812,7 @@
             <a:endParaRPr sz="2200"/>
           </a:p>
           <a:p>
-            <a:pPr lvl="0" marL="342900" indent="-342900">
+            <a:pPr marL="342900" lvl="0" indent="-342900">
               <a:lnSpc>
                 <a:spcPct val="80000"/>
               </a:lnSpc>
@@ -9817,7 +9834,7 @@
             <a:endParaRPr sz="2200"/>
           </a:p>
           <a:p>
-            <a:pPr lvl="0" marL="342900" indent="-342900">
+            <a:pPr marL="342900" lvl="0" indent="-342900">
               <a:lnSpc>
                 <a:spcPct val="80000"/>
               </a:lnSpc>
@@ -9839,7 +9856,7 @@
             <a:endParaRPr sz="2200"/>
           </a:p>
           <a:p>
-            <a:pPr lvl="0" marL="342900" indent="-342900">
+            <a:pPr marL="342900" lvl="0" indent="-342900">
               <a:lnSpc>
                 <a:spcPct val="80000"/>
               </a:lnSpc>
@@ -9854,10 +9871,9 @@
               <a:rPr sz="2200"/>
               <a:t>	</a:t>
             </a:r>
-            <a:endParaRPr sz="2200"/>
-          </a:p>
-          <a:p>
-            <a:pPr lvl="0" marL="342900" indent="-342900">
+          </a:p>
+          <a:p>
+            <a:pPr marL="342900" lvl="0" indent="-342900">
               <a:lnSpc>
                 <a:spcPct val="80000"/>
               </a:lnSpc>
@@ -9872,10 +9888,9 @@
               <a:rPr sz="2200"/>
               <a:t>	Matrix s(0,0);</a:t>
             </a:r>
-            <a:endParaRPr sz="2200"/>
-          </a:p>
-          <a:p>
-            <a:pPr lvl="0" marL="342900" indent="-342900">
+          </a:p>
+          <a:p>
+            <a:pPr marL="342900" lvl="0" indent="-342900">
               <a:lnSpc>
                 <a:spcPct val="80000"/>
               </a:lnSpc>
@@ -9897,7 +9912,7 @@
             <a:endParaRPr sz="2200"/>
           </a:p>
           <a:p>
-            <a:pPr lvl="0" marL="342900" indent="-342900">
+            <a:pPr marL="342900" lvl="0" indent="-342900">
               <a:lnSpc>
                 <a:spcPct val="80000"/>
               </a:lnSpc>
@@ -9912,10 +9927,9 @@
               <a:rPr sz="2200"/>
               <a:t>	return s;</a:t>
             </a:r>
-            <a:endParaRPr sz="2200"/>
-          </a:p>
-          <a:p>
-            <a:pPr lvl="0" marL="342900" indent="-342900">
+          </a:p>
+          <a:p>
+            <a:pPr marL="342900" lvl="0" indent="-342900">
               <a:lnSpc>
                 <a:spcPct val="80000"/>
               </a:lnSpc>
@@ -9938,12 +9952,12 @@
   <p:clrMapOvr>
     <a:masterClrMapping/>
   </p:clrMapOvr>
-  <p:transition spd="med" advClick="1"/>
+  <p:transition xmlns:p14="http://schemas.microsoft.com/office/powerpoint/2010/main" spd="med"/>
 </p:sld>
 </file>
 
 <file path=ppt/slides/slide9.xml><?xml version="1.0" encoding="utf-8"?>
-<p:sld xmlns:a="http://schemas.openxmlformats.org/drawingml/2006/main" xmlns:r="http://schemas.openxmlformats.org/officeDocument/2006/relationships" xmlns:p="http://schemas.openxmlformats.org/presentationml/2006/main" showMasterSp="1" showMasterPhAnim="1">
+<p:sld xmlns:a="http://schemas.openxmlformats.org/drawingml/2006/main" xmlns:r="http://schemas.openxmlformats.org/officeDocument/2006/relationships" xmlns:p="http://schemas.openxmlformats.org/presentationml/2006/main">
   <p:cSld>
     <p:spTree>
       <p:nvGrpSpPr>
@@ -9962,7 +9976,9 @@
       <p:sp>
         <p:nvSpPr>
           <p:cNvPr id="78" name="Shape 78"/>
-          <p:cNvSpPr/>
+          <p:cNvSpPr>
+            <a:spLocks noGrp="1"/>
+          </p:cNvSpPr>
           <p:nvPr>
             <p:ph type="title"/>
           </p:nvPr>
@@ -9993,7 +10009,9 @@
       <p:sp>
         <p:nvSpPr>
           <p:cNvPr id="79" name="Shape 79"/>
-          <p:cNvSpPr/>
+          <p:cNvSpPr>
+            <a:spLocks noGrp="1"/>
+          </p:cNvSpPr>
           <p:nvPr>
             <p:ph type="body" idx="1"/>
           </p:nvPr>
@@ -10018,7 +10036,6 @@
               <a:rPr sz="3200"/>
               <a:t>Easy to use: One of the application of extensible language</a:t>
             </a:r>
-            <a:endParaRPr sz="3200"/>
           </a:p>
           <a:p>
             <a:pPr lvl="0">
@@ -10034,7 +10051,6 @@
               <a:rPr sz="3200"/>
               <a:t>Make complex things easy: Don’t know Black-Shole or anything alike.</a:t>
             </a:r>
-            <a:endParaRPr sz="3200"/>
           </a:p>
           <a:p>
             <a:pPr lvl="0">
@@ -10058,12 +10074,12 @@
   <p:clrMapOvr>
     <a:masterClrMapping/>
   </p:clrMapOvr>
-  <p:transition spd="med" advClick="1"/>
+  <p:transition xmlns:p14="http://schemas.microsoft.com/office/powerpoint/2010/main" spd="med"/>
 </p:sld>
 </file>
 
 <file path=ppt/theme/theme1.xml><?xml version="1.0" encoding="utf-8"?>
-<a:theme xmlns:a="http://schemas.openxmlformats.org/drawingml/2006/main" xmlns:r="http://schemas.openxmlformats.org/officeDocument/2006/relationships" name="Default">
+<a:theme xmlns:a="http://schemas.openxmlformats.org/drawingml/2006/main" name="Default">
   <a:themeElements>
     <a:clrScheme name="Default">
       <a:dk1>
@@ -10189,7 +10205,7 @@
       <a:effectStyleLst>
         <a:effectStyle>
           <a:effectLst>
-            <a:outerShdw sx="100000" sy="100000" kx="0" ky="0" algn="b" rotWithShape="0" blurRad="38100" dist="23000" dir="5400000">
+            <a:outerShdw blurRad="38100" dist="23000" dir="5400000" rotWithShape="0">
               <a:srgbClr val="000000">
                 <a:alpha val="35000"/>
               </a:srgbClr>
@@ -10198,7 +10214,7 @@
         </a:effectStyle>
         <a:effectStyle>
           <a:effectLst>
-            <a:outerShdw sx="100000" sy="100000" kx="0" ky="0" algn="b" rotWithShape="0" blurRad="38100" dist="23000" dir="5400000">
+            <a:outerShdw blurRad="38100" dist="23000" dir="5400000" rotWithShape="0">
               <a:srgbClr val="000000">
                 <a:alpha val="35000"/>
               </a:srgbClr>
@@ -10207,7 +10223,7 @@
         </a:effectStyle>
         <a:effectStyle>
           <a:effectLst>
-            <a:outerShdw sx="100000" sy="100000" kx="0" ky="0" algn="b" rotWithShape="0" blurRad="38100" dist="20000" dir="5400000">
+            <a:outerShdw blurRad="38100" dist="20000" dir="5400000" rotWithShape="0">
               <a:srgbClr val="000000">
                 <a:alpha val="38000"/>
               </a:srgbClr>
@@ -10281,14 +10297,14 @@
           <a:bevel/>
         </a:ln>
         <a:effectLst>
-          <a:outerShdw sx="100000" sy="100000" kx="0" ky="0" algn="b" rotWithShape="0" blurRad="38100" dist="23000" dir="5400000">
+          <a:outerShdw blurRad="38100" dist="23000" dir="5400000" rotWithShape="0">
             <a:srgbClr val="000000">
               <a:alpha val="35000"/>
             </a:srgbClr>
           </a:outerShdw>
         </a:effectLst>
       </a:spPr>
-      <a:bodyPr rot="0" spcFirstLastPara="1" vertOverflow="overflow" horzOverflow="overflow" vert="horz" wrap="square" lIns="45719" tIns="45719" rIns="45719" bIns="45719" numCol="1" spcCol="38100" rtlCol="0" anchor="ctr" upright="0">
+      <a:bodyPr rot="0" spcFirstLastPara="1" vertOverflow="overflow" horzOverflow="overflow" vert="horz" wrap="square" lIns="45719" tIns="45719" rIns="45719" bIns="45719" numCol="1" spcCol="38100" rtlCol="0" anchor="ctr">
         <a:spAutoFit/>
       </a:bodyPr>
       <a:lstStyle>
@@ -10307,7 +10323,7 @@
           <a:buFontTx/>
           <a:buNone/>
           <a:tabLst/>
-          <a:defRPr b="0" baseline="0" cap="none" i="0" spc="0" strike="noStrike" sz="1800" u="none" kumimoji="0" normalizeH="0">
+          <a:defRPr kumimoji="0" sz="1800" b="0" i="0" u="none" strike="noStrike" cap="none" spc="0" normalizeH="0" baseline="0">
             <a:ln>
               <a:noFill/>
             </a:ln>
@@ -10337,7 +10353,7 @@
           <a:buFontTx/>
           <a:buNone/>
           <a:tabLst/>
-          <a:defRPr b="0" baseline="0" cap="none" i="0" spc="0" strike="noStrike" sz="1800" u="none" kumimoji="0" normalizeH="0">
+          <a:defRPr kumimoji="0" sz="1800" b="0" i="0" u="none" strike="noStrike" cap="none" spc="0" normalizeH="0" baseline="0">
             <a:ln>
               <a:noFill/>
             </a:ln>
@@ -10363,7 +10379,7 @@
           <a:buFontTx/>
           <a:buNone/>
           <a:tabLst/>
-          <a:defRPr b="0" baseline="0" cap="none" i="0" spc="0" strike="noStrike" sz="1800" u="none" kumimoji="0" normalizeH="0">
+          <a:defRPr kumimoji="0" sz="1800" b="0" i="0" u="none" strike="noStrike" cap="none" spc="0" normalizeH="0" baseline="0">
             <a:ln>
               <a:noFill/>
             </a:ln>
@@ -10389,7 +10405,7 @@
           <a:buFontTx/>
           <a:buNone/>
           <a:tabLst/>
-          <a:defRPr b="0" baseline="0" cap="none" i="0" spc="0" strike="noStrike" sz="1800" u="none" kumimoji="0" normalizeH="0">
+          <a:defRPr kumimoji="0" sz="1800" b="0" i="0" u="none" strike="noStrike" cap="none" spc="0" normalizeH="0" baseline="0">
             <a:ln>
               <a:noFill/>
             </a:ln>
@@ -10415,7 +10431,7 @@
           <a:buFontTx/>
           <a:buNone/>
           <a:tabLst/>
-          <a:defRPr b="0" baseline="0" cap="none" i="0" spc="0" strike="noStrike" sz="1800" u="none" kumimoji="0" normalizeH="0">
+          <a:defRPr kumimoji="0" sz="1800" b="0" i="0" u="none" strike="noStrike" cap="none" spc="0" normalizeH="0" baseline="0">
             <a:ln>
               <a:noFill/>
             </a:ln>
@@ -10441,7 +10457,7 @@
           <a:buFontTx/>
           <a:buNone/>
           <a:tabLst/>
-          <a:defRPr b="0" baseline="0" cap="none" i="0" spc="0" strike="noStrike" sz="1800" u="none" kumimoji="0" normalizeH="0">
+          <a:defRPr kumimoji="0" sz="1800" b="0" i="0" u="none" strike="noStrike" cap="none" spc="0" normalizeH="0" baseline="0">
             <a:ln>
               <a:noFill/>
             </a:ln>
@@ -10467,7 +10483,7 @@
           <a:buFontTx/>
           <a:buNone/>
           <a:tabLst/>
-          <a:defRPr b="0" baseline="0" cap="none" i="0" spc="0" strike="noStrike" sz="1800" u="none" kumimoji="0" normalizeH="0">
+          <a:defRPr kumimoji="0" sz="1800" b="0" i="0" u="none" strike="noStrike" cap="none" spc="0" normalizeH="0" baseline="0">
             <a:ln>
               <a:noFill/>
             </a:ln>
@@ -10493,7 +10509,7 @@
           <a:buFontTx/>
           <a:buNone/>
           <a:tabLst/>
-          <a:defRPr b="0" baseline="0" cap="none" i="0" spc="0" strike="noStrike" sz="1800" u="none" kumimoji="0" normalizeH="0">
+          <a:defRPr kumimoji="0" sz="1800" b="0" i="0" u="none" strike="noStrike" cap="none" spc="0" normalizeH="0" baseline="0">
             <a:ln>
               <a:noFill/>
             </a:ln>
@@ -10519,7 +10535,7 @@
           <a:buFontTx/>
           <a:buNone/>
           <a:tabLst/>
-          <a:defRPr b="0" baseline="0" cap="none" i="0" spc="0" strike="noStrike" sz="1800" u="none" kumimoji="0" normalizeH="0">
+          <a:defRPr kumimoji="0" sz="1800" b="0" i="0" u="none" strike="noStrike" cap="none" spc="0" normalizeH="0" baseline="0">
             <a:ln>
               <a:noFill/>
             </a:ln>
@@ -10545,7 +10561,7 @@
           <a:buFontTx/>
           <a:buNone/>
           <a:tabLst/>
-          <a:defRPr b="0" baseline="0" cap="none" i="0" spc="0" strike="noStrike" sz="1800" u="none" kumimoji="0" normalizeH="0">
+          <a:defRPr kumimoji="0" sz="1800" b="0" i="0" u="none" strike="noStrike" cap="none" spc="0" normalizeH="0" baseline="0">
             <a:ln>
               <a:noFill/>
             </a:ln>
@@ -10558,9 +10574,15 @@
         </a:lvl9pPr>
       </a:lstStyle>
       <a:style>
-        <a:lnRef idx="0"/>
-        <a:fillRef idx="0"/>
-        <a:effectRef idx="0"/>
+        <a:lnRef idx="0">
+          <a:scrgbClr r="0" g="0" b="0"/>
+        </a:lnRef>
+        <a:fillRef idx="0">
+          <a:scrgbClr r="0" g="0" b="0"/>
+        </a:fillRef>
+        <a:effectRef idx="0">
+          <a:scrgbClr r="0" g="0" b="0"/>
+        </a:effectRef>
         <a:fontRef idx="none"/>
       </a:style>
     </a:spDef>
@@ -10575,14 +10597,14 @@
           <a:bevel/>
         </a:ln>
         <a:effectLst>
-          <a:outerShdw sx="100000" sy="100000" kx="0" ky="0" algn="b" rotWithShape="0" blurRad="38100" dist="20000" dir="5400000">
+          <a:outerShdw blurRad="38100" dist="20000" dir="5400000" rotWithShape="0">
             <a:srgbClr val="000000">
               <a:alpha val="38000"/>
             </a:srgbClr>
           </a:outerShdw>
         </a:effectLst>
       </a:spPr>
-      <a:bodyPr rot="0" spcFirstLastPara="1" vertOverflow="overflow" horzOverflow="overflow" vert="horz" wrap="square" lIns="91439" tIns="45719" rIns="91439" bIns="45719" numCol="1" spcCol="38100" rtlCol="0" anchor="t" upright="0">
+      <a:bodyPr rot="0" spcFirstLastPara="1" vertOverflow="overflow" horzOverflow="overflow" vert="horz" wrap="square" lIns="91439" tIns="45719" rIns="91439" bIns="45719" numCol="1" spcCol="38100" rtlCol="0" anchor="t">
         <a:noAutofit/>
       </a:bodyPr>
       <a:lstStyle>
@@ -10601,7 +10623,7 @@
           <a:buFontTx/>
           <a:buNone/>
           <a:tabLst/>
-          <a:defRPr b="0" baseline="0" cap="none" i="0" spc="0" strike="noStrike" sz="1800" u="none" kumimoji="0" normalizeH="0">
+          <a:defRPr kumimoji="0" sz="1800" b="0" i="0" u="none" strike="noStrike" cap="none" spc="0" normalizeH="0" baseline="0">
             <a:ln>
               <a:noFill/>
             </a:ln>
@@ -10627,7 +10649,7 @@
           <a:buFontTx/>
           <a:buNone/>
           <a:tabLst/>
-          <a:defRPr b="0" baseline="0" cap="none" i="0" spc="0" strike="noStrike" sz="1800" u="none" kumimoji="0" normalizeH="0">
+          <a:defRPr kumimoji="0" sz="1800" b="0" i="0" u="none" strike="noStrike" cap="none" spc="0" normalizeH="0" baseline="0">
             <a:ln>
               <a:noFill/>
             </a:ln>
@@ -10653,7 +10675,7 @@
           <a:buFontTx/>
           <a:buNone/>
           <a:tabLst/>
-          <a:defRPr b="0" baseline="0" cap="none" i="0" spc="0" strike="noStrike" sz="1800" u="none" kumimoji="0" normalizeH="0">
+          <a:defRPr kumimoji="0" sz="1800" b="0" i="0" u="none" strike="noStrike" cap="none" spc="0" normalizeH="0" baseline="0">
             <a:ln>
               <a:noFill/>
             </a:ln>
@@ -10679,7 +10701,7 @@
           <a:buFontTx/>
           <a:buNone/>
           <a:tabLst/>
-          <a:defRPr b="0" baseline="0" cap="none" i="0" spc="0" strike="noStrike" sz="1800" u="none" kumimoji="0" normalizeH="0">
+          <a:defRPr kumimoji="0" sz="1800" b="0" i="0" u="none" strike="noStrike" cap="none" spc="0" normalizeH="0" baseline="0">
             <a:ln>
               <a:noFill/>
             </a:ln>
@@ -10705,7 +10727,7 @@
           <a:buFontTx/>
           <a:buNone/>
           <a:tabLst/>
-          <a:defRPr b="0" baseline="0" cap="none" i="0" spc="0" strike="noStrike" sz="1800" u="none" kumimoji="0" normalizeH="0">
+          <a:defRPr kumimoji="0" sz="1800" b="0" i="0" u="none" strike="noStrike" cap="none" spc="0" normalizeH="0" baseline="0">
             <a:ln>
               <a:noFill/>
             </a:ln>
@@ -10731,7 +10753,7 @@
           <a:buFontTx/>
           <a:buNone/>
           <a:tabLst/>
-          <a:defRPr b="0" baseline="0" cap="none" i="0" spc="0" strike="noStrike" sz="1800" u="none" kumimoji="0" normalizeH="0">
+          <a:defRPr kumimoji="0" sz="1800" b="0" i="0" u="none" strike="noStrike" cap="none" spc="0" normalizeH="0" baseline="0">
             <a:ln>
               <a:noFill/>
             </a:ln>
@@ -10757,7 +10779,7 @@
           <a:buFontTx/>
           <a:buNone/>
           <a:tabLst/>
-          <a:defRPr b="0" baseline="0" cap="none" i="0" spc="0" strike="noStrike" sz="1800" u="none" kumimoji="0" normalizeH="0">
+          <a:defRPr kumimoji="0" sz="1800" b="0" i="0" u="none" strike="noStrike" cap="none" spc="0" normalizeH="0" baseline="0">
             <a:ln>
               <a:noFill/>
             </a:ln>
@@ -10783,7 +10805,7 @@
           <a:buFontTx/>
           <a:buNone/>
           <a:tabLst/>
-          <a:defRPr b="0" baseline="0" cap="none" i="0" spc="0" strike="noStrike" sz="1800" u="none" kumimoji="0" normalizeH="0">
+          <a:defRPr kumimoji="0" sz="1800" b="0" i="0" u="none" strike="noStrike" cap="none" spc="0" normalizeH="0" baseline="0">
             <a:ln>
               <a:noFill/>
             </a:ln>
@@ -10809,7 +10831,7 @@
           <a:buFontTx/>
           <a:buNone/>
           <a:tabLst/>
-          <a:defRPr b="0" baseline="0" cap="none" i="0" spc="0" strike="noStrike" sz="1800" u="none" kumimoji="0" normalizeH="0">
+          <a:defRPr kumimoji="0" sz="1800" b="0" i="0" u="none" strike="noStrike" cap="none" spc="0" normalizeH="0" baseline="0">
             <a:ln>
               <a:noFill/>
             </a:ln>
@@ -10835,7 +10857,7 @@
           <a:buFontTx/>
           <a:buNone/>
           <a:tabLst/>
-          <a:defRPr b="0" baseline="0" cap="none" i="0" spc="0" strike="noStrike" sz="1800" u="none" kumimoji="0" normalizeH="0">
+          <a:defRPr kumimoji="0" sz="1800" b="0" i="0" u="none" strike="noStrike" cap="none" spc="0" normalizeH="0" baseline="0">
             <a:ln>
               <a:noFill/>
             </a:ln>
@@ -10848,9 +10870,15 @@
         </a:lvl9pPr>
       </a:lstStyle>
       <a:style>
-        <a:lnRef idx="0"/>
-        <a:fillRef idx="0"/>
-        <a:effectRef idx="0"/>
+        <a:lnRef idx="0">
+          <a:scrgbClr r="0" g="0" b="0"/>
+        </a:lnRef>
+        <a:fillRef idx="0">
+          <a:scrgbClr r="0" g="0" b="0"/>
+        </a:fillRef>
+        <a:effectRef idx="0">
+          <a:scrgbClr r="0" g="0" b="0"/>
+        </a:effectRef>
         <a:fontRef idx="none"/>
       </a:style>
     </a:lnDef>
@@ -10863,7 +10891,7 @@
         </a:ln>
         <a:effectLst/>
       </a:spPr>
-      <a:bodyPr rot="0" spcFirstLastPara="1" vertOverflow="overflow" horzOverflow="overflow" vert="horz" wrap="square" lIns="45719" tIns="45719" rIns="45719" bIns="45719" numCol="1" spcCol="38100" rtlCol="0" anchor="t" upright="0">
+      <a:bodyPr rot="0" spcFirstLastPara="1" vertOverflow="overflow" horzOverflow="overflow" vert="horz" wrap="square" lIns="45719" tIns="45719" rIns="45719" bIns="45719" numCol="1" spcCol="38100" rtlCol="0" anchor="t">
         <a:spAutoFit/>
       </a:bodyPr>
       <a:lstStyle>
@@ -10882,7 +10910,7 @@
           <a:buFontTx/>
           <a:buNone/>
           <a:tabLst/>
-          <a:defRPr b="0" baseline="0" cap="none" i="0" spc="0" strike="noStrike" sz="1800" u="none" kumimoji="0" normalizeH="0">
+          <a:defRPr kumimoji="0" sz="1800" b="0" i="0" u="none" strike="noStrike" cap="none" spc="0" normalizeH="0" baseline="0">
             <a:ln>
               <a:noFill/>
             </a:ln>
@@ -10912,7 +10940,7 @@
           <a:buFontTx/>
           <a:buNone/>
           <a:tabLst/>
-          <a:defRPr b="0" baseline="0" cap="none" i="0" spc="0" strike="noStrike" sz="1800" u="none" kumimoji="0" normalizeH="0">
+          <a:defRPr kumimoji="0" sz="1800" b="0" i="0" u="none" strike="noStrike" cap="none" spc="0" normalizeH="0" baseline="0">
             <a:ln>
               <a:noFill/>
             </a:ln>
@@ -10938,7 +10966,7 @@
           <a:buFontTx/>
           <a:buNone/>
           <a:tabLst/>
-          <a:defRPr b="0" baseline="0" cap="none" i="0" spc="0" strike="noStrike" sz="1800" u="none" kumimoji="0" normalizeH="0">
+          <a:defRPr kumimoji="0" sz="1800" b="0" i="0" u="none" strike="noStrike" cap="none" spc="0" normalizeH="0" baseline="0">
             <a:ln>
               <a:noFill/>
             </a:ln>
@@ -10964,7 +10992,7 @@
           <a:buFontTx/>
           <a:buNone/>
           <a:tabLst/>
-          <a:defRPr b="0" baseline="0" cap="none" i="0" spc="0" strike="noStrike" sz="1800" u="none" kumimoji="0" normalizeH="0">
+          <a:defRPr kumimoji="0" sz="1800" b="0" i="0" u="none" strike="noStrike" cap="none" spc="0" normalizeH="0" baseline="0">
             <a:ln>
               <a:noFill/>
             </a:ln>
@@ -10990,7 +11018,7 @@
           <a:buFontTx/>
           <a:buNone/>
           <a:tabLst/>
-          <a:defRPr b="0" baseline="0" cap="none" i="0" spc="0" strike="noStrike" sz="1800" u="none" kumimoji="0" normalizeH="0">
+          <a:defRPr kumimoji="0" sz="1800" b="0" i="0" u="none" strike="noStrike" cap="none" spc="0" normalizeH="0" baseline="0">
             <a:ln>
               <a:noFill/>
             </a:ln>
@@ -11016,7 +11044,7 @@
           <a:buFontTx/>
           <a:buNone/>
           <a:tabLst/>
-          <a:defRPr b="0" baseline="0" cap="none" i="0" spc="0" strike="noStrike" sz="1800" u="none" kumimoji="0" normalizeH="0">
+          <a:defRPr kumimoji="0" sz="1800" b="0" i="0" u="none" strike="noStrike" cap="none" spc="0" normalizeH="0" baseline="0">
             <a:ln>
               <a:noFill/>
             </a:ln>
@@ -11042,7 +11070,7 @@
           <a:buFontTx/>
           <a:buNone/>
           <a:tabLst/>
-          <a:defRPr b="0" baseline="0" cap="none" i="0" spc="0" strike="noStrike" sz="1800" u="none" kumimoji="0" normalizeH="0">
+          <a:defRPr kumimoji="0" sz="1800" b="0" i="0" u="none" strike="noStrike" cap="none" spc="0" normalizeH="0" baseline="0">
             <a:ln>
               <a:noFill/>
             </a:ln>
@@ -11068,7 +11096,7 @@
           <a:buFontTx/>
           <a:buNone/>
           <a:tabLst/>
-          <a:defRPr b="0" baseline="0" cap="none" i="0" spc="0" strike="noStrike" sz="1800" u="none" kumimoji="0" normalizeH="0">
+          <a:defRPr kumimoji="0" sz="1800" b="0" i="0" u="none" strike="noStrike" cap="none" spc="0" normalizeH="0" baseline="0">
             <a:ln>
               <a:noFill/>
             </a:ln>
@@ -11094,7 +11122,7 @@
           <a:buFontTx/>
           <a:buNone/>
           <a:tabLst/>
-          <a:defRPr b="0" baseline="0" cap="none" i="0" spc="0" strike="noStrike" sz="1800" u="none" kumimoji="0" normalizeH="0">
+          <a:defRPr kumimoji="0" sz="1800" b="0" i="0" u="none" strike="noStrike" cap="none" spc="0" normalizeH="0" baseline="0">
             <a:ln>
               <a:noFill/>
             </a:ln>
@@ -11120,7 +11148,7 @@
           <a:buFontTx/>
           <a:buNone/>
           <a:tabLst/>
-          <a:defRPr b="0" baseline="0" cap="none" i="0" spc="0" strike="noStrike" sz="1800" u="none" kumimoji="0" normalizeH="0">
+          <a:defRPr kumimoji="0" sz="1800" b="0" i="0" u="none" strike="noStrike" cap="none" spc="0" normalizeH="0" baseline="0">
             <a:ln>
               <a:noFill/>
             </a:ln>
@@ -11133,18 +11161,25 @@
         </a:lvl9pPr>
       </a:lstStyle>
       <a:style>
-        <a:lnRef idx="0"/>
-        <a:fillRef idx="0"/>
-        <a:effectRef idx="0"/>
+        <a:lnRef idx="0">
+          <a:scrgbClr r="0" g="0" b="0"/>
+        </a:lnRef>
+        <a:fillRef idx="0">
+          <a:scrgbClr r="0" g="0" b="0"/>
+        </a:fillRef>
+        <a:effectRef idx="0">
+          <a:scrgbClr r="0" g="0" b="0"/>
+        </a:effectRef>
         <a:fontRef idx="none"/>
       </a:style>
     </a:txDef>
   </a:objectDefaults>
+  <a:extraClrSchemeLst/>
 </a:theme>
 </file>
 
 <file path=ppt/theme/theme2.xml><?xml version="1.0" encoding="utf-8"?>
-<a:theme xmlns:a="http://schemas.openxmlformats.org/drawingml/2006/main" xmlns:r="http://schemas.openxmlformats.org/officeDocument/2006/relationships" name="Default">
+<a:theme xmlns:a="http://schemas.openxmlformats.org/drawingml/2006/main" name="Default">
   <a:themeElements>
     <a:clrScheme name="Default">
       <a:dk1>
@@ -11270,7 +11305,7 @@
       <a:effectStyleLst>
         <a:effectStyle>
           <a:effectLst>
-            <a:outerShdw sx="100000" sy="100000" kx="0" ky="0" algn="b" rotWithShape="0" blurRad="38100" dist="23000" dir="5400000">
+            <a:outerShdw blurRad="38100" dist="23000" dir="5400000" rotWithShape="0">
               <a:srgbClr val="000000">
                 <a:alpha val="35000"/>
               </a:srgbClr>
@@ -11279,7 +11314,7 @@
         </a:effectStyle>
         <a:effectStyle>
           <a:effectLst>
-            <a:outerShdw sx="100000" sy="100000" kx="0" ky="0" algn="b" rotWithShape="0" blurRad="38100" dist="23000" dir="5400000">
+            <a:outerShdw blurRad="38100" dist="23000" dir="5400000" rotWithShape="0">
               <a:srgbClr val="000000">
                 <a:alpha val="35000"/>
               </a:srgbClr>
@@ -11288,7 +11323,7 @@
         </a:effectStyle>
         <a:effectStyle>
           <a:effectLst>
-            <a:outerShdw sx="100000" sy="100000" kx="0" ky="0" algn="b" rotWithShape="0" blurRad="38100" dist="20000" dir="5400000">
+            <a:outerShdw blurRad="38100" dist="20000" dir="5400000" rotWithShape="0">
               <a:srgbClr val="000000">
                 <a:alpha val="38000"/>
               </a:srgbClr>
@@ -11362,14 +11397,14 @@
           <a:bevel/>
         </a:ln>
         <a:effectLst>
-          <a:outerShdw sx="100000" sy="100000" kx="0" ky="0" algn="b" rotWithShape="0" blurRad="38100" dist="23000" dir="5400000">
+          <a:outerShdw blurRad="38100" dist="23000" dir="5400000" rotWithShape="0">
             <a:srgbClr val="000000">
               <a:alpha val="35000"/>
             </a:srgbClr>
           </a:outerShdw>
         </a:effectLst>
       </a:spPr>
-      <a:bodyPr rot="0" spcFirstLastPara="1" vertOverflow="overflow" horzOverflow="overflow" vert="horz" wrap="square" lIns="45719" tIns="45719" rIns="45719" bIns="45719" numCol="1" spcCol="38100" rtlCol="0" anchor="ctr" upright="0">
+      <a:bodyPr rot="0" spcFirstLastPara="1" vertOverflow="overflow" horzOverflow="overflow" vert="horz" wrap="square" lIns="45719" tIns="45719" rIns="45719" bIns="45719" numCol="1" spcCol="38100" rtlCol="0" anchor="ctr">
         <a:spAutoFit/>
       </a:bodyPr>
       <a:lstStyle>
@@ -11388,7 +11423,7 @@
           <a:buFontTx/>
           <a:buNone/>
           <a:tabLst/>
-          <a:defRPr b="0" baseline="0" cap="none" i="0" spc="0" strike="noStrike" sz="1800" u="none" kumimoji="0" normalizeH="0">
+          <a:defRPr kumimoji="0" sz="1800" b="0" i="0" u="none" strike="noStrike" cap="none" spc="0" normalizeH="0" baseline="0">
             <a:ln>
               <a:noFill/>
             </a:ln>
@@ -11418,7 +11453,7 @@
           <a:buFontTx/>
           <a:buNone/>
           <a:tabLst/>
-          <a:defRPr b="0" baseline="0" cap="none" i="0" spc="0" strike="noStrike" sz="1800" u="none" kumimoji="0" normalizeH="0">
+          <a:defRPr kumimoji="0" sz="1800" b="0" i="0" u="none" strike="noStrike" cap="none" spc="0" normalizeH="0" baseline="0">
             <a:ln>
               <a:noFill/>
             </a:ln>
@@ -11444,7 +11479,7 @@
           <a:buFontTx/>
           <a:buNone/>
           <a:tabLst/>
-          <a:defRPr b="0" baseline="0" cap="none" i="0" spc="0" strike="noStrike" sz="1800" u="none" kumimoji="0" normalizeH="0">
+          <a:defRPr kumimoji="0" sz="1800" b="0" i="0" u="none" strike="noStrike" cap="none" spc="0" normalizeH="0" baseline="0">
             <a:ln>
               <a:noFill/>
             </a:ln>
@@ -11470,7 +11505,7 @@
           <a:buFontTx/>
           <a:buNone/>
           <a:tabLst/>
-          <a:defRPr b="0" baseline="0" cap="none" i="0" spc="0" strike="noStrike" sz="1800" u="none" kumimoji="0" normalizeH="0">
+          <a:defRPr kumimoji="0" sz="1800" b="0" i="0" u="none" strike="noStrike" cap="none" spc="0" normalizeH="0" baseline="0">
             <a:ln>
               <a:noFill/>
             </a:ln>
@@ -11496,7 +11531,7 @@
           <a:buFontTx/>
           <a:buNone/>
           <a:tabLst/>
-          <a:defRPr b="0" baseline="0" cap="none" i="0" spc="0" strike="noStrike" sz="1800" u="none" kumimoji="0" normalizeH="0">
+          <a:defRPr kumimoji="0" sz="1800" b="0" i="0" u="none" strike="noStrike" cap="none" spc="0" normalizeH="0" baseline="0">
             <a:ln>
               <a:noFill/>
             </a:ln>
@@ -11522,7 +11557,7 @@
           <a:buFontTx/>
           <a:buNone/>
           <a:tabLst/>
-          <a:defRPr b="0" baseline="0" cap="none" i="0" spc="0" strike="noStrike" sz="1800" u="none" kumimoji="0" normalizeH="0">
+          <a:defRPr kumimoji="0" sz="1800" b="0" i="0" u="none" strike="noStrike" cap="none" spc="0" normalizeH="0" baseline="0">
             <a:ln>
               <a:noFill/>
             </a:ln>
@@ -11548,7 +11583,7 @@
           <a:buFontTx/>
           <a:buNone/>
           <a:tabLst/>
-          <a:defRPr b="0" baseline="0" cap="none" i="0" spc="0" strike="noStrike" sz="1800" u="none" kumimoji="0" normalizeH="0">
+          <a:defRPr kumimoji="0" sz="1800" b="0" i="0" u="none" strike="noStrike" cap="none" spc="0" normalizeH="0" baseline="0">
             <a:ln>
               <a:noFill/>
             </a:ln>
@@ -11574,7 +11609,7 @@
           <a:buFontTx/>
           <a:buNone/>
           <a:tabLst/>
-          <a:defRPr b="0" baseline="0" cap="none" i="0" spc="0" strike="noStrike" sz="1800" u="none" kumimoji="0" normalizeH="0">
+          <a:defRPr kumimoji="0" sz="1800" b="0" i="0" u="none" strike="noStrike" cap="none" spc="0" normalizeH="0" baseline="0">
             <a:ln>
               <a:noFill/>
             </a:ln>
@@ -11600,7 +11635,7 @@
           <a:buFontTx/>
           <a:buNone/>
           <a:tabLst/>
-          <a:defRPr b="0" baseline="0" cap="none" i="0" spc="0" strike="noStrike" sz="1800" u="none" kumimoji="0" normalizeH="0">
+          <a:defRPr kumimoji="0" sz="1800" b="0" i="0" u="none" strike="noStrike" cap="none" spc="0" normalizeH="0" baseline="0">
             <a:ln>
               <a:noFill/>
             </a:ln>
@@ -11626,7 +11661,7 @@
           <a:buFontTx/>
           <a:buNone/>
           <a:tabLst/>
-          <a:defRPr b="0" baseline="0" cap="none" i="0" spc="0" strike="noStrike" sz="1800" u="none" kumimoji="0" normalizeH="0">
+          <a:defRPr kumimoji="0" sz="1800" b="0" i="0" u="none" strike="noStrike" cap="none" spc="0" normalizeH="0" baseline="0">
             <a:ln>
               <a:noFill/>
             </a:ln>
@@ -11639,9 +11674,15 @@
         </a:lvl9pPr>
       </a:lstStyle>
       <a:style>
-        <a:lnRef idx="0"/>
-        <a:fillRef idx="0"/>
-        <a:effectRef idx="0"/>
+        <a:lnRef idx="0">
+          <a:scrgbClr r="0" g="0" b="0"/>
+        </a:lnRef>
+        <a:fillRef idx="0">
+          <a:scrgbClr r="0" g="0" b="0"/>
+        </a:fillRef>
+        <a:effectRef idx="0">
+          <a:scrgbClr r="0" g="0" b="0"/>
+        </a:effectRef>
         <a:fontRef idx="none"/>
       </a:style>
     </a:spDef>
@@ -11656,14 +11697,14 @@
           <a:bevel/>
         </a:ln>
         <a:effectLst>
-          <a:outerShdw sx="100000" sy="100000" kx="0" ky="0" algn="b" rotWithShape="0" blurRad="38100" dist="20000" dir="5400000">
+          <a:outerShdw blurRad="38100" dist="20000" dir="5400000" rotWithShape="0">
             <a:srgbClr val="000000">
               <a:alpha val="38000"/>
             </a:srgbClr>
           </a:outerShdw>
         </a:effectLst>
       </a:spPr>
-      <a:bodyPr rot="0" spcFirstLastPara="1" vertOverflow="overflow" horzOverflow="overflow" vert="horz" wrap="square" lIns="91439" tIns="45719" rIns="91439" bIns="45719" numCol="1" spcCol="38100" rtlCol="0" anchor="t" upright="0">
+      <a:bodyPr rot="0" spcFirstLastPara="1" vertOverflow="overflow" horzOverflow="overflow" vert="horz" wrap="square" lIns="91439" tIns="45719" rIns="91439" bIns="45719" numCol="1" spcCol="38100" rtlCol="0" anchor="t">
         <a:noAutofit/>
       </a:bodyPr>
       <a:lstStyle>
@@ -11682,7 +11723,7 @@
           <a:buFontTx/>
           <a:buNone/>
           <a:tabLst/>
-          <a:defRPr b="0" baseline="0" cap="none" i="0" spc="0" strike="noStrike" sz="1800" u="none" kumimoji="0" normalizeH="0">
+          <a:defRPr kumimoji="0" sz="1800" b="0" i="0" u="none" strike="noStrike" cap="none" spc="0" normalizeH="0" baseline="0">
             <a:ln>
               <a:noFill/>
             </a:ln>
@@ -11708,7 +11749,7 @@
           <a:buFontTx/>
           <a:buNone/>
           <a:tabLst/>
-          <a:defRPr b="0" baseline="0" cap="none" i="0" spc="0" strike="noStrike" sz="1800" u="none" kumimoji="0" normalizeH="0">
+          <a:defRPr kumimoji="0" sz="1800" b="0" i="0" u="none" strike="noStrike" cap="none" spc="0" normalizeH="0" baseline="0">
             <a:ln>
               <a:noFill/>
             </a:ln>
@@ -11734,7 +11775,7 @@
           <a:buFontTx/>
           <a:buNone/>
           <a:tabLst/>
-          <a:defRPr b="0" baseline="0" cap="none" i="0" spc="0" strike="noStrike" sz="1800" u="none" kumimoji="0" normalizeH="0">
+          <a:defRPr kumimoji="0" sz="1800" b="0" i="0" u="none" strike="noStrike" cap="none" spc="0" normalizeH="0" baseline="0">
             <a:ln>
               <a:noFill/>
             </a:ln>
@@ -11760,7 +11801,7 @@
           <a:buFontTx/>
           <a:buNone/>
           <a:tabLst/>
-          <a:defRPr b="0" baseline="0" cap="none" i="0" spc="0" strike="noStrike" sz="1800" u="none" kumimoji="0" normalizeH="0">
+          <a:defRPr kumimoji="0" sz="1800" b="0" i="0" u="none" strike="noStrike" cap="none" spc="0" normalizeH="0" baseline="0">
             <a:ln>
               <a:noFill/>
             </a:ln>
@@ -11786,7 +11827,7 @@
           <a:buFontTx/>
           <a:buNone/>
           <a:tabLst/>
-          <a:defRPr b="0" baseline="0" cap="none" i="0" spc="0" strike="noStrike" sz="1800" u="none" kumimoji="0" normalizeH="0">
+          <a:defRPr kumimoji="0" sz="1800" b="0" i="0" u="none" strike="noStrike" cap="none" spc="0" normalizeH="0" baseline="0">
             <a:ln>
               <a:noFill/>
             </a:ln>
@@ -11812,7 +11853,7 @@
           <a:buFontTx/>
           <a:buNone/>
           <a:tabLst/>
-          <a:defRPr b="0" baseline="0" cap="none" i="0" spc="0" strike="noStrike" sz="1800" u="none" kumimoji="0" normalizeH="0">
+          <a:defRPr kumimoji="0" sz="1800" b="0" i="0" u="none" strike="noStrike" cap="none" spc="0" normalizeH="0" baseline="0">
             <a:ln>
               <a:noFill/>
             </a:ln>
@@ -11838,7 +11879,7 @@
           <a:buFontTx/>
           <a:buNone/>
           <a:tabLst/>
-          <a:defRPr b="0" baseline="0" cap="none" i="0" spc="0" strike="noStrike" sz="1800" u="none" kumimoji="0" normalizeH="0">
+          <a:defRPr kumimoji="0" sz="1800" b="0" i="0" u="none" strike="noStrike" cap="none" spc="0" normalizeH="0" baseline="0">
             <a:ln>
               <a:noFill/>
             </a:ln>
@@ -11864,7 +11905,7 @@
           <a:buFontTx/>
           <a:buNone/>
           <a:tabLst/>
-          <a:defRPr b="0" baseline="0" cap="none" i="0" spc="0" strike="noStrike" sz="1800" u="none" kumimoji="0" normalizeH="0">
+          <a:defRPr kumimoji="0" sz="1800" b="0" i="0" u="none" strike="noStrike" cap="none" spc="0" normalizeH="0" baseline="0">
             <a:ln>
               <a:noFill/>
             </a:ln>
@@ -11890,7 +11931,7 @@
           <a:buFontTx/>
           <a:buNone/>
           <a:tabLst/>
-          <a:defRPr b="0" baseline="0" cap="none" i="0" spc="0" strike="noStrike" sz="1800" u="none" kumimoji="0" normalizeH="0">
+          <a:defRPr kumimoji="0" sz="1800" b="0" i="0" u="none" strike="noStrike" cap="none" spc="0" normalizeH="0" baseline="0">
             <a:ln>
               <a:noFill/>
             </a:ln>
@@ -11916,7 +11957,7 @@
           <a:buFontTx/>
           <a:buNone/>
           <a:tabLst/>
-          <a:defRPr b="0" baseline="0" cap="none" i="0" spc="0" strike="noStrike" sz="1800" u="none" kumimoji="0" normalizeH="0">
+          <a:defRPr kumimoji="0" sz="1800" b="0" i="0" u="none" strike="noStrike" cap="none" spc="0" normalizeH="0" baseline="0">
             <a:ln>
               <a:noFill/>
             </a:ln>
@@ -11929,9 +11970,15 @@
         </a:lvl9pPr>
       </a:lstStyle>
       <a:style>
-        <a:lnRef idx="0"/>
-        <a:fillRef idx="0"/>
-        <a:effectRef idx="0"/>
+        <a:lnRef idx="0">
+          <a:scrgbClr r="0" g="0" b="0"/>
+        </a:lnRef>
+        <a:fillRef idx="0">
+          <a:scrgbClr r="0" g="0" b="0"/>
+        </a:fillRef>
+        <a:effectRef idx="0">
+          <a:scrgbClr r="0" g="0" b="0"/>
+        </a:effectRef>
         <a:fontRef idx="none"/>
       </a:style>
     </a:lnDef>
@@ -11944,7 +11991,7 @@
         </a:ln>
         <a:effectLst/>
       </a:spPr>
-      <a:bodyPr rot="0" spcFirstLastPara="1" vertOverflow="overflow" horzOverflow="overflow" vert="horz" wrap="square" lIns="45719" tIns="45719" rIns="45719" bIns="45719" numCol="1" spcCol="38100" rtlCol="0" anchor="t" upright="0">
+      <a:bodyPr rot="0" spcFirstLastPara="1" vertOverflow="overflow" horzOverflow="overflow" vert="horz" wrap="square" lIns="45719" tIns="45719" rIns="45719" bIns="45719" numCol="1" spcCol="38100" rtlCol="0" anchor="t">
         <a:spAutoFit/>
       </a:bodyPr>
       <a:lstStyle>
@@ -11963,7 +12010,7 @@
           <a:buFontTx/>
           <a:buNone/>
           <a:tabLst/>
-          <a:defRPr b="0" baseline="0" cap="none" i="0" spc="0" strike="noStrike" sz="1800" u="none" kumimoji="0" normalizeH="0">
+          <a:defRPr kumimoji="0" sz="1800" b="0" i="0" u="none" strike="noStrike" cap="none" spc="0" normalizeH="0" baseline="0">
             <a:ln>
               <a:noFill/>
             </a:ln>
@@ -11993,7 +12040,7 @@
           <a:buFontTx/>
           <a:buNone/>
           <a:tabLst/>
-          <a:defRPr b="0" baseline="0" cap="none" i="0" spc="0" strike="noStrike" sz="1800" u="none" kumimoji="0" normalizeH="0">
+          <a:defRPr kumimoji="0" sz="1800" b="0" i="0" u="none" strike="noStrike" cap="none" spc="0" normalizeH="0" baseline="0">
             <a:ln>
               <a:noFill/>
             </a:ln>
@@ -12019,7 +12066,7 @@
           <a:buFontTx/>
           <a:buNone/>
           <a:tabLst/>
-          <a:defRPr b="0" baseline="0" cap="none" i="0" spc="0" strike="noStrike" sz="1800" u="none" kumimoji="0" normalizeH="0">
+          <a:defRPr kumimoji="0" sz="1800" b="0" i="0" u="none" strike="noStrike" cap="none" spc="0" normalizeH="0" baseline="0">
             <a:ln>
               <a:noFill/>
             </a:ln>
@@ -12045,7 +12092,7 @@
           <a:buFontTx/>
           <a:buNone/>
           <a:tabLst/>
-          <a:defRPr b="0" baseline="0" cap="none" i="0" spc="0" strike="noStrike" sz="1800" u="none" kumimoji="0" normalizeH="0">
+          <a:defRPr kumimoji="0" sz="1800" b="0" i="0" u="none" strike="noStrike" cap="none" spc="0" normalizeH="0" baseline="0">
             <a:ln>
               <a:noFill/>
             </a:ln>
@@ -12071,7 +12118,7 @@
           <a:buFontTx/>
           <a:buNone/>
           <a:tabLst/>
-          <a:defRPr b="0" baseline="0" cap="none" i="0" spc="0" strike="noStrike" sz="1800" u="none" kumimoji="0" normalizeH="0">
+          <a:defRPr kumimoji="0" sz="1800" b="0" i="0" u="none" strike="noStrike" cap="none" spc="0" normalizeH="0" baseline="0">
             <a:ln>
               <a:noFill/>
             </a:ln>
@@ -12097,7 +12144,7 @@
           <a:buFontTx/>
           <a:buNone/>
           <a:tabLst/>
-          <a:defRPr b="0" baseline="0" cap="none" i="0" spc="0" strike="noStrike" sz="1800" u="none" kumimoji="0" normalizeH="0">
+          <a:defRPr kumimoji="0" sz="1800" b="0" i="0" u="none" strike="noStrike" cap="none" spc="0" normalizeH="0" baseline="0">
             <a:ln>
               <a:noFill/>
             </a:ln>
@@ -12123,7 +12170,7 @@
           <a:buFontTx/>
           <a:buNone/>
           <a:tabLst/>
-          <a:defRPr b="0" baseline="0" cap="none" i="0" spc="0" strike="noStrike" sz="1800" u="none" kumimoji="0" normalizeH="0">
+          <a:defRPr kumimoji="0" sz="1800" b="0" i="0" u="none" strike="noStrike" cap="none" spc="0" normalizeH="0" baseline="0">
             <a:ln>
               <a:noFill/>
             </a:ln>
@@ -12149,7 +12196,7 @@
           <a:buFontTx/>
           <a:buNone/>
           <a:tabLst/>
-          <a:defRPr b="0" baseline="0" cap="none" i="0" spc="0" strike="noStrike" sz="1800" u="none" kumimoji="0" normalizeH="0">
+          <a:defRPr kumimoji="0" sz="1800" b="0" i="0" u="none" strike="noStrike" cap="none" spc="0" normalizeH="0" baseline="0">
             <a:ln>
               <a:noFill/>
             </a:ln>
@@ -12175,7 +12222,7 @@
           <a:buFontTx/>
           <a:buNone/>
           <a:tabLst/>
-          <a:defRPr b="0" baseline="0" cap="none" i="0" spc="0" strike="noStrike" sz="1800" u="none" kumimoji="0" normalizeH="0">
+          <a:defRPr kumimoji="0" sz="1800" b="0" i="0" u="none" strike="noStrike" cap="none" spc="0" normalizeH="0" baseline="0">
             <a:ln>
               <a:noFill/>
             </a:ln>
@@ -12201,7 +12248,7 @@
           <a:buFontTx/>
           <a:buNone/>
           <a:tabLst/>
-          <a:defRPr b="0" baseline="0" cap="none" i="0" spc="0" strike="noStrike" sz="1800" u="none" kumimoji="0" normalizeH="0">
+          <a:defRPr kumimoji="0" sz="1800" b="0" i="0" u="none" strike="noStrike" cap="none" spc="0" normalizeH="0" baseline="0">
             <a:ln>
               <a:noFill/>
             </a:ln>
@@ -12214,12 +12261,19 @@
         </a:lvl9pPr>
       </a:lstStyle>
       <a:style>
-        <a:lnRef idx="0"/>
-        <a:fillRef idx="0"/>
-        <a:effectRef idx="0"/>
+        <a:lnRef idx="0">
+          <a:scrgbClr r="0" g="0" b="0"/>
+        </a:lnRef>
+        <a:fillRef idx="0">
+          <a:scrgbClr r="0" g="0" b="0"/>
+        </a:fillRef>
+        <a:effectRef idx="0">
+          <a:scrgbClr r="0" g="0" b="0"/>
+        </a:effectRef>
         <a:fontRef idx="none"/>
       </a:style>
     </a:txDef>
   </a:objectDefaults>
+  <a:extraClrSchemeLst/>
 </a:theme>
 </file>
</xml_diff>